<commit_message>
LVTN update report 2
</commit_message>
<xml_diff>
--- a/Slide.pptx
+++ b/Slide.pptx
@@ -6,29 +6,39 @@
     <p:sldMasterId id="2147483656" r:id="rId5"/>
   </p:sldMasterIdLst>
   <p:notesMasterIdLst>
-    <p:notesMasterId r:id="rId23"/>
+    <p:notesMasterId r:id="rId33"/>
   </p:notesMasterIdLst>
   <p:handoutMasterIdLst>
-    <p:handoutMasterId r:id="rId24"/>
+    <p:handoutMasterId r:id="rId34"/>
   </p:handoutMasterIdLst>
   <p:sldIdLst>
     <p:sldId id="256" r:id="rId6"/>
     <p:sldId id="395" r:id="rId7"/>
-    <p:sldId id="450" r:id="rId8"/>
-    <p:sldId id="451" r:id="rId9"/>
-    <p:sldId id="456" r:id="rId10"/>
-    <p:sldId id="457" r:id="rId11"/>
-    <p:sldId id="458" r:id="rId12"/>
-    <p:sldId id="452" r:id="rId13"/>
-    <p:sldId id="453" r:id="rId14"/>
-    <p:sldId id="454" r:id="rId15"/>
-    <p:sldId id="459" r:id="rId16"/>
-    <p:sldId id="460" r:id="rId17"/>
-    <p:sldId id="461" r:id="rId18"/>
-    <p:sldId id="462" r:id="rId19"/>
-    <p:sldId id="463" r:id="rId20"/>
-    <p:sldId id="455" r:id="rId21"/>
-    <p:sldId id="394" r:id="rId22"/>
+    <p:sldId id="468" r:id="rId8"/>
+    <p:sldId id="450" r:id="rId9"/>
+    <p:sldId id="451" r:id="rId10"/>
+    <p:sldId id="456" r:id="rId11"/>
+    <p:sldId id="469" r:id="rId12"/>
+    <p:sldId id="457" r:id="rId13"/>
+    <p:sldId id="458" r:id="rId14"/>
+    <p:sldId id="452" r:id="rId15"/>
+    <p:sldId id="453" r:id="rId16"/>
+    <p:sldId id="470" r:id="rId17"/>
+    <p:sldId id="473" r:id="rId18"/>
+    <p:sldId id="471" r:id="rId19"/>
+    <p:sldId id="454" r:id="rId20"/>
+    <p:sldId id="459" r:id="rId21"/>
+    <p:sldId id="460" r:id="rId22"/>
+    <p:sldId id="461" r:id="rId23"/>
+    <p:sldId id="462" r:id="rId24"/>
+    <p:sldId id="472" r:id="rId25"/>
+    <p:sldId id="464" r:id="rId26"/>
+    <p:sldId id="465" r:id="rId27"/>
+    <p:sldId id="466" r:id="rId28"/>
+    <p:sldId id="467" r:id="rId29"/>
+    <p:sldId id="463" r:id="rId30"/>
+    <p:sldId id="455" r:id="rId31"/>
+    <p:sldId id="394" r:id="rId32"/>
   </p:sldIdLst>
   <p:sldSz cx="9144000" cy="6858000" type="screen4x3"/>
   <p:notesSz cx="9866313" cy="6754813"/>
@@ -513,7 +523,7 @@
           <a:p>
             <a:fld id="{B3D2EA87-6173-4DFB-9754-C2DB0166339E}" type="datetimeFigureOut">
               <a:rPr lang="en-US" smtClean="0"/>
-              <a:t>12/15/2016</a:t>
+              <a:t>12/20/2016</a:t>
             </a:fld>
             <a:endParaRPr lang="en-US"/>
           </a:p>
@@ -1344,7 +1354,7 @@
           <a:p>
             <a:fld id="{D4A788E2-4662-42DA-AE6D-55C618CE61F8}" type="datetimeFigureOut">
               <a:rPr lang="en-US" smtClean="0"/>
-              <a:t>12/15/2016</a:t>
+              <a:t>12/20/2016</a:t>
             </a:fld>
             <a:endParaRPr lang="en-US"/>
           </a:p>
@@ -1514,7 +1524,7 @@
           <a:p>
             <a:fld id="{D4A788E2-4662-42DA-AE6D-55C618CE61F8}" type="datetimeFigureOut">
               <a:rPr lang="en-US" smtClean="0"/>
-              <a:t>12/15/2016</a:t>
+              <a:t>12/20/2016</a:t>
             </a:fld>
             <a:endParaRPr lang="en-US"/>
           </a:p>
@@ -1694,7 +1704,7 @@
           <a:p>
             <a:fld id="{D4A788E2-4662-42DA-AE6D-55C618CE61F8}" type="datetimeFigureOut">
               <a:rPr lang="en-US" smtClean="0"/>
-              <a:t>12/15/2016</a:t>
+              <a:t>12/20/2016</a:t>
             </a:fld>
             <a:endParaRPr lang="en-US"/>
           </a:p>
@@ -1886,7 +1896,7 @@
           <a:p>
             <a:fld id="{D4A788E2-4662-42DA-AE6D-55C618CE61F8}" type="datetimeFigureOut">
               <a:rPr lang="en-US" smtClean="0"/>
-              <a:t>12/15/2016</a:t>
+              <a:t>12/20/2016</a:t>
             </a:fld>
             <a:endParaRPr lang="en-US"/>
           </a:p>
@@ -2056,7 +2066,7 @@
           <a:p>
             <a:fld id="{D4A788E2-4662-42DA-AE6D-55C618CE61F8}" type="datetimeFigureOut">
               <a:rPr lang="en-US" smtClean="0"/>
-              <a:t>12/15/2016</a:t>
+              <a:t>12/20/2016</a:t>
             </a:fld>
             <a:endParaRPr lang="en-US"/>
           </a:p>
@@ -2302,7 +2312,7 @@
           <a:p>
             <a:fld id="{D4A788E2-4662-42DA-AE6D-55C618CE61F8}" type="datetimeFigureOut">
               <a:rPr lang="en-US" smtClean="0"/>
-              <a:t>12/15/2016</a:t>
+              <a:t>12/20/2016</a:t>
             </a:fld>
             <a:endParaRPr lang="en-US"/>
           </a:p>
@@ -2534,7 +2544,7 @@
           <a:p>
             <a:fld id="{D4A788E2-4662-42DA-AE6D-55C618CE61F8}" type="datetimeFigureOut">
               <a:rPr lang="en-US" smtClean="0"/>
-              <a:t>12/15/2016</a:t>
+              <a:t>12/20/2016</a:t>
             </a:fld>
             <a:endParaRPr lang="en-US"/>
           </a:p>
@@ -2901,7 +2911,7 @@
           <a:p>
             <a:fld id="{D4A788E2-4662-42DA-AE6D-55C618CE61F8}" type="datetimeFigureOut">
               <a:rPr lang="en-US" smtClean="0"/>
-              <a:t>12/15/2016</a:t>
+              <a:t>12/20/2016</a:t>
             </a:fld>
             <a:endParaRPr lang="en-US"/>
           </a:p>
@@ -3019,7 +3029,7 @@
           <a:p>
             <a:fld id="{D4A788E2-4662-42DA-AE6D-55C618CE61F8}" type="datetimeFigureOut">
               <a:rPr lang="en-US" smtClean="0"/>
-              <a:t>12/15/2016</a:t>
+              <a:t>12/20/2016</a:t>
             </a:fld>
             <a:endParaRPr lang="en-US"/>
           </a:p>
@@ -3114,7 +3124,7 @@
           <a:p>
             <a:fld id="{D4A788E2-4662-42DA-AE6D-55C618CE61F8}" type="datetimeFigureOut">
               <a:rPr lang="en-US" smtClean="0"/>
-              <a:t>12/15/2016</a:t>
+              <a:t>12/20/2016</a:t>
             </a:fld>
             <a:endParaRPr lang="en-US"/>
           </a:p>
@@ -3391,7 +3401,7 @@
           <a:p>
             <a:fld id="{D4A788E2-4662-42DA-AE6D-55C618CE61F8}" type="datetimeFigureOut">
               <a:rPr lang="en-US" smtClean="0"/>
-              <a:t>12/15/2016</a:t>
+              <a:t>12/20/2016</a:t>
             </a:fld>
             <a:endParaRPr lang="en-US"/>
           </a:p>
@@ -4015,7 +4025,7 @@
           <a:p>
             <a:fld id="{D4A788E2-4662-42DA-AE6D-55C618CE61F8}" type="datetimeFigureOut">
               <a:rPr lang="en-US" smtClean="0"/>
-              <a:t>12/15/2016</a:t>
+              <a:t>12/20/2016</a:t>
             </a:fld>
             <a:endParaRPr lang="en-US"/>
           </a:p>
@@ -4596,7 +4606,14 @@
               </a:br>
               <a:r>
                 <a:rPr lang="en-US" sz="4400" dirty="0" smtClean="0"/>
-                <a:t>XÁC THỰC TỪ XA.</a:t>
+                <a:t>XÁC THỰC TỪ XA SỬ DỤNG </a:t>
+              </a:r>
+              <a:br>
+                <a:rPr lang="en-US" sz="4400" dirty="0" smtClean="0"/>
+              </a:br>
+              <a:r>
+                <a:rPr lang="en-US" sz="4400" dirty="0" smtClean="0"/>
+                <a:t>ĐẶC TRƯNG SINH TRẮC.</a:t>
               </a:r>
             </a:p>
           </p:txBody>
@@ -4947,7 +4964,7 @@
               <a:pPr>
                 <a:defRPr/>
               </a:pPr>
-              <a:t>Thursday, December 15, 2016</a:t>
+              <a:t>Tuesday, December 20, 2016</a:t>
             </a:fld>
             <a:endParaRPr lang="en-US" dirty="0"/>
           </a:p>
@@ -5157,8 +5174,8 @@
         </p:nvSpPr>
         <p:spPr>
           <a:xfrm>
-            <a:off x="3525253" y="6024851"/>
-            <a:ext cx="5618747" cy="476250"/>
+            <a:off x="3525253" y="5422104"/>
+            <a:ext cx="5618747" cy="800384"/>
           </a:xfrm>
           <a:prstGeom prst="rect">
             <a:avLst/>
@@ -5300,6 +5317,15 @@
               <a:rPr lang="en-US" sz="2000" dirty="0" smtClean="0"/>
               <a:t>Giảng Viên HD:Th.S Nguyễn Thị Ái Thảo</a:t>
             </a:r>
+          </a:p>
+          <a:p>
+            <a:pPr>
+              <a:defRPr/>
+            </a:pPr>
+            <a:r>
+              <a:rPr lang="en-US" sz="2000" dirty="0" smtClean="0"/>
+              <a:t>Giảng viên PB:Th.s  Trương  Quỳnh  Chi</a:t>
+            </a:r>
             <a:endParaRPr lang="en-US" sz="2000" dirty="0"/>
           </a:p>
         </p:txBody>
@@ -5378,10 +5404,42 @@
           <a:lstStyle/>
           <a:p>
             <a:r>
-              <a:rPr lang="en-US" sz="2400" dirty="0" smtClean="0"/>
-              <a:t>Như trên hình 3 đã nói rất rõ ý tưởng. Lúc enrollment server sẽ lưu sinh trắc của người dùng. Trong lúc xác thực người dùng sẽ truyền khóa K đến server để xác thực, nhưng nếu truyền khóa K thì rất dễ bị kẻ xấu lấy hoặc thay đổi, chính vì vậy nên trước khi truyền chúng ta sẽ kết hợp với sinh trắc của người dùng thông qua phép kết hợp đặc biệt để tạo thành BiometricBlock, cái này sẽ gửi lên server và server sẽ kiểm tra nếu mẫu sinh trắc này có một sai số trong khoảng cho phép thì sẽ phục hồi lại giống như khóa K lúc gởi đến và đây là cũng một người còn không thì ngược lại.</a:t>
-            </a:r>
-            <a:endParaRPr lang="en-US" sz="2400" dirty="0"/>
+              <a:rPr lang="en-US" dirty="0" smtClean="0"/>
+              <a:t>Ý tưởng chính của phương pháp:</a:t>
+            </a:r>
+            <a:br>
+              <a:rPr lang="en-US" dirty="0" smtClean="0"/>
+            </a:br>
+            <a:r>
+              <a:rPr lang="en-US" dirty="0"/>
+              <a:t>Ánh xạ các vector đặc trưng </a:t>
+            </a:r>
+            <a:r>
+              <a:rPr lang="en-US" b="1" i="1" dirty="0"/>
+              <a:t>x</a:t>
+            </a:r>
+            <a:r>
+              <a:rPr lang="en-US" dirty="0"/>
+              <a:t> sang miền bỏa mật sử dụng ma trận </a:t>
+            </a:r>
+            <a:r>
+              <a:rPr lang="en-US" b="1" i="1" dirty="0"/>
+              <a:t>A: y = </a:t>
+            </a:r>
+            <a:r>
+              <a:rPr lang="en-US" b="1" i="1" dirty="0" smtClean="0"/>
+              <a:t>A.x</a:t>
+            </a:r>
+          </a:p>
+          <a:p>
+            <a:r>
+              <a:rPr lang="en-US" dirty="0" smtClean="0"/>
+              <a:t>Với ma trận trực giao A có dạng:</a:t>
+            </a:r>
+            <a:br>
+              <a:rPr lang="en-US" dirty="0" smtClean="0"/>
+            </a:br>
+            <a:endParaRPr lang="en-US" dirty="0"/>
           </a:p>
         </p:txBody>
       </p:sp>
@@ -5414,10 +5472,34 @@
           </a:p>
         </p:txBody>
       </p:sp>
+      <p:pic>
+        <p:nvPicPr>
+          <p:cNvPr id="7" name="Picture 6"/>
+          <p:cNvPicPr>
+            <a:picLocks noChangeAspect="1"/>
+          </p:cNvPicPr>
+          <p:nvPr/>
+        </p:nvPicPr>
+        <p:blipFill>
+          <a:blip r:embed="rId2"/>
+          <a:stretch>
+            <a:fillRect/>
+          </a:stretch>
+        </p:blipFill>
+        <p:spPr>
+          <a:xfrm>
+            <a:off x="1946097" y="3262801"/>
+            <a:ext cx="5265252" cy="2586670"/>
+          </a:xfrm>
+          <a:prstGeom prst="rect">
+            <a:avLst/>
+          </a:prstGeom>
+        </p:spPr>
+      </p:pic>
     </p:spTree>
     <p:extLst>
       <p:ext uri="{BB962C8B-B14F-4D97-AF65-F5344CB8AC3E}">
-        <p14:creationId xmlns:p14="http://schemas.microsoft.com/office/powerpoint/2010/main" val="716088418"/>
+        <p14:creationId xmlns:p14="http://schemas.microsoft.com/office/powerpoint/2010/main" val="1094092390"/>
       </p:ext>
     </p:extLst>
   </p:cSld>
@@ -5462,7 +5544,11 @@
           <a:bodyPr/>
           <a:lstStyle/>
           <a:p>
-            <a:endParaRPr lang="en-US"/>
+            <a:r>
+              <a:rPr lang="en-US" dirty="0" smtClean="0"/>
+              <a:t>Giới thiệu đề tài</a:t>
+            </a:r>
+            <a:endParaRPr lang="en-US" dirty="0"/>
           </a:p>
         </p:txBody>
       </p:sp>
@@ -5481,12 +5567,17 @@
           <a:bodyPr/>
           <a:lstStyle/>
           <a:p>
+            <a:pPr marL="514350" indent="-514350">
+              <a:buFont typeface="+mj-lt"/>
+              <a:buAutoNum type="arabicPeriod" startAt="2"/>
+            </a:pPr>
             <a:r>
               <a:rPr lang="en-US" dirty="0" smtClean="0"/>
-              <a:t>Hệ thống xác thực sử dụng fuzzy-commitment:</a:t>
-            </a:r>
-          </a:p>
-          <a:p>
+              <a:t>Fuzzycommitment: sử dụng sức mạnh của logic mờ để chuyển dữ liệu thành dạng an toàn trước khi truyền trên kênh.</a:t>
+            </a:r>
+            <a:br>
+              <a:rPr lang="en-US" dirty="0" smtClean="0"/>
+            </a:br>
             <a:endParaRPr lang="en-US" dirty="0"/>
           </a:p>
         </p:txBody>
@@ -5515,6 +5606,610 @@
                 <a:defRPr/>
               </a:pPr>
               <a:t>11</a:t>
+            </a:fld>
+            <a:endParaRPr lang="en-US"/>
+          </a:p>
+        </p:txBody>
+      </p:sp>
+      <p:pic>
+        <p:nvPicPr>
+          <p:cNvPr id="5" name="Picture 4"/>
+          <p:cNvPicPr>
+            <a:picLocks noChangeAspect="1"/>
+          </p:cNvPicPr>
+          <p:nvPr/>
+        </p:nvPicPr>
+        <p:blipFill>
+          <a:blip r:embed="rId2"/>
+          <a:stretch>
+            <a:fillRect/>
+          </a:stretch>
+        </p:blipFill>
+        <p:spPr>
+          <a:xfrm>
+            <a:off x="1085581" y="2628015"/>
+            <a:ext cx="6986283" cy="2786196"/>
+          </a:xfrm>
+          <a:prstGeom prst="rect">
+            <a:avLst/>
+          </a:prstGeom>
+        </p:spPr>
+      </p:pic>
+    </p:spTree>
+    <p:extLst>
+      <p:ext uri="{BB962C8B-B14F-4D97-AF65-F5344CB8AC3E}">
+        <p14:creationId xmlns:p14="http://schemas.microsoft.com/office/powerpoint/2010/main" val="689745981"/>
+      </p:ext>
+    </p:extLst>
+  </p:cSld>
+  <p:clrMapOvr>
+    <a:masterClrMapping/>
+  </p:clrMapOvr>
+  <p:transition spd="med">
+    <p:fade/>
+  </p:transition>
+</p:sld>
+</file>
+
+<file path=ppt/slides/slide12.xml><?xml version="1.0" encoding="utf-8"?>
+<p:sld xmlns:a="http://schemas.openxmlformats.org/drawingml/2006/main" xmlns:r="http://schemas.openxmlformats.org/officeDocument/2006/relationships" xmlns:p="http://schemas.openxmlformats.org/presentationml/2006/main">
+  <p:cSld>
+    <p:spTree>
+      <p:nvGrpSpPr>
+        <p:cNvPr id="1" name=""/>
+        <p:cNvGrpSpPr/>
+        <p:nvPr/>
+      </p:nvGrpSpPr>
+      <p:grpSpPr>
+        <a:xfrm>
+          <a:off x="0" y="0"/>
+          <a:ext cx="0" cy="0"/>
+          <a:chOff x="0" y="0"/>
+          <a:chExt cx="0" cy="0"/>
+        </a:xfrm>
+      </p:grpSpPr>
+      <p:sp>
+        <p:nvSpPr>
+          <p:cNvPr id="2" name="Title 1"/>
+          <p:cNvSpPr>
+            <a:spLocks noGrp="1"/>
+          </p:cNvSpPr>
+          <p:nvPr>
+            <p:ph type="title"/>
+          </p:nvPr>
+        </p:nvSpPr>
+        <p:spPr/>
+        <p:txBody>
+          <a:bodyPr/>
+          <a:lstStyle/>
+          <a:p>
+            <a:r>
+              <a:rPr lang="en-US" dirty="0" smtClean="0"/>
+              <a:t>Đặc điểm của fuzzy commitment</a:t>
+            </a:r>
+            <a:endParaRPr lang="en-US" dirty="0"/>
+          </a:p>
+        </p:txBody>
+      </p:sp>
+      <p:sp>
+        <p:nvSpPr>
+          <p:cNvPr id="3" name="Content Placeholder 2"/>
+          <p:cNvSpPr>
+            <a:spLocks noGrp="1"/>
+          </p:cNvSpPr>
+          <p:nvPr>
+            <p:ph idx="1"/>
+          </p:nvPr>
+        </p:nvSpPr>
+        <p:spPr/>
+        <p:txBody>
+          <a:bodyPr/>
+          <a:lstStyle/>
+          <a:p>
+            <a:r>
+              <a:rPr lang="en-US" dirty="0" smtClean="0"/>
+              <a:t>Biometric Cryptosystem</a:t>
+            </a:r>
+          </a:p>
+          <a:p>
+            <a:endParaRPr lang="en-US" dirty="0"/>
+          </a:p>
+        </p:txBody>
+      </p:sp>
+      <p:sp>
+        <p:nvSpPr>
+          <p:cNvPr id="4" name="Slide Number Placeholder 3"/>
+          <p:cNvSpPr>
+            <a:spLocks noGrp="1"/>
+          </p:cNvSpPr>
+          <p:nvPr>
+            <p:ph type="sldNum" sz="quarter" idx="12"/>
+          </p:nvPr>
+        </p:nvSpPr>
+        <p:spPr/>
+        <p:txBody>
+          <a:bodyPr/>
+          <a:lstStyle/>
+          <a:p>
+            <a:pPr>
+              <a:defRPr/>
+            </a:pPr>
+            <a:fld id="{486618C1-054C-4E1D-BC19-6E8A9BAB5F99}" type="slidenum">
+              <a:rPr lang="en-US" smtClean="0"/>
+              <a:pPr>
+                <a:defRPr/>
+              </a:pPr>
+              <a:t>12</a:t>
+            </a:fld>
+            <a:endParaRPr lang="en-US"/>
+          </a:p>
+        </p:txBody>
+      </p:sp>
+      <p:pic>
+        <p:nvPicPr>
+          <p:cNvPr id="6" name="Picture 5"/>
+          <p:cNvPicPr>
+            <a:picLocks noChangeAspect="1"/>
+          </p:cNvPicPr>
+          <p:nvPr/>
+        </p:nvPicPr>
+        <p:blipFill>
+          <a:blip r:embed="rId2">
+            <a:extLst>
+              <a:ext uri="{28A0092B-C50C-407E-A947-70E740481C1C}">
+                <a14:useLocalDpi xmlns:a14="http://schemas.microsoft.com/office/drawing/2010/main" val="0"/>
+              </a:ext>
+            </a:extLst>
+          </a:blip>
+          <a:stretch>
+            <a:fillRect/>
+          </a:stretch>
+        </p:blipFill>
+        <p:spPr>
+          <a:xfrm>
+            <a:off x="1347537" y="1922451"/>
+            <a:ext cx="6291065" cy="3287223"/>
+          </a:xfrm>
+          <a:prstGeom prst="rect">
+            <a:avLst/>
+          </a:prstGeom>
+        </p:spPr>
+      </p:pic>
+    </p:spTree>
+    <p:extLst>
+      <p:ext uri="{BB962C8B-B14F-4D97-AF65-F5344CB8AC3E}">
+        <p14:creationId xmlns:p14="http://schemas.microsoft.com/office/powerpoint/2010/main" val="4156123135"/>
+      </p:ext>
+    </p:extLst>
+  </p:cSld>
+  <p:clrMapOvr>
+    <a:masterClrMapping/>
+  </p:clrMapOvr>
+  <p:transition spd="med">
+    <p:fade/>
+  </p:transition>
+</p:sld>
+</file>
+
+<file path=ppt/slides/slide13.xml><?xml version="1.0" encoding="utf-8"?>
+<p:sld xmlns:a="http://schemas.openxmlformats.org/drawingml/2006/main" xmlns:r="http://schemas.openxmlformats.org/officeDocument/2006/relationships" xmlns:p="http://schemas.openxmlformats.org/presentationml/2006/main">
+  <p:cSld>
+    <p:spTree>
+      <p:nvGrpSpPr>
+        <p:cNvPr id="1" name=""/>
+        <p:cNvGrpSpPr/>
+        <p:nvPr/>
+      </p:nvGrpSpPr>
+      <p:grpSpPr>
+        <a:xfrm>
+          <a:off x="0" y="0"/>
+          <a:ext cx="0" cy="0"/>
+          <a:chOff x="0" y="0"/>
+          <a:chExt cx="0" cy="0"/>
+        </a:xfrm>
+      </p:grpSpPr>
+      <p:sp>
+        <p:nvSpPr>
+          <p:cNvPr id="2" name="Title 1"/>
+          <p:cNvSpPr>
+            <a:spLocks noGrp="1"/>
+          </p:cNvSpPr>
+          <p:nvPr>
+            <p:ph type="title"/>
+          </p:nvPr>
+        </p:nvSpPr>
+        <p:spPr/>
+        <p:txBody>
+          <a:bodyPr/>
+          <a:lstStyle/>
+          <a:p>
+            <a:r>
+              <a:rPr lang="en-US" dirty="0" smtClean="0"/>
+              <a:t>Sơ đồ ý tưởng fuzzy-commitment</a:t>
+            </a:r>
+            <a:endParaRPr lang="en-US" dirty="0"/>
+          </a:p>
+        </p:txBody>
+      </p:sp>
+      <p:pic>
+        <p:nvPicPr>
+          <p:cNvPr id="5" name="Content Placeholder 4"/>
+          <p:cNvPicPr>
+            <a:picLocks noGrp="1" noChangeAspect="1"/>
+          </p:cNvPicPr>
+          <p:nvPr>
+            <p:ph idx="1"/>
+          </p:nvPr>
+        </p:nvPicPr>
+        <p:blipFill>
+          <a:blip r:embed="rId2">
+            <a:extLst>
+              <a:ext uri="{28A0092B-C50C-407E-A947-70E740481C1C}">
+                <a14:useLocalDpi xmlns:a14="http://schemas.microsoft.com/office/drawing/2010/main" val="0"/>
+              </a:ext>
+            </a:extLst>
+          </a:blip>
+          <a:stretch>
+            <a:fillRect/>
+          </a:stretch>
+        </p:blipFill>
+        <p:spPr>
+          <a:xfrm>
+            <a:off x="407659" y="925423"/>
+            <a:ext cx="8399458" cy="5033052"/>
+          </a:xfrm>
+        </p:spPr>
+      </p:pic>
+      <p:sp>
+        <p:nvSpPr>
+          <p:cNvPr id="4" name="Slide Number Placeholder 3"/>
+          <p:cNvSpPr>
+            <a:spLocks noGrp="1"/>
+          </p:cNvSpPr>
+          <p:nvPr>
+            <p:ph type="sldNum" sz="quarter" idx="12"/>
+          </p:nvPr>
+        </p:nvSpPr>
+        <p:spPr/>
+        <p:txBody>
+          <a:bodyPr/>
+          <a:lstStyle/>
+          <a:p>
+            <a:pPr>
+              <a:defRPr/>
+            </a:pPr>
+            <a:fld id="{486618C1-054C-4E1D-BC19-6E8A9BAB5F99}" type="slidenum">
+              <a:rPr lang="en-US" smtClean="0"/>
+              <a:pPr>
+                <a:defRPr/>
+              </a:pPr>
+              <a:t>13</a:t>
+            </a:fld>
+            <a:endParaRPr lang="en-US"/>
+          </a:p>
+        </p:txBody>
+      </p:sp>
+    </p:spTree>
+    <p:extLst>
+      <p:ext uri="{BB962C8B-B14F-4D97-AF65-F5344CB8AC3E}">
+        <p14:creationId xmlns:p14="http://schemas.microsoft.com/office/powerpoint/2010/main" val="4023994372"/>
+      </p:ext>
+    </p:extLst>
+  </p:cSld>
+  <p:clrMapOvr>
+    <a:masterClrMapping/>
+  </p:clrMapOvr>
+  <p:transition spd="med">
+    <p:fade/>
+  </p:transition>
+</p:sld>
+</file>
+
+<file path=ppt/slides/slide14.xml><?xml version="1.0" encoding="utf-8"?>
+<p:sld xmlns:a="http://schemas.openxmlformats.org/drawingml/2006/main" xmlns:r="http://schemas.openxmlformats.org/officeDocument/2006/relationships" xmlns:p="http://schemas.openxmlformats.org/presentationml/2006/main">
+  <p:cSld>
+    <p:spTree>
+      <p:nvGrpSpPr>
+        <p:cNvPr id="1" name=""/>
+        <p:cNvGrpSpPr/>
+        <p:nvPr/>
+      </p:nvGrpSpPr>
+      <p:grpSpPr>
+        <a:xfrm>
+          <a:off x="0" y="0"/>
+          <a:ext cx="0" cy="0"/>
+          <a:chOff x="0" y="0"/>
+          <a:chExt cx="0" cy="0"/>
+        </a:xfrm>
+      </p:grpSpPr>
+      <p:sp>
+        <p:nvSpPr>
+          <p:cNvPr id="2" name="Title 1"/>
+          <p:cNvSpPr>
+            <a:spLocks noGrp="1"/>
+          </p:cNvSpPr>
+          <p:nvPr>
+            <p:ph type="title"/>
+          </p:nvPr>
+        </p:nvSpPr>
+        <p:spPr/>
+        <p:txBody>
+          <a:bodyPr/>
+          <a:lstStyle/>
+          <a:p>
+            <a:r>
+              <a:rPr lang="en-US" dirty="0" smtClean="0"/>
+              <a:t>Đặc điểm của fuzzy-commitment</a:t>
+            </a:r>
+            <a:endParaRPr lang="en-US" dirty="0"/>
+          </a:p>
+        </p:txBody>
+      </p:sp>
+      <p:sp>
+        <p:nvSpPr>
+          <p:cNvPr id="3" name="Content Placeholder 2"/>
+          <p:cNvSpPr>
+            <a:spLocks noGrp="1"/>
+          </p:cNvSpPr>
+          <p:nvPr>
+            <p:ph idx="1"/>
+          </p:nvPr>
+        </p:nvSpPr>
+        <p:spPr/>
+        <p:txBody>
+          <a:bodyPr/>
+          <a:lstStyle/>
+          <a:p>
+            <a:r>
+              <a:rPr lang="en-US" dirty="0" smtClean="0"/>
+              <a:t>Không thể lấy được khóa hay mẫu sinh trắc từ helper-data, và helper-data sẽ được public.</a:t>
+            </a:r>
+            <a:endParaRPr lang="en-US" dirty="0"/>
+          </a:p>
+        </p:txBody>
+      </p:sp>
+      <p:sp>
+        <p:nvSpPr>
+          <p:cNvPr id="4" name="Slide Number Placeholder 3"/>
+          <p:cNvSpPr>
+            <a:spLocks noGrp="1"/>
+          </p:cNvSpPr>
+          <p:nvPr>
+            <p:ph type="sldNum" sz="quarter" idx="12"/>
+          </p:nvPr>
+        </p:nvSpPr>
+        <p:spPr/>
+        <p:txBody>
+          <a:bodyPr/>
+          <a:lstStyle/>
+          <a:p>
+            <a:pPr>
+              <a:defRPr/>
+            </a:pPr>
+            <a:fld id="{486618C1-054C-4E1D-BC19-6E8A9BAB5F99}" type="slidenum">
+              <a:rPr lang="en-US" smtClean="0"/>
+              <a:pPr>
+                <a:defRPr/>
+              </a:pPr>
+              <a:t>14</a:t>
+            </a:fld>
+            <a:endParaRPr lang="en-US"/>
+          </a:p>
+        </p:txBody>
+      </p:sp>
+    </p:spTree>
+    <p:extLst>
+      <p:ext uri="{BB962C8B-B14F-4D97-AF65-F5344CB8AC3E}">
+        <p14:creationId xmlns:p14="http://schemas.microsoft.com/office/powerpoint/2010/main" val="1405415123"/>
+      </p:ext>
+    </p:extLst>
+  </p:cSld>
+  <p:clrMapOvr>
+    <a:masterClrMapping/>
+  </p:clrMapOvr>
+  <p:transition spd="med">
+    <p:fade/>
+  </p:transition>
+</p:sld>
+</file>
+
+<file path=ppt/slides/slide15.xml><?xml version="1.0" encoding="utf-8"?>
+<p:sld xmlns:a="http://schemas.openxmlformats.org/drawingml/2006/main" xmlns:r="http://schemas.openxmlformats.org/officeDocument/2006/relationships" xmlns:p="http://schemas.openxmlformats.org/presentationml/2006/main">
+  <p:cSld>
+    <p:spTree>
+      <p:nvGrpSpPr>
+        <p:cNvPr id="1" name=""/>
+        <p:cNvGrpSpPr/>
+        <p:nvPr/>
+      </p:nvGrpSpPr>
+      <p:grpSpPr>
+        <a:xfrm>
+          <a:off x="0" y="0"/>
+          <a:ext cx="0" cy="0"/>
+          <a:chOff x="0" y="0"/>
+          <a:chExt cx="0" cy="0"/>
+        </a:xfrm>
+      </p:grpSpPr>
+      <p:sp>
+        <p:nvSpPr>
+          <p:cNvPr id="2" name="Title 1"/>
+          <p:cNvSpPr>
+            <a:spLocks noGrp="1"/>
+          </p:cNvSpPr>
+          <p:nvPr>
+            <p:ph type="title"/>
+          </p:nvPr>
+        </p:nvSpPr>
+        <p:spPr/>
+        <p:txBody>
+          <a:bodyPr/>
+          <a:lstStyle/>
+          <a:p>
+            <a:r>
+              <a:rPr lang="en-US" dirty="0" smtClean="0"/>
+              <a:t>Giới thiệu đề tài</a:t>
+            </a:r>
+            <a:endParaRPr lang="en-US" dirty="0"/>
+          </a:p>
+        </p:txBody>
+      </p:sp>
+      <p:sp>
+        <p:nvSpPr>
+          <p:cNvPr id="3" name="Content Placeholder 2"/>
+          <p:cNvSpPr>
+            <a:spLocks noGrp="1"/>
+          </p:cNvSpPr>
+          <p:nvPr>
+            <p:ph idx="1"/>
+          </p:nvPr>
+        </p:nvSpPr>
+        <p:spPr/>
+        <p:txBody>
+          <a:bodyPr/>
+          <a:lstStyle/>
+          <a:p>
+            <a:r>
+              <a:rPr lang="en-US" sz="2400" dirty="0" smtClean="0"/>
+              <a:t>Như trên hình 3 đã nói rất rõ ý tưởng. Lúc enrollment server sẽ lưu sinh trắc của người dùng. Trong lúc xác thực người dùng sẽ truyền khóa K đến server để xác thực, nhưng nếu truyền khóa K thì rất dễ bị kẻ xấu lấy hoặc thay đổi, chính vì vậy nên trước khi truyền chúng ta sẽ kết hợp với sinh trắc của người dùng thông qua phép kết hợp đặc biệt để tạo thành BiometricBlock, cái này sẽ gửi lên server và server sẽ kiểm tra nếu mẫu sinh trắc này có một sai số trong khoảng cho phép thì sẽ phục hồi lại giống như khóa K lúc gởi đến và đây là cũng một người còn không thì ngược lại.</a:t>
+            </a:r>
+            <a:endParaRPr lang="en-US" sz="2400" dirty="0"/>
+          </a:p>
+        </p:txBody>
+      </p:sp>
+      <p:sp>
+        <p:nvSpPr>
+          <p:cNvPr id="4" name="Slide Number Placeholder 3"/>
+          <p:cNvSpPr>
+            <a:spLocks noGrp="1"/>
+          </p:cNvSpPr>
+          <p:nvPr>
+            <p:ph type="sldNum" sz="quarter" idx="12"/>
+          </p:nvPr>
+        </p:nvSpPr>
+        <p:spPr/>
+        <p:txBody>
+          <a:bodyPr/>
+          <a:lstStyle/>
+          <a:p>
+            <a:pPr>
+              <a:defRPr/>
+            </a:pPr>
+            <a:fld id="{486618C1-054C-4E1D-BC19-6E8A9BAB5F99}" type="slidenum">
+              <a:rPr lang="en-US" smtClean="0"/>
+              <a:pPr>
+                <a:defRPr/>
+              </a:pPr>
+              <a:t>15</a:t>
+            </a:fld>
+            <a:endParaRPr lang="en-US"/>
+          </a:p>
+        </p:txBody>
+      </p:sp>
+    </p:spTree>
+    <p:extLst>
+      <p:ext uri="{BB962C8B-B14F-4D97-AF65-F5344CB8AC3E}">
+        <p14:creationId xmlns:p14="http://schemas.microsoft.com/office/powerpoint/2010/main" val="716088418"/>
+      </p:ext>
+    </p:extLst>
+  </p:cSld>
+  <p:clrMapOvr>
+    <a:masterClrMapping/>
+  </p:clrMapOvr>
+  <p:transition spd="med">
+    <p:fade/>
+  </p:transition>
+</p:sld>
+</file>
+
+<file path=ppt/slides/slide16.xml><?xml version="1.0" encoding="utf-8"?>
+<p:sld xmlns:a="http://schemas.openxmlformats.org/drawingml/2006/main" xmlns:r="http://schemas.openxmlformats.org/officeDocument/2006/relationships" xmlns:p="http://schemas.openxmlformats.org/presentationml/2006/main">
+  <p:cSld>
+    <p:spTree>
+      <p:nvGrpSpPr>
+        <p:cNvPr id="1" name=""/>
+        <p:cNvGrpSpPr/>
+        <p:nvPr/>
+      </p:nvGrpSpPr>
+      <p:grpSpPr>
+        <a:xfrm>
+          <a:off x="0" y="0"/>
+          <a:ext cx="0" cy="0"/>
+          <a:chOff x="0" y="0"/>
+          <a:chExt cx="0" cy="0"/>
+        </a:xfrm>
+      </p:grpSpPr>
+      <p:sp>
+        <p:nvSpPr>
+          <p:cNvPr id="2" name="Title 1"/>
+          <p:cNvSpPr>
+            <a:spLocks noGrp="1"/>
+          </p:cNvSpPr>
+          <p:nvPr>
+            <p:ph type="title"/>
+          </p:nvPr>
+        </p:nvSpPr>
+        <p:spPr/>
+        <p:txBody>
+          <a:bodyPr/>
+          <a:lstStyle/>
+          <a:p>
+            <a:r>
+              <a:rPr lang="en-US" dirty="0" smtClean="0"/>
+              <a:t>Fuzzy-commitment</a:t>
+            </a:r>
+            <a:endParaRPr lang="en-US" dirty="0"/>
+          </a:p>
+        </p:txBody>
+      </p:sp>
+      <p:sp>
+        <p:nvSpPr>
+          <p:cNvPr id="3" name="Content Placeholder 2"/>
+          <p:cNvSpPr>
+            <a:spLocks noGrp="1"/>
+          </p:cNvSpPr>
+          <p:nvPr>
+            <p:ph idx="1"/>
+          </p:nvPr>
+        </p:nvSpPr>
+        <p:spPr/>
+        <p:txBody>
+          <a:bodyPr/>
+          <a:lstStyle/>
+          <a:p>
+            <a:r>
+              <a:rPr lang="en-US" dirty="0" smtClean="0"/>
+              <a:t>Hệ thống xác thực sử dụng fuzzy-commitment:</a:t>
+            </a:r>
+          </a:p>
+          <a:p>
+            <a:endParaRPr lang="en-US" dirty="0"/>
+          </a:p>
+        </p:txBody>
+      </p:sp>
+      <p:sp>
+        <p:nvSpPr>
+          <p:cNvPr id="4" name="Slide Number Placeholder 3"/>
+          <p:cNvSpPr>
+            <a:spLocks noGrp="1"/>
+          </p:cNvSpPr>
+          <p:nvPr>
+            <p:ph type="sldNum" sz="quarter" idx="12"/>
+          </p:nvPr>
+        </p:nvSpPr>
+        <p:spPr/>
+        <p:txBody>
+          <a:bodyPr/>
+          <a:lstStyle/>
+          <a:p>
+            <a:pPr>
+              <a:defRPr/>
+            </a:pPr>
+            <a:fld id="{486618C1-054C-4E1D-BC19-6E8A9BAB5F99}" type="slidenum">
+              <a:rPr lang="en-US" smtClean="0"/>
+              <a:pPr>
+                <a:defRPr/>
+              </a:pPr>
+              <a:t>16</a:t>
             </a:fld>
             <a:endParaRPr lang="en-US"/>
           </a:p>
@@ -5558,7 +6253,7 @@
 </p:sld>
 </file>
 
-<file path=ppt/slides/slide12.xml><?xml version="1.0" encoding="utf-8"?>
+<file path=ppt/slides/slide17.xml><?xml version="1.0" encoding="utf-8"?>
 <p:sld xmlns:a="http://schemas.openxmlformats.org/drawingml/2006/main" xmlns:r="http://schemas.openxmlformats.org/officeDocument/2006/relationships" xmlns:p="http://schemas.openxmlformats.org/presentationml/2006/main">
   <p:cSld>
     <p:spTree>
@@ -5646,7 +6341,7 @@
               <a:pPr>
                 <a:defRPr/>
               </a:pPr>
-              <a:t>12</a:t>
+              <a:t>17</a:t>
             </a:fld>
             <a:endParaRPr lang="en-US"/>
           </a:p>
@@ -5687,10 +6382,17 @@
   <p:transition spd="med">
     <p:fade/>
   </p:transition>
+  <p:timing>
+    <p:tnLst>
+      <p:par>
+        <p:cTn id="1" dur="indefinite" restart="never" nodeType="tmRoot"/>
+      </p:par>
+    </p:tnLst>
+  </p:timing>
 </p:sld>
 </file>
 
-<file path=ppt/slides/slide13.xml><?xml version="1.0" encoding="utf-8"?>
+<file path=ppt/slides/slide18.xml><?xml version="1.0" encoding="utf-8"?>
 <p:sld xmlns:a="http://schemas.openxmlformats.org/drawingml/2006/main" xmlns:r="http://schemas.openxmlformats.org/officeDocument/2006/relationships" xmlns:p="http://schemas.openxmlformats.org/presentationml/2006/main">
   <p:cSld>
     <p:spTree>
@@ -5778,7 +6480,7 @@
               <a:pPr>
                 <a:defRPr/>
               </a:pPr>
-              <a:t>13</a:t>
+              <a:t>18</a:t>
             </a:fld>
             <a:endParaRPr lang="en-US"/>
           </a:p>
@@ -5819,10 +6521,17 @@
   <p:transition spd="med">
     <p:fade/>
   </p:transition>
+  <p:timing>
+    <p:tnLst>
+      <p:par>
+        <p:cTn id="1" dur="indefinite" restart="never" nodeType="tmRoot"/>
+      </p:par>
+    </p:tnLst>
+  </p:timing>
 </p:sld>
 </file>
 
-<file path=ppt/slides/slide14.xml><?xml version="1.0" encoding="utf-8"?>
+<file path=ppt/slides/slide19.xml><?xml version="1.0" encoding="utf-8"?>
 <p:sld xmlns:a="http://schemas.openxmlformats.org/drawingml/2006/main" xmlns:r="http://schemas.openxmlformats.org/officeDocument/2006/relationships" xmlns:p="http://schemas.openxmlformats.org/presentationml/2006/main">
   <p:cSld>
     <p:spTree>
@@ -5935,7 +6644,7 @@
               <a:pPr>
                 <a:defRPr/>
               </a:pPr>
-              <a:t>14</a:t>
+              <a:t>19</a:t>
             </a:fld>
             <a:endParaRPr lang="en-US"/>
           </a:p>
@@ -5957,7 +6666,144 @@
 </p:sld>
 </file>
 
-<file path=ppt/slides/slide15.xml><?xml version="1.0" encoding="utf-8"?>
+<file path=ppt/slides/slide2.xml><?xml version="1.0" encoding="utf-8"?>
+<p:sld xmlns:a="http://schemas.openxmlformats.org/drawingml/2006/main" xmlns:r="http://schemas.openxmlformats.org/officeDocument/2006/relationships" xmlns:p="http://schemas.openxmlformats.org/presentationml/2006/main">
+  <p:cSld>
+    <p:bg>
+      <p:bgPr>
+        <a:solidFill>
+          <a:srgbClr val="F8F8F8"/>
+        </a:solidFill>
+        <a:effectLst/>
+      </p:bgPr>
+    </p:bg>
+    <p:spTree>
+      <p:nvGrpSpPr>
+        <p:cNvPr id="1" name=""/>
+        <p:cNvGrpSpPr/>
+        <p:nvPr/>
+      </p:nvGrpSpPr>
+      <p:grpSpPr>
+        <a:xfrm>
+          <a:off x="0" y="0"/>
+          <a:ext cx="0" cy="0"/>
+          <a:chOff x="0" y="0"/>
+          <a:chExt cx="0" cy="0"/>
+        </a:xfrm>
+      </p:grpSpPr>
+      <p:sp>
+        <p:nvSpPr>
+          <p:cNvPr id="2" name="Title 1"/>
+          <p:cNvSpPr>
+            <a:spLocks noGrp="1"/>
+          </p:cNvSpPr>
+          <p:nvPr>
+            <p:ph type="title"/>
+          </p:nvPr>
+        </p:nvSpPr>
+        <p:spPr/>
+        <p:txBody>
+          <a:bodyPr/>
+          <a:lstStyle/>
+          <a:p>
+            <a:r>
+              <a:rPr lang="en-US" sz="3000" dirty="0" smtClean="0"/>
+              <a:t>Giới thiệu đề tài</a:t>
+            </a:r>
+            <a:endParaRPr lang="en-US" sz="3000" dirty="0"/>
+          </a:p>
+        </p:txBody>
+      </p:sp>
+      <p:sp>
+        <p:nvSpPr>
+          <p:cNvPr id="3" name="Content Placeholder 2"/>
+          <p:cNvSpPr>
+            <a:spLocks noGrp="1"/>
+          </p:cNvSpPr>
+          <p:nvPr>
+            <p:ph idx="1"/>
+          </p:nvPr>
+        </p:nvSpPr>
+        <p:spPr/>
+        <p:txBody>
+          <a:bodyPr/>
+          <a:lstStyle/>
+          <a:p>
+            <a:r>
+              <a:rPr lang="en-US" dirty="0" smtClean="0"/>
+              <a:t>Sự lỗi thời của hệ thống xác thực cũ.</a:t>
+            </a:r>
+          </a:p>
+          <a:p>
+            <a:r>
+              <a:rPr lang="en-US" sz="2800" dirty="0" smtClean="0"/>
+              <a:t>Giới hạn từ phía người dùng.</a:t>
+            </a:r>
+          </a:p>
+          <a:p>
+            <a:r>
+              <a:rPr lang="en-US" dirty="0" smtClean="0"/>
+              <a:t>Chưa có hệ thống nào thực sự được đưa vào thực tiễn với quy mô lớn.</a:t>
+            </a:r>
+          </a:p>
+          <a:p>
+            <a:endParaRPr lang="en-US" sz="2800" dirty="0" smtClean="0"/>
+          </a:p>
+        </p:txBody>
+      </p:sp>
+      <p:sp>
+        <p:nvSpPr>
+          <p:cNvPr id="4" name="Slide Number Placeholder 3"/>
+          <p:cNvSpPr>
+            <a:spLocks noGrp="1"/>
+          </p:cNvSpPr>
+          <p:nvPr>
+            <p:ph type="sldNum" sz="quarter" idx="12"/>
+          </p:nvPr>
+        </p:nvSpPr>
+        <p:spPr/>
+        <p:txBody>
+          <a:bodyPr/>
+          <a:lstStyle/>
+          <a:p>
+            <a:pPr>
+              <a:defRPr/>
+            </a:pPr>
+            <a:fld id="{486618C1-054C-4E1D-BC19-6E8A9BAB5F99}" type="slidenum">
+              <a:rPr lang="en-US" smtClean="0"/>
+              <a:pPr>
+                <a:defRPr/>
+              </a:pPr>
+              <a:t>2</a:t>
+            </a:fld>
+            <a:endParaRPr lang="en-US"/>
+          </a:p>
+        </p:txBody>
+      </p:sp>
+    </p:spTree>
+    <p:extLst>
+      <p:ext uri="{BB962C8B-B14F-4D97-AF65-F5344CB8AC3E}">
+        <p14:creationId xmlns:p14="http://schemas.microsoft.com/office/powerpoint/2010/main" val="3603639932"/>
+      </p:ext>
+    </p:extLst>
+  </p:cSld>
+  <p:clrMapOvr>
+    <a:masterClrMapping/>
+  </p:clrMapOvr>
+  <p:transition spd="med">
+    <p:fade/>
+  </p:transition>
+  <p:timing>
+    <p:tnLst>
+      <p:par>
+        <p:cTn id="1" dur="indefinite" restart="never" nodeType="tmRoot"/>
+      </p:par>
+    </p:tnLst>
+  </p:timing>
+</p:sld>
+</file>
+
+<file path=ppt/slides/slide20.xml><?xml version="1.0" encoding="utf-8"?>
 <p:sld xmlns:a="http://schemas.openxmlformats.org/drawingml/2006/main" xmlns:r="http://schemas.openxmlformats.org/officeDocument/2006/relationships" xmlns:p="http://schemas.openxmlformats.org/presentationml/2006/main">
   <p:cSld>
     <p:spTree>
@@ -5991,7 +6837,48 @@
           <a:p>
             <a:r>
               <a:rPr lang="en-US" dirty="0" smtClean="0"/>
-              <a:t>Kiểm tra hệ thống</a:t>
+              <a:t>Đánh </a:t>
+            </a:r>
+            <a:r>
+              <a:rPr lang="en-US" dirty="0" smtClean="0"/>
+              <a:t>giá</a:t>
+            </a:r>
+            <a:r>
+              <a:rPr lang="en-US" dirty="0" smtClean="0"/>
+              <a:t> </a:t>
+            </a:r>
+            <a:r>
+              <a:rPr lang="en-US" dirty="0" smtClean="0"/>
+              <a:t>PCA</a:t>
+            </a:r>
+            <a:endParaRPr lang="en-US" dirty="0"/>
+          </a:p>
+        </p:txBody>
+      </p:sp>
+      <p:sp>
+        <p:nvSpPr>
+          <p:cNvPr id="3" name="Content Placeholder 2"/>
+          <p:cNvSpPr>
+            <a:spLocks noGrp="1"/>
+          </p:cNvSpPr>
+          <p:nvPr>
+            <p:ph idx="1"/>
+          </p:nvPr>
+        </p:nvSpPr>
+        <p:spPr/>
+        <p:txBody>
+          <a:bodyPr/>
+          <a:lstStyle/>
+          <a:p>
+            <a:r>
+              <a:rPr lang="en-US" dirty="0" smtClean="0"/>
+              <a:t>Là phần quan trọng nhất trước khi hoàn thiện hệ thống.</a:t>
+            </a:r>
+          </a:p>
+          <a:p>
+            <a:r>
+              <a:rPr lang="en-US" dirty="0" smtClean="0"/>
+              <a:t>Phương pháp này sử dụng độ lệch Euclidean distance giữa hai vector, liệu rằng nó có chấp nhận độ lệch mới được đề xuất trong luận văn này hay không?.(độ lệch giữa từng thành phần của vector sinh trắc).</a:t>
             </a:r>
             <a:endParaRPr lang="en-US" dirty="0"/>
           </a:p>
@@ -6020,7 +6907,553 @@
               <a:pPr>
                 <a:defRPr/>
               </a:pPr>
-              <a:t>15</a:t>
+              <a:t>20</a:t>
+            </a:fld>
+            <a:endParaRPr lang="en-US"/>
+          </a:p>
+        </p:txBody>
+      </p:sp>
+    </p:spTree>
+    <p:extLst>
+      <p:ext uri="{BB962C8B-B14F-4D97-AF65-F5344CB8AC3E}">
+        <p14:creationId xmlns:p14="http://schemas.microsoft.com/office/powerpoint/2010/main" val="910024692"/>
+      </p:ext>
+    </p:extLst>
+  </p:cSld>
+  <p:clrMapOvr>
+    <a:masterClrMapping/>
+  </p:clrMapOvr>
+  <p:transition spd="med">
+    <p:fade/>
+  </p:transition>
+</p:sld>
+</file>
+
+<file path=ppt/slides/slide21.xml><?xml version="1.0" encoding="utf-8"?>
+<p:sld xmlns:a="http://schemas.openxmlformats.org/drawingml/2006/main" xmlns:r="http://schemas.openxmlformats.org/officeDocument/2006/relationships" xmlns:p="http://schemas.openxmlformats.org/presentationml/2006/main">
+  <p:cSld>
+    <p:spTree>
+      <p:nvGrpSpPr>
+        <p:cNvPr id="1" name=""/>
+        <p:cNvGrpSpPr/>
+        <p:nvPr/>
+      </p:nvGrpSpPr>
+      <p:grpSpPr>
+        <a:xfrm>
+          <a:off x="0" y="0"/>
+          <a:ext cx="0" cy="0"/>
+          <a:chOff x="0" y="0"/>
+          <a:chExt cx="0" cy="0"/>
+        </a:xfrm>
+      </p:grpSpPr>
+      <p:sp>
+        <p:nvSpPr>
+          <p:cNvPr id="2" name="Title 1"/>
+          <p:cNvSpPr>
+            <a:spLocks noGrp="1"/>
+          </p:cNvSpPr>
+          <p:nvPr>
+            <p:ph type="title"/>
+          </p:nvPr>
+        </p:nvSpPr>
+        <p:spPr/>
+        <p:txBody>
+          <a:bodyPr/>
+          <a:lstStyle/>
+          <a:p>
+            <a:r>
+              <a:rPr lang="en-US" dirty="0" smtClean="0"/>
+              <a:t>Kiểm tra độ tương thích PCA</a:t>
+            </a:r>
+            <a:endParaRPr lang="en-US" dirty="0"/>
+          </a:p>
+        </p:txBody>
+      </p:sp>
+      <p:pic>
+        <p:nvPicPr>
+          <p:cNvPr id="5" name="Content Placeholder 4"/>
+          <p:cNvPicPr>
+            <a:picLocks noGrp="1" noChangeAspect="1"/>
+          </p:cNvPicPr>
+          <p:nvPr>
+            <p:ph idx="1"/>
+          </p:nvPr>
+        </p:nvPicPr>
+        <p:blipFill>
+          <a:blip r:embed="rId2">
+            <a:extLst>
+              <a:ext uri="{28A0092B-C50C-407E-A947-70E740481C1C}">
+                <a14:useLocalDpi xmlns:a14="http://schemas.microsoft.com/office/drawing/2010/main" val="0"/>
+              </a:ext>
+            </a:extLst>
+          </a:blip>
+          <a:stretch>
+            <a:fillRect/>
+          </a:stretch>
+        </p:blipFill>
+        <p:spPr>
+          <a:xfrm>
+            <a:off x="170457" y="1323474"/>
+            <a:ext cx="8758388" cy="4102767"/>
+          </a:xfrm>
+        </p:spPr>
+      </p:pic>
+      <p:sp>
+        <p:nvSpPr>
+          <p:cNvPr id="4" name="Slide Number Placeholder 3"/>
+          <p:cNvSpPr>
+            <a:spLocks noGrp="1"/>
+          </p:cNvSpPr>
+          <p:nvPr>
+            <p:ph type="sldNum" sz="quarter" idx="12"/>
+          </p:nvPr>
+        </p:nvSpPr>
+        <p:spPr/>
+        <p:txBody>
+          <a:bodyPr/>
+          <a:lstStyle/>
+          <a:p>
+            <a:pPr>
+              <a:defRPr/>
+            </a:pPr>
+            <a:fld id="{486618C1-054C-4E1D-BC19-6E8A9BAB5F99}" type="slidenum">
+              <a:rPr lang="en-US" smtClean="0"/>
+              <a:pPr>
+                <a:defRPr/>
+              </a:pPr>
+              <a:t>21</a:t>
+            </a:fld>
+            <a:endParaRPr lang="en-US"/>
+          </a:p>
+        </p:txBody>
+      </p:sp>
+    </p:spTree>
+    <p:extLst>
+      <p:ext uri="{BB962C8B-B14F-4D97-AF65-F5344CB8AC3E}">
+        <p14:creationId xmlns:p14="http://schemas.microsoft.com/office/powerpoint/2010/main" val="3708297768"/>
+      </p:ext>
+    </p:extLst>
+  </p:cSld>
+  <p:clrMapOvr>
+    <a:masterClrMapping/>
+  </p:clrMapOvr>
+  <p:transition spd="med">
+    <p:fade/>
+  </p:transition>
+</p:sld>
+</file>
+
+<file path=ppt/slides/slide22.xml><?xml version="1.0" encoding="utf-8"?>
+<p:sld xmlns:a="http://schemas.openxmlformats.org/drawingml/2006/main" xmlns:r="http://schemas.openxmlformats.org/officeDocument/2006/relationships" xmlns:p="http://schemas.openxmlformats.org/presentationml/2006/main">
+  <p:cSld>
+    <p:spTree>
+      <p:nvGrpSpPr>
+        <p:cNvPr id="1" name=""/>
+        <p:cNvGrpSpPr/>
+        <p:nvPr/>
+      </p:nvGrpSpPr>
+      <p:grpSpPr>
+        <a:xfrm>
+          <a:off x="0" y="0"/>
+          <a:ext cx="0" cy="0"/>
+          <a:chOff x="0" y="0"/>
+          <a:chExt cx="0" cy="0"/>
+        </a:xfrm>
+      </p:grpSpPr>
+      <p:sp>
+        <p:nvSpPr>
+          <p:cNvPr id="2" name="Title 1"/>
+          <p:cNvSpPr>
+            <a:spLocks noGrp="1"/>
+          </p:cNvSpPr>
+          <p:nvPr>
+            <p:ph type="title"/>
+          </p:nvPr>
+        </p:nvSpPr>
+        <p:spPr/>
+        <p:txBody>
+          <a:bodyPr/>
+          <a:lstStyle/>
+          <a:p>
+            <a:r>
+              <a:rPr lang="en-US" dirty="0" smtClean="0"/>
+              <a:t>Histogram PCA</a:t>
+            </a:r>
+            <a:endParaRPr lang="en-US" dirty="0"/>
+          </a:p>
+        </p:txBody>
+      </p:sp>
+      <p:pic>
+        <p:nvPicPr>
+          <p:cNvPr id="5" name="Content Placeholder 4"/>
+          <p:cNvPicPr>
+            <a:picLocks noGrp="1" noChangeAspect="1"/>
+          </p:cNvPicPr>
+          <p:nvPr>
+            <p:ph idx="1"/>
+          </p:nvPr>
+        </p:nvPicPr>
+        <p:blipFill>
+          <a:blip r:embed="rId2">
+            <a:extLst>
+              <a:ext uri="{28A0092B-C50C-407E-A947-70E740481C1C}">
+                <a14:useLocalDpi xmlns:a14="http://schemas.microsoft.com/office/drawing/2010/main" val="0"/>
+              </a:ext>
+            </a:extLst>
+          </a:blip>
+          <a:stretch>
+            <a:fillRect/>
+          </a:stretch>
+        </p:blipFill>
+        <p:spPr>
+          <a:xfrm>
+            <a:off x="154821" y="1443790"/>
+            <a:ext cx="8861128" cy="4150894"/>
+          </a:xfrm>
+        </p:spPr>
+      </p:pic>
+      <p:sp>
+        <p:nvSpPr>
+          <p:cNvPr id="4" name="Slide Number Placeholder 3"/>
+          <p:cNvSpPr>
+            <a:spLocks noGrp="1"/>
+          </p:cNvSpPr>
+          <p:nvPr>
+            <p:ph type="sldNum" sz="quarter" idx="12"/>
+          </p:nvPr>
+        </p:nvSpPr>
+        <p:spPr/>
+        <p:txBody>
+          <a:bodyPr/>
+          <a:lstStyle/>
+          <a:p>
+            <a:pPr>
+              <a:defRPr/>
+            </a:pPr>
+            <a:fld id="{486618C1-054C-4E1D-BC19-6E8A9BAB5F99}" type="slidenum">
+              <a:rPr lang="en-US" smtClean="0"/>
+              <a:pPr>
+                <a:defRPr/>
+              </a:pPr>
+              <a:t>22</a:t>
+            </a:fld>
+            <a:endParaRPr lang="en-US"/>
+          </a:p>
+        </p:txBody>
+      </p:sp>
+    </p:spTree>
+    <p:extLst>
+      <p:ext uri="{BB962C8B-B14F-4D97-AF65-F5344CB8AC3E}">
+        <p14:creationId xmlns:p14="http://schemas.microsoft.com/office/powerpoint/2010/main" val="2179442538"/>
+      </p:ext>
+    </p:extLst>
+  </p:cSld>
+  <p:clrMapOvr>
+    <a:masterClrMapping/>
+  </p:clrMapOvr>
+  <p:transition spd="med">
+    <p:fade/>
+  </p:transition>
+</p:sld>
+</file>
+
+<file path=ppt/slides/slide23.xml><?xml version="1.0" encoding="utf-8"?>
+<p:sld xmlns:a="http://schemas.openxmlformats.org/drawingml/2006/main" xmlns:r="http://schemas.openxmlformats.org/officeDocument/2006/relationships" xmlns:p="http://schemas.openxmlformats.org/presentationml/2006/main">
+  <p:cSld>
+    <p:spTree>
+      <p:nvGrpSpPr>
+        <p:cNvPr id="1" name=""/>
+        <p:cNvGrpSpPr/>
+        <p:nvPr/>
+      </p:nvGrpSpPr>
+      <p:grpSpPr>
+        <a:xfrm>
+          <a:off x="0" y="0"/>
+          <a:ext cx="0" cy="0"/>
+          <a:chOff x="0" y="0"/>
+          <a:chExt cx="0" cy="0"/>
+        </a:xfrm>
+      </p:grpSpPr>
+      <p:sp>
+        <p:nvSpPr>
+          <p:cNvPr id="2" name="Title 1"/>
+          <p:cNvSpPr>
+            <a:spLocks noGrp="1"/>
+          </p:cNvSpPr>
+          <p:nvPr>
+            <p:ph type="title"/>
+          </p:nvPr>
+        </p:nvSpPr>
+        <p:spPr>
+          <a:xfrm>
+            <a:off x="215153" y="126338"/>
+            <a:ext cx="8606118" cy="604198"/>
+          </a:xfrm>
+        </p:spPr>
+        <p:txBody>
+          <a:bodyPr/>
+          <a:lstStyle/>
+          <a:p>
+            <a:r>
+              <a:rPr lang="en-US" dirty="0" smtClean="0"/>
+              <a:t>Kiểm tra phương pháp trích xuất</a:t>
+            </a:r>
+            <a:endParaRPr lang="en-US" dirty="0"/>
+          </a:p>
+        </p:txBody>
+      </p:sp>
+      <p:pic>
+        <p:nvPicPr>
+          <p:cNvPr id="5" name="Content Placeholder 4"/>
+          <p:cNvPicPr>
+            <a:picLocks noGrp="1" noChangeAspect="1"/>
+          </p:cNvPicPr>
+          <p:nvPr>
+            <p:ph idx="1"/>
+          </p:nvPr>
+        </p:nvPicPr>
+        <p:blipFill>
+          <a:blip r:embed="rId2">
+            <a:extLst>
+              <a:ext uri="{28A0092B-C50C-407E-A947-70E740481C1C}">
+                <a14:useLocalDpi xmlns:a14="http://schemas.microsoft.com/office/drawing/2010/main" val="0"/>
+              </a:ext>
+            </a:extLst>
+          </a:blip>
+          <a:stretch>
+            <a:fillRect/>
+          </a:stretch>
+        </p:blipFill>
+        <p:spPr>
+          <a:xfrm>
+            <a:off x="128049" y="1472052"/>
+            <a:ext cx="8800796" cy="4122632"/>
+          </a:xfrm>
+        </p:spPr>
+      </p:pic>
+      <p:sp>
+        <p:nvSpPr>
+          <p:cNvPr id="4" name="Slide Number Placeholder 3"/>
+          <p:cNvSpPr>
+            <a:spLocks noGrp="1"/>
+          </p:cNvSpPr>
+          <p:nvPr>
+            <p:ph type="sldNum" sz="quarter" idx="12"/>
+          </p:nvPr>
+        </p:nvSpPr>
+        <p:spPr/>
+        <p:txBody>
+          <a:bodyPr/>
+          <a:lstStyle/>
+          <a:p>
+            <a:pPr>
+              <a:defRPr/>
+            </a:pPr>
+            <a:fld id="{486618C1-054C-4E1D-BC19-6E8A9BAB5F99}" type="slidenum">
+              <a:rPr lang="en-US" smtClean="0"/>
+              <a:pPr>
+                <a:defRPr/>
+              </a:pPr>
+              <a:t>23</a:t>
+            </a:fld>
+            <a:endParaRPr lang="en-US"/>
+          </a:p>
+        </p:txBody>
+      </p:sp>
+    </p:spTree>
+    <p:extLst>
+      <p:ext uri="{BB962C8B-B14F-4D97-AF65-F5344CB8AC3E}">
+        <p14:creationId xmlns:p14="http://schemas.microsoft.com/office/powerpoint/2010/main" val="482391247"/>
+      </p:ext>
+    </p:extLst>
+  </p:cSld>
+  <p:clrMapOvr>
+    <a:masterClrMapping/>
+  </p:clrMapOvr>
+  <p:transition spd="med">
+    <p:fade/>
+  </p:transition>
+</p:sld>
+</file>
+
+<file path=ppt/slides/slide24.xml><?xml version="1.0" encoding="utf-8"?>
+<p:sld xmlns:a="http://schemas.openxmlformats.org/drawingml/2006/main" xmlns:r="http://schemas.openxmlformats.org/officeDocument/2006/relationships" xmlns:p="http://schemas.openxmlformats.org/presentationml/2006/main">
+  <p:cSld>
+    <p:spTree>
+      <p:nvGrpSpPr>
+        <p:cNvPr id="1" name=""/>
+        <p:cNvGrpSpPr/>
+        <p:nvPr/>
+      </p:nvGrpSpPr>
+      <p:grpSpPr>
+        <a:xfrm>
+          <a:off x="0" y="0"/>
+          <a:ext cx="0" cy="0"/>
+          <a:chOff x="0" y="0"/>
+          <a:chExt cx="0" cy="0"/>
+        </a:xfrm>
+      </p:grpSpPr>
+      <p:sp>
+        <p:nvSpPr>
+          <p:cNvPr id="2" name="Title 1"/>
+          <p:cNvSpPr>
+            <a:spLocks noGrp="1"/>
+          </p:cNvSpPr>
+          <p:nvPr>
+            <p:ph type="title"/>
+          </p:nvPr>
+        </p:nvSpPr>
+        <p:spPr/>
+        <p:txBody>
+          <a:bodyPr/>
+          <a:lstStyle/>
+          <a:p>
+            <a:r>
+              <a:rPr lang="en-US" dirty="0" smtClean="0"/>
+              <a:t>Kiểm tra Non-invertible Transform</a:t>
+            </a:r>
+            <a:endParaRPr lang="en-US" dirty="0"/>
+          </a:p>
+        </p:txBody>
+      </p:sp>
+      <p:pic>
+        <p:nvPicPr>
+          <p:cNvPr id="5" name="Content Placeholder 4"/>
+          <p:cNvPicPr>
+            <a:picLocks noGrp="1" noChangeAspect="1"/>
+          </p:cNvPicPr>
+          <p:nvPr>
+            <p:ph idx="1"/>
+          </p:nvPr>
+        </p:nvPicPr>
+        <p:blipFill>
+          <a:blip r:embed="rId2">
+            <a:extLst>
+              <a:ext uri="{28A0092B-C50C-407E-A947-70E740481C1C}">
+                <a14:useLocalDpi xmlns:a14="http://schemas.microsoft.com/office/drawing/2010/main" val="0"/>
+              </a:ext>
+            </a:extLst>
+          </a:blip>
+          <a:stretch>
+            <a:fillRect/>
+          </a:stretch>
+        </p:blipFill>
+        <p:spPr>
+          <a:xfrm>
+            <a:off x="215153" y="1472051"/>
+            <a:ext cx="8713692" cy="4081829"/>
+          </a:xfrm>
+        </p:spPr>
+      </p:pic>
+      <p:sp>
+        <p:nvSpPr>
+          <p:cNvPr id="4" name="Slide Number Placeholder 3"/>
+          <p:cNvSpPr>
+            <a:spLocks noGrp="1"/>
+          </p:cNvSpPr>
+          <p:nvPr>
+            <p:ph type="sldNum" sz="quarter" idx="12"/>
+          </p:nvPr>
+        </p:nvSpPr>
+        <p:spPr/>
+        <p:txBody>
+          <a:bodyPr/>
+          <a:lstStyle/>
+          <a:p>
+            <a:pPr>
+              <a:defRPr/>
+            </a:pPr>
+            <a:fld id="{486618C1-054C-4E1D-BC19-6E8A9BAB5F99}" type="slidenum">
+              <a:rPr lang="en-US" smtClean="0"/>
+              <a:pPr>
+                <a:defRPr/>
+              </a:pPr>
+              <a:t>24</a:t>
+            </a:fld>
+            <a:endParaRPr lang="en-US"/>
+          </a:p>
+        </p:txBody>
+      </p:sp>
+    </p:spTree>
+    <p:extLst>
+      <p:ext uri="{BB962C8B-B14F-4D97-AF65-F5344CB8AC3E}">
+        <p14:creationId xmlns:p14="http://schemas.microsoft.com/office/powerpoint/2010/main" val="2457184408"/>
+      </p:ext>
+    </p:extLst>
+  </p:cSld>
+  <p:clrMapOvr>
+    <a:masterClrMapping/>
+  </p:clrMapOvr>
+  <p:transition spd="med">
+    <p:fade/>
+  </p:transition>
+</p:sld>
+</file>
+
+<file path=ppt/slides/slide25.xml><?xml version="1.0" encoding="utf-8"?>
+<p:sld xmlns:a="http://schemas.openxmlformats.org/drawingml/2006/main" xmlns:r="http://schemas.openxmlformats.org/officeDocument/2006/relationships" xmlns:p="http://schemas.openxmlformats.org/presentationml/2006/main">
+  <p:cSld>
+    <p:spTree>
+      <p:nvGrpSpPr>
+        <p:cNvPr id="1" name=""/>
+        <p:cNvGrpSpPr/>
+        <p:nvPr/>
+      </p:nvGrpSpPr>
+      <p:grpSpPr>
+        <a:xfrm>
+          <a:off x="0" y="0"/>
+          <a:ext cx="0" cy="0"/>
+          <a:chOff x="0" y="0"/>
+          <a:chExt cx="0" cy="0"/>
+        </a:xfrm>
+      </p:grpSpPr>
+      <p:sp>
+        <p:nvSpPr>
+          <p:cNvPr id="2" name="Title 1"/>
+          <p:cNvSpPr>
+            <a:spLocks noGrp="1"/>
+          </p:cNvSpPr>
+          <p:nvPr>
+            <p:ph type="title"/>
+          </p:nvPr>
+        </p:nvSpPr>
+        <p:spPr/>
+        <p:txBody>
+          <a:bodyPr/>
+          <a:lstStyle/>
+          <a:p>
+            <a:r>
+              <a:rPr lang="en-US" dirty="0" smtClean="0"/>
+              <a:t>Kiểm tra hệ thống</a:t>
+            </a:r>
+            <a:endParaRPr lang="en-US" dirty="0"/>
+          </a:p>
+        </p:txBody>
+      </p:sp>
+      <p:sp>
+        <p:nvSpPr>
+          <p:cNvPr id="4" name="Slide Number Placeholder 3"/>
+          <p:cNvSpPr>
+            <a:spLocks noGrp="1"/>
+          </p:cNvSpPr>
+          <p:nvPr>
+            <p:ph type="sldNum" sz="quarter" idx="12"/>
+          </p:nvPr>
+        </p:nvSpPr>
+        <p:spPr/>
+        <p:txBody>
+          <a:bodyPr/>
+          <a:lstStyle/>
+          <a:p>
+            <a:pPr>
+              <a:defRPr/>
+            </a:pPr>
+            <a:fld id="{486618C1-054C-4E1D-BC19-6E8A9BAB5F99}" type="slidenum">
+              <a:rPr lang="en-US" smtClean="0"/>
+              <a:pPr>
+                <a:defRPr/>
+              </a:pPr>
+              <a:t>25</a:t>
             </a:fld>
             <a:endParaRPr lang="en-US"/>
           </a:p>
@@ -6079,7 +7512,7 @@
 </p:sld>
 </file>
 
-<file path=ppt/slides/slide16.xml><?xml version="1.0" encoding="utf-8"?>
+<file path=ppt/slides/slide26.xml><?xml version="1.0" encoding="utf-8"?>
 <p:sld xmlns:a="http://schemas.openxmlformats.org/drawingml/2006/main" xmlns:r="http://schemas.openxmlformats.org/officeDocument/2006/relationships" xmlns:p="http://schemas.openxmlformats.org/presentationml/2006/main">
   <p:cSld>
     <p:spTree>
@@ -6171,7 +7604,7 @@
               <a:pPr>
                 <a:defRPr/>
               </a:pPr>
-              <a:t>16</a:t>
+              <a:t>26</a:t>
             </a:fld>
             <a:endParaRPr lang="en-US"/>
           </a:p>
@@ -6193,7 +7626,7 @@
 </p:sld>
 </file>
 
-<file path=ppt/slides/slide17.xml><?xml version="1.0" encoding="utf-8"?>
+<file path=ppt/slides/slide27.xml><?xml version="1.0" encoding="utf-8"?>
 <p:sld xmlns:a="http://schemas.openxmlformats.org/drawingml/2006/main" xmlns:r="http://schemas.openxmlformats.org/officeDocument/2006/relationships" xmlns:p="http://schemas.openxmlformats.org/presentationml/2006/main">
   <p:cSld>
     <p:spTree>
@@ -6554,159 +7987,13 @@
               <a:pPr>
                 <a:defRPr/>
               </a:pPr>
-              <a:t>17</a:t>
+              <a:t>27</a:t>
             </a:fld>
             <a:endParaRPr lang="en-US"/>
           </a:p>
         </p:txBody>
       </p:sp>
     </p:spTree>
-  </p:cSld>
-  <p:clrMapOvr>
-    <a:masterClrMapping/>
-  </p:clrMapOvr>
-  <p:transition spd="med">
-    <p:fade/>
-  </p:transition>
-  <p:timing>
-    <p:tnLst>
-      <p:par>
-        <p:cTn id="1" dur="indefinite" restart="never" nodeType="tmRoot"/>
-      </p:par>
-    </p:tnLst>
-  </p:timing>
-</p:sld>
-</file>
-
-<file path=ppt/slides/slide2.xml><?xml version="1.0" encoding="utf-8"?>
-<p:sld xmlns:a="http://schemas.openxmlformats.org/drawingml/2006/main" xmlns:r="http://schemas.openxmlformats.org/officeDocument/2006/relationships" xmlns:p="http://schemas.openxmlformats.org/presentationml/2006/main">
-  <p:cSld>
-    <p:bg>
-      <p:bgPr>
-        <a:solidFill>
-          <a:srgbClr val="F8F8F8"/>
-        </a:solidFill>
-        <a:effectLst/>
-      </p:bgPr>
-    </p:bg>
-    <p:spTree>
-      <p:nvGrpSpPr>
-        <p:cNvPr id="1" name=""/>
-        <p:cNvGrpSpPr/>
-        <p:nvPr/>
-      </p:nvGrpSpPr>
-      <p:grpSpPr>
-        <a:xfrm>
-          <a:off x="0" y="0"/>
-          <a:ext cx="0" cy="0"/>
-          <a:chOff x="0" y="0"/>
-          <a:chExt cx="0" cy="0"/>
-        </a:xfrm>
-      </p:grpSpPr>
-      <p:sp>
-        <p:nvSpPr>
-          <p:cNvPr id="2" name="Title 1"/>
-          <p:cNvSpPr>
-            <a:spLocks noGrp="1"/>
-          </p:cNvSpPr>
-          <p:nvPr>
-            <p:ph type="title"/>
-          </p:nvPr>
-        </p:nvSpPr>
-        <p:spPr/>
-        <p:txBody>
-          <a:bodyPr/>
-          <a:lstStyle/>
-          <a:p>
-            <a:r>
-              <a:rPr lang="en-US" sz="3000" dirty="0" smtClean="0"/>
-              <a:t>Giới thiệu đề tài</a:t>
-            </a:r>
-            <a:endParaRPr lang="en-US" sz="3000" dirty="0"/>
-          </a:p>
-        </p:txBody>
-      </p:sp>
-      <p:sp>
-        <p:nvSpPr>
-          <p:cNvPr id="3" name="Content Placeholder 2"/>
-          <p:cNvSpPr>
-            <a:spLocks noGrp="1"/>
-          </p:cNvSpPr>
-          <p:nvPr>
-            <p:ph idx="1"/>
-          </p:nvPr>
-        </p:nvSpPr>
-        <p:spPr/>
-        <p:txBody>
-          <a:bodyPr/>
-          <a:lstStyle/>
-          <a:p>
-            <a:pPr marL="0" indent="0">
-              <a:buNone/>
-            </a:pPr>
-            <a:r>
-              <a:rPr lang="en-US" dirty="0" smtClean="0"/>
-              <a:t>tìm hiểu mô hình xác thực từ xa sử dụng đặc trưng sinh trắc, phương pháp bảo vệ mẫu sinh trắc và bảo vệ trên đường truyền có bảo vệ đặc trưng sinh trắc. Giống với phương pháp sử dụng password thì mục đích cuối cùng là xây dựng hệ thống xác thực người dùng an toàn và hiệu quả, thì để giải quyết vấn đề này chúng ta cần giải quyết hai việc cơ bản:</a:t>
-            </a:r>
-          </a:p>
-          <a:p>
-            <a:pPr>
-              <a:buFont typeface="Arial" panose="020B0604020202020204" pitchFamily="34" charset="0"/>
-              <a:buChar char="•"/>
-            </a:pPr>
-            <a:r>
-              <a:rPr lang="en-US" sz="2800" dirty="0" smtClean="0"/>
-              <a:t>Làm sao bảo vệ mẫu sinh trắc lưu trên server.</a:t>
-            </a:r>
-          </a:p>
-          <a:p>
-            <a:pPr>
-              <a:buFont typeface="Arial" panose="020B0604020202020204" pitchFamily="34" charset="0"/>
-              <a:buChar char="•"/>
-            </a:pPr>
-            <a:r>
-              <a:rPr lang="en-US" dirty="0" smtClean="0"/>
-              <a:t>Làm sao bảo vệ sinh trắc trên đường truyền mạng.</a:t>
-            </a:r>
-            <a:endParaRPr lang="en-US" sz="2800" dirty="0" smtClean="0"/>
-          </a:p>
-        </p:txBody>
-      </p:sp>
-      <p:sp>
-        <p:nvSpPr>
-          <p:cNvPr id="4" name="Slide Number Placeholder 3"/>
-          <p:cNvSpPr>
-            <a:spLocks noGrp="1"/>
-          </p:cNvSpPr>
-          <p:nvPr>
-            <p:ph type="sldNum" sz="quarter" idx="12"/>
-          </p:nvPr>
-        </p:nvSpPr>
-        <p:spPr/>
-        <p:txBody>
-          <a:bodyPr/>
-          <a:lstStyle/>
-          <a:p>
-            <a:pPr>
-              <a:defRPr/>
-            </a:pPr>
-            <a:fld id="{486618C1-054C-4E1D-BC19-6E8A9BAB5F99}" type="slidenum">
-              <a:rPr lang="en-US" smtClean="0"/>
-              <a:pPr>
-                <a:defRPr/>
-              </a:pPr>
-              <a:t>2</a:t>
-            </a:fld>
-            <a:endParaRPr lang="en-US"/>
-          </a:p>
-        </p:txBody>
-      </p:sp>
-    </p:spTree>
-    <p:extLst>
-      <p:ext uri="{BB962C8B-B14F-4D97-AF65-F5344CB8AC3E}">
-        <p14:creationId xmlns:p14="http://schemas.microsoft.com/office/powerpoint/2010/main" val="3603639932"/>
-      </p:ext>
-    </p:extLst>
   </p:cSld>
   <p:clrMapOvr>
     <a:masterClrMapping/>
@@ -6758,6 +8045,144 @@
           <a:p>
             <a:r>
               <a:rPr lang="en-US" dirty="0" smtClean="0"/>
+              <a:t>Nội dung luận văn</a:t>
+            </a:r>
+            <a:endParaRPr lang="en-US" dirty="0"/>
+          </a:p>
+        </p:txBody>
+      </p:sp>
+      <p:sp>
+        <p:nvSpPr>
+          <p:cNvPr id="3" name="Content Placeholder 2"/>
+          <p:cNvSpPr>
+            <a:spLocks noGrp="1"/>
+          </p:cNvSpPr>
+          <p:nvPr>
+            <p:ph idx="1"/>
+          </p:nvPr>
+        </p:nvSpPr>
+        <p:spPr/>
+        <p:txBody>
+          <a:bodyPr/>
+          <a:lstStyle/>
+          <a:p>
+            <a:r>
+              <a:rPr lang="en-US" dirty="0" smtClean="0"/>
+              <a:t>Hiện thực giao thức được đề xuất</a:t>
+            </a:r>
+          </a:p>
+          <a:p>
+            <a:r>
+              <a:rPr lang="en-US" dirty="0" smtClean="0"/>
+              <a:t>Đọc hiểu hệ thống xác thực sinh trắc</a:t>
+            </a:r>
+          </a:p>
+          <a:p>
+            <a:r>
+              <a:rPr lang="en-US" dirty="0" smtClean="0"/>
+              <a:t>Đọc hiểu kĩ thuật bảo vệ sinh trắc: feature transform và fuzzy commitment</a:t>
+            </a:r>
+          </a:p>
+          <a:p>
+            <a:r>
+              <a:rPr lang="en-US" dirty="0" smtClean="0"/>
+              <a:t>Hiện thực hai kĩ thuật trên</a:t>
+            </a:r>
+          </a:p>
+          <a:p>
+            <a:r>
+              <a:rPr lang="en-US" dirty="0" smtClean="0"/>
+              <a:t>Nhúng hai kĩ thuật vào hệ thống xác thực từ xa có sử dụng đặc trưng sinh trắc</a:t>
+            </a:r>
+          </a:p>
+          <a:p>
+            <a:r>
+              <a:rPr lang="en-US" dirty="0" smtClean="0"/>
+              <a:t>Đánh giá hệ thống</a:t>
+            </a:r>
+            <a:endParaRPr lang="en-US" dirty="0"/>
+          </a:p>
+        </p:txBody>
+      </p:sp>
+      <p:sp>
+        <p:nvSpPr>
+          <p:cNvPr id="4" name="Slide Number Placeholder 3"/>
+          <p:cNvSpPr>
+            <a:spLocks noGrp="1"/>
+          </p:cNvSpPr>
+          <p:nvPr>
+            <p:ph type="sldNum" sz="quarter" idx="12"/>
+          </p:nvPr>
+        </p:nvSpPr>
+        <p:spPr/>
+        <p:txBody>
+          <a:bodyPr/>
+          <a:lstStyle/>
+          <a:p>
+            <a:pPr>
+              <a:defRPr/>
+            </a:pPr>
+            <a:fld id="{486618C1-054C-4E1D-BC19-6E8A9BAB5F99}" type="slidenum">
+              <a:rPr lang="en-US" smtClean="0"/>
+              <a:pPr>
+                <a:defRPr/>
+              </a:pPr>
+              <a:t>3</a:t>
+            </a:fld>
+            <a:endParaRPr lang="en-US"/>
+          </a:p>
+        </p:txBody>
+      </p:sp>
+    </p:spTree>
+    <p:extLst>
+      <p:ext uri="{BB962C8B-B14F-4D97-AF65-F5344CB8AC3E}">
+        <p14:creationId xmlns:p14="http://schemas.microsoft.com/office/powerpoint/2010/main" val="3849723430"/>
+      </p:ext>
+    </p:extLst>
+  </p:cSld>
+  <p:clrMapOvr>
+    <a:masterClrMapping/>
+  </p:clrMapOvr>
+  <p:transition spd="med">
+    <p:fade/>
+  </p:transition>
+</p:sld>
+</file>
+
+<file path=ppt/slides/slide4.xml><?xml version="1.0" encoding="utf-8"?>
+<p:sld xmlns:a="http://schemas.openxmlformats.org/drawingml/2006/main" xmlns:r="http://schemas.openxmlformats.org/officeDocument/2006/relationships" xmlns:p="http://schemas.openxmlformats.org/presentationml/2006/main">
+  <p:cSld>
+    <p:spTree>
+      <p:nvGrpSpPr>
+        <p:cNvPr id="1" name=""/>
+        <p:cNvGrpSpPr/>
+        <p:nvPr/>
+      </p:nvGrpSpPr>
+      <p:grpSpPr>
+        <a:xfrm>
+          <a:off x="0" y="0"/>
+          <a:ext cx="0" cy="0"/>
+          <a:chOff x="0" y="0"/>
+          <a:chExt cx="0" cy="0"/>
+        </a:xfrm>
+      </p:grpSpPr>
+      <p:sp>
+        <p:nvSpPr>
+          <p:cNvPr id="2" name="Title 1"/>
+          <p:cNvSpPr>
+            <a:spLocks noGrp="1"/>
+          </p:cNvSpPr>
+          <p:nvPr>
+            <p:ph type="title"/>
+          </p:nvPr>
+        </p:nvSpPr>
+        <p:spPr/>
+        <p:txBody>
+          <a:bodyPr/>
+          <a:lstStyle/>
+          <a:p>
+            <a:r>
+              <a:rPr lang="en-US" dirty="0" smtClean="0"/>
               <a:t>Đặc trưng sinh trắc là gì?</a:t>
             </a:r>
             <a:endParaRPr lang="en-US" dirty="0"/>
@@ -6818,7 +8243,7 @@
               <a:pPr>
                 <a:defRPr/>
               </a:pPr>
-              <a:t>3</a:t>
+              <a:t>4</a:t>
             </a:fld>
             <a:endParaRPr lang="en-US"/>
           </a:p>
@@ -6900,7 +8325,7 @@
 </p:sld>
 </file>
 
-<file path=ppt/slides/slide4.xml><?xml version="1.0" encoding="utf-8"?>
+<file path=ppt/slides/slide5.xml><?xml version="1.0" encoding="utf-8"?>
 <p:sld xmlns:a="http://schemas.openxmlformats.org/drawingml/2006/main" xmlns:r="http://schemas.openxmlformats.org/officeDocument/2006/relationships" xmlns:p="http://schemas.openxmlformats.org/presentationml/2006/main">
   <p:cSld>
     <p:spTree>
@@ -6963,7 +8388,7 @@
               <a:pPr>
                 <a:defRPr/>
               </a:pPr>
-              <a:t>4</a:t>
+              <a:t>5</a:t>
             </a:fld>
             <a:endParaRPr lang="en-US"/>
           </a:p>
@@ -7011,7 +8436,7 @@
 </p:sld>
 </file>
 
-<file path=ppt/slides/slide5.xml><?xml version="1.0" encoding="utf-8"?>
+<file path=ppt/slides/slide6.xml><?xml version="1.0" encoding="utf-8"?>
 <p:sld xmlns:a="http://schemas.openxmlformats.org/drawingml/2006/main" xmlns:r="http://schemas.openxmlformats.org/officeDocument/2006/relationships" xmlns:p="http://schemas.openxmlformats.org/presentationml/2006/main">
   <p:cSld>
     <p:spTree>
@@ -7074,7 +8499,7 @@
               <a:pPr>
                 <a:defRPr/>
               </a:pPr>
-              <a:t>5</a:t>
+              <a:t>6</a:t>
             </a:fld>
             <a:endParaRPr lang="en-US"/>
           </a:p>
@@ -7122,7 +8547,7 @@
 </p:sld>
 </file>
 
-<file path=ppt/slides/slide6.xml><?xml version="1.0" encoding="utf-8"?>
+<file path=ppt/slides/slide7.xml><?xml version="1.0" encoding="utf-8"?>
 <p:sld xmlns:a="http://schemas.openxmlformats.org/drawingml/2006/main" xmlns:r="http://schemas.openxmlformats.org/officeDocument/2006/relationships" xmlns:p="http://schemas.openxmlformats.org/presentationml/2006/main">
   <p:cSld>
     <p:spTree>
@@ -7154,6 +8579,10 @@
           <a:bodyPr/>
           <a:lstStyle/>
           <a:p>
+            <a:r>
+              <a:rPr lang="en-US" dirty="0" smtClean="0"/>
+              <a:t>Đặc tính của Non-invertible transform</a:t>
+            </a:r>
             <a:endParaRPr lang="en-US" dirty="0"/>
           </a:p>
         </p:txBody>
@@ -7175,7 +8604,20 @@
           <a:p>
             <a:r>
               <a:rPr lang="en-US" dirty="0" smtClean="0"/>
-              <a:t>Đây là phép biến đổi một chiều dựa vào hàm biến đổi F.</a:t>
+              <a:t>Homomorphic encryption.</a:t>
+            </a:r>
+            <a:br>
+              <a:rPr lang="en-US" dirty="0" smtClean="0"/>
+            </a:br>
+            <a:r>
+              <a:rPr lang="en-US" dirty="0" smtClean="0"/>
+              <a:t>T - T’ ~ F(T) - F(T’).</a:t>
+            </a:r>
+          </a:p>
+          <a:p>
+            <a:r>
+              <a:rPr lang="en-US" dirty="0" smtClean="0"/>
+              <a:t>One-way transfromations(hash)</a:t>
             </a:r>
           </a:p>
           <a:p>
@@ -7206,7 +8648,113 @@
               <a:pPr>
                 <a:defRPr/>
               </a:pPr>
-              <a:t>6</a:t>
+              <a:t>7</a:t>
+            </a:fld>
+            <a:endParaRPr lang="en-US"/>
+          </a:p>
+        </p:txBody>
+      </p:sp>
+    </p:spTree>
+    <p:extLst>
+      <p:ext uri="{BB962C8B-B14F-4D97-AF65-F5344CB8AC3E}">
+        <p14:creationId xmlns:p14="http://schemas.microsoft.com/office/powerpoint/2010/main" val="2895429003"/>
+      </p:ext>
+    </p:extLst>
+  </p:cSld>
+  <p:clrMapOvr>
+    <a:masterClrMapping/>
+  </p:clrMapOvr>
+  <p:transition spd="med">
+    <p:fade/>
+  </p:transition>
+</p:sld>
+</file>
+
+<file path=ppt/slides/slide8.xml><?xml version="1.0" encoding="utf-8"?>
+<p:sld xmlns:a="http://schemas.openxmlformats.org/drawingml/2006/main" xmlns:r="http://schemas.openxmlformats.org/officeDocument/2006/relationships" xmlns:p="http://schemas.openxmlformats.org/presentationml/2006/main">
+  <p:cSld>
+    <p:spTree>
+      <p:nvGrpSpPr>
+        <p:cNvPr id="1" name=""/>
+        <p:cNvGrpSpPr/>
+        <p:nvPr/>
+      </p:nvGrpSpPr>
+      <p:grpSpPr>
+        <a:xfrm>
+          <a:off x="0" y="0"/>
+          <a:ext cx="0" cy="0"/>
+          <a:chOff x="0" y="0"/>
+          <a:chExt cx="0" cy="0"/>
+        </a:xfrm>
+      </p:grpSpPr>
+      <p:sp>
+        <p:nvSpPr>
+          <p:cNvPr id="2" name="Title 1"/>
+          <p:cNvSpPr>
+            <a:spLocks noGrp="1"/>
+          </p:cNvSpPr>
+          <p:nvPr>
+            <p:ph type="title"/>
+          </p:nvPr>
+        </p:nvSpPr>
+        <p:spPr/>
+        <p:txBody>
+          <a:bodyPr/>
+          <a:lstStyle/>
+          <a:p>
+            <a:endParaRPr lang="en-US" dirty="0"/>
+          </a:p>
+        </p:txBody>
+      </p:sp>
+      <p:sp>
+        <p:nvSpPr>
+          <p:cNvPr id="3" name="Content Placeholder 2"/>
+          <p:cNvSpPr>
+            <a:spLocks noGrp="1"/>
+          </p:cNvSpPr>
+          <p:nvPr>
+            <p:ph idx="1"/>
+          </p:nvPr>
+        </p:nvSpPr>
+        <p:spPr/>
+        <p:txBody>
+          <a:bodyPr/>
+          <a:lstStyle/>
+          <a:p>
+            <a:r>
+              <a:rPr lang="en-US" dirty="0" smtClean="0"/>
+              <a:t>Đây là phép biến đổi một chiều dựa vào hàm biến đổi F.</a:t>
+            </a:r>
+          </a:p>
+          <a:p>
+            <a:endParaRPr lang="en-US" dirty="0"/>
+          </a:p>
+        </p:txBody>
+      </p:sp>
+      <p:sp>
+        <p:nvSpPr>
+          <p:cNvPr id="4" name="Slide Number Placeholder 3"/>
+          <p:cNvSpPr>
+            <a:spLocks noGrp="1"/>
+          </p:cNvSpPr>
+          <p:nvPr>
+            <p:ph type="sldNum" sz="quarter" idx="12"/>
+          </p:nvPr>
+        </p:nvSpPr>
+        <p:spPr/>
+        <p:txBody>
+          <a:bodyPr/>
+          <a:lstStyle/>
+          <a:p>
+            <a:pPr>
+              <a:defRPr/>
+            </a:pPr>
+            <a:fld id="{486618C1-054C-4E1D-BC19-6E8A9BAB5F99}" type="slidenum">
+              <a:rPr lang="en-US" smtClean="0"/>
+              <a:pPr>
+                <a:defRPr/>
+              </a:pPr>
+              <a:t>8</a:t>
             </a:fld>
             <a:endParaRPr lang="en-US"/>
           </a:p>
@@ -7250,274 +8798,6 @@
 </p:sld>
 </file>
 
-<file path=ppt/slides/slide7.xml><?xml version="1.0" encoding="utf-8"?>
-<p:sld xmlns:a="http://schemas.openxmlformats.org/drawingml/2006/main" xmlns:r="http://schemas.openxmlformats.org/officeDocument/2006/relationships" xmlns:p="http://schemas.openxmlformats.org/presentationml/2006/main">
-  <p:cSld>
-    <p:spTree>
-      <p:nvGrpSpPr>
-        <p:cNvPr id="1" name=""/>
-        <p:cNvGrpSpPr/>
-        <p:nvPr/>
-      </p:nvGrpSpPr>
-      <p:grpSpPr>
-        <a:xfrm>
-          <a:off x="0" y="0"/>
-          <a:ext cx="0" cy="0"/>
-          <a:chOff x="0" y="0"/>
-          <a:chExt cx="0" cy="0"/>
-        </a:xfrm>
-      </p:grpSpPr>
-      <p:sp>
-        <p:nvSpPr>
-          <p:cNvPr id="2" name="Title 1"/>
-          <p:cNvSpPr>
-            <a:spLocks noGrp="1"/>
-          </p:cNvSpPr>
-          <p:nvPr>
-            <p:ph type="title"/>
-          </p:nvPr>
-        </p:nvSpPr>
-        <p:spPr/>
-        <p:txBody>
-          <a:bodyPr/>
-          <a:lstStyle/>
-          <a:p>
-            <a:endParaRPr lang="en-US"/>
-          </a:p>
-        </p:txBody>
-      </p:sp>
-      <p:sp>
-        <p:nvSpPr>
-          <p:cNvPr id="3" name="Content Placeholder 2"/>
-          <p:cNvSpPr>
-            <a:spLocks noGrp="1"/>
-          </p:cNvSpPr>
-          <p:nvPr>
-            <p:ph idx="1"/>
-          </p:nvPr>
-        </p:nvSpPr>
-        <p:spPr/>
-        <p:txBody>
-          <a:bodyPr/>
-          <a:lstStyle/>
-          <a:p>
-            <a:r>
-              <a:rPr lang="en-US" dirty="0" smtClean="0"/>
-              <a:t>Cốt lõi của phép biến đổi này là phép nhân ma trận. Với công thức tổng quá là y = A.x với x là mẫu sinh trắc gôc, A là ma trận trực giao, y là kết quả sau khi biến đổi, với ma trận trực giao được sinh ra theo phương pháp His-ham Al-assam.</a:t>
-            </a:r>
-            <a:endParaRPr lang="en-US" dirty="0"/>
-          </a:p>
-        </p:txBody>
-      </p:sp>
-      <p:sp>
-        <p:nvSpPr>
-          <p:cNvPr id="4" name="Slide Number Placeholder 3"/>
-          <p:cNvSpPr>
-            <a:spLocks noGrp="1"/>
-          </p:cNvSpPr>
-          <p:nvPr>
-            <p:ph type="sldNum" sz="quarter" idx="12"/>
-          </p:nvPr>
-        </p:nvSpPr>
-        <p:spPr/>
-        <p:txBody>
-          <a:bodyPr/>
-          <a:lstStyle/>
-          <a:p>
-            <a:pPr>
-              <a:defRPr/>
-            </a:pPr>
-            <a:fld id="{486618C1-054C-4E1D-BC19-6E8A9BAB5F99}" type="slidenum">
-              <a:rPr lang="en-US" smtClean="0"/>
-              <a:pPr>
-                <a:defRPr/>
-              </a:pPr>
-              <a:t>7</a:t>
-            </a:fld>
-            <a:endParaRPr lang="en-US"/>
-          </a:p>
-        </p:txBody>
-      </p:sp>
-    </p:spTree>
-    <p:extLst>
-      <p:ext uri="{BB962C8B-B14F-4D97-AF65-F5344CB8AC3E}">
-        <p14:creationId xmlns:p14="http://schemas.microsoft.com/office/powerpoint/2010/main" val="298590175"/>
-      </p:ext>
-    </p:extLst>
-  </p:cSld>
-  <p:clrMapOvr>
-    <a:masterClrMapping/>
-  </p:clrMapOvr>
-  <p:transition spd="med">
-    <p:fade/>
-  </p:transition>
-</p:sld>
-</file>
-
-<file path=ppt/slides/slide8.xml><?xml version="1.0" encoding="utf-8"?>
-<p:sld xmlns:a="http://schemas.openxmlformats.org/drawingml/2006/main" xmlns:r="http://schemas.openxmlformats.org/officeDocument/2006/relationships" xmlns:p="http://schemas.openxmlformats.org/presentationml/2006/main">
-  <p:cSld>
-    <p:spTree>
-      <p:nvGrpSpPr>
-        <p:cNvPr id="1" name=""/>
-        <p:cNvGrpSpPr/>
-        <p:nvPr/>
-      </p:nvGrpSpPr>
-      <p:grpSpPr>
-        <a:xfrm>
-          <a:off x="0" y="0"/>
-          <a:ext cx="0" cy="0"/>
-          <a:chOff x="0" y="0"/>
-          <a:chExt cx="0" cy="0"/>
-        </a:xfrm>
-      </p:grpSpPr>
-      <p:sp>
-        <p:nvSpPr>
-          <p:cNvPr id="2" name="Title 1"/>
-          <p:cNvSpPr>
-            <a:spLocks noGrp="1"/>
-          </p:cNvSpPr>
-          <p:nvPr>
-            <p:ph type="title"/>
-          </p:nvPr>
-        </p:nvSpPr>
-        <p:spPr/>
-        <p:txBody>
-          <a:bodyPr/>
-          <a:lstStyle/>
-          <a:p>
-            <a:r>
-              <a:rPr lang="en-US" dirty="0" smtClean="0"/>
-              <a:t>Giới thiệu đề tài</a:t>
-            </a:r>
-            <a:endParaRPr lang="en-US" dirty="0"/>
-          </a:p>
-        </p:txBody>
-      </p:sp>
-      <p:sp>
-        <p:nvSpPr>
-          <p:cNvPr id="3" name="Content Placeholder 2"/>
-          <p:cNvSpPr>
-            <a:spLocks noGrp="1"/>
-          </p:cNvSpPr>
-          <p:nvPr>
-            <p:ph idx="1"/>
-          </p:nvPr>
-        </p:nvSpPr>
-        <p:spPr/>
-        <p:txBody>
-          <a:bodyPr/>
-          <a:lstStyle/>
-          <a:p>
-            <a:r>
-              <a:rPr lang="en-US" dirty="0" smtClean="0"/>
-              <a:t>Ý tưởng chính của phương pháp:</a:t>
-            </a:r>
-            <a:br>
-              <a:rPr lang="en-US" dirty="0" smtClean="0"/>
-            </a:br>
-            <a:r>
-              <a:rPr lang="en-US" dirty="0"/>
-              <a:t>Ánh xạ các vector đặc trưng </a:t>
-            </a:r>
-            <a:r>
-              <a:rPr lang="en-US" b="1" i="1" dirty="0"/>
-              <a:t>x</a:t>
-            </a:r>
-            <a:r>
-              <a:rPr lang="en-US" dirty="0"/>
-              <a:t> sang miền bỏa mật sử dụng ma trận </a:t>
-            </a:r>
-            <a:r>
-              <a:rPr lang="en-US" b="1" i="1" dirty="0"/>
-              <a:t>A: y = </a:t>
-            </a:r>
-            <a:r>
-              <a:rPr lang="en-US" b="1" i="1" dirty="0" smtClean="0"/>
-              <a:t>A.x</a:t>
-            </a:r>
-          </a:p>
-          <a:p>
-            <a:r>
-              <a:rPr lang="en-US" dirty="0" smtClean="0"/>
-              <a:t>Với ma trận trực giao A có dạng:</a:t>
-            </a:r>
-            <a:br>
-              <a:rPr lang="en-US" dirty="0" smtClean="0"/>
-            </a:br>
-            <a:endParaRPr lang="en-US" dirty="0"/>
-          </a:p>
-        </p:txBody>
-      </p:sp>
-      <p:sp>
-        <p:nvSpPr>
-          <p:cNvPr id="4" name="Slide Number Placeholder 3"/>
-          <p:cNvSpPr>
-            <a:spLocks noGrp="1"/>
-          </p:cNvSpPr>
-          <p:nvPr>
-            <p:ph type="sldNum" sz="quarter" idx="12"/>
-          </p:nvPr>
-        </p:nvSpPr>
-        <p:spPr/>
-        <p:txBody>
-          <a:bodyPr/>
-          <a:lstStyle/>
-          <a:p>
-            <a:pPr>
-              <a:defRPr/>
-            </a:pPr>
-            <a:fld id="{486618C1-054C-4E1D-BC19-6E8A9BAB5F99}" type="slidenum">
-              <a:rPr lang="en-US" smtClean="0"/>
-              <a:pPr>
-                <a:defRPr/>
-              </a:pPr>
-              <a:t>8</a:t>
-            </a:fld>
-            <a:endParaRPr lang="en-US"/>
-          </a:p>
-        </p:txBody>
-      </p:sp>
-      <p:pic>
-        <p:nvPicPr>
-          <p:cNvPr id="7" name="Picture 6"/>
-          <p:cNvPicPr>
-            <a:picLocks noChangeAspect="1"/>
-          </p:cNvPicPr>
-          <p:nvPr/>
-        </p:nvPicPr>
-        <p:blipFill>
-          <a:blip r:embed="rId2"/>
-          <a:stretch>
-            <a:fillRect/>
-          </a:stretch>
-        </p:blipFill>
-        <p:spPr>
-          <a:xfrm>
-            <a:off x="1946097" y="3262801"/>
-            <a:ext cx="5265252" cy="2586670"/>
-          </a:xfrm>
-          <a:prstGeom prst="rect">
-            <a:avLst/>
-          </a:prstGeom>
-        </p:spPr>
-      </p:pic>
-    </p:spTree>
-    <p:extLst>
-      <p:ext uri="{BB962C8B-B14F-4D97-AF65-F5344CB8AC3E}">
-        <p14:creationId xmlns:p14="http://schemas.microsoft.com/office/powerpoint/2010/main" val="1094092390"/>
-      </p:ext>
-    </p:extLst>
-  </p:cSld>
-  <p:clrMapOvr>
-    <a:masterClrMapping/>
-  </p:clrMapOvr>
-  <p:transition spd="med">
-    <p:fade/>
-  </p:transition>
-</p:sld>
-</file>
-
 <file path=ppt/slides/slide9.xml><?xml version="1.0" encoding="utf-8"?>
 <p:sld xmlns:a="http://schemas.openxmlformats.org/drawingml/2006/main" xmlns:r="http://schemas.openxmlformats.org/officeDocument/2006/relationships" xmlns:p="http://schemas.openxmlformats.org/presentationml/2006/main">
   <p:cSld>
@@ -7550,40 +8830,29 @@
           <a:bodyPr/>
           <a:lstStyle/>
           <a:p>
+            <a:endParaRPr lang="en-US"/>
+          </a:p>
+        </p:txBody>
+      </p:sp>
+      <p:sp>
+        <p:nvSpPr>
+          <p:cNvPr id="3" name="Content Placeholder 2"/>
+          <p:cNvSpPr>
+            <a:spLocks noGrp="1"/>
+          </p:cNvSpPr>
+          <p:nvPr>
+            <p:ph idx="1"/>
+          </p:nvPr>
+        </p:nvSpPr>
+        <p:spPr/>
+        <p:txBody>
+          <a:bodyPr/>
+          <a:lstStyle/>
+          <a:p>
             <a:r>
               <a:rPr lang="en-US" dirty="0" smtClean="0"/>
-              <a:t>Giới thiệu đề tài</a:t>
-            </a:r>
-            <a:endParaRPr lang="en-US" dirty="0"/>
-          </a:p>
-        </p:txBody>
-      </p:sp>
-      <p:sp>
-        <p:nvSpPr>
-          <p:cNvPr id="3" name="Content Placeholder 2"/>
-          <p:cNvSpPr>
-            <a:spLocks noGrp="1"/>
-          </p:cNvSpPr>
-          <p:nvPr>
-            <p:ph idx="1"/>
-          </p:nvPr>
-        </p:nvSpPr>
-        <p:spPr/>
-        <p:txBody>
-          <a:bodyPr/>
-          <a:lstStyle/>
-          <a:p>
-            <a:pPr marL="514350" indent="-514350">
-              <a:buFont typeface="+mj-lt"/>
-              <a:buAutoNum type="arabicPeriod" startAt="2"/>
-            </a:pPr>
-            <a:r>
-              <a:rPr lang="en-US" dirty="0" smtClean="0"/>
-              <a:t>Fuzzycommitment: sử dụng sức mạnh của logic mờ để chuyển dữ liệu thành dạng an toàn trước khi truyền trên kênh.</a:t>
-            </a:r>
-            <a:br>
-              <a:rPr lang="en-US" dirty="0" smtClean="0"/>
-            </a:br>
+              <a:t>Cốt lõi của phép biến đổi này là phép nhân ma trận. Với công thức tổng quá là y = A.x với x là mẫu sinh trắc gôc, A là ma trận trực giao, y là kết quả sau khi biến đổi, với ma trận trực giao được sinh ra theo phương pháp His-ham Al-assam.</a:t>
+            </a:r>
             <a:endParaRPr lang="en-US" dirty="0"/>
           </a:p>
         </p:txBody>
@@ -7617,34 +8886,10 @@
           </a:p>
         </p:txBody>
       </p:sp>
-      <p:pic>
-        <p:nvPicPr>
-          <p:cNvPr id="5" name="Picture 4"/>
-          <p:cNvPicPr>
-            <a:picLocks noChangeAspect="1"/>
-          </p:cNvPicPr>
-          <p:nvPr/>
-        </p:nvPicPr>
-        <p:blipFill>
-          <a:blip r:embed="rId2"/>
-          <a:stretch>
-            <a:fillRect/>
-          </a:stretch>
-        </p:blipFill>
-        <p:spPr>
-          <a:xfrm>
-            <a:off x="1085581" y="2628015"/>
-            <a:ext cx="6986283" cy="2786196"/>
-          </a:xfrm>
-          <a:prstGeom prst="rect">
-            <a:avLst/>
-          </a:prstGeom>
-        </p:spPr>
-      </p:pic>
     </p:spTree>
     <p:extLst>
       <p:ext uri="{BB962C8B-B14F-4D97-AF65-F5344CB8AC3E}">
-        <p14:creationId xmlns:p14="http://schemas.microsoft.com/office/powerpoint/2010/main" val="689745981"/>
+        <p14:creationId xmlns:p14="http://schemas.microsoft.com/office/powerpoint/2010/main" val="298590175"/>
       </p:ext>
     </p:extLst>
   </p:cSld>

</xml_diff>

<commit_message>
LVTN update report 10
</commit_message>
<xml_diff>
--- a/Slide.pptx
+++ b/Slide.pptx
@@ -6,39 +6,47 @@
     <p:sldMasterId id="2147483656" r:id="rId5"/>
   </p:sldMasterIdLst>
   <p:notesMasterIdLst>
-    <p:notesMasterId r:id="rId33"/>
+    <p:notesMasterId r:id="rId41"/>
   </p:notesMasterIdLst>
   <p:handoutMasterIdLst>
-    <p:handoutMasterId r:id="rId34"/>
+    <p:handoutMasterId r:id="rId42"/>
   </p:handoutMasterIdLst>
   <p:sldIdLst>
     <p:sldId id="256" r:id="rId6"/>
-    <p:sldId id="395" r:id="rId7"/>
-    <p:sldId id="468" r:id="rId8"/>
-    <p:sldId id="450" r:id="rId9"/>
-    <p:sldId id="451" r:id="rId10"/>
-    <p:sldId id="456" r:id="rId11"/>
-    <p:sldId id="469" r:id="rId12"/>
-    <p:sldId id="457" r:id="rId13"/>
-    <p:sldId id="458" r:id="rId14"/>
-    <p:sldId id="452" r:id="rId15"/>
-    <p:sldId id="453" r:id="rId16"/>
-    <p:sldId id="470" r:id="rId17"/>
-    <p:sldId id="473" r:id="rId18"/>
-    <p:sldId id="471" r:id="rId19"/>
-    <p:sldId id="454" r:id="rId20"/>
-    <p:sldId id="459" r:id="rId21"/>
-    <p:sldId id="460" r:id="rId22"/>
-    <p:sldId id="461" r:id="rId23"/>
-    <p:sldId id="462" r:id="rId24"/>
-    <p:sldId id="472" r:id="rId25"/>
-    <p:sldId id="464" r:id="rId26"/>
-    <p:sldId id="465" r:id="rId27"/>
-    <p:sldId id="466" r:id="rId28"/>
-    <p:sldId id="467" r:id="rId29"/>
-    <p:sldId id="463" r:id="rId30"/>
-    <p:sldId id="455" r:id="rId31"/>
-    <p:sldId id="394" r:id="rId32"/>
+    <p:sldId id="468" r:id="rId7"/>
+    <p:sldId id="481" r:id="rId8"/>
+    <p:sldId id="395" r:id="rId9"/>
+    <p:sldId id="482" r:id="rId10"/>
+    <p:sldId id="450" r:id="rId11"/>
+    <p:sldId id="474" r:id="rId12"/>
+    <p:sldId id="475" r:id="rId13"/>
+    <p:sldId id="476" r:id="rId14"/>
+    <p:sldId id="479" r:id="rId15"/>
+    <p:sldId id="477" r:id="rId16"/>
+    <p:sldId id="478" r:id="rId17"/>
+    <p:sldId id="483" r:id="rId18"/>
+    <p:sldId id="451" r:id="rId19"/>
+    <p:sldId id="456" r:id="rId20"/>
+    <p:sldId id="469" r:id="rId21"/>
+    <p:sldId id="457" r:id="rId22"/>
+    <p:sldId id="458" r:id="rId23"/>
+    <p:sldId id="452" r:id="rId24"/>
+    <p:sldId id="453" r:id="rId25"/>
+    <p:sldId id="470" r:id="rId26"/>
+    <p:sldId id="473" r:id="rId27"/>
+    <p:sldId id="459" r:id="rId28"/>
+    <p:sldId id="480" r:id="rId29"/>
+    <p:sldId id="460" r:id="rId30"/>
+    <p:sldId id="461" r:id="rId31"/>
+    <p:sldId id="462" r:id="rId32"/>
+    <p:sldId id="472" r:id="rId33"/>
+    <p:sldId id="464" r:id="rId34"/>
+    <p:sldId id="465" r:id="rId35"/>
+    <p:sldId id="466" r:id="rId36"/>
+    <p:sldId id="467" r:id="rId37"/>
+    <p:sldId id="463" r:id="rId38"/>
+    <p:sldId id="455" r:id="rId39"/>
+    <p:sldId id="394" r:id="rId40"/>
   </p:sldIdLst>
   <p:sldSz cx="9144000" cy="6858000" type="screen4x3"/>
   <p:notesSz cx="9866313" cy="6754813"/>
@@ -523,7 +531,7 @@
           <a:p>
             <a:fld id="{B3D2EA87-6173-4DFB-9754-C2DB0166339E}" type="datetimeFigureOut">
               <a:rPr lang="en-US" smtClean="0"/>
-              <a:t>12/20/2016</a:t>
+              <a:t>12/23/2016</a:t>
             </a:fld>
             <a:endParaRPr lang="en-US"/>
           </a:p>
@@ -1354,7 +1362,7 @@
           <a:p>
             <a:fld id="{D4A788E2-4662-42DA-AE6D-55C618CE61F8}" type="datetimeFigureOut">
               <a:rPr lang="en-US" smtClean="0"/>
-              <a:t>12/20/2016</a:t>
+              <a:t>12/23/2016</a:t>
             </a:fld>
             <a:endParaRPr lang="en-US"/>
           </a:p>
@@ -1524,7 +1532,7 @@
           <a:p>
             <a:fld id="{D4A788E2-4662-42DA-AE6D-55C618CE61F8}" type="datetimeFigureOut">
               <a:rPr lang="en-US" smtClean="0"/>
-              <a:t>12/20/2016</a:t>
+              <a:t>12/23/2016</a:t>
             </a:fld>
             <a:endParaRPr lang="en-US"/>
           </a:p>
@@ -1704,7 +1712,7 @@
           <a:p>
             <a:fld id="{D4A788E2-4662-42DA-AE6D-55C618CE61F8}" type="datetimeFigureOut">
               <a:rPr lang="en-US" smtClean="0"/>
-              <a:t>12/20/2016</a:t>
+              <a:t>12/23/2016</a:t>
             </a:fld>
             <a:endParaRPr lang="en-US"/>
           </a:p>
@@ -1896,7 +1904,7 @@
           <a:p>
             <a:fld id="{D4A788E2-4662-42DA-AE6D-55C618CE61F8}" type="datetimeFigureOut">
               <a:rPr lang="en-US" smtClean="0"/>
-              <a:t>12/20/2016</a:t>
+              <a:t>12/23/2016</a:t>
             </a:fld>
             <a:endParaRPr lang="en-US"/>
           </a:p>
@@ -2066,7 +2074,7 @@
           <a:p>
             <a:fld id="{D4A788E2-4662-42DA-AE6D-55C618CE61F8}" type="datetimeFigureOut">
               <a:rPr lang="en-US" smtClean="0"/>
-              <a:t>12/20/2016</a:t>
+              <a:t>12/23/2016</a:t>
             </a:fld>
             <a:endParaRPr lang="en-US"/>
           </a:p>
@@ -2312,7 +2320,7 @@
           <a:p>
             <a:fld id="{D4A788E2-4662-42DA-AE6D-55C618CE61F8}" type="datetimeFigureOut">
               <a:rPr lang="en-US" smtClean="0"/>
-              <a:t>12/20/2016</a:t>
+              <a:t>12/23/2016</a:t>
             </a:fld>
             <a:endParaRPr lang="en-US"/>
           </a:p>
@@ -2544,7 +2552,7 @@
           <a:p>
             <a:fld id="{D4A788E2-4662-42DA-AE6D-55C618CE61F8}" type="datetimeFigureOut">
               <a:rPr lang="en-US" smtClean="0"/>
-              <a:t>12/20/2016</a:t>
+              <a:t>12/23/2016</a:t>
             </a:fld>
             <a:endParaRPr lang="en-US"/>
           </a:p>
@@ -2911,7 +2919,7 @@
           <a:p>
             <a:fld id="{D4A788E2-4662-42DA-AE6D-55C618CE61F8}" type="datetimeFigureOut">
               <a:rPr lang="en-US" smtClean="0"/>
-              <a:t>12/20/2016</a:t>
+              <a:t>12/23/2016</a:t>
             </a:fld>
             <a:endParaRPr lang="en-US"/>
           </a:p>
@@ -3029,7 +3037,7 @@
           <a:p>
             <a:fld id="{D4A788E2-4662-42DA-AE6D-55C618CE61F8}" type="datetimeFigureOut">
               <a:rPr lang="en-US" smtClean="0"/>
-              <a:t>12/20/2016</a:t>
+              <a:t>12/23/2016</a:t>
             </a:fld>
             <a:endParaRPr lang="en-US"/>
           </a:p>
@@ -3124,7 +3132,7 @@
           <a:p>
             <a:fld id="{D4A788E2-4662-42DA-AE6D-55C618CE61F8}" type="datetimeFigureOut">
               <a:rPr lang="en-US" smtClean="0"/>
-              <a:t>12/20/2016</a:t>
+              <a:t>12/23/2016</a:t>
             </a:fld>
             <a:endParaRPr lang="en-US"/>
           </a:p>
@@ -3401,7 +3409,7 @@
           <a:p>
             <a:fld id="{D4A788E2-4662-42DA-AE6D-55C618CE61F8}" type="datetimeFigureOut">
               <a:rPr lang="en-US" smtClean="0"/>
-              <a:t>12/20/2016</a:t>
+              <a:t>12/23/2016</a:t>
             </a:fld>
             <a:endParaRPr lang="en-US"/>
           </a:p>
@@ -4025,7 +4033,7 @@
           <a:p>
             <a:fld id="{D4A788E2-4662-42DA-AE6D-55C618CE61F8}" type="datetimeFigureOut">
               <a:rPr lang="en-US" smtClean="0"/>
-              <a:t>12/20/2016</a:t>
+              <a:t>12/23/2016</a:t>
             </a:fld>
             <a:endParaRPr lang="en-US"/>
           </a:p>
@@ -4770,7 +4778,23 @@
             </a:pPr>
             <a:r>
               <a:rPr lang="en-US" sz="2000" dirty="0" smtClean="0"/>
-              <a:t>Nhóm thực hiện(1 người): Nguyễn Nam Tiệp</a:t>
+              <a:t>SV</a:t>
+            </a:r>
+            <a:r>
+              <a:rPr lang="en-US" sz="2000" dirty="0" smtClean="0"/>
+              <a:t> </a:t>
+            </a:r>
+            <a:r>
+              <a:rPr lang="en-US" sz="2000" dirty="0" smtClean="0"/>
+              <a:t>thực </a:t>
+            </a:r>
+            <a:r>
+              <a:rPr lang="en-US" sz="2000" dirty="0" smtClean="0"/>
+              <a:t>hiện: </a:t>
+            </a:r>
+            <a:r>
+              <a:rPr lang="en-US" sz="2000" dirty="0" smtClean="0"/>
+              <a:t>Nguyễn Nam Tiệp</a:t>
             </a:r>
             <a:endParaRPr lang="en-US" sz="2000" dirty="0"/>
           </a:p>
@@ -4964,7 +4988,7 @@
               <a:pPr>
                 <a:defRPr/>
               </a:pPr>
-              <a:t>Tuesday, December 20, 2016</a:t>
+              <a:t>Friday, December 23, 2016</a:t>
             </a:fld>
             <a:endParaRPr lang="en-US" dirty="0"/>
           </a:p>
@@ -5381,9 +5405,1421 @@
           <a:lstStyle/>
           <a:p>
             <a:r>
+              <a:rPr lang="en-US" dirty="0"/>
+              <a:t>Các loại tấn công</a:t>
+            </a:r>
+          </a:p>
+        </p:txBody>
+      </p:sp>
+      <p:sp>
+        <p:nvSpPr>
+          <p:cNvPr id="3" name="Content Placeholder 2"/>
+          <p:cNvSpPr>
+            <a:spLocks noGrp="1"/>
+          </p:cNvSpPr>
+          <p:nvPr>
+            <p:ph idx="1"/>
+          </p:nvPr>
+        </p:nvSpPr>
+        <p:spPr/>
+        <p:txBody>
+          <a:bodyPr/>
+          <a:lstStyle/>
+          <a:p>
+            <a:r>
+              <a:rPr lang="en-US" dirty="0" smtClean="0"/>
+              <a:t>Replay Attack</a:t>
+            </a:r>
+          </a:p>
+          <a:p>
+            <a:endParaRPr lang="en-US" dirty="0"/>
+          </a:p>
+        </p:txBody>
+      </p:sp>
+      <p:sp>
+        <p:nvSpPr>
+          <p:cNvPr id="4" name="Slide Number Placeholder 3"/>
+          <p:cNvSpPr>
+            <a:spLocks noGrp="1"/>
+          </p:cNvSpPr>
+          <p:nvPr>
+            <p:ph type="sldNum" sz="quarter" idx="12"/>
+          </p:nvPr>
+        </p:nvSpPr>
+        <p:spPr/>
+        <p:txBody>
+          <a:bodyPr/>
+          <a:lstStyle/>
+          <a:p>
+            <a:pPr>
+              <a:defRPr/>
+            </a:pPr>
+            <a:fld id="{486618C1-054C-4E1D-BC19-6E8A9BAB5F99}" type="slidenum">
+              <a:rPr lang="en-US" smtClean="0"/>
+              <a:pPr>
+                <a:defRPr/>
+              </a:pPr>
+              <a:t>10</a:t>
+            </a:fld>
+            <a:endParaRPr lang="en-US"/>
+          </a:p>
+        </p:txBody>
+      </p:sp>
+      <p:pic>
+        <p:nvPicPr>
+          <p:cNvPr id="5" name="Picture 4"/>
+          <p:cNvPicPr>
+            <a:picLocks noChangeAspect="1"/>
+          </p:cNvPicPr>
+          <p:nvPr/>
+        </p:nvPicPr>
+        <p:blipFill>
+          <a:blip r:embed="rId2">
+            <a:extLst>
+              <a:ext uri="{28A0092B-C50C-407E-A947-70E740481C1C}">
+                <a14:useLocalDpi xmlns:a14="http://schemas.microsoft.com/office/drawing/2010/main" val="0"/>
+              </a:ext>
+            </a:extLst>
+          </a:blip>
+          <a:stretch>
+            <a:fillRect/>
+          </a:stretch>
+        </p:blipFill>
+        <p:spPr>
+          <a:xfrm>
+            <a:off x="628888" y="1831238"/>
+            <a:ext cx="7899670" cy="3370336"/>
+          </a:xfrm>
+          <a:prstGeom prst="rect">
+            <a:avLst/>
+          </a:prstGeom>
+        </p:spPr>
+      </p:pic>
+    </p:spTree>
+    <p:extLst>
+      <p:ext uri="{BB962C8B-B14F-4D97-AF65-F5344CB8AC3E}">
+        <p14:creationId xmlns:p14="http://schemas.microsoft.com/office/powerpoint/2010/main" val="3105120380"/>
+      </p:ext>
+    </p:extLst>
+  </p:cSld>
+  <p:clrMapOvr>
+    <a:masterClrMapping/>
+  </p:clrMapOvr>
+  <p:transition spd="med">
+    <p:fade/>
+  </p:transition>
+</p:sld>
+</file>
+
+<file path=ppt/slides/slide11.xml><?xml version="1.0" encoding="utf-8"?>
+<p:sld xmlns:a="http://schemas.openxmlformats.org/drawingml/2006/main" xmlns:r="http://schemas.openxmlformats.org/officeDocument/2006/relationships" xmlns:p="http://schemas.openxmlformats.org/presentationml/2006/main">
+  <p:cSld>
+    <p:spTree>
+      <p:nvGrpSpPr>
+        <p:cNvPr id="1" name=""/>
+        <p:cNvGrpSpPr/>
+        <p:nvPr/>
+      </p:nvGrpSpPr>
+      <p:grpSpPr>
+        <a:xfrm>
+          <a:off x="0" y="0"/>
+          <a:ext cx="0" cy="0"/>
+          <a:chOff x="0" y="0"/>
+          <a:chExt cx="0" cy="0"/>
+        </a:xfrm>
+      </p:grpSpPr>
+      <p:sp>
+        <p:nvSpPr>
+          <p:cNvPr id="2" name="Title 1"/>
+          <p:cNvSpPr>
+            <a:spLocks noGrp="1"/>
+          </p:cNvSpPr>
+          <p:nvPr>
+            <p:ph type="title"/>
+          </p:nvPr>
+        </p:nvSpPr>
+        <p:spPr/>
+        <p:txBody>
+          <a:bodyPr/>
+          <a:lstStyle/>
+          <a:p>
+            <a:r>
+              <a:rPr lang="en-US" dirty="0"/>
+              <a:t>Các loại tấn công</a:t>
+            </a:r>
+          </a:p>
+        </p:txBody>
+      </p:sp>
+      <p:sp>
+        <p:nvSpPr>
+          <p:cNvPr id="3" name="Content Placeholder 2"/>
+          <p:cNvSpPr>
+            <a:spLocks noGrp="1"/>
+          </p:cNvSpPr>
+          <p:nvPr>
+            <p:ph idx="1"/>
+          </p:nvPr>
+        </p:nvSpPr>
+        <p:spPr/>
+        <p:txBody>
+          <a:bodyPr/>
+          <a:lstStyle/>
+          <a:p>
+            <a:r>
+              <a:rPr lang="en-US" dirty="0" smtClean="0"/>
+              <a:t>Main-in-the-midle attack</a:t>
+            </a:r>
+            <a:endParaRPr lang="en-US" dirty="0"/>
+          </a:p>
+        </p:txBody>
+      </p:sp>
+      <p:sp>
+        <p:nvSpPr>
+          <p:cNvPr id="4" name="Slide Number Placeholder 3"/>
+          <p:cNvSpPr>
+            <a:spLocks noGrp="1"/>
+          </p:cNvSpPr>
+          <p:nvPr>
+            <p:ph type="sldNum" sz="quarter" idx="12"/>
+          </p:nvPr>
+        </p:nvSpPr>
+        <p:spPr/>
+        <p:txBody>
+          <a:bodyPr/>
+          <a:lstStyle/>
+          <a:p>
+            <a:pPr>
+              <a:defRPr/>
+            </a:pPr>
+            <a:fld id="{486618C1-054C-4E1D-BC19-6E8A9BAB5F99}" type="slidenum">
+              <a:rPr lang="en-US" smtClean="0"/>
+              <a:pPr>
+                <a:defRPr/>
+              </a:pPr>
+              <a:t>11</a:t>
+            </a:fld>
+            <a:endParaRPr lang="en-US"/>
+          </a:p>
+        </p:txBody>
+      </p:sp>
+      <p:pic>
+        <p:nvPicPr>
+          <p:cNvPr id="5" name="Picture 4"/>
+          <p:cNvPicPr>
+            <a:picLocks noChangeAspect="1"/>
+          </p:cNvPicPr>
+          <p:nvPr/>
+        </p:nvPicPr>
+        <p:blipFill>
+          <a:blip r:embed="rId2">
+            <a:extLst>
+              <a:ext uri="{28A0092B-C50C-407E-A947-70E740481C1C}">
+                <a14:useLocalDpi xmlns:a14="http://schemas.microsoft.com/office/drawing/2010/main" val="0"/>
+              </a:ext>
+            </a:extLst>
+          </a:blip>
+          <a:stretch>
+            <a:fillRect/>
+          </a:stretch>
+        </p:blipFill>
+        <p:spPr>
+          <a:xfrm>
+            <a:off x="1105691" y="1849639"/>
+            <a:ext cx="6946064" cy="3516445"/>
+          </a:xfrm>
+          <a:prstGeom prst="rect">
+            <a:avLst/>
+          </a:prstGeom>
+        </p:spPr>
+      </p:pic>
+    </p:spTree>
+    <p:extLst>
+      <p:ext uri="{BB962C8B-B14F-4D97-AF65-F5344CB8AC3E}">
+        <p14:creationId xmlns:p14="http://schemas.microsoft.com/office/powerpoint/2010/main" val="1402644826"/>
+      </p:ext>
+    </p:extLst>
+  </p:cSld>
+  <p:clrMapOvr>
+    <a:masterClrMapping/>
+  </p:clrMapOvr>
+  <p:transition spd="med">
+    <p:fade/>
+  </p:transition>
+</p:sld>
+</file>
+
+<file path=ppt/slides/slide12.xml><?xml version="1.0" encoding="utf-8"?>
+<p:sld xmlns:a="http://schemas.openxmlformats.org/drawingml/2006/main" xmlns:r="http://schemas.openxmlformats.org/officeDocument/2006/relationships" xmlns:p="http://schemas.openxmlformats.org/presentationml/2006/main">
+  <p:cSld>
+    <p:spTree>
+      <p:nvGrpSpPr>
+        <p:cNvPr id="1" name=""/>
+        <p:cNvGrpSpPr/>
+        <p:nvPr/>
+      </p:nvGrpSpPr>
+      <p:grpSpPr>
+        <a:xfrm>
+          <a:off x="0" y="0"/>
+          <a:ext cx="0" cy="0"/>
+          <a:chOff x="0" y="0"/>
+          <a:chExt cx="0" cy="0"/>
+        </a:xfrm>
+      </p:grpSpPr>
+      <p:sp>
+        <p:nvSpPr>
+          <p:cNvPr id="2" name="Title 1"/>
+          <p:cNvSpPr>
+            <a:spLocks noGrp="1"/>
+          </p:cNvSpPr>
+          <p:nvPr>
+            <p:ph type="title"/>
+          </p:nvPr>
+        </p:nvSpPr>
+        <p:spPr/>
+        <p:txBody>
+          <a:bodyPr/>
+          <a:lstStyle/>
+          <a:p>
+            <a:r>
+              <a:rPr lang="en-US" dirty="0"/>
+              <a:t>Các loại tấn công</a:t>
+            </a:r>
+          </a:p>
+        </p:txBody>
+      </p:sp>
+      <p:sp>
+        <p:nvSpPr>
+          <p:cNvPr id="3" name="Content Placeholder 2"/>
+          <p:cNvSpPr>
+            <a:spLocks noGrp="1"/>
+          </p:cNvSpPr>
+          <p:nvPr>
+            <p:ph idx="1"/>
+          </p:nvPr>
+        </p:nvSpPr>
+        <p:spPr/>
+        <p:txBody>
+          <a:bodyPr/>
+          <a:lstStyle/>
+          <a:p>
+            <a:r>
+              <a:rPr lang="en-US" dirty="0" smtClean="0"/>
+              <a:t>Insider attack: là loại tấn công từ phía server, có thể do chủ đích của người quản trị(administrantor) hay máy chủ bị cài malicious.</a:t>
+            </a:r>
+          </a:p>
+          <a:p>
+            <a:endParaRPr lang="en-US" dirty="0"/>
+          </a:p>
+        </p:txBody>
+      </p:sp>
+      <p:sp>
+        <p:nvSpPr>
+          <p:cNvPr id="4" name="Slide Number Placeholder 3"/>
+          <p:cNvSpPr>
+            <a:spLocks noGrp="1"/>
+          </p:cNvSpPr>
+          <p:nvPr>
+            <p:ph type="sldNum" sz="quarter" idx="12"/>
+          </p:nvPr>
+        </p:nvSpPr>
+        <p:spPr/>
+        <p:txBody>
+          <a:bodyPr/>
+          <a:lstStyle/>
+          <a:p>
+            <a:pPr>
+              <a:defRPr/>
+            </a:pPr>
+            <a:fld id="{486618C1-054C-4E1D-BC19-6E8A9BAB5F99}" type="slidenum">
+              <a:rPr lang="en-US" smtClean="0"/>
+              <a:pPr>
+                <a:defRPr/>
+              </a:pPr>
+              <a:t>12</a:t>
+            </a:fld>
+            <a:endParaRPr lang="en-US"/>
+          </a:p>
+        </p:txBody>
+      </p:sp>
+      <p:pic>
+        <p:nvPicPr>
+          <p:cNvPr id="5" name="Picture 4"/>
+          <p:cNvPicPr>
+            <a:picLocks noChangeAspect="1"/>
+          </p:cNvPicPr>
+          <p:nvPr/>
+        </p:nvPicPr>
+        <p:blipFill>
+          <a:blip r:embed="rId2">
+            <a:extLst>
+              <a:ext uri="{28A0092B-C50C-407E-A947-70E740481C1C}">
+                <a14:useLocalDpi xmlns:a14="http://schemas.microsoft.com/office/drawing/2010/main" val="0"/>
+              </a:ext>
+            </a:extLst>
+          </a:blip>
+          <a:stretch>
+            <a:fillRect/>
+          </a:stretch>
+        </p:blipFill>
+        <p:spPr>
+          <a:xfrm>
+            <a:off x="5422142" y="2587709"/>
+            <a:ext cx="3506703" cy="3506703"/>
+          </a:xfrm>
+          <a:prstGeom prst="rect">
+            <a:avLst/>
+          </a:prstGeom>
+        </p:spPr>
+      </p:pic>
+    </p:spTree>
+    <p:extLst>
+      <p:ext uri="{BB962C8B-B14F-4D97-AF65-F5344CB8AC3E}">
+        <p14:creationId xmlns:p14="http://schemas.microsoft.com/office/powerpoint/2010/main" val="157293496"/>
+      </p:ext>
+    </p:extLst>
+  </p:cSld>
+  <p:clrMapOvr>
+    <a:masterClrMapping/>
+  </p:clrMapOvr>
+  <p:transition spd="med">
+    <p:fade/>
+  </p:transition>
+</p:sld>
+</file>
+
+<file path=ppt/slides/slide13.xml><?xml version="1.0" encoding="utf-8"?>
+<p:sld xmlns:a="http://schemas.openxmlformats.org/drawingml/2006/main" xmlns:r="http://schemas.openxmlformats.org/officeDocument/2006/relationships" xmlns:p="http://schemas.openxmlformats.org/presentationml/2006/main">
+  <p:cSld>
+    <p:spTree>
+      <p:nvGrpSpPr>
+        <p:cNvPr id="1" name=""/>
+        <p:cNvGrpSpPr/>
+        <p:nvPr/>
+      </p:nvGrpSpPr>
+      <p:grpSpPr>
+        <a:xfrm>
+          <a:off x="0" y="0"/>
+          <a:ext cx="0" cy="0"/>
+          <a:chOff x="0" y="0"/>
+          <a:chExt cx="0" cy="0"/>
+        </a:xfrm>
+      </p:grpSpPr>
+      <p:sp>
+        <p:nvSpPr>
+          <p:cNvPr id="2" name="Title 1"/>
+          <p:cNvSpPr>
+            <a:spLocks noGrp="1"/>
+          </p:cNvSpPr>
+          <p:nvPr>
+            <p:ph type="title"/>
+          </p:nvPr>
+        </p:nvSpPr>
+        <p:spPr/>
+        <p:txBody>
+          <a:bodyPr/>
+          <a:lstStyle/>
+          <a:p>
+            <a:r>
+              <a:rPr lang="en-US" dirty="0" smtClean="0"/>
+              <a:t>Nội </a:t>
+            </a:r>
+            <a:r>
+              <a:rPr lang="en-US" dirty="0" smtClean="0"/>
+              <a:t>dung</a:t>
+            </a:r>
+            <a:endParaRPr lang="en-US" dirty="0"/>
+          </a:p>
+        </p:txBody>
+      </p:sp>
+      <p:sp>
+        <p:nvSpPr>
+          <p:cNvPr id="3" name="Content Placeholder 2"/>
+          <p:cNvSpPr>
+            <a:spLocks noGrp="1"/>
+          </p:cNvSpPr>
+          <p:nvPr>
+            <p:ph idx="1"/>
+          </p:nvPr>
+        </p:nvSpPr>
+        <p:spPr/>
+        <p:txBody>
+          <a:bodyPr/>
+          <a:lstStyle/>
+          <a:p>
+            <a:r>
               <a:rPr lang="en-US" dirty="0" smtClean="0"/>
               <a:t>Giới thiệu đề tài</a:t>
             </a:r>
+            <a:endParaRPr lang="en-US" dirty="0" smtClean="0"/>
+          </a:p>
+          <a:p>
+            <a:r>
+              <a:rPr lang="en-US" dirty="0" smtClean="0"/>
+              <a:t>Sinh trắc</a:t>
+            </a:r>
+            <a:endParaRPr lang="en-US" dirty="0" smtClean="0"/>
+          </a:p>
+          <a:p>
+            <a:r>
+              <a:rPr lang="en-US" b="1" dirty="0" smtClean="0"/>
+              <a:t>Kĩ </a:t>
+            </a:r>
+            <a:r>
+              <a:rPr lang="en-US" b="1" dirty="0" smtClean="0"/>
+              <a:t>thuật bảo </a:t>
+            </a:r>
+            <a:r>
+              <a:rPr lang="en-US" b="1" dirty="0" smtClean="0"/>
+              <a:t>vệ mẫu sinh trắc</a:t>
+            </a:r>
+          </a:p>
+          <a:p>
+            <a:r>
+              <a:rPr lang="en-US" dirty="0" smtClean="0"/>
+              <a:t>Mô hình đề xuất</a:t>
+            </a:r>
+            <a:endParaRPr lang="en-US" dirty="0" smtClean="0"/>
+          </a:p>
+          <a:p>
+            <a:r>
+              <a:rPr lang="en-US" dirty="0" smtClean="0"/>
+              <a:t>Đánh </a:t>
+            </a:r>
+            <a:r>
+              <a:rPr lang="en-US" dirty="0" smtClean="0"/>
+              <a:t>giá</a:t>
+            </a:r>
+          </a:p>
+          <a:p>
+            <a:r>
+              <a:rPr lang="en-US" dirty="0" smtClean="0"/>
+              <a:t>Kết luận</a:t>
+            </a:r>
+            <a:endParaRPr lang="en-US" dirty="0"/>
+          </a:p>
+        </p:txBody>
+      </p:sp>
+      <p:sp>
+        <p:nvSpPr>
+          <p:cNvPr id="4" name="Slide Number Placeholder 3"/>
+          <p:cNvSpPr>
+            <a:spLocks noGrp="1"/>
+          </p:cNvSpPr>
+          <p:nvPr>
+            <p:ph type="sldNum" sz="quarter" idx="12"/>
+          </p:nvPr>
+        </p:nvSpPr>
+        <p:spPr/>
+        <p:txBody>
+          <a:bodyPr/>
+          <a:lstStyle/>
+          <a:p>
+            <a:pPr>
+              <a:defRPr/>
+            </a:pPr>
+            <a:fld id="{486618C1-054C-4E1D-BC19-6E8A9BAB5F99}" type="slidenum">
+              <a:rPr lang="en-US" smtClean="0"/>
+              <a:pPr>
+                <a:defRPr/>
+              </a:pPr>
+              <a:t>13</a:t>
+            </a:fld>
+            <a:endParaRPr lang="en-US"/>
+          </a:p>
+        </p:txBody>
+      </p:sp>
+    </p:spTree>
+    <p:extLst>
+      <p:ext uri="{BB962C8B-B14F-4D97-AF65-F5344CB8AC3E}">
+        <p14:creationId xmlns:p14="http://schemas.microsoft.com/office/powerpoint/2010/main" val="3193229624"/>
+      </p:ext>
+    </p:extLst>
+  </p:cSld>
+  <p:clrMapOvr>
+    <a:masterClrMapping/>
+  </p:clrMapOvr>
+  <p:transition spd="med">
+    <p:fade/>
+  </p:transition>
+  <p:timing>
+    <p:tnLst>
+      <p:par>
+        <p:cTn id="1" dur="indefinite" restart="never" nodeType="tmRoot"/>
+      </p:par>
+    </p:tnLst>
+  </p:timing>
+</p:sld>
+</file>
+
+<file path=ppt/slides/slide14.xml><?xml version="1.0" encoding="utf-8"?>
+<p:sld xmlns:a="http://schemas.openxmlformats.org/drawingml/2006/main" xmlns:r="http://schemas.openxmlformats.org/officeDocument/2006/relationships" xmlns:p="http://schemas.openxmlformats.org/presentationml/2006/main">
+  <p:cSld>
+    <p:spTree>
+      <p:nvGrpSpPr>
+        <p:cNvPr id="1" name=""/>
+        <p:cNvGrpSpPr/>
+        <p:nvPr/>
+      </p:nvGrpSpPr>
+      <p:grpSpPr>
+        <a:xfrm>
+          <a:off x="0" y="0"/>
+          <a:ext cx="0" cy="0"/>
+          <a:chOff x="0" y="0"/>
+          <a:chExt cx="0" cy="0"/>
+        </a:xfrm>
+      </p:grpSpPr>
+      <p:sp>
+        <p:nvSpPr>
+          <p:cNvPr id="2" name="Title 1"/>
+          <p:cNvSpPr>
+            <a:spLocks noGrp="1"/>
+          </p:cNvSpPr>
+          <p:nvPr>
+            <p:ph type="title"/>
+          </p:nvPr>
+        </p:nvSpPr>
+        <p:spPr/>
+        <p:txBody>
+          <a:bodyPr/>
+          <a:lstStyle/>
+          <a:p>
+            <a:r>
+              <a:rPr lang="en-US" dirty="0" smtClean="0"/>
+              <a:t>Phương pháp bảo vệ mẫu sinh trắc</a:t>
+            </a:r>
+            <a:endParaRPr lang="en-US" dirty="0"/>
+          </a:p>
+        </p:txBody>
+      </p:sp>
+      <p:sp>
+        <p:nvSpPr>
+          <p:cNvPr id="4" name="Slide Number Placeholder 3"/>
+          <p:cNvSpPr>
+            <a:spLocks noGrp="1"/>
+          </p:cNvSpPr>
+          <p:nvPr>
+            <p:ph type="sldNum" sz="quarter" idx="12"/>
+          </p:nvPr>
+        </p:nvSpPr>
+        <p:spPr/>
+        <p:txBody>
+          <a:bodyPr/>
+          <a:lstStyle/>
+          <a:p>
+            <a:pPr>
+              <a:defRPr/>
+            </a:pPr>
+            <a:fld id="{486618C1-054C-4E1D-BC19-6E8A9BAB5F99}" type="slidenum">
+              <a:rPr lang="en-US" smtClean="0"/>
+              <a:pPr>
+                <a:defRPr/>
+              </a:pPr>
+              <a:t>14</a:t>
+            </a:fld>
+            <a:endParaRPr lang="en-US"/>
+          </a:p>
+        </p:txBody>
+      </p:sp>
+      <p:pic>
+        <p:nvPicPr>
+          <p:cNvPr id="6" name="Content Placeholder 5"/>
+          <p:cNvPicPr>
+            <a:picLocks noGrp="1"/>
+          </p:cNvPicPr>
+          <p:nvPr>
+            <p:ph idx="1"/>
+          </p:nvPr>
+        </p:nvPicPr>
+        <p:blipFill>
+          <a:blip r:embed="rId2"/>
+          <a:stretch>
+            <a:fillRect/>
+          </a:stretch>
+        </p:blipFill>
+        <p:spPr>
+          <a:xfrm>
+            <a:off x="1154428" y="1634863"/>
+            <a:ext cx="6849431" cy="3762900"/>
+          </a:xfrm>
+          <a:prstGeom prst="rect">
+            <a:avLst/>
+          </a:prstGeom>
+        </p:spPr>
+      </p:pic>
+      <p:sp>
+        <p:nvSpPr>
+          <p:cNvPr id="5" name="Oval 4"/>
+          <p:cNvSpPr/>
+          <p:nvPr/>
+        </p:nvSpPr>
+        <p:spPr bwMode="auto">
+          <a:xfrm>
+            <a:off x="2683042" y="4211053"/>
+            <a:ext cx="1949116" cy="1186710"/>
+          </a:xfrm>
+          <a:prstGeom prst="ellipse">
+            <a:avLst/>
+          </a:prstGeom>
+          <a:noFill/>
+          <a:ln w="19050" cap="flat" cmpd="sng" algn="ctr">
+            <a:solidFill>
+              <a:srgbClr val="C00000"/>
+            </a:solidFill>
+            <a:prstDash val="solid"/>
+            <a:round/>
+            <a:headEnd type="none" w="med" len="med"/>
+            <a:tailEnd type="none" w="med" len="med"/>
+          </a:ln>
+          <a:effectLst/>
+        </p:spPr>
+        <p:txBody>
+          <a:bodyPr vert="horz" wrap="square" lIns="91440" tIns="45720" rIns="91440" bIns="45720" numCol="1" rtlCol="0" anchor="t" anchorCtr="0" compatLnSpc="1">
+            <a:prstTxWarp prst="textNoShape">
+              <a:avLst/>
+            </a:prstTxWarp>
+          </a:bodyPr>
+          <a:lstStyle/>
+          <a:p>
+            <a:pPr marL="0" marR="0" indent="0" algn="l" defTabSz="914400" rtl="0" eaLnBrk="1" fontAlgn="base" latinLnBrk="0" hangingPunct="1">
+              <a:lnSpc>
+                <a:spcPct val="100000"/>
+              </a:lnSpc>
+              <a:spcBef>
+                <a:spcPct val="50000"/>
+              </a:spcBef>
+              <a:spcAft>
+                <a:spcPct val="0"/>
+              </a:spcAft>
+              <a:buClrTx/>
+              <a:buSzTx/>
+              <a:buFontTx/>
+              <a:buNone/>
+              <a:tabLst/>
+            </a:pPr>
+            <a:endParaRPr kumimoji="0" lang="en-US" sz="1400" b="1" i="0" u="none" strike="noStrike" cap="none" normalizeH="0" baseline="0" smtClean="0">
+              <a:ln>
+                <a:noFill/>
+              </a:ln>
+              <a:solidFill>
+                <a:schemeClr val="tx1"/>
+              </a:solidFill>
+              <a:effectLst/>
+              <a:latin typeface="Arial" charset="0"/>
+            </a:endParaRPr>
+          </a:p>
+        </p:txBody>
+      </p:sp>
+      <p:sp>
+        <p:nvSpPr>
+          <p:cNvPr id="7" name="Oval 6"/>
+          <p:cNvSpPr/>
+          <p:nvPr/>
+        </p:nvSpPr>
+        <p:spPr bwMode="auto">
+          <a:xfrm>
+            <a:off x="4363453" y="4267197"/>
+            <a:ext cx="1949116" cy="1186710"/>
+          </a:xfrm>
+          <a:prstGeom prst="ellipse">
+            <a:avLst/>
+          </a:prstGeom>
+          <a:noFill/>
+          <a:ln w="19050" cap="flat" cmpd="sng" algn="ctr">
+            <a:solidFill>
+              <a:srgbClr val="C00000"/>
+            </a:solidFill>
+            <a:prstDash val="solid"/>
+            <a:round/>
+            <a:headEnd type="none" w="med" len="med"/>
+            <a:tailEnd type="none" w="med" len="med"/>
+          </a:ln>
+          <a:effectLst/>
+        </p:spPr>
+        <p:txBody>
+          <a:bodyPr vert="horz" wrap="square" lIns="91440" tIns="45720" rIns="91440" bIns="45720" numCol="1" rtlCol="0" anchor="t" anchorCtr="0" compatLnSpc="1">
+            <a:prstTxWarp prst="textNoShape">
+              <a:avLst/>
+            </a:prstTxWarp>
+          </a:bodyPr>
+          <a:lstStyle/>
+          <a:p>
+            <a:pPr marL="0" marR="0" indent="0" algn="l" defTabSz="914400" rtl="0" eaLnBrk="1" fontAlgn="base" latinLnBrk="0" hangingPunct="1">
+              <a:lnSpc>
+                <a:spcPct val="100000"/>
+              </a:lnSpc>
+              <a:spcBef>
+                <a:spcPct val="50000"/>
+              </a:spcBef>
+              <a:spcAft>
+                <a:spcPct val="0"/>
+              </a:spcAft>
+              <a:buClrTx/>
+              <a:buSzTx/>
+              <a:buFontTx/>
+              <a:buNone/>
+              <a:tabLst/>
+            </a:pPr>
+            <a:endParaRPr kumimoji="0" lang="en-US" sz="1400" b="1" i="0" u="none" strike="noStrike" cap="none" normalizeH="0" baseline="0" smtClean="0">
+              <a:ln>
+                <a:noFill/>
+              </a:ln>
+              <a:solidFill>
+                <a:schemeClr val="tx1"/>
+              </a:solidFill>
+              <a:effectLst/>
+              <a:latin typeface="Arial" charset="0"/>
+            </a:endParaRPr>
+          </a:p>
+        </p:txBody>
+      </p:sp>
+    </p:spTree>
+    <p:extLst>
+      <p:ext uri="{BB962C8B-B14F-4D97-AF65-F5344CB8AC3E}">
+        <p14:creationId xmlns:p14="http://schemas.microsoft.com/office/powerpoint/2010/main" val="557920327"/>
+      </p:ext>
+    </p:extLst>
+  </p:cSld>
+  <p:clrMapOvr>
+    <a:masterClrMapping/>
+  </p:clrMapOvr>
+  <p:transition spd="med">
+    <p:fade/>
+  </p:transition>
+  <p:timing>
+    <p:tnLst>
+      <p:par>
+        <p:cTn id="1" dur="indefinite" restart="never" nodeType="tmRoot">
+          <p:childTnLst>
+            <p:seq concurrent="1" nextAc="seek">
+              <p:cTn id="2" dur="indefinite" nodeType="mainSeq">
+                <p:childTnLst>
+                  <p:par>
+                    <p:cTn id="3" fill="hold">
+                      <p:stCondLst>
+                        <p:cond delay="indefinite"/>
+                      </p:stCondLst>
+                      <p:childTnLst>
+                        <p:par>
+                          <p:cTn id="4" fill="hold">
+                            <p:stCondLst>
+                              <p:cond delay="0"/>
+                            </p:stCondLst>
+                            <p:childTnLst>
+                              <p:par>
+                                <p:cTn id="5" presetID="1" presetClass="entr" presetSubtype="0" fill="hold" grpId="0" nodeType="clickEffect">
+                                  <p:stCondLst>
+                                    <p:cond delay="0"/>
+                                  </p:stCondLst>
+                                  <p:childTnLst>
+                                    <p:set>
+                                      <p:cBhvr>
+                                        <p:cTn id="6" dur="1" fill="hold">
+                                          <p:stCondLst>
+                                            <p:cond delay="0"/>
+                                          </p:stCondLst>
+                                        </p:cTn>
+                                        <p:tgtEl>
+                                          <p:spTgt spid="7"/>
+                                        </p:tgtEl>
+                                        <p:attrNameLst>
+                                          <p:attrName>style.visibility</p:attrName>
+                                        </p:attrNameLst>
+                                      </p:cBhvr>
+                                      <p:to>
+                                        <p:strVal val="visible"/>
+                                      </p:to>
+                                    </p:set>
+                                  </p:childTnLst>
+                                </p:cTn>
+                              </p:par>
+                              <p:par>
+                                <p:cTn id="7" presetID="1" presetClass="entr" presetSubtype="0" fill="hold" grpId="0" nodeType="withEffect">
+                                  <p:stCondLst>
+                                    <p:cond delay="0"/>
+                                  </p:stCondLst>
+                                  <p:childTnLst>
+                                    <p:set>
+                                      <p:cBhvr>
+                                        <p:cTn id="8" dur="1" fill="hold">
+                                          <p:stCondLst>
+                                            <p:cond delay="0"/>
+                                          </p:stCondLst>
+                                        </p:cTn>
+                                        <p:tgtEl>
+                                          <p:spTgt spid="5"/>
+                                        </p:tgtEl>
+                                        <p:attrNameLst>
+                                          <p:attrName>style.visibility</p:attrName>
+                                        </p:attrNameLst>
+                                      </p:cBhvr>
+                                      <p:to>
+                                        <p:strVal val="visible"/>
+                                      </p:to>
+                                    </p:set>
+                                  </p:childTnLst>
+                                </p:cTn>
+                              </p:par>
+                            </p:childTnLst>
+                          </p:cTn>
+                        </p:par>
+                      </p:childTnLst>
+                    </p:cTn>
+                  </p:par>
+                </p:childTnLst>
+              </p:cTn>
+              <p:prevCondLst>
+                <p:cond evt="onPrev" delay="0">
+                  <p:tgtEl>
+                    <p:sldTgt/>
+                  </p:tgtEl>
+                </p:cond>
+              </p:prevCondLst>
+              <p:nextCondLst>
+                <p:cond evt="onNext" delay="0">
+                  <p:tgtEl>
+                    <p:sldTgt/>
+                  </p:tgtEl>
+                </p:cond>
+              </p:nextCondLst>
+            </p:seq>
+          </p:childTnLst>
+        </p:cTn>
+      </p:par>
+    </p:tnLst>
+    <p:bldLst>
+      <p:bldP spid="5" grpId="0" animBg="1"/>
+      <p:bldP spid="7" grpId="0" animBg="1"/>
+    </p:bldLst>
+  </p:timing>
+</p:sld>
+</file>
+
+<file path=ppt/slides/slide15.xml><?xml version="1.0" encoding="utf-8"?>
+<p:sld xmlns:a="http://schemas.openxmlformats.org/drawingml/2006/main" xmlns:r="http://schemas.openxmlformats.org/officeDocument/2006/relationships" xmlns:p="http://schemas.openxmlformats.org/presentationml/2006/main">
+  <p:cSld>
+    <p:spTree>
+      <p:nvGrpSpPr>
+        <p:cNvPr id="1" name=""/>
+        <p:cNvGrpSpPr/>
+        <p:nvPr/>
+      </p:nvGrpSpPr>
+      <p:grpSpPr>
+        <a:xfrm>
+          <a:off x="0" y="0"/>
+          <a:ext cx="0" cy="0"/>
+          <a:chOff x="0" y="0"/>
+          <a:chExt cx="0" cy="0"/>
+        </a:xfrm>
+      </p:grpSpPr>
+      <p:sp>
+        <p:nvSpPr>
+          <p:cNvPr id="2" name="Title 1"/>
+          <p:cNvSpPr>
+            <a:spLocks noGrp="1"/>
+          </p:cNvSpPr>
+          <p:nvPr>
+            <p:ph type="title"/>
+          </p:nvPr>
+        </p:nvSpPr>
+        <p:spPr/>
+        <p:txBody>
+          <a:bodyPr/>
+          <a:lstStyle/>
+          <a:p>
+            <a:r>
+              <a:rPr lang="en-US" dirty="0" smtClean="0"/>
+              <a:t>Non-invertible Transformation</a:t>
+            </a:r>
+            <a:endParaRPr lang="en-US" dirty="0"/>
+          </a:p>
+        </p:txBody>
+      </p:sp>
+      <p:sp>
+        <p:nvSpPr>
+          <p:cNvPr id="4" name="Slide Number Placeholder 3"/>
+          <p:cNvSpPr>
+            <a:spLocks noGrp="1"/>
+          </p:cNvSpPr>
+          <p:nvPr>
+            <p:ph type="sldNum" sz="quarter" idx="12"/>
+          </p:nvPr>
+        </p:nvSpPr>
+        <p:spPr/>
+        <p:txBody>
+          <a:bodyPr/>
+          <a:lstStyle/>
+          <a:p>
+            <a:pPr>
+              <a:defRPr/>
+            </a:pPr>
+            <a:fld id="{486618C1-054C-4E1D-BC19-6E8A9BAB5F99}" type="slidenum">
+              <a:rPr lang="en-US" smtClean="0"/>
+              <a:pPr>
+                <a:defRPr/>
+              </a:pPr>
+              <a:t>15</a:t>
+            </a:fld>
+            <a:endParaRPr lang="en-US"/>
+          </a:p>
+        </p:txBody>
+      </p:sp>
+      <p:pic>
+        <p:nvPicPr>
+          <p:cNvPr id="5" name="Content Placeholder 4"/>
+          <p:cNvPicPr>
+            <a:picLocks noGrp="1"/>
+          </p:cNvPicPr>
+          <p:nvPr>
+            <p:ph idx="1"/>
+          </p:nvPr>
+        </p:nvPicPr>
+        <p:blipFill>
+          <a:blip r:embed="rId2"/>
+          <a:stretch>
+            <a:fillRect/>
+          </a:stretch>
+        </p:blipFill>
+        <p:spPr>
+          <a:xfrm>
+            <a:off x="1073455" y="2249311"/>
+            <a:ext cx="7011378" cy="2534004"/>
+          </a:xfrm>
+          <a:prstGeom prst="rect">
+            <a:avLst/>
+          </a:prstGeom>
+        </p:spPr>
+      </p:pic>
+    </p:spTree>
+    <p:extLst>
+      <p:ext uri="{BB962C8B-B14F-4D97-AF65-F5344CB8AC3E}">
+        <p14:creationId xmlns:p14="http://schemas.microsoft.com/office/powerpoint/2010/main" val="4259602043"/>
+      </p:ext>
+    </p:extLst>
+  </p:cSld>
+  <p:clrMapOvr>
+    <a:masterClrMapping/>
+  </p:clrMapOvr>
+  <p:transition spd="med">
+    <p:fade/>
+  </p:transition>
+  <p:timing>
+    <p:tnLst>
+      <p:par>
+        <p:cTn id="1" dur="indefinite" restart="never" nodeType="tmRoot"/>
+      </p:par>
+    </p:tnLst>
+  </p:timing>
+</p:sld>
+</file>
+
+<file path=ppt/slides/slide16.xml><?xml version="1.0" encoding="utf-8"?>
+<p:sld xmlns:a="http://schemas.openxmlformats.org/drawingml/2006/main" xmlns:r="http://schemas.openxmlformats.org/officeDocument/2006/relationships" xmlns:p="http://schemas.openxmlformats.org/presentationml/2006/main">
+  <p:cSld>
+    <p:spTree>
+      <p:nvGrpSpPr>
+        <p:cNvPr id="1" name=""/>
+        <p:cNvGrpSpPr/>
+        <p:nvPr/>
+      </p:nvGrpSpPr>
+      <p:grpSpPr>
+        <a:xfrm>
+          <a:off x="0" y="0"/>
+          <a:ext cx="0" cy="0"/>
+          <a:chOff x="0" y="0"/>
+          <a:chExt cx="0" cy="0"/>
+        </a:xfrm>
+      </p:grpSpPr>
+      <p:sp>
+        <p:nvSpPr>
+          <p:cNvPr id="2" name="Title 1"/>
+          <p:cNvSpPr>
+            <a:spLocks noGrp="1"/>
+          </p:cNvSpPr>
+          <p:nvPr>
+            <p:ph type="title"/>
+          </p:nvPr>
+        </p:nvSpPr>
+        <p:spPr/>
+        <p:txBody>
+          <a:bodyPr/>
+          <a:lstStyle/>
+          <a:p>
+            <a:r>
+              <a:rPr lang="en-US" dirty="0" smtClean="0"/>
+              <a:t>Tính chất của Non-invertible transform</a:t>
+            </a:r>
+            <a:endParaRPr lang="en-US" dirty="0"/>
+          </a:p>
+        </p:txBody>
+      </p:sp>
+      <p:sp>
+        <p:nvSpPr>
+          <p:cNvPr id="3" name="Content Placeholder 2"/>
+          <p:cNvSpPr>
+            <a:spLocks noGrp="1"/>
+          </p:cNvSpPr>
+          <p:nvPr>
+            <p:ph idx="1"/>
+          </p:nvPr>
+        </p:nvSpPr>
+        <p:spPr/>
+        <p:txBody>
+          <a:bodyPr/>
+          <a:lstStyle/>
+          <a:p>
+            <a:r>
+              <a:rPr lang="en-US" dirty="0" smtClean="0"/>
+              <a:t>Không những bảo vệ được mẫu sinh trắc mà còn bảo toàn được các công thức tính độ lệch giữa hai vector như khoản cách euclid, city block,..</a:t>
+            </a:r>
+            <a:br>
+              <a:rPr lang="en-US" dirty="0" smtClean="0"/>
+            </a:br>
+            <a:r>
+              <a:rPr lang="en-US" dirty="0" smtClean="0"/>
+              <a:t>T - T’ ~ F(T) - F(T’).</a:t>
+            </a:r>
+          </a:p>
+          <a:p>
+            <a:r>
+              <a:rPr lang="en-US" dirty="0" smtClean="0"/>
+              <a:t>One-way transfromations.</a:t>
+            </a:r>
+          </a:p>
+          <a:p>
+            <a:endParaRPr lang="en-US" dirty="0"/>
+          </a:p>
+        </p:txBody>
+      </p:sp>
+      <p:sp>
+        <p:nvSpPr>
+          <p:cNvPr id="4" name="Slide Number Placeholder 3"/>
+          <p:cNvSpPr>
+            <a:spLocks noGrp="1"/>
+          </p:cNvSpPr>
+          <p:nvPr>
+            <p:ph type="sldNum" sz="quarter" idx="12"/>
+          </p:nvPr>
+        </p:nvSpPr>
+        <p:spPr/>
+        <p:txBody>
+          <a:bodyPr/>
+          <a:lstStyle/>
+          <a:p>
+            <a:pPr>
+              <a:defRPr/>
+            </a:pPr>
+            <a:fld id="{486618C1-054C-4E1D-BC19-6E8A9BAB5F99}" type="slidenum">
+              <a:rPr lang="en-US" smtClean="0"/>
+              <a:pPr>
+                <a:defRPr/>
+              </a:pPr>
+              <a:t>16</a:t>
+            </a:fld>
+            <a:endParaRPr lang="en-US"/>
+          </a:p>
+        </p:txBody>
+      </p:sp>
+    </p:spTree>
+    <p:extLst>
+      <p:ext uri="{BB962C8B-B14F-4D97-AF65-F5344CB8AC3E}">
+        <p14:creationId xmlns:p14="http://schemas.microsoft.com/office/powerpoint/2010/main" val="2895429003"/>
+      </p:ext>
+    </p:extLst>
+  </p:cSld>
+  <p:clrMapOvr>
+    <a:masterClrMapping/>
+  </p:clrMapOvr>
+  <p:transition spd="med">
+    <p:fade/>
+  </p:transition>
+  <p:timing>
+    <p:tnLst>
+      <p:par>
+        <p:cTn id="1" dur="indefinite" restart="never" nodeType="tmRoot"/>
+      </p:par>
+    </p:tnLst>
+  </p:timing>
+</p:sld>
+</file>
+
+<file path=ppt/slides/slide17.xml><?xml version="1.0" encoding="utf-8"?>
+<p:sld xmlns:a="http://schemas.openxmlformats.org/drawingml/2006/main" xmlns:r="http://schemas.openxmlformats.org/officeDocument/2006/relationships" xmlns:p="http://schemas.openxmlformats.org/presentationml/2006/main">
+  <p:cSld>
+    <p:spTree>
+      <p:nvGrpSpPr>
+        <p:cNvPr id="1" name=""/>
+        <p:cNvGrpSpPr/>
+        <p:nvPr/>
+      </p:nvGrpSpPr>
+      <p:grpSpPr>
+        <a:xfrm>
+          <a:off x="0" y="0"/>
+          <a:ext cx="0" cy="0"/>
+          <a:chOff x="0" y="0"/>
+          <a:chExt cx="0" cy="0"/>
+        </a:xfrm>
+      </p:grpSpPr>
+      <p:sp>
+        <p:nvSpPr>
+          <p:cNvPr id="2" name="Title 1"/>
+          <p:cNvSpPr>
+            <a:spLocks noGrp="1"/>
+          </p:cNvSpPr>
+          <p:nvPr>
+            <p:ph type="title"/>
+          </p:nvPr>
+        </p:nvSpPr>
+        <p:spPr/>
+        <p:txBody>
+          <a:bodyPr/>
+          <a:lstStyle/>
+          <a:p>
+            <a:endParaRPr lang="en-US" dirty="0"/>
+          </a:p>
+        </p:txBody>
+      </p:sp>
+      <p:sp>
+        <p:nvSpPr>
+          <p:cNvPr id="3" name="Content Placeholder 2"/>
+          <p:cNvSpPr>
+            <a:spLocks noGrp="1"/>
+          </p:cNvSpPr>
+          <p:nvPr>
+            <p:ph idx="1"/>
+          </p:nvPr>
+        </p:nvSpPr>
+        <p:spPr/>
+        <p:txBody>
+          <a:bodyPr/>
+          <a:lstStyle/>
+          <a:p>
+            <a:r>
+              <a:rPr lang="en-US" dirty="0" smtClean="0"/>
+              <a:t>Đây là phép biến đổi một chiều dựa vào hàm biến đổi F.</a:t>
+            </a:r>
+          </a:p>
+          <a:p>
+            <a:endParaRPr lang="en-US" dirty="0"/>
+          </a:p>
+        </p:txBody>
+      </p:sp>
+      <p:sp>
+        <p:nvSpPr>
+          <p:cNvPr id="4" name="Slide Number Placeholder 3"/>
+          <p:cNvSpPr>
+            <a:spLocks noGrp="1"/>
+          </p:cNvSpPr>
+          <p:nvPr>
+            <p:ph type="sldNum" sz="quarter" idx="12"/>
+          </p:nvPr>
+        </p:nvSpPr>
+        <p:spPr/>
+        <p:txBody>
+          <a:bodyPr/>
+          <a:lstStyle/>
+          <a:p>
+            <a:pPr>
+              <a:defRPr/>
+            </a:pPr>
+            <a:fld id="{486618C1-054C-4E1D-BC19-6E8A9BAB5F99}" type="slidenum">
+              <a:rPr lang="en-US" smtClean="0"/>
+              <a:pPr>
+                <a:defRPr/>
+              </a:pPr>
+              <a:t>17</a:t>
+            </a:fld>
+            <a:endParaRPr lang="en-US"/>
+          </a:p>
+        </p:txBody>
+      </p:sp>
+      <p:pic>
+        <p:nvPicPr>
+          <p:cNvPr id="5" name="Picture 4"/>
+          <p:cNvPicPr/>
+          <p:nvPr/>
+        </p:nvPicPr>
+        <p:blipFill>
+          <a:blip r:embed="rId2"/>
+          <a:stretch>
+            <a:fillRect/>
+          </a:stretch>
+        </p:blipFill>
+        <p:spPr>
+          <a:xfrm>
+            <a:off x="2296836" y="2292516"/>
+            <a:ext cx="4563773" cy="3400543"/>
+          </a:xfrm>
+          <a:prstGeom prst="rect">
+            <a:avLst/>
+          </a:prstGeom>
+        </p:spPr>
+      </p:pic>
+    </p:spTree>
+    <p:extLst>
+      <p:ext uri="{BB962C8B-B14F-4D97-AF65-F5344CB8AC3E}">
+        <p14:creationId xmlns:p14="http://schemas.microsoft.com/office/powerpoint/2010/main" val="243166183"/>
+      </p:ext>
+    </p:extLst>
+  </p:cSld>
+  <p:clrMapOvr>
+    <a:masterClrMapping/>
+  </p:clrMapOvr>
+  <p:transition spd="med">
+    <p:fade/>
+  </p:transition>
+  <p:timing>
+    <p:tnLst>
+      <p:par>
+        <p:cTn id="1" dur="indefinite" restart="never" nodeType="tmRoot"/>
+      </p:par>
+    </p:tnLst>
+  </p:timing>
+</p:sld>
+</file>
+
+<file path=ppt/slides/slide18.xml><?xml version="1.0" encoding="utf-8"?>
+<p:sld xmlns:a="http://schemas.openxmlformats.org/drawingml/2006/main" xmlns:r="http://schemas.openxmlformats.org/officeDocument/2006/relationships" xmlns:p="http://schemas.openxmlformats.org/presentationml/2006/main">
+  <p:cSld>
+    <p:spTree>
+      <p:nvGrpSpPr>
+        <p:cNvPr id="1" name=""/>
+        <p:cNvGrpSpPr/>
+        <p:nvPr/>
+      </p:nvGrpSpPr>
+      <p:grpSpPr>
+        <a:xfrm>
+          <a:off x="0" y="0"/>
+          <a:ext cx="0" cy="0"/>
+          <a:chOff x="0" y="0"/>
+          <a:chExt cx="0" cy="0"/>
+        </a:xfrm>
+      </p:grpSpPr>
+      <p:sp>
+        <p:nvSpPr>
+          <p:cNvPr id="2" name="Title 1"/>
+          <p:cNvSpPr>
+            <a:spLocks noGrp="1"/>
+          </p:cNvSpPr>
+          <p:nvPr>
+            <p:ph type="title"/>
+          </p:nvPr>
+        </p:nvSpPr>
+        <p:spPr/>
+        <p:txBody>
+          <a:bodyPr/>
+          <a:lstStyle/>
+          <a:p>
+            <a:endParaRPr lang="en-US"/>
+          </a:p>
+        </p:txBody>
+      </p:sp>
+      <p:sp>
+        <p:nvSpPr>
+          <p:cNvPr id="3" name="Content Placeholder 2"/>
+          <p:cNvSpPr>
+            <a:spLocks noGrp="1"/>
+          </p:cNvSpPr>
+          <p:nvPr>
+            <p:ph idx="1"/>
+          </p:nvPr>
+        </p:nvSpPr>
+        <p:spPr/>
+        <p:txBody>
+          <a:bodyPr/>
+          <a:lstStyle/>
+          <a:p>
+            <a:r>
+              <a:rPr lang="en-US" dirty="0" smtClean="0"/>
+              <a:t>Cốt lõi của phép biến đổi này là phép nhân ma trận. Với công thức tổng quá là y = A.x với x là mẫu sinh trắc gốc, A là ma trận trực giao, y là kết quả sau khi biến đổi, với ma trận trực giao được sinh ra theo phương pháp His-ham Al-assam.</a:t>
+            </a:r>
+            <a:endParaRPr lang="en-US" dirty="0"/>
+          </a:p>
+        </p:txBody>
+      </p:sp>
+      <p:sp>
+        <p:nvSpPr>
+          <p:cNvPr id="4" name="Slide Number Placeholder 3"/>
+          <p:cNvSpPr>
+            <a:spLocks noGrp="1"/>
+          </p:cNvSpPr>
+          <p:nvPr>
+            <p:ph type="sldNum" sz="quarter" idx="12"/>
+          </p:nvPr>
+        </p:nvSpPr>
+        <p:spPr/>
+        <p:txBody>
+          <a:bodyPr/>
+          <a:lstStyle/>
+          <a:p>
+            <a:pPr>
+              <a:defRPr/>
+            </a:pPr>
+            <a:fld id="{486618C1-054C-4E1D-BC19-6E8A9BAB5F99}" type="slidenum">
+              <a:rPr lang="en-US" smtClean="0"/>
+              <a:pPr>
+                <a:defRPr/>
+              </a:pPr>
+              <a:t>18</a:t>
+            </a:fld>
+            <a:endParaRPr lang="en-US"/>
+          </a:p>
+        </p:txBody>
+      </p:sp>
+    </p:spTree>
+    <p:extLst>
+      <p:ext uri="{BB962C8B-B14F-4D97-AF65-F5344CB8AC3E}">
+        <p14:creationId xmlns:p14="http://schemas.microsoft.com/office/powerpoint/2010/main" val="298590175"/>
+      </p:ext>
+    </p:extLst>
+  </p:cSld>
+  <p:clrMapOvr>
+    <a:masterClrMapping/>
+  </p:clrMapOvr>
+  <p:transition spd="med">
+    <p:fade/>
+  </p:transition>
+  <p:timing>
+    <p:tnLst>
+      <p:par>
+        <p:cTn id="1" dur="indefinite" restart="never" nodeType="tmRoot"/>
+      </p:par>
+    </p:tnLst>
+  </p:timing>
+</p:sld>
+</file>
+
+<file path=ppt/slides/slide19.xml><?xml version="1.0" encoding="utf-8"?>
+<p:sld xmlns:a="http://schemas.openxmlformats.org/drawingml/2006/main" xmlns:r="http://schemas.openxmlformats.org/officeDocument/2006/relationships" xmlns:p="http://schemas.openxmlformats.org/presentationml/2006/main">
+  <p:cSld>
+    <p:spTree>
+      <p:nvGrpSpPr>
+        <p:cNvPr id="1" name=""/>
+        <p:cNvGrpSpPr/>
+        <p:nvPr/>
+      </p:nvGrpSpPr>
+      <p:grpSpPr>
+        <a:xfrm>
+          <a:off x="0" y="0"/>
+          <a:ext cx="0" cy="0"/>
+          <a:chOff x="0" y="0"/>
+          <a:chExt cx="0" cy="0"/>
+        </a:xfrm>
+      </p:grpSpPr>
+      <p:sp>
+        <p:nvSpPr>
+          <p:cNvPr id="2" name="Title 1"/>
+          <p:cNvSpPr>
+            <a:spLocks noGrp="1"/>
+          </p:cNvSpPr>
+          <p:nvPr>
+            <p:ph type="title"/>
+          </p:nvPr>
+        </p:nvSpPr>
+        <p:spPr/>
+        <p:txBody>
+          <a:bodyPr/>
+          <a:lstStyle/>
+          <a:p>
             <a:endParaRPr lang="en-US" dirty="0"/>
           </a:p>
         </p:txBody>
@@ -5466,7 +6902,7 @@
               <a:pPr>
                 <a:defRPr/>
               </a:pPr>
-              <a:t>10</a:t>
+              <a:t>19</a:t>
             </a:fld>
             <a:endParaRPr lang="en-US"/>
           </a:p>
@@ -5509,10 +6945,17 @@
   <p:transition spd="med">
     <p:fade/>
   </p:transition>
+  <p:timing>
+    <p:tnLst>
+      <p:par>
+        <p:cTn id="1" dur="indefinite" restart="never" nodeType="tmRoot"/>
+      </p:par>
+    </p:tnLst>
+  </p:timing>
 </p:sld>
 </file>
 
-<file path=ppt/slides/slide11.xml><?xml version="1.0" encoding="utf-8"?>
+<file path=ppt/slides/slide2.xml><?xml version="1.0" encoding="utf-8"?>
 <p:sld xmlns:a="http://schemas.openxmlformats.org/drawingml/2006/main" xmlns:r="http://schemas.openxmlformats.org/officeDocument/2006/relationships" xmlns:p="http://schemas.openxmlformats.org/presentationml/2006/main">
   <p:cSld>
     <p:spTree>
@@ -5546,7 +6989,164 @@
           <a:p>
             <a:r>
               <a:rPr lang="en-US" dirty="0" smtClean="0"/>
+              <a:t>Nội </a:t>
+            </a:r>
+            <a:r>
+              <a:rPr lang="en-US" dirty="0" smtClean="0"/>
+              <a:t>dung</a:t>
+            </a:r>
+            <a:endParaRPr lang="en-US" dirty="0"/>
+          </a:p>
+        </p:txBody>
+      </p:sp>
+      <p:sp>
+        <p:nvSpPr>
+          <p:cNvPr id="3" name="Content Placeholder 2"/>
+          <p:cNvSpPr>
+            <a:spLocks noGrp="1"/>
+          </p:cNvSpPr>
+          <p:nvPr>
+            <p:ph idx="1"/>
+          </p:nvPr>
+        </p:nvSpPr>
+        <p:spPr/>
+        <p:txBody>
+          <a:bodyPr/>
+          <a:lstStyle/>
+          <a:p>
+            <a:r>
+              <a:rPr lang="en-US" dirty="0" smtClean="0"/>
               <a:t>Giới thiệu đề tài</a:t>
+            </a:r>
+            <a:endParaRPr lang="en-US" dirty="0" smtClean="0"/>
+          </a:p>
+          <a:p>
+            <a:r>
+              <a:rPr lang="en-US" dirty="0" smtClean="0"/>
+              <a:t>Sinh trắc</a:t>
+            </a:r>
+            <a:endParaRPr lang="en-US" dirty="0" smtClean="0"/>
+          </a:p>
+          <a:p>
+            <a:r>
+              <a:rPr lang="en-US" dirty="0" smtClean="0"/>
+              <a:t>Kĩ </a:t>
+            </a:r>
+            <a:r>
+              <a:rPr lang="en-US" dirty="0" smtClean="0"/>
+              <a:t>thuật bảo </a:t>
+            </a:r>
+            <a:r>
+              <a:rPr lang="en-US" dirty="0" smtClean="0"/>
+              <a:t>vệ mẫu sinh trắc</a:t>
+            </a:r>
+          </a:p>
+          <a:p>
+            <a:r>
+              <a:rPr lang="en-US" dirty="0" smtClean="0"/>
+              <a:t>Mô hình đề xuất</a:t>
+            </a:r>
+            <a:endParaRPr lang="en-US" dirty="0" smtClean="0"/>
+          </a:p>
+          <a:p>
+            <a:r>
+              <a:rPr lang="en-US" dirty="0" smtClean="0"/>
+              <a:t>Đánh </a:t>
+            </a:r>
+            <a:r>
+              <a:rPr lang="en-US" dirty="0" smtClean="0"/>
+              <a:t>giá</a:t>
+            </a:r>
+          </a:p>
+          <a:p>
+            <a:r>
+              <a:rPr lang="en-US" dirty="0" smtClean="0"/>
+              <a:t>Kết luận</a:t>
+            </a:r>
+            <a:endParaRPr lang="en-US" dirty="0"/>
+          </a:p>
+        </p:txBody>
+      </p:sp>
+      <p:sp>
+        <p:nvSpPr>
+          <p:cNvPr id="4" name="Slide Number Placeholder 3"/>
+          <p:cNvSpPr>
+            <a:spLocks noGrp="1"/>
+          </p:cNvSpPr>
+          <p:nvPr>
+            <p:ph type="sldNum" sz="quarter" idx="12"/>
+          </p:nvPr>
+        </p:nvSpPr>
+        <p:spPr/>
+        <p:txBody>
+          <a:bodyPr/>
+          <a:lstStyle/>
+          <a:p>
+            <a:pPr>
+              <a:defRPr/>
+            </a:pPr>
+            <a:fld id="{486618C1-054C-4E1D-BC19-6E8A9BAB5F99}" type="slidenum">
+              <a:rPr lang="en-US" smtClean="0"/>
+              <a:pPr>
+                <a:defRPr/>
+              </a:pPr>
+              <a:t>2</a:t>
+            </a:fld>
+            <a:endParaRPr lang="en-US"/>
+          </a:p>
+        </p:txBody>
+      </p:sp>
+    </p:spTree>
+    <p:extLst>
+      <p:ext uri="{BB962C8B-B14F-4D97-AF65-F5344CB8AC3E}">
+        <p14:creationId xmlns:p14="http://schemas.microsoft.com/office/powerpoint/2010/main" val="3849723430"/>
+      </p:ext>
+    </p:extLst>
+  </p:cSld>
+  <p:clrMapOvr>
+    <a:masterClrMapping/>
+  </p:clrMapOvr>
+  <p:transition spd="med">
+    <p:fade/>
+  </p:transition>
+</p:sld>
+</file>
+
+<file path=ppt/slides/slide20.xml><?xml version="1.0" encoding="utf-8"?>
+<p:sld xmlns:a="http://schemas.openxmlformats.org/drawingml/2006/main" xmlns:r="http://schemas.openxmlformats.org/officeDocument/2006/relationships" xmlns:p="http://schemas.openxmlformats.org/presentationml/2006/main">
+  <p:cSld>
+    <p:spTree>
+      <p:nvGrpSpPr>
+        <p:cNvPr id="1" name=""/>
+        <p:cNvGrpSpPr/>
+        <p:nvPr/>
+      </p:nvGrpSpPr>
+      <p:grpSpPr>
+        <a:xfrm>
+          <a:off x="0" y="0"/>
+          <a:ext cx="0" cy="0"/>
+          <a:chOff x="0" y="0"/>
+          <a:chExt cx="0" cy="0"/>
+        </a:xfrm>
+      </p:grpSpPr>
+      <p:sp>
+        <p:nvSpPr>
+          <p:cNvPr id="2" name="Title 1"/>
+          <p:cNvSpPr>
+            <a:spLocks noGrp="1"/>
+          </p:cNvSpPr>
+          <p:nvPr>
+            <p:ph type="title"/>
+          </p:nvPr>
+        </p:nvSpPr>
+        <p:spPr/>
+        <p:txBody>
+          <a:bodyPr/>
+          <a:lstStyle/>
+          <a:p>
+            <a:r>
+              <a:rPr lang="en-US" dirty="0" smtClean="0"/>
+              <a:t>2. Fuzzy commitment</a:t>
             </a:r>
             <a:endParaRPr lang="en-US" dirty="0"/>
           </a:p>
@@ -5573,7 +7173,7 @@
             </a:pPr>
             <a:r>
               <a:rPr lang="en-US" dirty="0" smtClean="0"/>
-              <a:t>Fuzzycommitment: sử dụng sức mạnh của logic mờ để chuyển dữ liệu thành dạng an toàn trước khi truyền trên kênh.</a:t>
+              <a:t>Fuzzy-commitment: sử dụng sức mạnh của logic mờ để chuyển dữ liệu thành dạng an toàn trước khi truyền trên kênh.</a:t>
             </a:r>
             <a:br>
               <a:rPr lang="en-US" dirty="0" smtClean="0"/>
@@ -5605,7 +7205,7 @@
               <a:pPr>
                 <a:defRPr/>
               </a:pPr>
-              <a:t>11</a:t>
+              <a:t>20</a:t>
             </a:fld>
             <a:endParaRPr lang="en-US"/>
           </a:p>
@@ -5648,10 +7248,17 @@
   <p:transition spd="med">
     <p:fade/>
   </p:transition>
+  <p:timing>
+    <p:tnLst>
+      <p:par>
+        <p:cTn id="1" dur="indefinite" restart="never" nodeType="tmRoot"/>
+      </p:par>
+    </p:tnLst>
+  </p:timing>
 </p:sld>
 </file>
 
-<file path=ppt/slides/slide12.xml><?xml version="1.0" encoding="utf-8"?>
+<file path=ppt/slides/slide21.xml><?xml version="1.0" encoding="utf-8"?>
 <p:sld xmlns:a="http://schemas.openxmlformats.org/drawingml/2006/main" xmlns:r="http://schemas.openxmlformats.org/officeDocument/2006/relationships" xmlns:p="http://schemas.openxmlformats.org/presentationml/2006/main">
   <p:cSld>
     <p:spTree>
@@ -5708,7 +7315,7 @@
           <a:p>
             <a:r>
               <a:rPr lang="en-US" dirty="0" smtClean="0"/>
-              <a:t>Biometric Cryptosystem</a:t>
+              <a:t>Biometric Cryptosystem: thuộc dạng key-binding.</a:t>
             </a:r>
           </a:p>
           <a:p>
@@ -5739,7 +7346,7 @@
               <a:pPr>
                 <a:defRPr/>
               </a:pPr>
-              <a:t>12</a:t>
+              <a:t>21</a:t>
             </a:fld>
             <a:endParaRPr lang="en-US"/>
           </a:p>
@@ -5788,10 +7395,17 @@
   <p:transition spd="med">
     <p:fade/>
   </p:transition>
+  <p:timing>
+    <p:tnLst>
+      <p:par>
+        <p:cTn id="1" dur="indefinite" restart="never" nodeType="tmRoot"/>
+      </p:par>
+    </p:tnLst>
+  </p:timing>
 </p:sld>
 </file>
 
-<file path=ppt/slides/slide13.xml><?xml version="1.0" encoding="utf-8"?>
+<file path=ppt/slides/slide22.xml><?xml version="1.0" encoding="utf-8"?>
 <p:sld xmlns:a="http://schemas.openxmlformats.org/drawingml/2006/main" xmlns:r="http://schemas.openxmlformats.org/officeDocument/2006/relationships" xmlns:p="http://schemas.openxmlformats.org/presentationml/2006/main">
   <p:cSld>
     <p:spTree>
@@ -5883,7 +7497,7 @@
               <a:pPr>
                 <a:defRPr/>
               </a:pPr>
-              <a:t>13</a:t>
+              <a:t>22</a:t>
             </a:fld>
             <a:endParaRPr lang="en-US"/>
           </a:p>
@@ -5902,10 +7516,17 @@
   <p:transition spd="med">
     <p:fade/>
   </p:transition>
+  <p:timing>
+    <p:tnLst>
+      <p:par>
+        <p:cTn id="1" dur="indefinite" restart="never" nodeType="tmRoot"/>
+      </p:par>
+    </p:tnLst>
+  </p:timing>
 </p:sld>
 </file>
 
-<file path=ppt/slides/slide14.xml><?xml version="1.0" encoding="utf-8"?>
+<file path=ppt/slides/slide23.xml><?xml version="1.0" encoding="utf-8"?>
 <p:sld xmlns:a="http://schemas.openxmlformats.org/drawingml/2006/main" xmlns:r="http://schemas.openxmlformats.org/officeDocument/2006/relationships" xmlns:p="http://schemas.openxmlformats.org/presentationml/2006/main">
   <p:cSld>
     <p:spTree>
@@ -5939,7 +7560,7 @@
           <a:p>
             <a:r>
               <a:rPr lang="en-US" dirty="0" smtClean="0"/>
-              <a:t>Đặc điểm của fuzzy-commitment</a:t>
+              <a:t>Fuzzy-commitment</a:t>
             </a:r>
             <a:endParaRPr lang="en-US" dirty="0"/>
           </a:p>
@@ -5962,8 +7583,10 @@
           <a:p>
             <a:r>
               <a:rPr lang="en-US" dirty="0" smtClean="0"/>
-              <a:t>Không thể lấy được khóa hay mẫu sinh trắc từ helper-data, và helper-data sẽ được public.</a:t>
-            </a:r>
+              <a:t>Hệ thống xác thực sử dụng fuzzy-commitment:</a:t>
+            </a:r>
+          </a:p>
+          <a:p>
             <a:endParaRPr lang="en-US" dirty="0"/>
           </a:p>
         </p:txBody>
@@ -5991,225 +7614,7 @@
               <a:pPr>
                 <a:defRPr/>
               </a:pPr>
-              <a:t>14</a:t>
-            </a:fld>
-            <a:endParaRPr lang="en-US"/>
-          </a:p>
-        </p:txBody>
-      </p:sp>
-    </p:spTree>
-    <p:extLst>
-      <p:ext uri="{BB962C8B-B14F-4D97-AF65-F5344CB8AC3E}">
-        <p14:creationId xmlns:p14="http://schemas.microsoft.com/office/powerpoint/2010/main" val="1405415123"/>
-      </p:ext>
-    </p:extLst>
-  </p:cSld>
-  <p:clrMapOvr>
-    <a:masterClrMapping/>
-  </p:clrMapOvr>
-  <p:transition spd="med">
-    <p:fade/>
-  </p:transition>
-</p:sld>
-</file>
-
-<file path=ppt/slides/slide15.xml><?xml version="1.0" encoding="utf-8"?>
-<p:sld xmlns:a="http://schemas.openxmlformats.org/drawingml/2006/main" xmlns:r="http://schemas.openxmlformats.org/officeDocument/2006/relationships" xmlns:p="http://schemas.openxmlformats.org/presentationml/2006/main">
-  <p:cSld>
-    <p:spTree>
-      <p:nvGrpSpPr>
-        <p:cNvPr id="1" name=""/>
-        <p:cNvGrpSpPr/>
-        <p:nvPr/>
-      </p:nvGrpSpPr>
-      <p:grpSpPr>
-        <a:xfrm>
-          <a:off x="0" y="0"/>
-          <a:ext cx="0" cy="0"/>
-          <a:chOff x="0" y="0"/>
-          <a:chExt cx="0" cy="0"/>
-        </a:xfrm>
-      </p:grpSpPr>
-      <p:sp>
-        <p:nvSpPr>
-          <p:cNvPr id="2" name="Title 1"/>
-          <p:cNvSpPr>
-            <a:spLocks noGrp="1"/>
-          </p:cNvSpPr>
-          <p:nvPr>
-            <p:ph type="title"/>
-          </p:nvPr>
-        </p:nvSpPr>
-        <p:spPr/>
-        <p:txBody>
-          <a:bodyPr/>
-          <a:lstStyle/>
-          <a:p>
-            <a:r>
-              <a:rPr lang="en-US" dirty="0" smtClean="0"/>
-              <a:t>Giới thiệu đề tài</a:t>
-            </a:r>
-            <a:endParaRPr lang="en-US" dirty="0"/>
-          </a:p>
-        </p:txBody>
-      </p:sp>
-      <p:sp>
-        <p:nvSpPr>
-          <p:cNvPr id="3" name="Content Placeholder 2"/>
-          <p:cNvSpPr>
-            <a:spLocks noGrp="1"/>
-          </p:cNvSpPr>
-          <p:nvPr>
-            <p:ph idx="1"/>
-          </p:nvPr>
-        </p:nvSpPr>
-        <p:spPr/>
-        <p:txBody>
-          <a:bodyPr/>
-          <a:lstStyle/>
-          <a:p>
-            <a:r>
-              <a:rPr lang="en-US" sz="2400" dirty="0" smtClean="0"/>
-              <a:t>Như trên hình 3 đã nói rất rõ ý tưởng. Lúc enrollment server sẽ lưu sinh trắc của người dùng. Trong lúc xác thực người dùng sẽ truyền khóa K đến server để xác thực, nhưng nếu truyền khóa K thì rất dễ bị kẻ xấu lấy hoặc thay đổi, chính vì vậy nên trước khi truyền chúng ta sẽ kết hợp với sinh trắc của người dùng thông qua phép kết hợp đặc biệt để tạo thành BiometricBlock, cái này sẽ gửi lên server và server sẽ kiểm tra nếu mẫu sinh trắc này có một sai số trong khoảng cho phép thì sẽ phục hồi lại giống như khóa K lúc gởi đến và đây là cũng một người còn không thì ngược lại.</a:t>
-            </a:r>
-            <a:endParaRPr lang="en-US" sz="2400" dirty="0"/>
-          </a:p>
-        </p:txBody>
-      </p:sp>
-      <p:sp>
-        <p:nvSpPr>
-          <p:cNvPr id="4" name="Slide Number Placeholder 3"/>
-          <p:cNvSpPr>
-            <a:spLocks noGrp="1"/>
-          </p:cNvSpPr>
-          <p:nvPr>
-            <p:ph type="sldNum" sz="quarter" idx="12"/>
-          </p:nvPr>
-        </p:nvSpPr>
-        <p:spPr/>
-        <p:txBody>
-          <a:bodyPr/>
-          <a:lstStyle/>
-          <a:p>
-            <a:pPr>
-              <a:defRPr/>
-            </a:pPr>
-            <a:fld id="{486618C1-054C-4E1D-BC19-6E8A9BAB5F99}" type="slidenum">
-              <a:rPr lang="en-US" smtClean="0"/>
-              <a:pPr>
-                <a:defRPr/>
-              </a:pPr>
-              <a:t>15</a:t>
-            </a:fld>
-            <a:endParaRPr lang="en-US"/>
-          </a:p>
-        </p:txBody>
-      </p:sp>
-    </p:spTree>
-    <p:extLst>
-      <p:ext uri="{BB962C8B-B14F-4D97-AF65-F5344CB8AC3E}">
-        <p14:creationId xmlns:p14="http://schemas.microsoft.com/office/powerpoint/2010/main" val="716088418"/>
-      </p:ext>
-    </p:extLst>
-  </p:cSld>
-  <p:clrMapOvr>
-    <a:masterClrMapping/>
-  </p:clrMapOvr>
-  <p:transition spd="med">
-    <p:fade/>
-  </p:transition>
-</p:sld>
-</file>
-
-<file path=ppt/slides/slide16.xml><?xml version="1.0" encoding="utf-8"?>
-<p:sld xmlns:a="http://schemas.openxmlformats.org/drawingml/2006/main" xmlns:r="http://schemas.openxmlformats.org/officeDocument/2006/relationships" xmlns:p="http://schemas.openxmlformats.org/presentationml/2006/main">
-  <p:cSld>
-    <p:spTree>
-      <p:nvGrpSpPr>
-        <p:cNvPr id="1" name=""/>
-        <p:cNvGrpSpPr/>
-        <p:nvPr/>
-      </p:nvGrpSpPr>
-      <p:grpSpPr>
-        <a:xfrm>
-          <a:off x="0" y="0"/>
-          <a:ext cx="0" cy="0"/>
-          <a:chOff x="0" y="0"/>
-          <a:chExt cx="0" cy="0"/>
-        </a:xfrm>
-      </p:grpSpPr>
-      <p:sp>
-        <p:nvSpPr>
-          <p:cNvPr id="2" name="Title 1"/>
-          <p:cNvSpPr>
-            <a:spLocks noGrp="1"/>
-          </p:cNvSpPr>
-          <p:nvPr>
-            <p:ph type="title"/>
-          </p:nvPr>
-        </p:nvSpPr>
-        <p:spPr/>
-        <p:txBody>
-          <a:bodyPr/>
-          <a:lstStyle/>
-          <a:p>
-            <a:r>
-              <a:rPr lang="en-US" dirty="0" smtClean="0"/>
-              <a:t>Fuzzy-commitment</a:t>
-            </a:r>
-            <a:endParaRPr lang="en-US" dirty="0"/>
-          </a:p>
-        </p:txBody>
-      </p:sp>
-      <p:sp>
-        <p:nvSpPr>
-          <p:cNvPr id="3" name="Content Placeholder 2"/>
-          <p:cNvSpPr>
-            <a:spLocks noGrp="1"/>
-          </p:cNvSpPr>
-          <p:nvPr>
-            <p:ph idx="1"/>
-          </p:nvPr>
-        </p:nvSpPr>
-        <p:spPr/>
-        <p:txBody>
-          <a:bodyPr/>
-          <a:lstStyle/>
-          <a:p>
-            <a:r>
-              <a:rPr lang="en-US" dirty="0" smtClean="0"/>
-              <a:t>Hệ thống xác thực sử dụng fuzzy-commitment:</a:t>
-            </a:r>
-          </a:p>
-          <a:p>
-            <a:endParaRPr lang="en-US" dirty="0"/>
-          </a:p>
-        </p:txBody>
-      </p:sp>
-      <p:sp>
-        <p:nvSpPr>
-          <p:cNvPr id="4" name="Slide Number Placeholder 3"/>
-          <p:cNvSpPr>
-            <a:spLocks noGrp="1"/>
-          </p:cNvSpPr>
-          <p:nvPr>
-            <p:ph type="sldNum" sz="quarter" idx="12"/>
-          </p:nvPr>
-        </p:nvSpPr>
-        <p:spPr/>
-        <p:txBody>
-          <a:bodyPr/>
-          <a:lstStyle/>
-          <a:p>
-            <a:pPr>
-              <a:defRPr/>
-            </a:pPr>
-            <a:fld id="{486618C1-054C-4E1D-BC19-6E8A9BAB5F99}" type="slidenum">
-              <a:rPr lang="en-US" smtClean="0"/>
-              <a:pPr>
-                <a:defRPr/>
-              </a:pPr>
-              <a:t>16</a:t>
+              <a:t>23</a:t>
             </a:fld>
             <a:endParaRPr lang="en-US"/>
           </a:p>
@@ -6250,10 +7655,17 @@
   <p:transition spd="med">
     <p:fade/>
   </p:transition>
+  <p:timing>
+    <p:tnLst>
+      <p:par>
+        <p:cTn id="1" dur="indefinite" restart="never" nodeType="tmRoot"/>
+      </p:par>
+    </p:tnLst>
+  </p:timing>
 </p:sld>
 </file>
 
-<file path=ppt/slides/slide17.xml><?xml version="1.0" encoding="utf-8"?>
+<file path=ppt/slides/slide24.xml><?xml version="1.0" encoding="utf-8"?>
 <p:sld xmlns:a="http://schemas.openxmlformats.org/drawingml/2006/main" xmlns:r="http://schemas.openxmlformats.org/officeDocument/2006/relationships" xmlns:p="http://schemas.openxmlformats.org/presentationml/2006/main">
   <p:cSld>
     <p:spTree>
@@ -6287,7 +7699,7 @@
           <a:p>
             <a:r>
               <a:rPr lang="en-US" dirty="0" smtClean="0"/>
-              <a:t>Mô hình đề xuất.</a:t>
+              <a:t>Đặc điểm của fuzzy-commitment</a:t>
             </a:r>
             <a:endParaRPr lang="en-US" dirty="0"/>
           </a:p>
@@ -6310,10 +7722,14 @@
           <a:p>
             <a:r>
               <a:rPr lang="en-US" dirty="0" smtClean="0"/>
-              <a:t>Enrrollment.</a:t>
-            </a:r>
-          </a:p>
-          <a:p>
+              <a:t>Kết quả của việc binding giữa key và biometric sẽ tạo ra một Biometric-Block và dữ liệu này an toàn và có thể public ra ngoài mà không sợ bị lộ key hay biometric.</a:t>
+            </a:r>
+          </a:p>
+          <a:p>
+            <a:r>
+              <a:rPr lang="en-US" dirty="0" smtClean="0"/>
+              <a:t>Độ phức tạp của fuzzy-commitment thì phụ thuộc vào giải thuật ECC(Error Correcting Code) và hàm binding.</a:t>
+            </a:r>
             <a:endParaRPr lang="en-US" dirty="0"/>
           </a:p>
         </p:txBody>
@@ -6341,7 +7757,124 @@
               <a:pPr>
                 <a:defRPr/>
               </a:pPr>
-              <a:t>17</a:t>
+              <a:t>24</a:t>
+            </a:fld>
+            <a:endParaRPr lang="en-US"/>
+          </a:p>
+        </p:txBody>
+      </p:sp>
+    </p:spTree>
+    <p:extLst>
+      <p:ext uri="{BB962C8B-B14F-4D97-AF65-F5344CB8AC3E}">
+        <p14:creationId xmlns:p14="http://schemas.microsoft.com/office/powerpoint/2010/main" val="324955871"/>
+      </p:ext>
+    </p:extLst>
+  </p:cSld>
+  <p:clrMapOvr>
+    <a:masterClrMapping/>
+  </p:clrMapOvr>
+  <p:transition spd="med">
+    <p:fade/>
+  </p:transition>
+  <p:timing>
+    <p:tnLst>
+      <p:par>
+        <p:cTn id="1" dur="indefinite" restart="never" nodeType="tmRoot"/>
+      </p:par>
+    </p:tnLst>
+  </p:timing>
+</p:sld>
+</file>
+
+<file path=ppt/slides/slide25.xml><?xml version="1.0" encoding="utf-8"?>
+<p:sld xmlns:a="http://schemas.openxmlformats.org/drawingml/2006/main" xmlns:r="http://schemas.openxmlformats.org/officeDocument/2006/relationships" xmlns:p="http://schemas.openxmlformats.org/presentationml/2006/main">
+  <p:cSld>
+    <p:spTree>
+      <p:nvGrpSpPr>
+        <p:cNvPr id="1" name=""/>
+        <p:cNvGrpSpPr/>
+        <p:nvPr/>
+      </p:nvGrpSpPr>
+      <p:grpSpPr>
+        <a:xfrm>
+          <a:off x="0" y="0"/>
+          <a:ext cx="0" cy="0"/>
+          <a:chOff x="0" y="0"/>
+          <a:chExt cx="0" cy="0"/>
+        </a:xfrm>
+      </p:grpSpPr>
+      <p:sp>
+        <p:nvSpPr>
+          <p:cNvPr id="2" name="Title 1"/>
+          <p:cNvSpPr>
+            <a:spLocks noGrp="1"/>
+          </p:cNvSpPr>
+          <p:nvPr>
+            <p:ph type="title"/>
+          </p:nvPr>
+        </p:nvSpPr>
+        <p:spPr/>
+        <p:txBody>
+          <a:bodyPr/>
+          <a:lstStyle/>
+          <a:p>
+            <a:r>
+              <a:rPr lang="en-US" dirty="0" smtClean="0"/>
+              <a:t>Mô hình đề xuất.</a:t>
+            </a:r>
+            <a:endParaRPr lang="en-US" dirty="0"/>
+          </a:p>
+        </p:txBody>
+      </p:sp>
+      <p:sp>
+        <p:nvSpPr>
+          <p:cNvPr id="3" name="Content Placeholder 2"/>
+          <p:cNvSpPr>
+            <a:spLocks noGrp="1"/>
+          </p:cNvSpPr>
+          <p:nvPr>
+            <p:ph idx="1"/>
+          </p:nvPr>
+        </p:nvSpPr>
+        <p:spPr/>
+        <p:txBody>
+          <a:bodyPr/>
+          <a:lstStyle/>
+          <a:p>
+            <a:r>
+              <a:rPr lang="en-US" dirty="0" smtClean="0"/>
+              <a:t>Enrrollment.</a:t>
+            </a:r>
+          </a:p>
+          <a:p>
+            <a:endParaRPr lang="en-US" dirty="0"/>
+          </a:p>
+        </p:txBody>
+      </p:sp>
+      <p:sp>
+        <p:nvSpPr>
+          <p:cNvPr id="4" name="Slide Number Placeholder 3"/>
+          <p:cNvSpPr>
+            <a:spLocks noGrp="1"/>
+          </p:cNvSpPr>
+          <p:nvPr>
+            <p:ph type="sldNum" sz="quarter" idx="12"/>
+          </p:nvPr>
+        </p:nvSpPr>
+        <p:spPr/>
+        <p:txBody>
+          <a:bodyPr/>
+          <a:lstStyle/>
+          <a:p>
+            <a:pPr>
+              <a:defRPr/>
+            </a:pPr>
+            <a:fld id="{486618C1-054C-4E1D-BC19-6E8A9BAB5F99}" type="slidenum">
+              <a:rPr lang="en-US" smtClean="0"/>
+              <a:pPr>
+                <a:defRPr/>
+              </a:pPr>
+              <a:t>25</a:t>
             </a:fld>
             <a:endParaRPr lang="en-US"/>
           </a:p>
@@ -6392,7 +7925,7 @@
 </p:sld>
 </file>
 
-<file path=ppt/slides/slide18.xml><?xml version="1.0" encoding="utf-8"?>
+<file path=ppt/slides/slide26.xml><?xml version="1.0" encoding="utf-8"?>
 <p:sld xmlns:a="http://schemas.openxmlformats.org/drawingml/2006/main" xmlns:r="http://schemas.openxmlformats.org/officeDocument/2006/relationships" xmlns:p="http://schemas.openxmlformats.org/presentationml/2006/main">
   <p:cSld>
     <p:spTree>
@@ -6480,7 +8013,7 @@
               <a:pPr>
                 <a:defRPr/>
               </a:pPr>
-              <a:t>18</a:t>
+              <a:t>26</a:t>
             </a:fld>
             <a:endParaRPr lang="en-US"/>
           </a:p>
@@ -6531,7 +8064,7 @@
 </p:sld>
 </file>
 
-<file path=ppt/slides/slide19.xml><?xml version="1.0" encoding="utf-8"?>
+<file path=ppt/slides/slide27.xml><?xml version="1.0" encoding="utf-8"?>
 <p:sld xmlns:a="http://schemas.openxmlformats.org/drawingml/2006/main" xmlns:r="http://schemas.openxmlformats.org/officeDocument/2006/relationships" xmlns:p="http://schemas.openxmlformats.org/presentationml/2006/main">
   <p:cSld>
     <p:spTree>
@@ -6597,25 +8130,50 @@
           <a:p>
             <a:r>
               <a:rPr lang="en-US" dirty="0" smtClean="0"/>
-              <a:t>Biometric template attack</a:t>
+              <a:t>Biometric template attack: Non-invertible.</a:t>
             </a:r>
           </a:p>
           <a:p>
             <a:r>
               <a:rPr lang="en-US" dirty="0" smtClean="0"/>
-              <a:t>Replay attack</a:t>
-            </a:r>
-          </a:p>
-          <a:p>
+              <a:t>Replay attack: N</a:t>
+            </a:r>
+            <a:r>
+              <a:rPr lang="en-US" baseline="-25000" dirty="0" smtClean="0"/>
+              <a:t>A</a:t>
+            </a:r>
             <a:r>
               <a:rPr lang="en-US" dirty="0" smtClean="0"/>
-              <a:t>Man-midle-attack</a:t>
-            </a:r>
+              <a:t> và K</a:t>
+            </a:r>
+            <a:r>
+              <a:rPr lang="en-US" baseline="-25000" dirty="0" smtClean="0"/>
+              <a:t>A.</a:t>
+            </a:r>
+            <a:endParaRPr lang="en-US" dirty="0" smtClean="0"/>
           </a:p>
           <a:p>
             <a:r>
               <a:rPr lang="en-US" dirty="0" smtClean="0"/>
-              <a:t>Insider attack</a:t>
+              <a:t>Man-midle-attack: mutual authentication.</a:t>
+            </a:r>
+          </a:p>
+          <a:p>
+            <a:r>
+              <a:rPr lang="en-US" dirty="0" smtClean="0"/>
+              <a:t>Insider attack: S</a:t>
+            </a:r>
+            <a:r>
+              <a:rPr lang="en-US" baseline="-25000" dirty="0" smtClean="0"/>
+              <a:t>1</a:t>
+            </a:r>
+            <a:r>
+              <a:rPr lang="en-US" dirty="0" smtClean="0"/>
+              <a:t> and S</a:t>
+            </a:r>
+            <a:r>
+              <a:rPr lang="en-US" baseline="-25000" dirty="0" smtClean="0"/>
+              <a:t>2</a:t>
             </a:r>
             <a:endParaRPr lang="en-US" dirty="0"/>
           </a:p>
@@ -6644,7 +8202,7 @@
               <a:pPr>
                 <a:defRPr/>
               </a:pPr>
-              <a:t>19</a:t>
+              <a:t>27</a:t>
             </a:fld>
             <a:endParaRPr lang="en-US"/>
           </a:p>
@@ -6654,136 +8212,6 @@
     <p:extLst>
       <p:ext uri="{BB962C8B-B14F-4D97-AF65-F5344CB8AC3E}">
         <p14:creationId xmlns:p14="http://schemas.microsoft.com/office/powerpoint/2010/main" val="346600327"/>
-      </p:ext>
-    </p:extLst>
-  </p:cSld>
-  <p:clrMapOvr>
-    <a:masterClrMapping/>
-  </p:clrMapOvr>
-  <p:transition spd="med">
-    <p:fade/>
-  </p:transition>
-</p:sld>
-</file>
-
-<file path=ppt/slides/slide2.xml><?xml version="1.0" encoding="utf-8"?>
-<p:sld xmlns:a="http://schemas.openxmlformats.org/drawingml/2006/main" xmlns:r="http://schemas.openxmlformats.org/officeDocument/2006/relationships" xmlns:p="http://schemas.openxmlformats.org/presentationml/2006/main">
-  <p:cSld>
-    <p:bg>
-      <p:bgPr>
-        <a:solidFill>
-          <a:srgbClr val="F8F8F8"/>
-        </a:solidFill>
-        <a:effectLst/>
-      </p:bgPr>
-    </p:bg>
-    <p:spTree>
-      <p:nvGrpSpPr>
-        <p:cNvPr id="1" name=""/>
-        <p:cNvGrpSpPr/>
-        <p:nvPr/>
-      </p:nvGrpSpPr>
-      <p:grpSpPr>
-        <a:xfrm>
-          <a:off x="0" y="0"/>
-          <a:ext cx="0" cy="0"/>
-          <a:chOff x="0" y="0"/>
-          <a:chExt cx="0" cy="0"/>
-        </a:xfrm>
-      </p:grpSpPr>
-      <p:sp>
-        <p:nvSpPr>
-          <p:cNvPr id="2" name="Title 1"/>
-          <p:cNvSpPr>
-            <a:spLocks noGrp="1"/>
-          </p:cNvSpPr>
-          <p:nvPr>
-            <p:ph type="title"/>
-          </p:nvPr>
-        </p:nvSpPr>
-        <p:spPr/>
-        <p:txBody>
-          <a:bodyPr/>
-          <a:lstStyle/>
-          <a:p>
-            <a:r>
-              <a:rPr lang="en-US" sz="3000" dirty="0" smtClean="0"/>
-              <a:t>Giới thiệu đề tài</a:t>
-            </a:r>
-            <a:endParaRPr lang="en-US" sz="3000" dirty="0"/>
-          </a:p>
-        </p:txBody>
-      </p:sp>
-      <p:sp>
-        <p:nvSpPr>
-          <p:cNvPr id="3" name="Content Placeholder 2"/>
-          <p:cNvSpPr>
-            <a:spLocks noGrp="1"/>
-          </p:cNvSpPr>
-          <p:nvPr>
-            <p:ph idx="1"/>
-          </p:nvPr>
-        </p:nvSpPr>
-        <p:spPr/>
-        <p:txBody>
-          <a:bodyPr/>
-          <a:lstStyle/>
-          <a:p>
-            <a:r>
-              <a:rPr lang="en-US" dirty="0" smtClean="0"/>
-              <a:t>Sự lỗi thời của hệ thống xác thực cũ.</a:t>
-            </a:r>
-          </a:p>
-          <a:p>
-            <a:r>
-              <a:rPr lang="en-US" sz="2800" dirty="0" smtClean="0"/>
-              <a:t>Giới hạn từ phía người dùng.</a:t>
-            </a:r>
-          </a:p>
-          <a:p>
-            <a:r>
-              <a:rPr lang="en-US" dirty="0" smtClean="0"/>
-              <a:t>Chưa có hệ thống nào thực sự được đưa vào thực tiễn với quy mô lớn.</a:t>
-            </a:r>
-          </a:p>
-          <a:p>
-            <a:endParaRPr lang="en-US" sz="2800" dirty="0" smtClean="0"/>
-          </a:p>
-        </p:txBody>
-      </p:sp>
-      <p:sp>
-        <p:nvSpPr>
-          <p:cNvPr id="4" name="Slide Number Placeholder 3"/>
-          <p:cNvSpPr>
-            <a:spLocks noGrp="1"/>
-          </p:cNvSpPr>
-          <p:nvPr>
-            <p:ph type="sldNum" sz="quarter" idx="12"/>
-          </p:nvPr>
-        </p:nvSpPr>
-        <p:spPr/>
-        <p:txBody>
-          <a:bodyPr/>
-          <a:lstStyle/>
-          <a:p>
-            <a:pPr>
-              <a:defRPr/>
-            </a:pPr>
-            <a:fld id="{486618C1-054C-4E1D-BC19-6E8A9BAB5F99}" type="slidenum">
-              <a:rPr lang="en-US" smtClean="0"/>
-              <a:pPr>
-                <a:defRPr/>
-              </a:pPr>
-              <a:t>2</a:t>
-            </a:fld>
-            <a:endParaRPr lang="en-US"/>
-          </a:p>
-        </p:txBody>
-      </p:sp>
-    </p:spTree>
-    <p:extLst>
-      <p:ext uri="{BB962C8B-B14F-4D97-AF65-F5344CB8AC3E}">
-        <p14:creationId xmlns:p14="http://schemas.microsoft.com/office/powerpoint/2010/main" val="3603639932"/>
       </p:ext>
     </p:extLst>
   </p:cSld>
@@ -6803,7 +8231,7 @@
 </p:sld>
 </file>
 
-<file path=ppt/slides/slide20.xml><?xml version="1.0" encoding="utf-8"?>
+<file path=ppt/slides/slide28.xml><?xml version="1.0" encoding="utf-8"?>
 <p:sld xmlns:a="http://schemas.openxmlformats.org/drawingml/2006/main" xmlns:r="http://schemas.openxmlformats.org/officeDocument/2006/relationships" xmlns:p="http://schemas.openxmlformats.org/presentationml/2006/main">
   <p:cSld>
     <p:spTree>
@@ -6837,19 +8265,7 @@
           <a:p>
             <a:r>
               <a:rPr lang="en-US" dirty="0" smtClean="0"/>
-              <a:t>Đánh </a:t>
-            </a:r>
-            <a:r>
-              <a:rPr lang="en-US" dirty="0" smtClean="0"/>
-              <a:t>giá</a:t>
-            </a:r>
-            <a:r>
-              <a:rPr lang="en-US" dirty="0" smtClean="0"/>
-              <a:t> </a:t>
-            </a:r>
-            <a:r>
-              <a:rPr lang="en-US" dirty="0" smtClean="0"/>
-              <a:t>PCA</a:t>
+              <a:t>Đánh giá PCA</a:t>
             </a:r>
             <a:endParaRPr lang="en-US" dirty="0"/>
           </a:p>
@@ -6907,7 +8323,7 @@
               <a:pPr>
                 <a:defRPr/>
               </a:pPr>
-              <a:t>20</a:t>
+              <a:t>28</a:t>
             </a:fld>
             <a:endParaRPr lang="en-US"/>
           </a:p>
@@ -6926,10 +8342,17 @@
   <p:transition spd="med">
     <p:fade/>
   </p:transition>
+  <p:timing>
+    <p:tnLst>
+      <p:par>
+        <p:cTn id="1" dur="indefinite" restart="never" nodeType="tmRoot"/>
+      </p:par>
+    </p:tnLst>
+  </p:timing>
 </p:sld>
 </file>
 
-<file path=ppt/slides/slide21.xml><?xml version="1.0" encoding="utf-8"?>
+<file path=ppt/slides/slide29.xml><?xml version="1.0" encoding="utf-8"?>
 <p:sld xmlns:a="http://schemas.openxmlformats.org/drawingml/2006/main" xmlns:r="http://schemas.openxmlformats.org/officeDocument/2006/relationships" xmlns:p="http://schemas.openxmlformats.org/presentationml/2006/main">
   <p:cSld>
     <p:spTree>
@@ -6963,7 +8386,7 @@
           <a:p>
             <a:r>
               <a:rPr lang="en-US" dirty="0" smtClean="0"/>
-              <a:t>Kiểm tra độ tương thích PCA</a:t>
+              <a:t>Đánh giá PCA(thống kê)</a:t>
             </a:r>
             <a:endParaRPr lang="en-US" dirty="0"/>
           </a:p>
@@ -7021,7 +8444,7 @@
               <a:pPr>
                 <a:defRPr/>
               </a:pPr>
-              <a:t>21</a:t>
+              <a:t>29</a:t>
             </a:fld>
             <a:endParaRPr lang="en-US"/>
           </a:p>
@@ -7040,10 +8463,17 @@
   <p:transition spd="med">
     <p:fade/>
   </p:transition>
+  <p:timing>
+    <p:tnLst>
+      <p:par>
+        <p:cTn id="1" dur="indefinite" restart="never" nodeType="tmRoot"/>
+      </p:par>
+    </p:tnLst>
+  </p:timing>
 </p:sld>
 </file>
 
-<file path=ppt/slides/slide22.xml><?xml version="1.0" encoding="utf-8"?>
+<file path=ppt/slides/slide3.xml><?xml version="1.0" encoding="utf-8"?>
 <p:sld xmlns:a="http://schemas.openxmlformats.org/drawingml/2006/main" xmlns:r="http://schemas.openxmlformats.org/officeDocument/2006/relationships" xmlns:p="http://schemas.openxmlformats.org/presentationml/2006/main">
   <p:cSld>
     <p:spTree>
@@ -7077,7 +8507,164 @@
           <a:p>
             <a:r>
               <a:rPr lang="en-US" dirty="0" smtClean="0"/>
-              <a:t>Histogram PCA</a:t>
+              <a:t>Nội </a:t>
+            </a:r>
+            <a:r>
+              <a:rPr lang="en-US" dirty="0" smtClean="0"/>
+              <a:t>dung</a:t>
+            </a:r>
+            <a:endParaRPr lang="en-US" dirty="0"/>
+          </a:p>
+        </p:txBody>
+      </p:sp>
+      <p:sp>
+        <p:nvSpPr>
+          <p:cNvPr id="3" name="Content Placeholder 2"/>
+          <p:cNvSpPr>
+            <a:spLocks noGrp="1"/>
+          </p:cNvSpPr>
+          <p:nvPr>
+            <p:ph idx="1"/>
+          </p:nvPr>
+        </p:nvSpPr>
+        <p:spPr/>
+        <p:txBody>
+          <a:bodyPr/>
+          <a:lstStyle/>
+          <a:p>
+            <a:r>
+              <a:rPr lang="en-US" b="1" dirty="0" smtClean="0"/>
+              <a:t>Giới thiệu đề tài</a:t>
+            </a:r>
+            <a:endParaRPr lang="en-US" b="1" dirty="0" smtClean="0"/>
+          </a:p>
+          <a:p>
+            <a:r>
+              <a:rPr lang="en-US" dirty="0" smtClean="0"/>
+              <a:t>Sinh trắc</a:t>
+            </a:r>
+            <a:endParaRPr lang="en-US" dirty="0" smtClean="0"/>
+          </a:p>
+          <a:p>
+            <a:r>
+              <a:rPr lang="en-US" dirty="0" smtClean="0"/>
+              <a:t>Kĩ </a:t>
+            </a:r>
+            <a:r>
+              <a:rPr lang="en-US" dirty="0" smtClean="0"/>
+              <a:t>thuật bảo </a:t>
+            </a:r>
+            <a:r>
+              <a:rPr lang="en-US" dirty="0" smtClean="0"/>
+              <a:t>vệ mẫu sinh trắc</a:t>
+            </a:r>
+          </a:p>
+          <a:p>
+            <a:r>
+              <a:rPr lang="en-US" dirty="0" smtClean="0"/>
+              <a:t>Mô hình đề xuất</a:t>
+            </a:r>
+            <a:endParaRPr lang="en-US" dirty="0" smtClean="0"/>
+          </a:p>
+          <a:p>
+            <a:r>
+              <a:rPr lang="en-US" dirty="0" smtClean="0"/>
+              <a:t>Đánh </a:t>
+            </a:r>
+            <a:r>
+              <a:rPr lang="en-US" dirty="0" smtClean="0"/>
+              <a:t>giá</a:t>
+            </a:r>
+          </a:p>
+          <a:p>
+            <a:r>
+              <a:rPr lang="en-US" dirty="0" smtClean="0"/>
+              <a:t>Kết luận</a:t>
+            </a:r>
+            <a:endParaRPr lang="en-US" dirty="0"/>
+          </a:p>
+        </p:txBody>
+      </p:sp>
+      <p:sp>
+        <p:nvSpPr>
+          <p:cNvPr id="4" name="Slide Number Placeholder 3"/>
+          <p:cNvSpPr>
+            <a:spLocks noGrp="1"/>
+          </p:cNvSpPr>
+          <p:nvPr>
+            <p:ph type="sldNum" sz="quarter" idx="12"/>
+          </p:nvPr>
+        </p:nvSpPr>
+        <p:spPr/>
+        <p:txBody>
+          <a:bodyPr/>
+          <a:lstStyle/>
+          <a:p>
+            <a:pPr>
+              <a:defRPr/>
+            </a:pPr>
+            <a:fld id="{486618C1-054C-4E1D-BC19-6E8A9BAB5F99}" type="slidenum">
+              <a:rPr lang="en-US" smtClean="0"/>
+              <a:pPr>
+                <a:defRPr/>
+              </a:pPr>
+              <a:t>3</a:t>
+            </a:fld>
+            <a:endParaRPr lang="en-US"/>
+          </a:p>
+        </p:txBody>
+      </p:sp>
+    </p:spTree>
+    <p:extLst>
+      <p:ext uri="{BB962C8B-B14F-4D97-AF65-F5344CB8AC3E}">
+        <p14:creationId xmlns:p14="http://schemas.microsoft.com/office/powerpoint/2010/main" val="168371941"/>
+      </p:ext>
+    </p:extLst>
+  </p:cSld>
+  <p:clrMapOvr>
+    <a:masterClrMapping/>
+  </p:clrMapOvr>
+  <p:transition spd="med">
+    <p:fade/>
+  </p:transition>
+</p:sld>
+</file>
+
+<file path=ppt/slides/slide30.xml><?xml version="1.0" encoding="utf-8"?>
+<p:sld xmlns:a="http://schemas.openxmlformats.org/drawingml/2006/main" xmlns:r="http://schemas.openxmlformats.org/officeDocument/2006/relationships" xmlns:p="http://schemas.openxmlformats.org/presentationml/2006/main">
+  <p:cSld>
+    <p:spTree>
+      <p:nvGrpSpPr>
+        <p:cNvPr id="1" name=""/>
+        <p:cNvGrpSpPr/>
+        <p:nvPr/>
+      </p:nvGrpSpPr>
+      <p:grpSpPr>
+        <a:xfrm>
+          <a:off x="0" y="0"/>
+          <a:ext cx="0" cy="0"/>
+          <a:chOff x="0" y="0"/>
+          <a:chExt cx="0" cy="0"/>
+        </a:xfrm>
+      </p:grpSpPr>
+      <p:sp>
+        <p:nvSpPr>
+          <p:cNvPr id="2" name="Title 1"/>
+          <p:cNvSpPr>
+            <a:spLocks noGrp="1"/>
+          </p:cNvSpPr>
+          <p:nvPr>
+            <p:ph type="title"/>
+          </p:nvPr>
+        </p:nvSpPr>
+        <p:spPr/>
+        <p:txBody>
+          <a:bodyPr/>
+          <a:lstStyle/>
+          <a:p>
+            <a:r>
+              <a:rPr lang="en-US" dirty="0" smtClean="0"/>
+              <a:t>Đánh giá PCA(Histogram)</a:t>
             </a:r>
             <a:endParaRPr lang="en-US" dirty="0"/>
           </a:p>
@@ -7135,7 +8722,7 @@
               <a:pPr>
                 <a:defRPr/>
               </a:pPr>
-              <a:t>22</a:t>
+              <a:t>30</a:t>
             </a:fld>
             <a:endParaRPr lang="en-US"/>
           </a:p>
@@ -7154,10 +8741,17 @@
   <p:transition spd="med">
     <p:fade/>
   </p:transition>
+  <p:timing>
+    <p:tnLst>
+      <p:par>
+        <p:cTn id="1" dur="indefinite" restart="never" nodeType="tmRoot"/>
+      </p:par>
+    </p:tnLst>
+  </p:timing>
 </p:sld>
 </file>
 
-<file path=ppt/slides/slide23.xml><?xml version="1.0" encoding="utf-8"?>
+<file path=ppt/slides/slide31.xml><?xml version="1.0" encoding="utf-8"?>
 <p:sld xmlns:a="http://schemas.openxmlformats.org/drawingml/2006/main" xmlns:r="http://schemas.openxmlformats.org/officeDocument/2006/relationships" xmlns:p="http://schemas.openxmlformats.org/presentationml/2006/main">
   <p:cSld>
     <p:spTree>
@@ -7196,7 +8790,7 @@
           <a:p>
             <a:r>
               <a:rPr lang="en-US" dirty="0" smtClean="0"/>
-              <a:t>Kiểm tra phương pháp trích xuất</a:t>
+              <a:t>Đánh giá PCA(FRR và FAR)</a:t>
             </a:r>
             <a:endParaRPr lang="en-US" dirty="0"/>
           </a:p>
@@ -7254,7 +8848,7 @@
               <a:pPr>
                 <a:defRPr/>
               </a:pPr>
-              <a:t>23</a:t>
+              <a:t>31</a:t>
             </a:fld>
             <a:endParaRPr lang="en-US"/>
           </a:p>
@@ -7273,10 +8867,17 @@
   <p:transition spd="med">
     <p:fade/>
   </p:transition>
+  <p:timing>
+    <p:tnLst>
+      <p:par>
+        <p:cTn id="1" dur="indefinite" restart="never" nodeType="tmRoot"/>
+      </p:par>
+    </p:tnLst>
+  </p:timing>
 </p:sld>
 </file>
 
-<file path=ppt/slides/slide24.xml><?xml version="1.0" encoding="utf-8"?>
+<file path=ppt/slides/slide32.xml><?xml version="1.0" encoding="utf-8"?>
 <p:sld xmlns:a="http://schemas.openxmlformats.org/drawingml/2006/main" xmlns:r="http://schemas.openxmlformats.org/officeDocument/2006/relationships" xmlns:p="http://schemas.openxmlformats.org/presentationml/2006/main">
   <p:cSld>
     <p:spTree>
@@ -7303,14 +8904,19 @@
             <p:ph type="title"/>
           </p:nvPr>
         </p:nvSpPr>
-        <p:spPr/>
+        <p:spPr>
+          <a:xfrm>
+            <a:off x="215153" y="126338"/>
+            <a:ext cx="8928847" cy="604198"/>
+          </a:xfrm>
+        </p:spPr>
         <p:txBody>
           <a:bodyPr/>
           <a:lstStyle/>
           <a:p>
             <a:r>
               <a:rPr lang="en-US" dirty="0" smtClean="0"/>
-              <a:t>Kiểm tra Non-invertible Transform</a:t>
+              <a:t>Đánh giá Non-invertible Transform(FRR và FAR)</a:t>
             </a:r>
             <a:endParaRPr lang="en-US" dirty="0"/>
           </a:p>
@@ -7368,7 +8974,7 @@
               <a:pPr>
                 <a:defRPr/>
               </a:pPr>
-              <a:t>24</a:t>
+              <a:t>32</a:t>
             </a:fld>
             <a:endParaRPr lang="en-US"/>
           </a:p>
@@ -7387,10 +8993,17 @@
   <p:transition spd="med">
     <p:fade/>
   </p:transition>
+  <p:timing>
+    <p:tnLst>
+      <p:par>
+        <p:cTn id="1" dur="indefinite" restart="never" nodeType="tmRoot"/>
+      </p:par>
+    </p:tnLst>
+  </p:timing>
 </p:sld>
 </file>
 
-<file path=ppt/slides/slide25.xml><?xml version="1.0" encoding="utf-8"?>
+<file path=ppt/slides/slide33.xml><?xml version="1.0" encoding="utf-8"?>
 <p:sld xmlns:a="http://schemas.openxmlformats.org/drawingml/2006/main" xmlns:r="http://schemas.openxmlformats.org/officeDocument/2006/relationships" xmlns:p="http://schemas.openxmlformats.org/presentationml/2006/main">
   <p:cSld>
     <p:spTree>
@@ -7424,7 +9037,7 @@
           <a:p>
             <a:r>
               <a:rPr lang="en-US" dirty="0" smtClean="0"/>
-              <a:t>Kiểm tra hệ thống</a:t>
+              <a:t>Đánh giá hệ thống(FRR và FAR)</a:t>
             </a:r>
             <a:endParaRPr lang="en-US" dirty="0"/>
           </a:p>
@@ -7453,7 +9066,7 @@
               <a:pPr>
                 <a:defRPr/>
               </a:pPr>
-              <a:t>25</a:t>
+              <a:t>33</a:t>
             </a:fld>
             <a:endParaRPr lang="en-US"/>
           </a:p>
@@ -7509,10 +9122,17 @@
   <p:transition spd="med">
     <p:fade/>
   </p:transition>
+  <p:timing>
+    <p:tnLst>
+      <p:par>
+        <p:cTn id="1" dur="indefinite" restart="never" nodeType="tmRoot"/>
+      </p:par>
+    </p:tnLst>
+  </p:timing>
 </p:sld>
 </file>
 
-<file path=ppt/slides/slide26.xml><?xml version="1.0" encoding="utf-8"?>
+<file path=ppt/slides/slide34.xml><?xml version="1.0" encoding="utf-8"?>
 <p:sld xmlns:a="http://schemas.openxmlformats.org/drawingml/2006/main" xmlns:r="http://schemas.openxmlformats.org/officeDocument/2006/relationships" xmlns:p="http://schemas.openxmlformats.org/presentationml/2006/main">
   <p:cSld>
     <p:spTree>
@@ -7604,7 +9224,7 @@
               <a:pPr>
                 <a:defRPr/>
               </a:pPr>
-              <a:t>26</a:t>
+              <a:t>34</a:t>
             </a:fld>
             <a:endParaRPr lang="en-US"/>
           </a:p>
@@ -7623,10 +9243,17 @@
   <p:transition spd="med">
     <p:fade/>
   </p:transition>
+  <p:timing>
+    <p:tnLst>
+      <p:par>
+        <p:cTn id="1" dur="indefinite" restart="never" nodeType="tmRoot"/>
+      </p:par>
+    </p:tnLst>
+  </p:timing>
 </p:sld>
 </file>
 
-<file path=ppt/slides/slide27.xml><?xml version="1.0" encoding="utf-8"?>
+<file path=ppt/slides/slide35.xml><?xml version="1.0" encoding="utf-8"?>
 <p:sld xmlns:a="http://schemas.openxmlformats.org/drawingml/2006/main" xmlns:r="http://schemas.openxmlformats.org/officeDocument/2006/relationships" xmlns:p="http://schemas.openxmlformats.org/presentationml/2006/main">
   <p:cSld>
     <p:spTree>
@@ -7987,7 +9614,7 @@
               <a:pPr>
                 <a:defRPr/>
               </a:pPr>
-              <a:t>27</a:t>
+              <a:t>35</a:t>
             </a:fld>
             <a:endParaRPr lang="en-US"/>
           </a:p>
@@ -8011,7 +9638,153 @@
 </p:sld>
 </file>
 
-<file path=ppt/slides/slide3.xml><?xml version="1.0" encoding="utf-8"?>
+<file path=ppt/slides/slide4.xml><?xml version="1.0" encoding="utf-8"?>
+<p:sld xmlns:a="http://schemas.openxmlformats.org/drawingml/2006/main" xmlns:r="http://schemas.openxmlformats.org/officeDocument/2006/relationships" xmlns:p="http://schemas.openxmlformats.org/presentationml/2006/main">
+  <p:cSld>
+    <p:bg>
+      <p:bgPr>
+        <a:solidFill>
+          <a:srgbClr val="F8F8F8"/>
+        </a:solidFill>
+        <a:effectLst/>
+      </p:bgPr>
+    </p:bg>
+    <p:spTree>
+      <p:nvGrpSpPr>
+        <p:cNvPr id="1" name=""/>
+        <p:cNvGrpSpPr/>
+        <p:nvPr/>
+      </p:nvGrpSpPr>
+      <p:grpSpPr>
+        <a:xfrm>
+          <a:off x="0" y="0"/>
+          <a:ext cx="0" cy="0"/>
+          <a:chOff x="0" y="0"/>
+          <a:chExt cx="0" cy="0"/>
+        </a:xfrm>
+      </p:grpSpPr>
+      <p:sp>
+        <p:nvSpPr>
+          <p:cNvPr id="2" name="Title 1"/>
+          <p:cNvSpPr>
+            <a:spLocks noGrp="1"/>
+          </p:cNvSpPr>
+          <p:nvPr>
+            <p:ph type="title"/>
+          </p:nvPr>
+        </p:nvSpPr>
+        <p:spPr/>
+        <p:txBody>
+          <a:bodyPr/>
+          <a:lstStyle/>
+          <a:p>
+            <a:r>
+              <a:rPr lang="en-US" dirty="0" smtClean="0"/>
+              <a:t>Giới thiệu</a:t>
+            </a:r>
+            <a:endParaRPr lang="en-US" sz="3000" dirty="0"/>
+          </a:p>
+        </p:txBody>
+      </p:sp>
+      <p:sp>
+        <p:nvSpPr>
+          <p:cNvPr id="3" name="Content Placeholder 2"/>
+          <p:cNvSpPr>
+            <a:spLocks noGrp="1"/>
+          </p:cNvSpPr>
+          <p:nvPr>
+            <p:ph idx="1"/>
+          </p:nvPr>
+        </p:nvSpPr>
+        <p:spPr/>
+        <p:txBody>
+          <a:bodyPr/>
+          <a:lstStyle/>
+          <a:p>
+            <a:r>
+              <a:rPr lang="en-US" dirty="0" smtClean="0"/>
+              <a:t>Sự lỗi thời của hệ thống xác thực cũ.</a:t>
+            </a:r>
+          </a:p>
+          <a:p>
+            <a:r>
+              <a:rPr lang="en-US" sz="2800" dirty="0" smtClean="0"/>
+              <a:t>Giới hạn từ phía người dùng(pasword quá dài hoặc quá ngắn).</a:t>
+            </a:r>
+          </a:p>
+          <a:p>
+            <a:r>
+              <a:rPr lang="en-US" dirty="0" smtClean="0"/>
+              <a:t>Chưa có hệ thống nào thực sự được đưa vào thực tiễn với quy mô lớn.</a:t>
+            </a:r>
+          </a:p>
+          <a:p>
+            <a:pPr marL="0" indent="0">
+              <a:buNone/>
+            </a:pPr>
+            <a:r>
+              <a:rPr lang="en-US" dirty="0" smtClean="0"/>
+              <a:t>=&gt; Cần một hệ thống đáp ứng mọi yêu cầu bảo mật và có thể áp dụng trên thực tiễn.</a:t>
+            </a:r>
+          </a:p>
+          <a:p>
+            <a:endParaRPr lang="en-US" sz="2800" dirty="0" smtClean="0"/>
+          </a:p>
+        </p:txBody>
+      </p:sp>
+      <p:sp>
+        <p:nvSpPr>
+          <p:cNvPr id="4" name="Slide Number Placeholder 3"/>
+          <p:cNvSpPr>
+            <a:spLocks noGrp="1"/>
+          </p:cNvSpPr>
+          <p:nvPr>
+            <p:ph type="sldNum" sz="quarter" idx="12"/>
+          </p:nvPr>
+        </p:nvSpPr>
+        <p:spPr/>
+        <p:txBody>
+          <a:bodyPr/>
+          <a:lstStyle/>
+          <a:p>
+            <a:pPr>
+              <a:defRPr/>
+            </a:pPr>
+            <a:fld id="{486618C1-054C-4E1D-BC19-6E8A9BAB5F99}" type="slidenum">
+              <a:rPr lang="en-US" smtClean="0"/>
+              <a:pPr>
+                <a:defRPr/>
+              </a:pPr>
+              <a:t>4</a:t>
+            </a:fld>
+            <a:endParaRPr lang="en-US"/>
+          </a:p>
+        </p:txBody>
+      </p:sp>
+    </p:spTree>
+    <p:extLst>
+      <p:ext uri="{BB962C8B-B14F-4D97-AF65-F5344CB8AC3E}">
+        <p14:creationId xmlns:p14="http://schemas.microsoft.com/office/powerpoint/2010/main" val="3603639932"/>
+      </p:ext>
+    </p:extLst>
+  </p:cSld>
+  <p:clrMapOvr>
+    <a:masterClrMapping/>
+  </p:clrMapOvr>
+  <p:transition spd="med">
+    <p:fade/>
+  </p:transition>
+  <p:timing>
+    <p:tnLst>
+      <p:par>
+        <p:cTn id="1" dur="indefinite" restart="never" nodeType="tmRoot"/>
+      </p:par>
+    </p:tnLst>
+  </p:timing>
+</p:sld>
+</file>
+
+<file path=ppt/slides/slide5.xml><?xml version="1.0" encoding="utf-8"?>
 <p:sld xmlns:a="http://schemas.openxmlformats.org/drawingml/2006/main" xmlns:r="http://schemas.openxmlformats.org/officeDocument/2006/relationships" xmlns:p="http://schemas.openxmlformats.org/presentationml/2006/main">
   <p:cSld>
     <p:spTree>
@@ -8045,7 +9818,11 @@
           <a:p>
             <a:r>
               <a:rPr lang="en-US" dirty="0" smtClean="0"/>
-              <a:t>Nội dung luận văn</a:t>
+              <a:t>Nội </a:t>
+            </a:r>
+            <a:r>
+              <a:rPr lang="en-US" dirty="0" smtClean="0"/>
+              <a:t>dung</a:t>
             </a:r>
             <a:endParaRPr lang="en-US" dirty="0"/>
           </a:p>
@@ -8068,37 +9845,52 @@
           <a:p>
             <a:r>
               <a:rPr lang="en-US" dirty="0" smtClean="0"/>
-              <a:t>Hiện thực giao thức được đề xuất</a:t>
-            </a:r>
+              <a:t>Giới thiệu đề tài</a:t>
+            </a:r>
+            <a:endParaRPr lang="en-US" dirty="0" smtClean="0"/>
+          </a:p>
+          <a:p>
+            <a:r>
+              <a:rPr lang="en-US" b="1" dirty="0" smtClean="0"/>
+              <a:t>Sinh trắc</a:t>
+            </a:r>
+            <a:endParaRPr lang="en-US" b="1" dirty="0" smtClean="0"/>
           </a:p>
           <a:p>
             <a:r>
               <a:rPr lang="en-US" dirty="0" smtClean="0"/>
-              <a:t>Đọc hiểu hệ thống xác thực sinh trắc</a:t>
-            </a:r>
-          </a:p>
-          <a:p>
+              <a:t>Kĩ </a:t>
+            </a:r>
             <a:r>
               <a:rPr lang="en-US" dirty="0" smtClean="0"/>
-              <a:t>Đọc hiểu kĩ thuật bảo vệ sinh trắc: feature transform và fuzzy commitment</a:t>
-            </a:r>
-          </a:p>
-          <a:p>
+              <a:t>thuật bảo </a:t>
+            </a:r>
             <a:r>
               <a:rPr lang="en-US" dirty="0" smtClean="0"/>
-              <a:t>Hiện thực hai kĩ thuật trên</a:t>
+              <a:t>vệ mẫu sinh trắc</a:t>
             </a:r>
           </a:p>
           <a:p>
             <a:r>
               <a:rPr lang="en-US" dirty="0" smtClean="0"/>
-              <a:t>Nhúng hai kĩ thuật vào hệ thống xác thực từ xa có sử dụng đặc trưng sinh trắc</a:t>
-            </a:r>
+              <a:t>Mô hình đề xuất</a:t>
+            </a:r>
+            <a:endParaRPr lang="en-US" dirty="0" smtClean="0"/>
           </a:p>
           <a:p>
             <a:r>
               <a:rPr lang="en-US" dirty="0" smtClean="0"/>
-              <a:t>Đánh giá hệ thống</a:t>
+              <a:t>Đánh </a:t>
+            </a:r>
+            <a:r>
+              <a:rPr lang="en-US" dirty="0" smtClean="0"/>
+              <a:t>giá</a:t>
+            </a:r>
+          </a:p>
+          <a:p>
+            <a:r>
+              <a:rPr lang="en-US" dirty="0" smtClean="0"/>
+              <a:t>Kết luận</a:t>
             </a:r>
             <a:endParaRPr lang="en-US" dirty="0"/>
           </a:p>
@@ -8127,7 +9919,7 @@
               <a:pPr>
                 <a:defRPr/>
               </a:pPr>
-              <a:t>3</a:t>
+              <a:t>5</a:t>
             </a:fld>
             <a:endParaRPr lang="en-US"/>
           </a:p>
@@ -8136,7 +9928,7 @@
     </p:spTree>
     <p:extLst>
       <p:ext uri="{BB962C8B-B14F-4D97-AF65-F5344CB8AC3E}">
-        <p14:creationId xmlns:p14="http://schemas.microsoft.com/office/powerpoint/2010/main" val="3849723430"/>
+        <p14:creationId xmlns:p14="http://schemas.microsoft.com/office/powerpoint/2010/main" val="1465072780"/>
       </p:ext>
     </p:extLst>
   </p:cSld>
@@ -8149,7 +9941,7 @@
 </p:sld>
 </file>
 
-<file path=ppt/slides/slide4.xml><?xml version="1.0" encoding="utf-8"?>
+<file path=ppt/slides/slide6.xml><?xml version="1.0" encoding="utf-8"?>
 <p:sld xmlns:a="http://schemas.openxmlformats.org/drawingml/2006/main" xmlns:r="http://schemas.openxmlformats.org/officeDocument/2006/relationships" xmlns:p="http://schemas.openxmlformats.org/presentationml/2006/main">
   <p:cSld>
     <p:spTree>
@@ -8243,7 +10035,7 @@
               <a:pPr>
                 <a:defRPr/>
               </a:pPr>
-              <a:t>4</a:t>
+              <a:t>6</a:t>
             </a:fld>
             <a:endParaRPr lang="en-US"/>
           </a:p>
@@ -8325,228 +10117,6 @@
 </p:sld>
 </file>
 
-<file path=ppt/slides/slide5.xml><?xml version="1.0" encoding="utf-8"?>
-<p:sld xmlns:a="http://schemas.openxmlformats.org/drawingml/2006/main" xmlns:r="http://schemas.openxmlformats.org/officeDocument/2006/relationships" xmlns:p="http://schemas.openxmlformats.org/presentationml/2006/main">
-  <p:cSld>
-    <p:spTree>
-      <p:nvGrpSpPr>
-        <p:cNvPr id="1" name=""/>
-        <p:cNvGrpSpPr/>
-        <p:nvPr/>
-      </p:nvGrpSpPr>
-      <p:grpSpPr>
-        <a:xfrm>
-          <a:off x="0" y="0"/>
-          <a:ext cx="0" cy="0"/>
-          <a:chOff x="0" y="0"/>
-          <a:chExt cx="0" cy="0"/>
-        </a:xfrm>
-      </p:grpSpPr>
-      <p:sp>
-        <p:nvSpPr>
-          <p:cNvPr id="2" name="Title 1"/>
-          <p:cNvSpPr>
-            <a:spLocks noGrp="1"/>
-          </p:cNvSpPr>
-          <p:nvPr>
-            <p:ph type="title"/>
-          </p:nvPr>
-        </p:nvSpPr>
-        <p:spPr/>
-        <p:txBody>
-          <a:bodyPr/>
-          <a:lstStyle/>
-          <a:p>
-            <a:r>
-              <a:rPr lang="en-US" dirty="0" smtClean="0"/>
-              <a:t>Phương pháp bảo vệ mẫu sinh trắc</a:t>
-            </a:r>
-            <a:endParaRPr lang="en-US" dirty="0"/>
-          </a:p>
-        </p:txBody>
-      </p:sp>
-      <p:sp>
-        <p:nvSpPr>
-          <p:cNvPr id="4" name="Slide Number Placeholder 3"/>
-          <p:cNvSpPr>
-            <a:spLocks noGrp="1"/>
-          </p:cNvSpPr>
-          <p:nvPr>
-            <p:ph type="sldNum" sz="quarter" idx="12"/>
-          </p:nvPr>
-        </p:nvSpPr>
-        <p:spPr/>
-        <p:txBody>
-          <a:bodyPr/>
-          <a:lstStyle/>
-          <a:p>
-            <a:pPr>
-              <a:defRPr/>
-            </a:pPr>
-            <a:fld id="{486618C1-054C-4E1D-BC19-6E8A9BAB5F99}" type="slidenum">
-              <a:rPr lang="en-US" smtClean="0"/>
-              <a:pPr>
-                <a:defRPr/>
-              </a:pPr>
-              <a:t>5</a:t>
-            </a:fld>
-            <a:endParaRPr lang="en-US"/>
-          </a:p>
-        </p:txBody>
-      </p:sp>
-      <p:pic>
-        <p:nvPicPr>
-          <p:cNvPr id="6" name="Content Placeholder 5"/>
-          <p:cNvPicPr>
-            <a:picLocks noGrp="1"/>
-          </p:cNvPicPr>
-          <p:nvPr>
-            <p:ph idx="1"/>
-          </p:nvPr>
-        </p:nvPicPr>
-        <p:blipFill>
-          <a:blip r:embed="rId2"/>
-          <a:stretch>
-            <a:fillRect/>
-          </a:stretch>
-        </p:blipFill>
-        <p:spPr>
-          <a:xfrm>
-            <a:off x="1154428" y="1634863"/>
-            <a:ext cx="6849431" cy="3762900"/>
-          </a:xfrm>
-          <a:prstGeom prst="rect">
-            <a:avLst/>
-          </a:prstGeom>
-        </p:spPr>
-      </p:pic>
-    </p:spTree>
-    <p:extLst>
-      <p:ext uri="{BB962C8B-B14F-4D97-AF65-F5344CB8AC3E}">
-        <p14:creationId xmlns:p14="http://schemas.microsoft.com/office/powerpoint/2010/main" val="557920327"/>
-      </p:ext>
-    </p:extLst>
-  </p:cSld>
-  <p:clrMapOvr>
-    <a:masterClrMapping/>
-  </p:clrMapOvr>
-  <p:transition spd="med">
-    <p:fade/>
-  </p:transition>
-</p:sld>
-</file>
-
-<file path=ppt/slides/slide6.xml><?xml version="1.0" encoding="utf-8"?>
-<p:sld xmlns:a="http://schemas.openxmlformats.org/drawingml/2006/main" xmlns:r="http://schemas.openxmlformats.org/officeDocument/2006/relationships" xmlns:p="http://schemas.openxmlformats.org/presentationml/2006/main">
-  <p:cSld>
-    <p:spTree>
-      <p:nvGrpSpPr>
-        <p:cNvPr id="1" name=""/>
-        <p:cNvGrpSpPr/>
-        <p:nvPr/>
-      </p:nvGrpSpPr>
-      <p:grpSpPr>
-        <a:xfrm>
-          <a:off x="0" y="0"/>
-          <a:ext cx="0" cy="0"/>
-          <a:chOff x="0" y="0"/>
-          <a:chExt cx="0" cy="0"/>
-        </a:xfrm>
-      </p:grpSpPr>
-      <p:sp>
-        <p:nvSpPr>
-          <p:cNvPr id="2" name="Title 1"/>
-          <p:cNvSpPr>
-            <a:spLocks noGrp="1"/>
-          </p:cNvSpPr>
-          <p:nvPr>
-            <p:ph type="title"/>
-          </p:nvPr>
-        </p:nvSpPr>
-        <p:spPr/>
-        <p:txBody>
-          <a:bodyPr/>
-          <a:lstStyle/>
-          <a:p>
-            <a:r>
-              <a:rPr lang="en-US" dirty="0" smtClean="0"/>
-              <a:t>Non-invertible Transformation</a:t>
-            </a:r>
-            <a:endParaRPr lang="en-US" dirty="0"/>
-          </a:p>
-        </p:txBody>
-      </p:sp>
-      <p:sp>
-        <p:nvSpPr>
-          <p:cNvPr id="4" name="Slide Number Placeholder 3"/>
-          <p:cNvSpPr>
-            <a:spLocks noGrp="1"/>
-          </p:cNvSpPr>
-          <p:nvPr>
-            <p:ph type="sldNum" sz="quarter" idx="12"/>
-          </p:nvPr>
-        </p:nvSpPr>
-        <p:spPr/>
-        <p:txBody>
-          <a:bodyPr/>
-          <a:lstStyle/>
-          <a:p>
-            <a:pPr>
-              <a:defRPr/>
-            </a:pPr>
-            <a:fld id="{486618C1-054C-4E1D-BC19-6E8A9BAB5F99}" type="slidenum">
-              <a:rPr lang="en-US" smtClean="0"/>
-              <a:pPr>
-                <a:defRPr/>
-              </a:pPr>
-              <a:t>6</a:t>
-            </a:fld>
-            <a:endParaRPr lang="en-US"/>
-          </a:p>
-        </p:txBody>
-      </p:sp>
-      <p:pic>
-        <p:nvPicPr>
-          <p:cNvPr id="5" name="Content Placeholder 4"/>
-          <p:cNvPicPr>
-            <a:picLocks noGrp="1"/>
-          </p:cNvPicPr>
-          <p:nvPr>
-            <p:ph idx="1"/>
-          </p:nvPr>
-        </p:nvPicPr>
-        <p:blipFill>
-          <a:blip r:embed="rId2"/>
-          <a:stretch>
-            <a:fillRect/>
-          </a:stretch>
-        </p:blipFill>
-        <p:spPr>
-          <a:xfrm>
-            <a:off x="1073455" y="2249311"/>
-            <a:ext cx="7011378" cy="2534004"/>
-          </a:xfrm>
-          <a:prstGeom prst="rect">
-            <a:avLst/>
-          </a:prstGeom>
-        </p:spPr>
-      </p:pic>
-    </p:spTree>
-    <p:extLst>
-      <p:ext uri="{BB962C8B-B14F-4D97-AF65-F5344CB8AC3E}">
-        <p14:creationId xmlns:p14="http://schemas.microsoft.com/office/powerpoint/2010/main" val="4259602043"/>
-      </p:ext>
-    </p:extLst>
-  </p:cSld>
-  <p:clrMapOvr>
-    <a:masterClrMapping/>
-  </p:clrMapOvr>
-  <p:transition spd="med">
-    <p:fade/>
-  </p:transition>
-</p:sld>
-</file>
-
 <file path=ppt/slides/slide7.xml><?xml version="1.0" encoding="utf-8"?>
 <p:sld xmlns:a="http://schemas.openxmlformats.org/drawingml/2006/main" xmlns:r="http://schemas.openxmlformats.org/officeDocument/2006/relationships" xmlns:p="http://schemas.openxmlformats.org/presentationml/2006/main">
   <p:cSld>
@@ -8574,14 +10144,19 @@
             <p:ph type="title"/>
           </p:nvPr>
         </p:nvSpPr>
-        <p:spPr/>
+        <p:spPr>
+          <a:xfrm>
+            <a:off x="215153" y="126338"/>
+            <a:ext cx="8928847" cy="604198"/>
+          </a:xfrm>
+        </p:spPr>
         <p:txBody>
           <a:bodyPr/>
           <a:lstStyle/>
           <a:p>
             <a:r>
               <a:rPr lang="en-US" dirty="0" smtClean="0"/>
-              <a:t>Đặc tính của Non-invertible transform</a:t>
+              <a:t>Đặc tính cần thiết để có thể đưa vào hệ thống</a:t>
             </a:r>
             <a:endParaRPr lang="en-US" dirty="0"/>
           </a:p>
@@ -8604,23 +10179,44 @@
           <a:p>
             <a:r>
               <a:rPr lang="en-US" dirty="0" smtClean="0"/>
-              <a:t>Homomorphic encryption.</a:t>
-            </a:r>
-            <a:br>
+              <a:t>Tính rộng rãi</a:t>
+            </a:r>
+          </a:p>
+          <a:p>
+            <a:r>
               <a:rPr lang="en-US" dirty="0" smtClean="0"/>
-            </a:br>
+              <a:t>Tính phân biệt</a:t>
+            </a:r>
+          </a:p>
+          <a:p>
             <a:r>
               <a:rPr lang="en-US" dirty="0" smtClean="0"/>
-              <a:t>T - T’ ~ F(T) - F(T’).</a:t>
+              <a:t>Tính ổn định</a:t>
             </a:r>
           </a:p>
           <a:p>
             <a:r>
               <a:rPr lang="en-US" dirty="0" smtClean="0"/>
-              <a:t>One-way transfromations(hash)</a:t>
-            </a:r>
-          </a:p>
-          <a:p>
+              <a:t>Tính dễ thu nhập</a:t>
+            </a:r>
+          </a:p>
+          <a:p>
+            <a:r>
+              <a:rPr lang="en-US" dirty="0" smtClean="0"/>
+              <a:t>Tính hiệu quả</a:t>
+            </a:r>
+          </a:p>
+          <a:p>
+            <a:r>
+              <a:rPr lang="en-US" dirty="0" smtClean="0"/>
+              <a:t>Tính chấp nhận được</a:t>
+            </a:r>
+          </a:p>
+          <a:p>
+            <a:r>
+              <a:rPr lang="en-US" dirty="0" smtClean="0"/>
+              <a:t>Chống giả mạo</a:t>
+            </a:r>
             <a:endParaRPr lang="en-US" dirty="0"/>
           </a:p>
         </p:txBody>
@@ -8657,7 +10253,7 @@
     </p:spTree>
     <p:extLst>
       <p:ext uri="{BB962C8B-B14F-4D97-AF65-F5344CB8AC3E}">
-        <p14:creationId xmlns:p14="http://schemas.microsoft.com/office/powerpoint/2010/main" val="2895429003"/>
+        <p14:creationId xmlns:p14="http://schemas.microsoft.com/office/powerpoint/2010/main" val="191703141"/>
       </p:ext>
     </p:extLst>
   </p:cSld>
@@ -8702,6 +10298,10 @@
           <a:bodyPr/>
           <a:lstStyle/>
           <a:p>
+            <a:r>
+              <a:rPr lang="en-US" dirty="0" smtClean="0"/>
+              <a:t>Authentication System</a:t>
+            </a:r>
             <a:endParaRPr lang="en-US" dirty="0"/>
           </a:p>
         </p:txBody>
@@ -8723,10 +10323,54 @@
           <a:p>
             <a:r>
               <a:rPr lang="en-US" dirty="0" smtClean="0"/>
-              <a:t>Đây là phép biến đổi một chiều dựa vào hàm biến đổi F.</a:t>
-            </a:r>
-          </a:p>
-          <a:p>
+              <a:t>Chức năng: Enrollment và Authentication</a:t>
+            </a:r>
+          </a:p>
+          <a:p>
+            <a:r>
+              <a:rPr lang="en-US" dirty="0" smtClean="0"/>
+              <a:t>Thành phần:</a:t>
+            </a:r>
+          </a:p>
+          <a:p>
+            <a:pPr lvl="1">
+              <a:buFont typeface="Arial" panose="020B0604020202020204" pitchFamily="34" charset="0"/>
+              <a:buChar char="•"/>
+            </a:pPr>
+            <a:r>
+              <a:rPr lang="en-US" dirty="0" smtClean="0"/>
+              <a:t>Capture</a:t>
+            </a:r>
+          </a:p>
+          <a:p>
+            <a:pPr lvl="1">
+              <a:buFont typeface="Arial" panose="020B0604020202020204" pitchFamily="34" charset="0"/>
+              <a:buChar char="•"/>
+            </a:pPr>
+            <a:r>
+              <a:rPr lang="en-US" dirty="0" smtClean="0"/>
+              <a:t>Feature Extractor</a:t>
+            </a:r>
+          </a:p>
+          <a:p>
+            <a:pPr lvl="1">
+              <a:buFont typeface="Arial" panose="020B0604020202020204" pitchFamily="34" charset="0"/>
+              <a:buChar char="•"/>
+            </a:pPr>
+            <a:r>
+              <a:rPr lang="en-US" dirty="0" smtClean="0"/>
+              <a:t>Matching</a:t>
+            </a:r>
+          </a:p>
+          <a:p>
+            <a:pPr lvl="1">
+              <a:buFont typeface="Arial" panose="020B0604020202020204" pitchFamily="34" charset="0"/>
+              <a:buChar char="•"/>
+            </a:pPr>
+            <a:r>
+              <a:rPr lang="en-US" dirty="0" smtClean="0"/>
+              <a:t>Decision</a:t>
+            </a:r>
             <a:endParaRPr lang="en-US" dirty="0"/>
           </a:p>
         </p:txBody>
@@ -8763,19 +10407,27 @@
       <p:pic>
         <p:nvPicPr>
           <p:cNvPr id="5" name="Picture 4"/>
-          <p:cNvPicPr/>
+          <p:cNvPicPr>
+            <a:picLocks noChangeAspect="1"/>
+          </p:cNvPicPr>
           <p:nvPr/>
         </p:nvPicPr>
         <p:blipFill>
-          <a:blip r:embed="rId2"/>
+          <a:blip r:embed="rId2">
+            <a:extLst>
+              <a:ext uri="{28A0092B-C50C-407E-A947-70E740481C1C}">
+                <a14:useLocalDpi xmlns:a14="http://schemas.microsoft.com/office/drawing/2010/main" val="0"/>
+              </a:ext>
+            </a:extLst>
+          </a:blip>
           <a:stretch>
             <a:fillRect/>
           </a:stretch>
         </p:blipFill>
         <p:spPr>
           <a:xfrm>
-            <a:off x="2296836" y="2292516"/>
-            <a:ext cx="4563773" cy="3400543"/>
+            <a:off x="3721190" y="2298031"/>
+            <a:ext cx="5335031" cy="3074769"/>
           </a:xfrm>
           <a:prstGeom prst="rect">
             <a:avLst/>
@@ -8785,7 +10437,7 @@
     </p:spTree>
     <p:extLst>
       <p:ext uri="{BB962C8B-B14F-4D97-AF65-F5344CB8AC3E}">
-        <p14:creationId xmlns:p14="http://schemas.microsoft.com/office/powerpoint/2010/main" val="243166183"/>
+        <p14:creationId xmlns:p14="http://schemas.microsoft.com/office/powerpoint/2010/main" val="3306582057"/>
       </p:ext>
     </p:extLst>
   </p:cSld>
@@ -8830,7 +10482,11 @@
           <a:bodyPr/>
           <a:lstStyle/>
           <a:p>
-            <a:endParaRPr lang="en-US"/>
+            <a:r>
+              <a:rPr lang="en-US" dirty="0" smtClean="0"/>
+              <a:t>Các loại tấn công</a:t>
+            </a:r>
+            <a:endParaRPr lang="en-US" dirty="0"/>
           </a:p>
         </p:txBody>
       </p:sp>
@@ -8851,8 +10507,10 @@
           <a:p>
             <a:r>
               <a:rPr lang="en-US" dirty="0" smtClean="0"/>
-              <a:t>Cốt lõi của phép biến đổi này là phép nhân ma trận. Với công thức tổng quá là y = A.x với x là mẫu sinh trắc gôc, A là ma trận trực giao, y là kết quả sau khi biến đổi, với ma trận trực giao được sinh ra theo phương pháp His-ham Al-assam.</a:t>
-            </a:r>
+              <a:t>Biometric template attack</a:t>
+            </a:r>
+          </a:p>
+          <a:p>
             <a:endParaRPr lang="en-US" dirty="0"/>
           </a:p>
         </p:txBody>
@@ -8886,10 +10544,40 @@
           </a:p>
         </p:txBody>
       </p:sp>
+      <p:pic>
+        <p:nvPicPr>
+          <p:cNvPr id="6" name="Picture 5"/>
+          <p:cNvPicPr>
+            <a:picLocks noChangeAspect="1"/>
+          </p:cNvPicPr>
+          <p:nvPr/>
+        </p:nvPicPr>
+        <p:blipFill>
+          <a:blip r:embed="rId2">
+            <a:extLst>
+              <a:ext uri="{28A0092B-C50C-407E-A947-70E740481C1C}">
+                <a14:useLocalDpi xmlns:a14="http://schemas.microsoft.com/office/drawing/2010/main" val="0"/>
+              </a:ext>
+            </a:extLst>
+          </a:blip>
+          <a:stretch>
+            <a:fillRect/>
+          </a:stretch>
+        </p:blipFill>
+        <p:spPr>
+          <a:xfrm>
+            <a:off x="757989" y="1985877"/>
+            <a:ext cx="7878077" cy="3115512"/>
+          </a:xfrm>
+          <a:prstGeom prst="rect">
+            <a:avLst/>
+          </a:prstGeom>
+        </p:spPr>
+      </p:pic>
     </p:spTree>
     <p:extLst>
       <p:ext uri="{BB962C8B-B14F-4D97-AF65-F5344CB8AC3E}">
-        <p14:creationId xmlns:p14="http://schemas.microsoft.com/office/powerpoint/2010/main" val="298590175"/>
+        <p14:creationId xmlns:p14="http://schemas.microsoft.com/office/powerpoint/2010/main" val="3500709561"/>
       </p:ext>
     </p:extLst>
   </p:cSld>

</xml_diff>

<commit_message>
lvtn update report 12
</commit_message>
<xml_diff>
--- a/Slide.pptx
+++ b/Slide.pptx
@@ -6,10 +6,10 @@
     <p:sldMasterId id="2147483656" r:id="rId5"/>
   </p:sldMasterIdLst>
   <p:notesMasterIdLst>
-    <p:notesMasterId r:id="rId41"/>
+    <p:notesMasterId r:id="rId45"/>
   </p:notesMasterIdLst>
   <p:handoutMasterIdLst>
-    <p:handoutMasterId r:id="rId42"/>
+    <p:handoutMasterId r:id="rId46"/>
   </p:handoutMasterIdLst>
   <p:sldIdLst>
     <p:sldId id="256" r:id="rId6"/>
@@ -36,17 +36,21 @@
     <p:sldId id="473" r:id="rId27"/>
     <p:sldId id="459" r:id="rId28"/>
     <p:sldId id="480" r:id="rId29"/>
-    <p:sldId id="460" r:id="rId30"/>
-    <p:sldId id="461" r:id="rId31"/>
-    <p:sldId id="462" r:id="rId32"/>
-    <p:sldId id="472" r:id="rId33"/>
-    <p:sldId id="464" r:id="rId34"/>
-    <p:sldId id="465" r:id="rId35"/>
-    <p:sldId id="466" r:id="rId36"/>
-    <p:sldId id="467" r:id="rId37"/>
-    <p:sldId id="463" r:id="rId38"/>
-    <p:sldId id="455" r:id="rId39"/>
-    <p:sldId id="394" r:id="rId40"/>
+    <p:sldId id="484" r:id="rId30"/>
+    <p:sldId id="460" r:id="rId31"/>
+    <p:sldId id="488" r:id="rId32"/>
+    <p:sldId id="461" r:id="rId33"/>
+    <p:sldId id="485" r:id="rId34"/>
+    <p:sldId id="462" r:id="rId35"/>
+    <p:sldId id="472" r:id="rId36"/>
+    <p:sldId id="464" r:id="rId37"/>
+    <p:sldId id="466" r:id="rId38"/>
+    <p:sldId id="467" r:id="rId39"/>
+    <p:sldId id="487" r:id="rId40"/>
+    <p:sldId id="463" r:id="rId41"/>
+    <p:sldId id="486" r:id="rId42"/>
+    <p:sldId id="455" r:id="rId43"/>
+    <p:sldId id="394" r:id="rId44"/>
   </p:sldIdLst>
   <p:sldSz cx="9144000" cy="6858000" type="screen4x3"/>
   <p:notesSz cx="9866313" cy="6754813"/>
@@ -531,7 +535,7 @@
           <a:p>
             <a:fld id="{B3D2EA87-6173-4DFB-9754-C2DB0166339E}" type="datetimeFigureOut">
               <a:rPr lang="en-US" smtClean="0"/>
-              <a:t>12/23/2016</a:t>
+              <a:t>12/28/2016</a:t>
             </a:fld>
             <a:endParaRPr lang="en-US"/>
           </a:p>
@@ -1362,7 +1366,7 @@
           <a:p>
             <a:fld id="{D4A788E2-4662-42DA-AE6D-55C618CE61F8}" type="datetimeFigureOut">
               <a:rPr lang="en-US" smtClean="0"/>
-              <a:t>12/23/2016</a:t>
+              <a:t>12/28/2016</a:t>
             </a:fld>
             <a:endParaRPr lang="en-US"/>
           </a:p>
@@ -1532,7 +1536,7 @@
           <a:p>
             <a:fld id="{D4A788E2-4662-42DA-AE6D-55C618CE61F8}" type="datetimeFigureOut">
               <a:rPr lang="en-US" smtClean="0"/>
-              <a:t>12/23/2016</a:t>
+              <a:t>12/28/2016</a:t>
             </a:fld>
             <a:endParaRPr lang="en-US"/>
           </a:p>
@@ -1712,7 +1716,7 @@
           <a:p>
             <a:fld id="{D4A788E2-4662-42DA-AE6D-55C618CE61F8}" type="datetimeFigureOut">
               <a:rPr lang="en-US" smtClean="0"/>
-              <a:t>12/23/2016</a:t>
+              <a:t>12/28/2016</a:t>
             </a:fld>
             <a:endParaRPr lang="en-US"/>
           </a:p>
@@ -1904,7 +1908,7 @@
           <a:p>
             <a:fld id="{D4A788E2-4662-42DA-AE6D-55C618CE61F8}" type="datetimeFigureOut">
               <a:rPr lang="en-US" smtClean="0"/>
-              <a:t>12/23/2016</a:t>
+              <a:t>12/28/2016</a:t>
             </a:fld>
             <a:endParaRPr lang="en-US"/>
           </a:p>
@@ -2074,7 +2078,7 @@
           <a:p>
             <a:fld id="{D4A788E2-4662-42DA-AE6D-55C618CE61F8}" type="datetimeFigureOut">
               <a:rPr lang="en-US" smtClean="0"/>
-              <a:t>12/23/2016</a:t>
+              <a:t>12/28/2016</a:t>
             </a:fld>
             <a:endParaRPr lang="en-US"/>
           </a:p>
@@ -2320,7 +2324,7 @@
           <a:p>
             <a:fld id="{D4A788E2-4662-42DA-AE6D-55C618CE61F8}" type="datetimeFigureOut">
               <a:rPr lang="en-US" smtClean="0"/>
-              <a:t>12/23/2016</a:t>
+              <a:t>12/28/2016</a:t>
             </a:fld>
             <a:endParaRPr lang="en-US"/>
           </a:p>
@@ -2552,7 +2556,7 @@
           <a:p>
             <a:fld id="{D4A788E2-4662-42DA-AE6D-55C618CE61F8}" type="datetimeFigureOut">
               <a:rPr lang="en-US" smtClean="0"/>
-              <a:t>12/23/2016</a:t>
+              <a:t>12/28/2016</a:t>
             </a:fld>
             <a:endParaRPr lang="en-US"/>
           </a:p>
@@ -2919,7 +2923,7 @@
           <a:p>
             <a:fld id="{D4A788E2-4662-42DA-AE6D-55C618CE61F8}" type="datetimeFigureOut">
               <a:rPr lang="en-US" smtClean="0"/>
-              <a:t>12/23/2016</a:t>
+              <a:t>12/28/2016</a:t>
             </a:fld>
             <a:endParaRPr lang="en-US"/>
           </a:p>
@@ -3037,7 +3041,7 @@
           <a:p>
             <a:fld id="{D4A788E2-4662-42DA-AE6D-55C618CE61F8}" type="datetimeFigureOut">
               <a:rPr lang="en-US" smtClean="0"/>
-              <a:t>12/23/2016</a:t>
+              <a:t>12/28/2016</a:t>
             </a:fld>
             <a:endParaRPr lang="en-US"/>
           </a:p>
@@ -3132,7 +3136,7 @@
           <a:p>
             <a:fld id="{D4A788E2-4662-42DA-AE6D-55C618CE61F8}" type="datetimeFigureOut">
               <a:rPr lang="en-US" smtClean="0"/>
-              <a:t>12/23/2016</a:t>
+              <a:t>12/28/2016</a:t>
             </a:fld>
             <a:endParaRPr lang="en-US"/>
           </a:p>
@@ -3409,7 +3413,7 @@
           <a:p>
             <a:fld id="{D4A788E2-4662-42DA-AE6D-55C618CE61F8}" type="datetimeFigureOut">
               <a:rPr lang="en-US" smtClean="0"/>
-              <a:t>12/23/2016</a:t>
+              <a:t>12/28/2016</a:t>
             </a:fld>
             <a:endParaRPr lang="en-US"/>
           </a:p>
@@ -4033,7 +4037,7 @@
           <a:p>
             <a:fld id="{D4A788E2-4662-42DA-AE6D-55C618CE61F8}" type="datetimeFigureOut">
               <a:rPr lang="en-US" smtClean="0"/>
-              <a:t>12/23/2016</a:t>
+              <a:t>12/28/2016</a:t>
             </a:fld>
             <a:endParaRPr lang="en-US"/>
           </a:p>
@@ -4778,23 +4782,7 @@
             </a:pPr>
             <a:r>
               <a:rPr lang="en-US" sz="2000" dirty="0" smtClean="0"/>
-              <a:t>SV</a:t>
-            </a:r>
-            <a:r>
-              <a:rPr lang="en-US" sz="2000" dirty="0" smtClean="0"/>
-              <a:t> </a:t>
-            </a:r>
-            <a:r>
-              <a:rPr lang="en-US" sz="2000" dirty="0" smtClean="0"/>
-              <a:t>thực </a:t>
-            </a:r>
-            <a:r>
-              <a:rPr lang="en-US" sz="2000" dirty="0" smtClean="0"/>
-              <a:t>hiện: </a:t>
-            </a:r>
-            <a:r>
-              <a:rPr lang="en-US" sz="2000" dirty="0" smtClean="0"/>
-              <a:t>Nguyễn Nam Tiệp</a:t>
+              <a:t>SV thực hiện: Nguyễn Nam Tiệp</a:t>
             </a:r>
             <a:endParaRPr lang="en-US" sz="2000" dirty="0"/>
           </a:p>
@@ -4988,7 +4976,7 @@
               <a:pPr>
                 <a:defRPr/>
               </a:pPr>
-              <a:t>Friday, December 23, 2016</a:t>
+              <a:t>Wednesday, December 28, 2016</a:t>
             </a:fld>
             <a:endParaRPr lang="en-US" dirty="0"/>
           </a:p>
@@ -5821,11 +5809,7 @@
           <a:p>
             <a:r>
               <a:rPr lang="en-US" dirty="0" smtClean="0"/>
-              <a:t>Nội </a:t>
-            </a:r>
-            <a:r>
-              <a:rPr lang="en-US" dirty="0" smtClean="0"/>
-              <a:t>dung</a:t>
+              <a:t>Nội dung</a:t>
             </a:r>
             <a:endParaRPr lang="en-US" dirty="0"/>
           </a:p>
@@ -5850,27 +5834,17 @@
               <a:rPr lang="en-US" dirty="0" smtClean="0"/>
               <a:t>Giới thiệu đề tài</a:t>
             </a:r>
-            <a:endParaRPr lang="en-US" dirty="0" smtClean="0"/>
           </a:p>
           <a:p>
             <a:r>
               <a:rPr lang="en-US" dirty="0" smtClean="0"/>
               <a:t>Sinh trắc</a:t>
             </a:r>
-            <a:endParaRPr lang="en-US" dirty="0" smtClean="0"/>
           </a:p>
           <a:p>
             <a:r>
               <a:rPr lang="en-US" b="1" dirty="0" smtClean="0"/>
-              <a:t>Kĩ </a:t>
-            </a:r>
-            <a:r>
-              <a:rPr lang="en-US" b="1" dirty="0" smtClean="0"/>
-              <a:t>thuật bảo </a:t>
-            </a:r>
-            <a:r>
-              <a:rPr lang="en-US" b="1" dirty="0" smtClean="0"/>
-              <a:t>vệ mẫu sinh trắc</a:t>
+              <a:t>Kĩ thuật bảo vệ mẫu sinh trắc</a:t>
             </a:r>
           </a:p>
           <a:p>
@@ -5878,16 +5852,11 @@
               <a:rPr lang="en-US" dirty="0" smtClean="0"/>
               <a:t>Mô hình đề xuất</a:t>
             </a:r>
-            <a:endParaRPr lang="en-US" dirty="0" smtClean="0"/>
           </a:p>
           <a:p>
             <a:r>
               <a:rPr lang="en-US" dirty="0" smtClean="0"/>
-              <a:t>Đánh </a:t>
-            </a:r>
-            <a:r>
-              <a:rPr lang="en-US" dirty="0" smtClean="0"/>
-              <a:t>giá</a:t>
+              <a:t>Đánh giá</a:t>
             </a:r>
           </a:p>
           <a:p>
@@ -6446,7 +6415,7 @@
           <a:p>
             <a:r>
               <a:rPr lang="en-US" dirty="0" smtClean="0"/>
-              <a:t>Tính chất của Non-invertible transform</a:t>
+              <a:t>Non-invertible transform</a:t>
             </a:r>
             <a:endParaRPr lang="en-US" dirty="0"/>
           </a:p>
@@ -6574,6 +6543,10 @@
           <a:bodyPr/>
           <a:lstStyle/>
           <a:p>
+            <a:r>
+              <a:rPr lang="en-US" dirty="0" smtClean="0"/>
+              <a:t>Random Projection</a:t>
+            </a:r>
             <a:endParaRPr lang="en-US" dirty="0"/>
           </a:p>
         </p:txBody>
@@ -6709,7 +6682,10 @@
           <a:bodyPr/>
           <a:lstStyle/>
           <a:p>
-            <a:endParaRPr lang="en-US"/>
+            <a:r>
+              <a:rPr lang="en-US" dirty="0"/>
+              <a:t>Random Projection</a:t>
+            </a:r>
           </a:p>
         </p:txBody>
       </p:sp>
@@ -6820,7 +6796,10 @@
           <a:bodyPr/>
           <a:lstStyle/>
           <a:p>
-            <a:endParaRPr lang="en-US" dirty="0"/>
+            <a:r>
+              <a:rPr lang="en-US" dirty="0"/>
+              <a:t>Random Projection</a:t>
+            </a:r>
           </a:p>
         </p:txBody>
       </p:sp>
@@ -6989,11 +6968,7 @@
           <a:p>
             <a:r>
               <a:rPr lang="en-US" dirty="0" smtClean="0"/>
-              <a:t>Nội </a:t>
-            </a:r>
-            <a:r>
-              <a:rPr lang="en-US" dirty="0" smtClean="0"/>
-              <a:t>dung</a:t>
+              <a:t>Nội dung</a:t>
             </a:r>
             <a:endParaRPr lang="en-US" dirty="0"/>
           </a:p>
@@ -7018,27 +6993,17 @@
               <a:rPr lang="en-US" dirty="0" smtClean="0"/>
               <a:t>Giới thiệu đề tài</a:t>
             </a:r>
-            <a:endParaRPr lang="en-US" dirty="0" smtClean="0"/>
           </a:p>
           <a:p>
             <a:r>
               <a:rPr lang="en-US" dirty="0" smtClean="0"/>
               <a:t>Sinh trắc</a:t>
             </a:r>
-            <a:endParaRPr lang="en-US" dirty="0" smtClean="0"/>
           </a:p>
           <a:p>
             <a:r>
               <a:rPr lang="en-US" dirty="0" smtClean="0"/>
-              <a:t>Kĩ </a:t>
-            </a:r>
-            <a:r>
-              <a:rPr lang="en-US" dirty="0" smtClean="0"/>
-              <a:t>thuật bảo </a:t>
-            </a:r>
-            <a:r>
-              <a:rPr lang="en-US" dirty="0" smtClean="0"/>
-              <a:t>vệ mẫu sinh trắc</a:t>
+              <a:t>Kĩ thuật bảo vệ mẫu sinh trắc</a:t>
             </a:r>
           </a:p>
           <a:p>
@@ -7046,16 +7011,11 @@
               <a:rPr lang="en-US" dirty="0" smtClean="0"/>
               <a:t>Mô hình đề xuất</a:t>
             </a:r>
-            <a:endParaRPr lang="en-US" dirty="0" smtClean="0"/>
           </a:p>
           <a:p>
             <a:r>
               <a:rPr lang="en-US" dirty="0" smtClean="0"/>
-              <a:t>Đánh </a:t>
-            </a:r>
-            <a:r>
-              <a:rPr lang="en-US" dirty="0" smtClean="0"/>
-              <a:t>giá</a:t>
+              <a:t>Đánh giá</a:t>
             </a:r>
           </a:p>
           <a:p>
@@ -7109,6 +7069,13 @@
   <p:transition spd="med">
     <p:fade/>
   </p:transition>
+  <p:timing>
+    <p:tnLst>
+      <p:par>
+        <p:cTn id="1" dur="indefinite" restart="never" nodeType="tmRoot"/>
+      </p:par>
+    </p:tnLst>
+  </p:timing>
 </p:sld>
 </file>
 
@@ -7292,7 +7259,7 @@
           <a:p>
             <a:r>
               <a:rPr lang="en-US" dirty="0" smtClean="0"/>
-              <a:t>Đặc điểm của fuzzy commitment</a:t>
+              <a:t>Fuzzy commitment</a:t>
             </a:r>
             <a:endParaRPr lang="en-US" dirty="0"/>
           </a:p>
@@ -7722,7 +7689,7 @@
           <a:p>
             <a:r>
               <a:rPr lang="en-US" dirty="0" smtClean="0"/>
-              <a:t>Kết quả của việc binding giữa key và biometric sẽ tạo ra một Biometric-Block và dữ liệu này an toàn và có thể public ra ngoài mà không sợ bị lộ key hay biometric.</a:t>
+              <a:t>Kết quả của việc binding giữa key và biometric sẽ tạo ra một Biometric-Block và dữ liệu này an toàn và có thể đưa ra ngoài mà không sợ bị lộ key hay biometric.</a:t>
             </a:r>
           </a:p>
           <a:p>
@@ -7820,7 +7787,7 @@
           <a:p>
             <a:r>
               <a:rPr lang="en-US" dirty="0" smtClean="0"/>
-              <a:t>Mô hình đề xuất.</a:t>
+              <a:t>Nội dung</a:t>
             </a:r>
             <a:endParaRPr lang="en-US" dirty="0"/>
           </a:p>
@@ -7843,10 +7810,38 @@
           <a:p>
             <a:r>
               <a:rPr lang="en-US" dirty="0" smtClean="0"/>
-              <a:t>Enrrollment.</a:t>
-            </a:r>
-          </a:p>
-          <a:p>
+              <a:t>Giới thiệu đề tài</a:t>
+            </a:r>
+          </a:p>
+          <a:p>
+            <a:r>
+              <a:rPr lang="en-US" dirty="0" smtClean="0"/>
+              <a:t>Sinh trắc</a:t>
+            </a:r>
+          </a:p>
+          <a:p>
+            <a:r>
+              <a:rPr lang="en-US" dirty="0" smtClean="0"/>
+              <a:t>Kĩ thuật bảo vệ mẫu sinh trắc</a:t>
+            </a:r>
+          </a:p>
+          <a:p>
+            <a:r>
+              <a:rPr lang="en-US" b="1" dirty="0" smtClean="0"/>
+              <a:t>Mô hình đề xuất</a:t>
+            </a:r>
+          </a:p>
+          <a:p>
+            <a:r>
+              <a:rPr lang="en-US" dirty="0" smtClean="0"/>
+              <a:t>Đánh giá</a:t>
+            </a:r>
+          </a:p>
+          <a:p>
+            <a:r>
+              <a:rPr lang="en-US" dirty="0" smtClean="0"/>
+              <a:t>Kết luận</a:t>
+            </a:r>
             <a:endParaRPr lang="en-US" dirty="0"/>
           </a:p>
         </p:txBody>
@@ -7880,32 +7875,10 @@
           </a:p>
         </p:txBody>
       </p:sp>
-      <p:pic>
-        <p:nvPicPr>
-          <p:cNvPr id="5" name="Picture 4"/>
-          <p:cNvPicPr/>
-          <p:nvPr/>
-        </p:nvPicPr>
-        <p:blipFill>
-          <a:blip r:embed="rId2"/>
-          <a:stretch>
-            <a:fillRect/>
-          </a:stretch>
-        </p:blipFill>
-        <p:spPr>
-          <a:xfrm>
-            <a:off x="2824699" y="1428283"/>
-            <a:ext cx="4809691" cy="4659696"/>
-          </a:xfrm>
-          <a:prstGeom prst="rect">
-            <a:avLst/>
-          </a:prstGeom>
-        </p:spPr>
-      </p:pic>
     </p:spTree>
     <p:extLst>
       <p:ext uri="{BB962C8B-B14F-4D97-AF65-F5344CB8AC3E}">
-        <p14:creationId xmlns:p14="http://schemas.microsoft.com/office/powerpoint/2010/main" val="3862760521"/>
+        <p14:creationId xmlns:p14="http://schemas.microsoft.com/office/powerpoint/2010/main" val="1113788996"/>
       </p:ext>
     </p:extLst>
   </p:cSld>
@@ -7915,13 +7888,6 @@
   <p:transition spd="med">
     <p:fade/>
   </p:transition>
-  <p:timing>
-    <p:tnLst>
-      <p:par>
-        <p:cTn id="1" dur="indefinite" restart="never" nodeType="tmRoot"/>
-      </p:par>
-    </p:tnLst>
-  </p:timing>
 </p:sld>
 </file>
 
@@ -7959,7 +7925,7 @@
           <a:p>
             <a:r>
               <a:rPr lang="en-US" dirty="0" smtClean="0"/>
-              <a:t>Mô hình đề xuất</a:t>
+              <a:t>Enrrollment</a:t>
             </a:r>
             <a:endParaRPr lang="en-US" dirty="0"/>
           </a:p>
@@ -7980,10 +7946,10 @@
           <a:bodyPr/>
           <a:lstStyle/>
           <a:p>
-            <a:r>
-              <a:rPr lang="en-US" dirty="0" smtClean="0"/>
-              <a:t>Authentication.</a:t>
-            </a:r>
+            <a:pPr marL="0" indent="0">
+              <a:buNone/>
+            </a:pPr>
+            <a:endParaRPr lang="en-US" dirty="0" smtClean="0"/>
           </a:p>
           <a:p>
             <a:endParaRPr lang="en-US" dirty="0"/>
@@ -8021,8 +7987,10 @@
       </p:sp>
       <p:pic>
         <p:nvPicPr>
-          <p:cNvPr id="5" name="Picture 4"/>
-          <p:cNvPicPr/>
+          <p:cNvPr id="6" name="Picture 5"/>
+          <p:cNvPicPr>
+            <a:picLocks noChangeAspect="1"/>
+          </p:cNvPicPr>
           <p:nvPr/>
         </p:nvPicPr>
         <p:blipFill>
@@ -8033,8 +8001,8 @@
         </p:blipFill>
         <p:spPr>
           <a:xfrm>
-            <a:off x="3196700" y="985721"/>
-            <a:ext cx="5732145" cy="4742180"/>
+            <a:off x="2173325" y="1183341"/>
+            <a:ext cx="4810796" cy="4658375"/>
           </a:xfrm>
           <a:prstGeom prst="rect">
             <a:avLst/>
@@ -8044,7 +8012,7 @@
     </p:spTree>
     <p:extLst>
       <p:ext uri="{BB962C8B-B14F-4D97-AF65-F5344CB8AC3E}">
-        <p14:creationId xmlns:p14="http://schemas.microsoft.com/office/powerpoint/2010/main" val="2954388798"/>
+        <p14:creationId xmlns:p14="http://schemas.microsoft.com/office/powerpoint/2010/main" val="3862760521"/>
       </p:ext>
     </p:extLst>
   </p:cSld>
@@ -8098,7 +8066,7 @@
           <a:p>
             <a:r>
               <a:rPr lang="en-US" dirty="0" smtClean="0"/>
-              <a:t>Đánh giá hệ thống</a:t>
+              <a:t>Authentication</a:t>
             </a:r>
             <a:endParaRPr lang="en-US" dirty="0"/>
           </a:p>
@@ -8119,63 +8087,7 @@
           <a:bodyPr/>
           <a:lstStyle/>
           <a:p>
-            <a:pPr marL="0" indent="0">
-              <a:buNone/>
-            </a:pPr>
-            <a:r>
-              <a:rPr lang="en-US" dirty="0" smtClean="0"/>
-              <a:t>Hệ thống có khả năng chống lại các loại tấn công.</a:t>
-            </a:r>
-          </a:p>
-          <a:p>
-            <a:r>
-              <a:rPr lang="en-US" dirty="0" smtClean="0"/>
-              <a:t>Biometric template attack: Non-invertible.</a:t>
-            </a:r>
-          </a:p>
-          <a:p>
-            <a:r>
-              <a:rPr lang="en-US" dirty="0" smtClean="0"/>
-              <a:t>Replay attack: N</a:t>
-            </a:r>
-            <a:r>
-              <a:rPr lang="en-US" baseline="-25000" dirty="0" smtClean="0"/>
-              <a:t>A</a:t>
-            </a:r>
-            <a:r>
-              <a:rPr lang="en-US" dirty="0" smtClean="0"/>
-              <a:t> và K</a:t>
-            </a:r>
-            <a:r>
-              <a:rPr lang="en-US" baseline="-25000" dirty="0" smtClean="0"/>
-              <a:t>A.</a:t>
-            </a:r>
-            <a:endParaRPr lang="en-US" dirty="0" smtClean="0"/>
-          </a:p>
-          <a:p>
-            <a:r>
-              <a:rPr lang="en-US" dirty="0" smtClean="0"/>
-              <a:t>Man-midle-attack: mutual authentication.</a:t>
-            </a:r>
-          </a:p>
-          <a:p>
-            <a:r>
-              <a:rPr lang="en-US" dirty="0" smtClean="0"/>
-              <a:t>Insider attack: S</a:t>
-            </a:r>
-            <a:r>
-              <a:rPr lang="en-US" baseline="-25000" dirty="0" smtClean="0"/>
-              <a:t>1</a:t>
-            </a:r>
-            <a:r>
-              <a:rPr lang="en-US" dirty="0" smtClean="0"/>
-              <a:t> and S</a:t>
-            </a:r>
-            <a:r>
-              <a:rPr lang="en-US" baseline="-25000" dirty="0" smtClean="0"/>
-              <a:t>2</a:t>
-            </a:r>
-            <a:endParaRPr lang="en-US" dirty="0"/>
+            <a:endParaRPr lang="en-US"/>
           </a:p>
         </p:txBody>
       </p:sp>
@@ -8211,7 +8123,7 @@
     </p:spTree>
     <p:extLst>
       <p:ext uri="{BB962C8B-B14F-4D97-AF65-F5344CB8AC3E}">
-        <p14:creationId xmlns:p14="http://schemas.microsoft.com/office/powerpoint/2010/main" val="346600327"/>
+        <p14:creationId xmlns:p14="http://schemas.microsoft.com/office/powerpoint/2010/main" val="1818911214"/>
       </p:ext>
     </p:extLst>
   </p:cSld>
@@ -8221,13 +8133,6 @@
   <p:transition spd="med">
     <p:fade/>
   </p:transition>
-  <p:timing>
-    <p:tnLst>
-      <p:par>
-        <p:cTn id="1" dur="indefinite" restart="never" nodeType="tmRoot"/>
-      </p:par>
-    </p:tnLst>
-  </p:timing>
 </p:sld>
 </file>
 
@@ -8265,7 +8170,7 @@
           <a:p>
             <a:r>
               <a:rPr lang="en-US" dirty="0" smtClean="0"/>
-              <a:t>Đánh giá PCA</a:t>
+              <a:t>Authentication</a:t>
             </a:r>
             <a:endParaRPr lang="en-US" dirty="0"/>
           </a:p>
@@ -8286,16 +8191,12 @@
           <a:bodyPr/>
           <a:lstStyle/>
           <a:p>
-            <a:r>
-              <a:rPr lang="en-US" dirty="0" smtClean="0"/>
-              <a:t>Là phần quan trọng nhất trước khi hoàn thiện hệ thống.</a:t>
-            </a:r>
-          </a:p>
-          <a:p>
-            <a:r>
-              <a:rPr lang="en-US" dirty="0" smtClean="0"/>
-              <a:t>Phương pháp này sử dụng độ lệch Euclidean distance giữa hai vector, liệu rằng nó có chấp nhận độ lệch mới được đề xuất trong luận văn này hay không?.(độ lệch giữa từng thành phần của vector sinh trắc).</a:t>
-            </a:r>
+            <a:pPr marL="0" indent="0">
+              <a:buNone/>
+            </a:pPr>
+            <a:endParaRPr lang="en-US" dirty="0" smtClean="0"/>
+          </a:p>
+          <a:p>
             <a:endParaRPr lang="en-US" dirty="0"/>
           </a:p>
         </p:txBody>
@@ -8329,10 +8230,34 @@
           </a:p>
         </p:txBody>
       </p:sp>
+      <p:pic>
+        <p:nvPicPr>
+          <p:cNvPr id="7" name="Picture 6"/>
+          <p:cNvPicPr>
+            <a:picLocks noChangeAspect="1"/>
+          </p:cNvPicPr>
+          <p:nvPr/>
+        </p:nvPicPr>
+        <p:blipFill>
+          <a:blip r:embed="rId2"/>
+          <a:stretch>
+            <a:fillRect/>
+          </a:stretch>
+        </p:blipFill>
+        <p:spPr>
+          <a:xfrm>
+            <a:off x="-26142" y="-192512"/>
+            <a:ext cx="9170142" cy="7607385"/>
+          </a:xfrm>
+          <a:prstGeom prst="rect">
+            <a:avLst/>
+          </a:prstGeom>
+        </p:spPr>
+      </p:pic>
     </p:spTree>
     <p:extLst>
       <p:ext uri="{BB962C8B-B14F-4D97-AF65-F5344CB8AC3E}">
-        <p14:creationId xmlns:p14="http://schemas.microsoft.com/office/powerpoint/2010/main" val="910024692"/>
+        <p14:creationId xmlns:p14="http://schemas.microsoft.com/office/powerpoint/2010/main" val="2954388798"/>
       </p:ext>
     </p:extLst>
   </p:cSld>
@@ -8386,41 +8311,65 @@
           <a:p>
             <a:r>
               <a:rPr lang="en-US" dirty="0" smtClean="0"/>
-              <a:t>Đánh giá PCA(thống kê)</a:t>
+              <a:t>Nội dung</a:t>
             </a:r>
             <a:endParaRPr lang="en-US" dirty="0"/>
           </a:p>
         </p:txBody>
       </p:sp>
-      <p:pic>
-        <p:nvPicPr>
-          <p:cNvPr id="5" name="Content Placeholder 4"/>
-          <p:cNvPicPr>
-            <a:picLocks noGrp="1" noChangeAspect="1"/>
-          </p:cNvPicPr>
+      <p:sp>
+        <p:nvSpPr>
+          <p:cNvPr id="3" name="Content Placeholder 2"/>
+          <p:cNvSpPr>
+            <a:spLocks noGrp="1"/>
+          </p:cNvSpPr>
           <p:nvPr>
             <p:ph idx="1"/>
           </p:nvPr>
-        </p:nvPicPr>
-        <p:blipFill>
-          <a:blip r:embed="rId2">
-            <a:extLst>
-              <a:ext uri="{28A0092B-C50C-407E-A947-70E740481C1C}">
-                <a14:useLocalDpi xmlns:a14="http://schemas.microsoft.com/office/drawing/2010/main" val="0"/>
-              </a:ext>
-            </a:extLst>
-          </a:blip>
-          <a:stretch>
-            <a:fillRect/>
-          </a:stretch>
-        </p:blipFill>
-        <p:spPr>
-          <a:xfrm>
-            <a:off x="170457" y="1323474"/>
-            <a:ext cx="8758388" cy="4102767"/>
-          </a:xfrm>
-        </p:spPr>
-      </p:pic>
+        </p:nvSpPr>
+        <p:spPr/>
+        <p:txBody>
+          <a:bodyPr/>
+          <a:lstStyle/>
+          <a:p>
+            <a:r>
+              <a:rPr lang="en-US" dirty="0" smtClean="0"/>
+              <a:t>Giới thiệu đề tài</a:t>
+            </a:r>
+          </a:p>
+          <a:p>
+            <a:r>
+              <a:rPr lang="en-US" dirty="0" smtClean="0"/>
+              <a:t>Sinh trắc</a:t>
+            </a:r>
+          </a:p>
+          <a:p>
+            <a:r>
+              <a:rPr lang="en-US" dirty="0" smtClean="0"/>
+              <a:t>Kĩ thuật bảo vệ mẫu sinh trắc</a:t>
+            </a:r>
+          </a:p>
+          <a:p>
+            <a:r>
+              <a:rPr lang="en-US" dirty="0" smtClean="0"/>
+              <a:t>Mô hình đề xuất</a:t>
+            </a:r>
+          </a:p>
+          <a:p>
+            <a:r>
+              <a:rPr lang="en-US" b="1" dirty="0" smtClean="0"/>
+              <a:t>Đánh giá</a:t>
+            </a:r>
+          </a:p>
+          <a:p>
+            <a:r>
+              <a:rPr lang="en-US" dirty="0" smtClean="0"/>
+              <a:t>Kết luận</a:t>
+            </a:r>
+            <a:endParaRPr lang="en-US" dirty="0"/>
+          </a:p>
+        </p:txBody>
+      </p:sp>
       <p:sp>
         <p:nvSpPr>
           <p:cNvPr id="4" name="Slide Number Placeholder 3"/>
@@ -8453,7 +8402,7 @@
     </p:spTree>
     <p:extLst>
       <p:ext uri="{BB962C8B-B14F-4D97-AF65-F5344CB8AC3E}">
-        <p14:creationId xmlns:p14="http://schemas.microsoft.com/office/powerpoint/2010/main" val="3708297768"/>
+        <p14:creationId xmlns:p14="http://schemas.microsoft.com/office/powerpoint/2010/main" val="2788321633"/>
       </p:ext>
     </p:extLst>
   </p:cSld>
@@ -8507,11 +8456,7 @@
           <a:p>
             <a:r>
               <a:rPr lang="en-US" dirty="0" smtClean="0"/>
-              <a:t>Nội </a:t>
-            </a:r>
-            <a:r>
-              <a:rPr lang="en-US" dirty="0" smtClean="0"/>
-              <a:t>dung</a:t>
+              <a:t>Nội dung</a:t>
             </a:r>
             <a:endParaRPr lang="en-US" dirty="0"/>
           </a:p>
@@ -8536,27 +8481,17 @@
               <a:rPr lang="en-US" b="1" dirty="0" smtClean="0"/>
               <a:t>Giới thiệu đề tài</a:t>
             </a:r>
-            <a:endParaRPr lang="en-US" b="1" dirty="0" smtClean="0"/>
           </a:p>
           <a:p>
             <a:r>
               <a:rPr lang="en-US" dirty="0" smtClean="0"/>
               <a:t>Sinh trắc</a:t>
             </a:r>
-            <a:endParaRPr lang="en-US" dirty="0" smtClean="0"/>
           </a:p>
           <a:p>
             <a:r>
               <a:rPr lang="en-US" dirty="0" smtClean="0"/>
-              <a:t>Kĩ </a:t>
-            </a:r>
-            <a:r>
-              <a:rPr lang="en-US" dirty="0" smtClean="0"/>
-              <a:t>thuật bảo </a:t>
-            </a:r>
-            <a:r>
-              <a:rPr lang="en-US" dirty="0" smtClean="0"/>
-              <a:t>vệ mẫu sinh trắc</a:t>
+              <a:t>Kĩ thuật bảo vệ mẫu sinh trắc</a:t>
             </a:r>
           </a:p>
           <a:p>
@@ -8564,16 +8499,11 @@
               <a:rPr lang="en-US" dirty="0" smtClean="0"/>
               <a:t>Mô hình đề xuất</a:t>
             </a:r>
-            <a:endParaRPr lang="en-US" dirty="0" smtClean="0"/>
           </a:p>
           <a:p>
             <a:r>
               <a:rPr lang="en-US" dirty="0" smtClean="0"/>
-              <a:t>Đánh </a:t>
-            </a:r>
-            <a:r>
-              <a:rPr lang="en-US" dirty="0" smtClean="0"/>
-              <a:t>giá</a:t>
+              <a:t>Đánh giá</a:t>
             </a:r>
           </a:p>
           <a:p>
@@ -8664,41 +8594,87 @@
           <a:p>
             <a:r>
               <a:rPr lang="en-US" dirty="0" smtClean="0"/>
-              <a:t>Đánh giá PCA(Histogram)</a:t>
+              <a:t>Đánh giá hệ thống</a:t>
             </a:r>
             <a:endParaRPr lang="en-US" dirty="0"/>
           </a:p>
         </p:txBody>
       </p:sp>
-      <p:pic>
-        <p:nvPicPr>
-          <p:cNvPr id="5" name="Content Placeholder 4"/>
-          <p:cNvPicPr>
-            <a:picLocks noGrp="1" noChangeAspect="1"/>
-          </p:cNvPicPr>
+      <p:sp>
+        <p:nvSpPr>
+          <p:cNvPr id="3" name="Content Placeholder 2"/>
+          <p:cNvSpPr>
+            <a:spLocks noGrp="1"/>
+          </p:cNvSpPr>
           <p:nvPr>
             <p:ph idx="1"/>
           </p:nvPr>
-        </p:nvPicPr>
-        <p:blipFill>
-          <a:blip r:embed="rId2">
-            <a:extLst>
-              <a:ext uri="{28A0092B-C50C-407E-A947-70E740481C1C}">
-                <a14:useLocalDpi xmlns:a14="http://schemas.microsoft.com/office/drawing/2010/main" val="0"/>
-              </a:ext>
-            </a:extLst>
-          </a:blip>
-          <a:stretch>
-            <a:fillRect/>
-          </a:stretch>
-        </p:blipFill>
-        <p:spPr>
-          <a:xfrm>
-            <a:off x="154821" y="1443790"/>
-            <a:ext cx="8861128" cy="4150894"/>
-          </a:xfrm>
-        </p:spPr>
-      </p:pic>
+        </p:nvSpPr>
+        <p:spPr/>
+        <p:txBody>
+          <a:bodyPr/>
+          <a:lstStyle/>
+          <a:p>
+            <a:pPr marL="0" indent="0">
+              <a:buNone/>
+            </a:pPr>
+            <a:r>
+              <a:rPr lang="en-US" dirty="0" smtClean="0"/>
+              <a:t>Hệ thống có khả năng chống lại các loại tấn công.</a:t>
+            </a:r>
+          </a:p>
+          <a:p>
+            <a:r>
+              <a:rPr lang="en-US" dirty="0" smtClean="0"/>
+              <a:t>Biometric template attack: Non-invertible.</a:t>
+            </a:r>
+          </a:p>
+          <a:p>
+            <a:r>
+              <a:rPr lang="en-US" dirty="0" smtClean="0"/>
+              <a:t>Replay attack: N</a:t>
+            </a:r>
+            <a:r>
+              <a:rPr lang="en-US" baseline="-25000" dirty="0" smtClean="0"/>
+              <a:t>A</a:t>
+            </a:r>
+            <a:r>
+              <a:rPr lang="en-US" dirty="0" smtClean="0"/>
+              <a:t> và K</a:t>
+            </a:r>
+            <a:r>
+              <a:rPr lang="en-US" baseline="-25000" dirty="0" smtClean="0"/>
+              <a:t>A.</a:t>
+            </a:r>
+            <a:endParaRPr lang="en-US" dirty="0" smtClean="0"/>
+          </a:p>
+          <a:p>
+            <a:r>
+              <a:rPr lang="en-US" dirty="0" smtClean="0"/>
+              <a:t>Man-midle-attack: mutual authentication.</a:t>
+            </a:r>
+          </a:p>
+          <a:p>
+            <a:r>
+              <a:rPr lang="en-US" dirty="0" smtClean="0"/>
+              <a:t>Insider attack: S</a:t>
+            </a:r>
+            <a:r>
+              <a:rPr lang="en-US" baseline="-25000" dirty="0" smtClean="0"/>
+              <a:t>1</a:t>
+            </a:r>
+            <a:r>
+              <a:rPr lang="en-US" dirty="0" smtClean="0"/>
+              <a:t> and S</a:t>
+            </a:r>
+            <a:r>
+              <a:rPr lang="en-US" baseline="-25000" dirty="0" smtClean="0"/>
+              <a:t>2</a:t>
+            </a:r>
+            <a:endParaRPr lang="en-US" dirty="0"/>
+          </a:p>
+        </p:txBody>
+      </p:sp>
       <p:sp>
         <p:nvSpPr>
           <p:cNvPr id="4" name="Slide Number Placeholder 3"/>
@@ -8731,7 +8707,7 @@
     </p:spTree>
     <p:extLst>
       <p:ext uri="{BB962C8B-B14F-4D97-AF65-F5344CB8AC3E}">
-        <p14:creationId xmlns:p14="http://schemas.microsoft.com/office/powerpoint/2010/main" val="2179442538"/>
+        <p14:creationId xmlns:p14="http://schemas.microsoft.com/office/powerpoint/2010/main" val="346600327"/>
       </p:ext>
     </p:extLst>
   </p:cSld>
@@ -8778,53 +8754,48 @@
             <p:ph type="title"/>
           </p:nvPr>
         </p:nvSpPr>
-        <p:spPr>
-          <a:xfrm>
-            <a:off x="215153" y="126338"/>
-            <a:ext cx="8606118" cy="604198"/>
-          </a:xfrm>
-        </p:spPr>
+        <p:spPr/>
         <p:txBody>
           <a:bodyPr/>
           <a:lstStyle/>
           <a:p>
             <a:r>
               <a:rPr lang="en-US" dirty="0" smtClean="0"/>
-              <a:t>Đánh giá PCA(FRR và FAR)</a:t>
+              <a:t>Đánh giá PCA</a:t>
             </a:r>
             <a:endParaRPr lang="en-US" dirty="0"/>
           </a:p>
         </p:txBody>
       </p:sp>
-      <p:pic>
-        <p:nvPicPr>
-          <p:cNvPr id="5" name="Content Placeholder 4"/>
-          <p:cNvPicPr>
-            <a:picLocks noGrp="1" noChangeAspect="1"/>
-          </p:cNvPicPr>
+      <p:sp>
+        <p:nvSpPr>
+          <p:cNvPr id="3" name="Content Placeholder 2"/>
+          <p:cNvSpPr>
+            <a:spLocks noGrp="1"/>
+          </p:cNvSpPr>
           <p:nvPr>
             <p:ph idx="1"/>
           </p:nvPr>
-        </p:nvPicPr>
-        <p:blipFill>
-          <a:blip r:embed="rId2">
-            <a:extLst>
-              <a:ext uri="{28A0092B-C50C-407E-A947-70E740481C1C}">
-                <a14:useLocalDpi xmlns:a14="http://schemas.microsoft.com/office/drawing/2010/main" val="0"/>
-              </a:ext>
-            </a:extLst>
-          </a:blip>
-          <a:stretch>
-            <a:fillRect/>
-          </a:stretch>
-        </p:blipFill>
-        <p:spPr>
-          <a:xfrm>
-            <a:off x="128049" y="1472052"/>
-            <a:ext cx="8800796" cy="4122632"/>
-          </a:xfrm>
-        </p:spPr>
-      </p:pic>
+        </p:nvSpPr>
+        <p:spPr/>
+        <p:txBody>
+          <a:bodyPr/>
+          <a:lstStyle/>
+          <a:p>
+            <a:r>
+              <a:rPr lang="en-US" dirty="0" smtClean="0"/>
+              <a:t>Là phần quan trọng nhất trước khi hoàn thiện hệ thống.</a:t>
+            </a:r>
+          </a:p>
+          <a:p>
+            <a:r>
+              <a:rPr lang="en-US" dirty="0" smtClean="0"/>
+              <a:t>Phương pháp này sử dụng độ lệch Euclidean distance giữa hai vector, liệu rằng nó có chấp nhận độ lệch mới được đề xuất trong luận văn này hay không?.(độ lệch giữa từng thành phần của vector sinh trắc).</a:t>
+            </a:r>
+            <a:endParaRPr lang="en-US" dirty="0"/>
+          </a:p>
+        </p:txBody>
+      </p:sp>
       <p:sp>
         <p:nvSpPr>
           <p:cNvPr id="4" name="Slide Number Placeholder 3"/>
@@ -8857,7 +8828,7 @@
     </p:spTree>
     <p:extLst>
       <p:ext uri="{BB962C8B-B14F-4D97-AF65-F5344CB8AC3E}">
-        <p14:creationId xmlns:p14="http://schemas.microsoft.com/office/powerpoint/2010/main" val="482391247"/>
+        <p14:creationId xmlns:p14="http://schemas.microsoft.com/office/powerpoint/2010/main" val="910024692"/>
       </p:ext>
     </p:extLst>
   </p:cSld>
@@ -8904,27 +8875,55 @@
             <p:ph type="title"/>
           </p:nvPr>
         </p:nvSpPr>
-        <p:spPr>
-          <a:xfrm>
-            <a:off x="215153" y="126338"/>
-            <a:ext cx="8928847" cy="604198"/>
-          </a:xfrm>
-        </p:spPr>
+        <p:spPr/>
         <p:txBody>
           <a:bodyPr/>
           <a:lstStyle/>
           <a:p>
             <a:r>
               <a:rPr lang="en-US" dirty="0" smtClean="0"/>
-              <a:t>Đánh giá Non-invertible Transform(FRR và FAR)</a:t>
+              <a:t>Đánh giá PCA(thống </a:t>
+            </a:r>
+            <a:r>
+              <a:rPr lang="en-US" dirty="0" smtClean="0"/>
+              <a:t>kê độ lệch chuẩn)</a:t>
             </a:r>
             <a:endParaRPr lang="en-US" dirty="0"/>
+          </a:p>
+        </p:txBody>
+      </p:sp>
+      <p:sp>
+        <p:nvSpPr>
+          <p:cNvPr id="4" name="Slide Number Placeholder 3"/>
+          <p:cNvSpPr>
+            <a:spLocks noGrp="1"/>
+          </p:cNvSpPr>
+          <p:nvPr>
+            <p:ph type="sldNum" sz="quarter" idx="12"/>
+          </p:nvPr>
+        </p:nvSpPr>
+        <p:spPr/>
+        <p:txBody>
+          <a:bodyPr/>
+          <a:lstStyle/>
+          <a:p>
+            <a:pPr>
+              <a:defRPr/>
+            </a:pPr>
+            <a:fld id="{486618C1-054C-4E1D-BC19-6E8A9BAB5F99}" type="slidenum">
+              <a:rPr lang="en-US" smtClean="0"/>
+              <a:pPr>
+                <a:defRPr/>
+              </a:pPr>
+              <a:t>32</a:t>
+            </a:fld>
+            <a:endParaRPr lang="en-US"/>
           </a:p>
         </p:txBody>
       </p:sp>
       <p:pic>
         <p:nvPicPr>
-          <p:cNvPr id="5" name="Content Placeholder 4"/>
+          <p:cNvPr id="7" name="Content Placeholder 6"/>
           <p:cNvPicPr>
             <a:picLocks noGrp="1" noChangeAspect="1"/>
           </p:cNvPicPr>
@@ -8946,44 +8945,192 @@
         </p:blipFill>
         <p:spPr>
           <a:xfrm>
-            <a:off x="215153" y="1472051"/>
-            <a:ext cx="8713692" cy="4081829"/>
+            <a:off x="3756" y="1371601"/>
+            <a:ext cx="9140244" cy="4284488"/>
           </a:xfrm>
         </p:spPr>
       </p:pic>
       <p:sp>
         <p:nvSpPr>
-          <p:cNvPr id="4" name="Slide Number Placeholder 3"/>
-          <p:cNvSpPr>
-            <a:spLocks noGrp="1"/>
-          </p:cNvSpPr>
-          <p:nvPr>
-            <p:ph type="sldNum" sz="quarter" idx="12"/>
-          </p:nvPr>
-        </p:nvSpPr>
-        <p:spPr/>
-        <p:txBody>
-          <a:bodyPr/>
-          <a:lstStyle/>
-          <a:p>
-            <a:pPr>
-              <a:defRPr/>
-            </a:pPr>
-            <a:fld id="{486618C1-054C-4E1D-BC19-6E8A9BAB5F99}" type="slidenum">
-              <a:rPr lang="en-US" smtClean="0"/>
-              <a:pPr>
-                <a:defRPr/>
-              </a:pPr>
-              <a:t>32</a:t>
-            </a:fld>
-            <a:endParaRPr lang="en-US"/>
+          <p:cNvPr id="5" name="Content Placeholder 2"/>
+          <p:cNvSpPr txBox="1">
+            <a:spLocks/>
+          </p:cNvSpPr>
+          <p:nvPr/>
+        </p:nvSpPr>
+        <p:spPr>
+          <a:xfrm>
+            <a:off x="4144525" y="2947737"/>
+            <a:ext cx="3345487" cy="1347538"/>
+          </a:xfrm>
+          <a:prstGeom prst="rect">
+            <a:avLst/>
+          </a:prstGeom>
+        </p:spPr>
+        <p:txBody>
+          <a:bodyPr/>
+          <a:lstStyle>
+            <a:lvl1pPr marL="365760" indent="-365760" algn="l" rtl="0" eaLnBrk="0" fontAlgn="base" hangingPunct="0">
+              <a:spcBef>
+                <a:spcPts val="1200"/>
+              </a:spcBef>
+              <a:spcAft>
+                <a:spcPct val="0"/>
+              </a:spcAft>
+              <a:buSzPct val="120000"/>
+              <a:buChar char="•"/>
+              <a:defRPr sz="2800">
+                <a:solidFill>
+                  <a:schemeClr val="tx1"/>
+                </a:solidFill>
+                <a:latin typeface="+mn-lt"/>
+                <a:ea typeface="+mn-ea"/>
+                <a:cs typeface="+mn-cs"/>
+              </a:defRPr>
+            </a:lvl1pPr>
+            <a:lvl2pPr marL="685800" indent="-336550" algn="l" rtl="0" eaLnBrk="0" fontAlgn="base" hangingPunct="0">
+              <a:spcBef>
+                <a:spcPts val="1200"/>
+              </a:spcBef>
+              <a:spcAft>
+                <a:spcPct val="0"/>
+              </a:spcAft>
+              <a:buSzPct val="110000"/>
+              <a:buFont typeface="Wingdings" pitchFamily="2" charset="2"/>
+              <a:buChar char="§"/>
+              <a:defRPr sz="2600">
+                <a:solidFill>
+                  <a:schemeClr val="tx1"/>
+                </a:solidFill>
+                <a:latin typeface="+mn-lt"/>
+              </a:defRPr>
+            </a:lvl2pPr>
+            <a:lvl3pPr marL="1035050" indent="-349250" algn="l" rtl="0" eaLnBrk="0" fontAlgn="base" hangingPunct="0">
+              <a:spcBef>
+                <a:spcPts val="1200"/>
+              </a:spcBef>
+              <a:spcAft>
+                <a:spcPct val="0"/>
+              </a:spcAft>
+              <a:buFont typeface="Courier New" pitchFamily="49" charset="0"/>
+              <a:buChar char="o"/>
+              <a:defRPr sz="2400">
+                <a:solidFill>
+                  <a:schemeClr val="tx1"/>
+                </a:solidFill>
+                <a:latin typeface="+mn-lt"/>
+              </a:defRPr>
+            </a:lvl3pPr>
+            <a:lvl4pPr marL="1371600" indent="-336550" algn="l" rtl="0" eaLnBrk="0" fontAlgn="base" hangingPunct="0">
+              <a:spcBef>
+                <a:spcPts val="1200"/>
+              </a:spcBef>
+              <a:spcAft>
+                <a:spcPct val="0"/>
+              </a:spcAft>
+              <a:buChar char="–"/>
+              <a:defRPr sz="2200">
+                <a:solidFill>
+                  <a:schemeClr val="tx1"/>
+                </a:solidFill>
+                <a:latin typeface="+mn-lt"/>
+              </a:defRPr>
+            </a:lvl4pPr>
+            <a:lvl5pPr marL="1720850" indent="-349250" algn="l" rtl="0" eaLnBrk="0" fontAlgn="base" hangingPunct="0">
+              <a:spcBef>
+                <a:spcPts val="1200"/>
+              </a:spcBef>
+              <a:spcAft>
+                <a:spcPct val="0"/>
+              </a:spcAft>
+              <a:buChar char="»"/>
+              <a:defRPr sz="2000">
+                <a:solidFill>
+                  <a:schemeClr val="tx1"/>
+                </a:solidFill>
+                <a:latin typeface="+mn-lt"/>
+              </a:defRPr>
+            </a:lvl5pPr>
+            <a:lvl6pPr marL="2514600" indent="-228600" algn="l" rtl="0" fontAlgn="base">
+              <a:spcBef>
+                <a:spcPct val="20000"/>
+              </a:spcBef>
+              <a:spcAft>
+                <a:spcPct val="0"/>
+              </a:spcAft>
+              <a:buChar char="»"/>
+              <a:defRPr sz="2000">
+                <a:solidFill>
+                  <a:schemeClr val="tx1"/>
+                </a:solidFill>
+                <a:latin typeface="+mn-lt"/>
+              </a:defRPr>
+            </a:lvl6pPr>
+            <a:lvl7pPr marL="2971800" indent="-228600" algn="l" rtl="0" fontAlgn="base">
+              <a:spcBef>
+                <a:spcPct val="20000"/>
+              </a:spcBef>
+              <a:spcAft>
+                <a:spcPct val="0"/>
+              </a:spcAft>
+              <a:buChar char="»"/>
+              <a:defRPr sz="2000">
+                <a:solidFill>
+                  <a:schemeClr val="tx1"/>
+                </a:solidFill>
+                <a:latin typeface="+mn-lt"/>
+              </a:defRPr>
+            </a:lvl7pPr>
+            <a:lvl8pPr marL="3429000" indent="-228600" algn="l" rtl="0" fontAlgn="base">
+              <a:spcBef>
+                <a:spcPct val="20000"/>
+              </a:spcBef>
+              <a:spcAft>
+                <a:spcPct val="0"/>
+              </a:spcAft>
+              <a:buChar char="»"/>
+              <a:defRPr sz="2000">
+                <a:solidFill>
+                  <a:schemeClr val="tx1"/>
+                </a:solidFill>
+                <a:latin typeface="+mn-lt"/>
+              </a:defRPr>
+            </a:lvl8pPr>
+            <a:lvl9pPr marL="3886200" indent="-228600" algn="l" rtl="0" fontAlgn="base">
+              <a:spcBef>
+                <a:spcPct val="20000"/>
+              </a:spcBef>
+              <a:spcAft>
+                <a:spcPct val="0"/>
+              </a:spcAft>
+              <a:buChar char="»"/>
+              <a:defRPr sz="2000">
+                <a:solidFill>
+                  <a:schemeClr val="tx1"/>
+                </a:solidFill>
+                <a:latin typeface="+mn-lt"/>
+              </a:defRPr>
+            </a:lvl9pPr>
+          </a:lstStyle>
+          <a:p>
+            <a:r>
+              <a:rPr lang="en-US" dirty="0" smtClean="0"/>
+              <a:t>0.32</a:t>
+            </a:r>
+          </a:p>
+          <a:p>
+            <a:r>
+              <a:rPr lang="en-US" dirty="0" smtClean="0"/>
+              <a:t>0.07</a:t>
+            </a:r>
+            <a:endParaRPr lang="en-US" dirty="0"/>
           </a:p>
         </p:txBody>
       </p:sp>
     </p:spTree>
     <p:extLst>
       <p:ext uri="{BB962C8B-B14F-4D97-AF65-F5344CB8AC3E}">
-        <p14:creationId xmlns:p14="http://schemas.microsoft.com/office/powerpoint/2010/main" val="2457184408"/>
+        <p14:creationId xmlns:p14="http://schemas.microsoft.com/office/powerpoint/2010/main" val="3708297768"/>
       </p:ext>
     </p:extLst>
   </p:cSld>
@@ -9030,19 +9177,53 @@
             <p:ph type="title"/>
           </p:nvPr>
         </p:nvSpPr>
-        <p:spPr/>
+        <p:spPr>
+          <a:xfrm>
+            <a:off x="215153" y="126338"/>
+            <a:ext cx="8606118" cy="604198"/>
+          </a:xfrm>
+        </p:spPr>
         <p:txBody>
           <a:bodyPr/>
           <a:lstStyle/>
           <a:p>
             <a:r>
               <a:rPr lang="en-US" dirty="0" smtClean="0"/>
-              <a:t>Đánh giá hệ thống(FRR và FAR)</a:t>
+              <a:t>Đánh giá PCA(FRR và FAR)</a:t>
             </a:r>
             <a:endParaRPr lang="en-US" dirty="0"/>
           </a:p>
         </p:txBody>
       </p:sp>
+      <p:pic>
+        <p:nvPicPr>
+          <p:cNvPr id="5" name="Content Placeholder 4"/>
+          <p:cNvPicPr>
+            <a:picLocks noGrp="1" noChangeAspect="1"/>
+          </p:cNvPicPr>
+          <p:nvPr>
+            <p:ph idx="1"/>
+          </p:nvPr>
+        </p:nvPicPr>
+        <p:blipFill>
+          <a:blip r:embed="rId2">
+            <a:extLst>
+              <a:ext uri="{28A0092B-C50C-407E-A947-70E740481C1C}">
+                <a14:useLocalDpi xmlns:a14="http://schemas.microsoft.com/office/drawing/2010/main" val="0"/>
+              </a:ext>
+            </a:extLst>
+          </a:blip>
+          <a:stretch>
+            <a:fillRect/>
+          </a:stretch>
+        </p:blipFill>
+        <p:spPr>
+          <a:xfrm>
+            <a:off x="128049" y="1472052"/>
+            <a:ext cx="8800796" cy="4122632"/>
+          </a:xfrm>
+        </p:spPr>
+      </p:pic>
       <p:sp>
         <p:nvSpPr>
           <p:cNvPr id="4" name="Slide Number Placeholder 3"/>
@@ -9067,6 +9248,352 @@
                 <a:defRPr/>
               </a:pPr>
               <a:t>33</a:t>
+            </a:fld>
+            <a:endParaRPr lang="en-US"/>
+          </a:p>
+        </p:txBody>
+      </p:sp>
+    </p:spTree>
+    <p:extLst>
+      <p:ext uri="{BB962C8B-B14F-4D97-AF65-F5344CB8AC3E}">
+        <p14:creationId xmlns:p14="http://schemas.microsoft.com/office/powerpoint/2010/main" val="482391247"/>
+      </p:ext>
+    </p:extLst>
+  </p:cSld>
+  <p:clrMapOvr>
+    <a:masterClrMapping/>
+  </p:clrMapOvr>
+  <p:transition spd="med">
+    <p:fade/>
+  </p:transition>
+  <p:timing>
+    <p:tnLst>
+      <p:par>
+        <p:cTn id="1" dur="indefinite" restart="never" nodeType="tmRoot"/>
+      </p:par>
+    </p:tnLst>
+  </p:timing>
+</p:sld>
+</file>
+
+<file path=ppt/slides/slide34.xml><?xml version="1.0" encoding="utf-8"?>
+<p:sld xmlns:a="http://schemas.openxmlformats.org/drawingml/2006/main" xmlns:r="http://schemas.openxmlformats.org/officeDocument/2006/relationships" xmlns:p="http://schemas.openxmlformats.org/presentationml/2006/main">
+  <p:cSld>
+    <p:spTree>
+      <p:nvGrpSpPr>
+        <p:cNvPr id="1" name=""/>
+        <p:cNvGrpSpPr/>
+        <p:nvPr/>
+      </p:nvGrpSpPr>
+      <p:grpSpPr>
+        <a:xfrm>
+          <a:off x="0" y="0"/>
+          <a:ext cx="0" cy="0"/>
+          <a:chOff x="0" y="0"/>
+          <a:chExt cx="0" cy="0"/>
+        </a:xfrm>
+      </p:grpSpPr>
+      <p:sp>
+        <p:nvSpPr>
+          <p:cNvPr id="2" name="Title 1"/>
+          <p:cNvSpPr>
+            <a:spLocks noGrp="1"/>
+          </p:cNvSpPr>
+          <p:nvPr>
+            <p:ph type="title"/>
+          </p:nvPr>
+        </p:nvSpPr>
+        <p:spPr>
+          <a:xfrm>
+            <a:off x="215153" y="126338"/>
+            <a:ext cx="8928847" cy="604198"/>
+          </a:xfrm>
+        </p:spPr>
+        <p:txBody>
+          <a:bodyPr/>
+          <a:lstStyle/>
+          <a:p>
+            <a:r>
+              <a:rPr lang="en-US" dirty="0" smtClean="0"/>
+              <a:t>Đánh giá Non-invertible Transform(FRR và FAR)</a:t>
+            </a:r>
+            <a:endParaRPr lang="en-US" dirty="0"/>
+          </a:p>
+        </p:txBody>
+      </p:sp>
+      <p:pic>
+        <p:nvPicPr>
+          <p:cNvPr id="5" name="Content Placeholder 4"/>
+          <p:cNvPicPr>
+            <a:picLocks noGrp="1" noChangeAspect="1"/>
+          </p:cNvPicPr>
+          <p:nvPr>
+            <p:ph idx="1"/>
+          </p:nvPr>
+        </p:nvPicPr>
+        <p:blipFill>
+          <a:blip r:embed="rId2">
+            <a:extLst>
+              <a:ext uri="{28A0092B-C50C-407E-A947-70E740481C1C}">
+                <a14:useLocalDpi xmlns:a14="http://schemas.microsoft.com/office/drawing/2010/main" val="0"/>
+              </a:ext>
+            </a:extLst>
+          </a:blip>
+          <a:stretch>
+            <a:fillRect/>
+          </a:stretch>
+        </p:blipFill>
+        <p:spPr>
+          <a:xfrm>
+            <a:off x="215153" y="1472051"/>
+            <a:ext cx="8713692" cy="4081829"/>
+          </a:xfrm>
+        </p:spPr>
+      </p:pic>
+      <p:sp>
+        <p:nvSpPr>
+          <p:cNvPr id="4" name="Slide Number Placeholder 3"/>
+          <p:cNvSpPr>
+            <a:spLocks noGrp="1"/>
+          </p:cNvSpPr>
+          <p:nvPr>
+            <p:ph type="sldNum" sz="quarter" idx="12"/>
+          </p:nvPr>
+        </p:nvSpPr>
+        <p:spPr/>
+        <p:txBody>
+          <a:bodyPr/>
+          <a:lstStyle/>
+          <a:p>
+            <a:pPr>
+              <a:defRPr/>
+            </a:pPr>
+            <a:fld id="{486618C1-054C-4E1D-BC19-6E8A9BAB5F99}" type="slidenum">
+              <a:rPr lang="en-US" smtClean="0"/>
+              <a:pPr>
+                <a:defRPr/>
+              </a:pPr>
+              <a:t>34</a:t>
+            </a:fld>
+            <a:endParaRPr lang="en-US"/>
+          </a:p>
+        </p:txBody>
+      </p:sp>
+    </p:spTree>
+    <p:extLst>
+      <p:ext uri="{BB962C8B-B14F-4D97-AF65-F5344CB8AC3E}">
+        <p14:creationId xmlns:p14="http://schemas.microsoft.com/office/powerpoint/2010/main" val="2457184408"/>
+      </p:ext>
+    </p:extLst>
+  </p:cSld>
+  <p:clrMapOvr>
+    <a:masterClrMapping/>
+  </p:clrMapOvr>
+  <p:transition spd="med">
+    <p:fade/>
+  </p:transition>
+  <p:timing>
+    <p:tnLst>
+      <p:par>
+        <p:cTn id="1" dur="indefinite" restart="never" nodeType="tmRoot"/>
+      </p:par>
+    </p:tnLst>
+  </p:timing>
+</p:sld>
+</file>
+
+<file path=ppt/slides/slide35.xml><?xml version="1.0" encoding="utf-8"?>
+<p:sld xmlns:a="http://schemas.openxmlformats.org/drawingml/2006/main" xmlns:r="http://schemas.openxmlformats.org/officeDocument/2006/relationships" xmlns:p="http://schemas.openxmlformats.org/presentationml/2006/main">
+  <p:cSld>
+    <p:spTree>
+      <p:nvGrpSpPr>
+        <p:cNvPr id="1" name=""/>
+        <p:cNvGrpSpPr/>
+        <p:nvPr/>
+      </p:nvGrpSpPr>
+      <p:grpSpPr>
+        <a:xfrm>
+          <a:off x="0" y="0"/>
+          <a:ext cx="0" cy="0"/>
+          <a:chOff x="0" y="0"/>
+          <a:chExt cx="0" cy="0"/>
+        </a:xfrm>
+      </p:grpSpPr>
+      <p:sp>
+        <p:nvSpPr>
+          <p:cNvPr id="2" name="Title 1"/>
+          <p:cNvSpPr>
+            <a:spLocks noGrp="1"/>
+          </p:cNvSpPr>
+          <p:nvPr>
+            <p:ph type="title"/>
+          </p:nvPr>
+        </p:nvSpPr>
+        <p:spPr/>
+        <p:txBody>
+          <a:bodyPr/>
+          <a:lstStyle/>
+          <a:p>
+            <a:r>
+              <a:rPr lang="en-US" dirty="0" smtClean="0"/>
+              <a:t>Giải thích sự biến đổi</a:t>
+            </a:r>
+            <a:endParaRPr lang="en-US" dirty="0"/>
+          </a:p>
+        </p:txBody>
+      </p:sp>
+      <p:sp>
+        <p:nvSpPr>
+          <p:cNvPr id="4" name="Slide Number Placeholder 3"/>
+          <p:cNvSpPr>
+            <a:spLocks noGrp="1"/>
+          </p:cNvSpPr>
+          <p:nvPr>
+            <p:ph type="sldNum" sz="quarter" idx="12"/>
+          </p:nvPr>
+        </p:nvSpPr>
+        <p:spPr/>
+        <p:txBody>
+          <a:bodyPr/>
+          <a:lstStyle/>
+          <a:p>
+            <a:pPr>
+              <a:defRPr/>
+            </a:pPr>
+            <a:fld id="{486618C1-054C-4E1D-BC19-6E8A9BAB5F99}" type="slidenum">
+              <a:rPr lang="en-US" smtClean="0"/>
+              <a:pPr>
+                <a:defRPr/>
+              </a:pPr>
+              <a:t>35</a:t>
+            </a:fld>
+            <a:endParaRPr lang="en-US"/>
+          </a:p>
+        </p:txBody>
+      </p:sp>
+      <p:sp>
+        <p:nvSpPr>
+          <p:cNvPr id="6" name="Content Placeholder 5"/>
+          <p:cNvSpPr>
+            <a:spLocks noGrp="1"/>
+          </p:cNvSpPr>
+          <p:nvPr>
+            <p:ph idx="1"/>
+          </p:nvPr>
+        </p:nvSpPr>
+        <p:spPr/>
+        <p:txBody>
+          <a:bodyPr/>
+          <a:lstStyle/>
+          <a:p>
+            <a:endParaRPr lang="en-US" dirty="0"/>
+          </a:p>
+        </p:txBody>
+      </p:sp>
+      <p:pic>
+        <p:nvPicPr>
+          <p:cNvPr id="7" name="Picture 6"/>
+          <p:cNvPicPr>
+            <a:picLocks noChangeAspect="1"/>
+          </p:cNvPicPr>
+          <p:nvPr/>
+        </p:nvPicPr>
+        <p:blipFill>
+          <a:blip r:embed="rId2"/>
+          <a:stretch>
+            <a:fillRect/>
+          </a:stretch>
+        </p:blipFill>
+        <p:spPr>
+          <a:xfrm>
+            <a:off x="418465" y="957434"/>
+            <a:ext cx="7945605" cy="5117943"/>
+          </a:xfrm>
+          <a:prstGeom prst="rect">
+            <a:avLst/>
+          </a:prstGeom>
+        </p:spPr>
+      </p:pic>
+    </p:spTree>
+    <p:extLst>
+      <p:ext uri="{BB962C8B-B14F-4D97-AF65-F5344CB8AC3E}">
+        <p14:creationId xmlns:p14="http://schemas.microsoft.com/office/powerpoint/2010/main" val="1737421265"/>
+      </p:ext>
+    </p:extLst>
+  </p:cSld>
+  <p:clrMapOvr>
+    <a:masterClrMapping/>
+  </p:clrMapOvr>
+  <p:transition spd="med">
+    <p:fade/>
+  </p:transition>
+</p:sld>
+</file>
+
+<file path=ppt/slides/slide36.xml><?xml version="1.0" encoding="utf-8"?>
+<p:sld xmlns:a="http://schemas.openxmlformats.org/drawingml/2006/main" xmlns:r="http://schemas.openxmlformats.org/officeDocument/2006/relationships" xmlns:p="http://schemas.openxmlformats.org/presentationml/2006/main">
+  <p:cSld>
+    <p:spTree>
+      <p:nvGrpSpPr>
+        <p:cNvPr id="1" name=""/>
+        <p:cNvGrpSpPr/>
+        <p:nvPr/>
+      </p:nvGrpSpPr>
+      <p:grpSpPr>
+        <a:xfrm>
+          <a:off x="0" y="0"/>
+          <a:ext cx="0" cy="0"/>
+          <a:chOff x="0" y="0"/>
+          <a:chExt cx="0" cy="0"/>
+        </a:xfrm>
+      </p:grpSpPr>
+      <p:sp>
+        <p:nvSpPr>
+          <p:cNvPr id="2" name="Title 1"/>
+          <p:cNvSpPr>
+            <a:spLocks noGrp="1"/>
+          </p:cNvSpPr>
+          <p:nvPr>
+            <p:ph type="title"/>
+          </p:nvPr>
+        </p:nvSpPr>
+        <p:spPr/>
+        <p:txBody>
+          <a:bodyPr/>
+          <a:lstStyle/>
+          <a:p>
+            <a:r>
+              <a:rPr lang="en-US" dirty="0" smtClean="0"/>
+              <a:t>Đánh giá hệ thống(FRR và FAR)</a:t>
+            </a:r>
+            <a:endParaRPr lang="en-US" dirty="0"/>
+          </a:p>
+        </p:txBody>
+      </p:sp>
+      <p:sp>
+        <p:nvSpPr>
+          <p:cNvPr id="4" name="Slide Number Placeholder 3"/>
+          <p:cNvSpPr>
+            <a:spLocks noGrp="1"/>
+          </p:cNvSpPr>
+          <p:nvPr>
+            <p:ph type="sldNum" sz="quarter" idx="12"/>
+          </p:nvPr>
+        </p:nvSpPr>
+        <p:spPr/>
+        <p:txBody>
+          <a:bodyPr/>
+          <a:lstStyle/>
+          <a:p>
+            <a:pPr>
+              <a:defRPr/>
+            </a:pPr>
+            <a:fld id="{486618C1-054C-4E1D-BC19-6E8A9BAB5F99}" type="slidenum">
+              <a:rPr lang="en-US" smtClean="0"/>
+              <a:pPr>
+                <a:defRPr/>
+              </a:pPr>
+              <a:t>36</a:t>
             </a:fld>
             <a:endParaRPr lang="en-US"/>
           </a:p>
@@ -9132,7 +9659,7 @@
 </p:sld>
 </file>
 
-<file path=ppt/slides/slide34.xml><?xml version="1.0" encoding="utf-8"?>
+<file path=ppt/slides/slide37.xml><?xml version="1.0" encoding="utf-8"?>
 <p:sld xmlns:a="http://schemas.openxmlformats.org/drawingml/2006/main" xmlns:r="http://schemas.openxmlformats.org/officeDocument/2006/relationships" xmlns:p="http://schemas.openxmlformats.org/presentationml/2006/main">
   <p:cSld>
     <p:spTree>
@@ -9166,38 +9693,62 @@
           <a:p>
             <a:r>
               <a:rPr lang="en-US" dirty="0" smtClean="0"/>
+              <a:t>Nội dung</a:t>
+            </a:r>
+            <a:endParaRPr lang="en-US" dirty="0"/>
+          </a:p>
+        </p:txBody>
+      </p:sp>
+      <p:sp>
+        <p:nvSpPr>
+          <p:cNvPr id="3" name="Content Placeholder 2"/>
+          <p:cNvSpPr>
+            <a:spLocks noGrp="1"/>
+          </p:cNvSpPr>
+          <p:nvPr>
+            <p:ph idx="1"/>
+          </p:nvPr>
+        </p:nvSpPr>
+        <p:spPr/>
+        <p:txBody>
+          <a:bodyPr/>
+          <a:lstStyle/>
+          <a:p>
+            <a:r>
+              <a:rPr lang="en-US" dirty="0" smtClean="0"/>
+              <a:t>Giới thiệu đề tài</a:t>
+            </a:r>
+          </a:p>
+          <a:p>
+            <a:r>
+              <a:rPr lang="en-US" dirty="0" smtClean="0"/>
+              <a:t>Sinh trắc</a:t>
+            </a:r>
+          </a:p>
+          <a:p>
+            <a:r>
+              <a:rPr lang="en-US" dirty="0" smtClean="0"/>
+              <a:t>Kĩ thuật bảo vệ mẫu sinh trắc</a:t>
+            </a:r>
+          </a:p>
+          <a:p>
+            <a:r>
+              <a:rPr lang="en-US" dirty="0" smtClean="0"/>
+              <a:t>Mô hình đề xuất</a:t>
+            </a:r>
+          </a:p>
+          <a:p>
+            <a:r>
+              <a:rPr lang="en-US" dirty="0" smtClean="0"/>
+              <a:t>Đánh giá</a:t>
+            </a:r>
+          </a:p>
+          <a:p>
+            <a:r>
+              <a:rPr lang="en-US" b="1" dirty="0" smtClean="0"/>
               <a:t>Kết luận</a:t>
             </a:r>
-            <a:endParaRPr lang="en-US" dirty="0"/>
-          </a:p>
-        </p:txBody>
-      </p:sp>
-      <p:sp>
-        <p:nvSpPr>
-          <p:cNvPr id="3" name="Content Placeholder 2"/>
-          <p:cNvSpPr>
-            <a:spLocks noGrp="1"/>
-          </p:cNvSpPr>
-          <p:nvPr>
-            <p:ph idx="1"/>
-          </p:nvPr>
-        </p:nvSpPr>
-        <p:spPr/>
-        <p:txBody>
-          <a:bodyPr/>
-          <a:lstStyle/>
-          <a:p>
-            <a:r>
-              <a:rPr lang="en-US" dirty="0" smtClean="0"/>
-              <a:t>Kết quả thu được khá khả quan, với chỉ số sai lệch khoản hơn 8% thì đây có thể được xem là một thành công.</a:t>
-            </a:r>
-          </a:p>
-          <a:p>
-            <a:r>
-              <a:rPr lang="en-US" dirty="0" smtClean="0"/>
-              <a:t>Hiệu suất chương trình gần như không thay đổi so với hệ thống cũ vì tuy giải thuật hơi phức tạp như độ khó của phép tính không quá cao và phép nhân hai ma trận cũng không tốn nhiều tài nguyên vì đây là nhân với ma trận trực giao.</a:t>
-            </a:r>
-            <a:endParaRPr lang="en-US" dirty="0"/>
+            <a:endParaRPr lang="en-US" b="1" dirty="0"/>
           </a:p>
         </p:txBody>
       </p:sp>
@@ -9224,7 +9775,127 @@
               <a:pPr>
                 <a:defRPr/>
               </a:pPr>
-              <a:t>34</a:t>
+              <a:t>37</a:t>
+            </a:fld>
+            <a:endParaRPr lang="en-US"/>
+          </a:p>
+        </p:txBody>
+      </p:sp>
+    </p:spTree>
+    <p:extLst>
+      <p:ext uri="{BB962C8B-B14F-4D97-AF65-F5344CB8AC3E}">
+        <p14:creationId xmlns:p14="http://schemas.microsoft.com/office/powerpoint/2010/main" val="2106403091"/>
+      </p:ext>
+    </p:extLst>
+  </p:cSld>
+  <p:clrMapOvr>
+    <a:masterClrMapping/>
+  </p:clrMapOvr>
+  <p:transition spd="med">
+    <p:fade/>
+  </p:transition>
+</p:sld>
+</file>
+
+<file path=ppt/slides/slide38.xml><?xml version="1.0" encoding="utf-8"?>
+<p:sld xmlns:a="http://schemas.openxmlformats.org/drawingml/2006/main" xmlns:r="http://schemas.openxmlformats.org/officeDocument/2006/relationships" xmlns:p="http://schemas.openxmlformats.org/presentationml/2006/main">
+  <p:cSld>
+    <p:spTree>
+      <p:nvGrpSpPr>
+        <p:cNvPr id="1" name=""/>
+        <p:cNvGrpSpPr/>
+        <p:nvPr/>
+      </p:nvGrpSpPr>
+      <p:grpSpPr>
+        <a:xfrm>
+          <a:off x="0" y="0"/>
+          <a:ext cx="0" cy="0"/>
+          <a:chOff x="0" y="0"/>
+          <a:chExt cx="0" cy="0"/>
+        </a:xfrm>
+      </p:grpSpPr>
+      <p:sp>
+        <p:nvSpPr>
+          <p:cNvPr id="2" name="Title 1"/>
+          <p:cNvSpPr>
+            <a:spLocks noGrp="1"/>
+          </p:cNvSpPr>
+          <p:nvPr>
+            <p:ph type="title"/>
+          </p:nvPr>
+        </p:nvSpPr>
+        <p:spPr/>
+        <p:txBody>
+          <a:bodyPr/>
+          <a:lstStyle/>
+          <a:p>
+            <a:r>
+              <a:rPr lang="en-US" dirty="0" smtClean="0"/>
+              <a:t>Kết luận</a:t>
+            </a:r>
+            <a:endParaRPr lang="en-US" dirty="0"/>
+          </a:p>
+        </p:txBody>
+      </p:sp>
+      <p:sp>
+        <p:nvSpPr>
+          <p:cNvPr id="3" name="Content Placeholder 2"/>
+          <p:cNvSpPr>
+            <a:spLocks noGrp="1"/>
+          </p:cNvSpPr>
+          <p:nvPr>
+            <p:ph idx="1"/>
+          </p:nvPr>
+        </p:nvSpPr>
+        <p:spPr/>
+        <p:txBody>
+          <a:bodyPr/>
+          <a:lstStyle/>
+          <a:p>
+            <a:r>
+              <a:rPr lang="en-US" dirty="0" smtClean="0"/>
+              <a:t>Kết quả thu được khá khả quan, với chỉ số sai lệch khoản hơn 8% thì đây có thể được xem là khá tốt.</a:t>
+            </a:r>
+          </a:p>
+          <a:p>
+            <a:r>
+              <a:rPr lang="en-US" dirty="0" smtClean="0"/>
+              <a:t>Hiệu suất chương trình gần như không thay đổi so với hệ thống cũ vì tuy giải thuật hơi phức tạp như độ khó của phép tính không quá cao và phép nhân hai ma trận cũng không tốn nhiều tài nguyên vì đây là nhân với ma trận trực giao.</a:t>
+            </a:r>
+          </a:p>
+          <a:p>
+            <a:r>
+              <a:rPr lang="en-US" dirty="0" smtClean="0"/>
+              <a:t>Hướng phát triển.</a:t>
+            </a:r>
+            <a:endParaRPr lang="en-US" dirty="0"/>
+          </a:p>
+        </p:txBody>
+      </p:sp>
+      <p:sp>
+        <p:nvSpPr>
+          <p:cNvPr id="4" name="Slide Number Placeholder 3"/>
+          <p:cNvSpPr>
+            <a:spLocks noGrp="1"/>
+          </p:cNvSpPr>
+          <p:nvPr>
+            <p:ph type="sldNum" sz="quarter" idx="12"/>
+          </p:nvPr>
+        </p:nvSpPr>
+        <p:spPr/>
+        <p:txBody>
+          <a:bodyPr/>
+          <a:lstStyle/>
+          <a:p>
+            <a:pPr>
+              <a:defRPr/>
+            </a:pPr>
+            <a:fld id="{486618C1-054C-4E1D-BC19-6E8A9BAB5F99}" type="slidenum">
+              <a:rPr lang="en-US" smtClean="0"/>
+              <a:pPr>
+                <a:defRPr/>
+              </a:pPr>
+              <a:t>38</a:t>
             </a:fld>
             <a:endParaRPr lang="en-US"/>
           </a:p>
@@ -9253,7 +9924,7 @@
 </p:sld>
 </file>
 
-<file path=ppt/slides/slide35.xml><?xml version="1.0" encoding="utf-8"?>
+<file path=ppt/slides/slide39.xml><?xml version="1.0" encoding="utf-8"?>
 <p:sld xmlns:a="http://schemas.openxmlformats.org/drawingml/2006/main" xmlns:r="http://schemas.openxmlformats.org/officeDocument/2006/relationships" xmlns:p="http://schemas.openxmlformats.org/presentationml/2006/main">
   <p:cSld>
     <p:spTree>
@@ -9614,7 +10285,7 @@
               <a:pPr>
                 <a:defRPr/>
               </a:pPr>
-              <a:t>35</a:t>
+              <a:t>39</a:t>
             </a:fld>
             <a:endParaRPr lang="en-US"/>
           </a:p>
@@ -9818,11 +10489,7 @@
           <a:p>
             <a:r>
               <a:rPr lang="en-US" dirty="0" smtClean="0"/>
-              <a:t>Nội </a:t>
-            </a:r>
-            <a:r>
-              <a:rPr lang="en-US" dirty="0" smtClean="0"/>
-              <a:t>dung</a:t>
+              <a:t>Nội dung</a:t>
             </a:r>
             <a:endParaRPr lang="en-US" dirty="0"/>
           </a:p>
@@ -9847,27 +10514,17 @@
               <a:rPr lang="en-US" dirty="0" smtClean="0"/>
               <a:t>Giới thiệu đề tài</a:t>
             </a:r>
-            <a:endParaRPr lang="en-US" dirty="0" smtClean="0"/>
           </a:p>
           <a:p>
             <a:r>
               <a:rPr lang="en-US" b="1" dirty="0" smtClean="0"/>
               <a:t>Sinh trắc</a:t>
             </a:r>
-            <a:endParaRPr lang="en-US" b="1" dirty="0" smtClean="0"/>
           </a:p>
           <a:p>
             <a:r>
               <a:rPr lang="en-US" dirty="0" smtClean="0"/>
-              <a:t>Kĩ </a:t>
-            </a:r>
-            <a:r>
-              <a:rPr lang="en-US" dirty="0" smtClean="0"/>
-              <a:t>thuật bảo </a:t>
-            </a:r>
-            <a:r>
-              <a:rPr lang="en-US" dirty="0" smtClean="0"/>
-              <a:t>vệ mẫu sinh trắc</a:t>
+              <a:t>Kĩ thuật bảo vệ mẫu sinh trắc</a:t>
             </a:r>
           </a:p>
           <a:p>
@@ -9875,16 +10532,11 @@
               <a:rPr lang="en-US" dirty="0" smtClean="0"/>
               <a:t>Mô hình đề xuất</a:t>
             </a:r>
-            <a:endParaRPr lang="en-US" dirty="0" smtClean="0"/>
           </a:p>
           <a:p>
             <a:r>
               <a:rPr lang="en-US" dirty="0" smtClean="0"/>
-              <a:t>Đánh </a:t>
-            </a:r>
-            <a:r>
-              <a:rPr lang="en-US" dirty="0" smtClean="0"/>
-              <a:t>giá</a:t>
+              <a:t>Đánh giá</a:t>
             </a:r>
           </a:p>
           <a:p>
@@ -12255,15 +12907,6 @@
 </file>
 
 <file path=customXml/item1.xml><?xml version="1.0" encoding="utf-8"?>
-<p:properties xmlns:p="http://schemas.microsoft.com/office/2006/metadata/properties" xmlns:xsi="http://www.w3.org/2001/XMLSchema-instance" xmlns:pc="http://schemas.microsoft.com/office/infopath/2007/PartnerControls">
-  <documentManagement>
-    <N_x1ed9_i_x0020_dung_x0020_v_x1eaf_n_x0020_t_x1eaf_t xmlns="f5d0caf3-682d-4511-bb09-f534ff9a8d59">Quy định soạn thảo và mẫu tài liệu Slide</N_x1ed9_i_x0020_dung_x0020_v_x1eaf_n_x0020_t_x1eaf_t>
-    <Ng_x00e0_y_x0020_ban_x0020_h_x00e0_nh xmlns="f5d0caf3-682d-4511-bb09-f534ff9a8d59">2013-06-18T17:00:00+00:00</Ng_x00e0_y_x0020_ban_x0020_h_x00e0_nh>
-  </documentManagement>
-</p:properties>
-</file>
-
-<file path=customXml/item2.xml><?xml version="1.0" encoding="utf-8"?>
 <ct:contentTypeSchema xmlns:ct="http://schemas.microsoft.com/office/2006/metadata/contentType" xmlns:ma="http://schemas.microsoft.com/office/2006/metadata/properties/metaAttributes" ct:_="" ma:_="" ma:contentTypeName="Document" ma:contentTypeID="0x010100A5C46A0FE39FF64D8E7CA40201285CFB" ma:contentTypeVersion="2" ma:contentTypeDescription="Create a new document." ma:contentTypeScope="" ma:versionID="7769227c9d869afbca44a997b860d24e">
   <xsd:schema xmlns:xsd="http://www.w3.org/2001/XMLSchema" xmlns:xs="http://www.w3.org/2001/XMLSchema" xmlns:p="http://schemas.microsoft.com/office/2006/metadata/properties" xmlns:ns2="f5d0caf3-682d-4511-bb09-f534ff9a8d59" targetNamespace="http://schemas.microsoft.com/office/2006/metadata/properties" ma:root="true" ma:fieldsID="f74a8646942e335a3fc7e56a4aa8bfe5" ns2:_="">
     <xsd:import namespace="f5d0caf3-682d-4511-bb09-f534ff9a8d59"/>
@@ -12397,6 +13040,15 @@
 </ct:contentTypeSchema>
 </file>
 
+<file path=customXml/item2.xml><?xml version="1.0" encoding="utf-8"?>
+<p:properties xmlns:p="http://schemas.microsoft.com/office/2006/metadata/properties" xmlns:xsi="http://www.w3.org/2001/XMLSchema-instance" xmlns:pc="http://schemas.microsoft.com/office/infopath/2007/PartnerControls">
+  <documentManagement>
+    <N_x1ed9_i_x0020_dung_x0020_v_x1eaf_n_x0020_t_x1eaf_t xmlns="f5d0caf3-682d-4511-bb09-f534ff9a8d59">Quy định soạn thảo và mẫu tài liệu Slide</N_x1ed9_i_x0020_dung_x0020_v_x1eaf_n_x0020_t_x1eaf_t>
+    <Ng_x00e0_y_x0020_ban_x0020_h_x00e0_nh xmlns="f5d0caf3-682d-4511-bb09-f534ff9a8d59">2013-06-18T17:00:00+00:00</Ng_x00e0_y_x0020_ban_x0020_h_x00e0_nh>
+  </documentManagement>
+</p:properties>
+</file>
+
 <file path=customXml/item3.xml><?xml version="1.0" encoding="utf-8"?>
 <?mso-contentType ?>
 <FormTemplates xmlns="http://schemas.microsoft.com/sharepoint/v3/contenttype/forms">
@@ -12407,22 +13059,6 @@
 </file>
 
 <file path=customXml/itemProps1.xml><?xml version="1.0" encoding="utf-8"?>
-<ds:datastoreItem xmlns:ds="http://schemas.openxmlformats.org/officeDocument/2006/customXml" ds:itemID="{56DAF02F-E1F5-415E-B21E-A647B8A5E393}">
-  <ds:schemaRefs>
-    <ds:schemaRef ds:uri="http://schemas.openxmlformats.org/package/2006/metadata/core-properties"/>
-    <ds:schemaRef ds:uri="f5d0caf3-682d-4511-bb09-f534ff9a8d59"/>
-    <ds:schemaRef ds:uri="http://schemas.microsoft.com/office/infopath/2007/PartnerControls"/>
-    <ds:schemaRef ds:uri="http://purl.org/dc/dcmitype/"/>
-    <ds:schemaRef ds:uri="http://purl.org/dc/elements/1.1/"/>
-    <ds:schemaRef ds:uri="http://schemas.microsoft.com/office/2006/documentManagement/types"/>
-    <ds:schemaRef ds:uri="http://purl.org/dc/terms/"/>
-    <ds:schemaRef ds:uri="http://schemas.microsoft.com/office/2006/metadata/properties"/>
-    <ds:schemaRef ds:uri="http://www.w3.org/XML/1998/namespace"/>
-  </ds:schemaRefs>
-</ds:datastoreItem>
-</file>
-
-<file path=customXml/itemProps2.xml><?xml version="1.0" encoding="utf-8"?>
 <ds:datastoreItem xmlns:ds="http://schemas.openxmlformats.org/officeDocument/2006/customXml" ds:itemID="{108A4DCC-84DE-4465-8BA6-9916E65DA385}">
   <ds:schemaRefs>
     <ds:schemaRef ds:uri="http://schemas.microsoft.com/office/2006/metadata/contentType"/>
@@ -12440,6 +13076,22 @@
 </ds:datastoreItem>
 </file>
 
+<file path=customXml/itemProps2.xml><?xml version="1.0" encoding="utf-8"?>
+<ds:datastoreItem xmlns:ds="http://schemas.openxmlformats.org/officeDocument/2006/customXml" ds:itemID="{56DAF02F-E1F5-415E-B21E-A647B8A5E393}">
+  <ds:schemaRefs>
+    <ds:schemaRef ds:uri="http://schemas.openxmlformats.org/package/2006/metadata/core-properties"/>
+    <ds:schemaRef ds:uri="f5d0caf3-682d-4511-bb09-f534ff9a8d59"/>
+    <ds:schemaRef ds:uri="http://schemas.microsoft.com/office/infopath/2007/PartnerControls"/>
+    <ds:schemaRef ds:uri="http://purl.org/dc/dcmitype/"/>
+    <ds:schemaRef ds:uri="http://purl.org/dc/elements/1.1/"/>
+    <ds:schemaRef ds:uri="http://schemas.microsoft.com/office/2006/documentManagement/types"/>
+    <ds:schemaRef ds:uri="http://purl.org/dc/terms/"/>
+    <ds:schemaRef ds:uri="http://schemas.microsoft.com/office/2006/metadata/properties"/>
+    <ds:schemaRef ds:uri="http://www.w3.org/XML/1998/namespace"/>
+  </ds:schemaRefs>
+</ds:datastoreItem>
+</file>
+
 <file path=customXml/itemProps3.xml><?xml version="1.0" encoding="utf-8"?>
 <ds:datastoreItem xmlns:ds="http://schemas.openxmlformats.org/officeDocument/2006/customXml" ds:itemID="{C89A9221-F11E-42DD-868A-EF57A2B6C81B}">
   <ds:schemaRefs>

</xml_diff>

<commit_message>
lvtn update report 13
</commit_message>
<xml_diff>
--- a/Slide.pptx
+++ b/Slide.pptx
@@ -6,10 +6,10 @@
     <p:sldMasterId id="2147483656" r:id="rId5"/>
   </p:sldMasterIdLst>
   <p:notesMasterIdLst>
-    <p:notesMasterId r:id="rId45"/>
+    <p:notesMasterId r:id="rId46"/>
   </p:notesMasterIdLst>
   <p:handoutMasterIdLst>
-    <p:handoutMasterId r:id="rId46"/>
+    <p:handoutMasterId r:id="rId47"/>
   </p:handoutMasterIdLst>
   <p:sldIdLst>
     <p:sldId id="256" r:id="rId6"/>
@@ -43,14 +43,15 @@
     <p:sldId id="485" r:id="rId34"/>
     <p:sldId id="462" r:id="rId35"/>
     <p:sldId id="472" r:id="rId36"/>
-    <p:sldId id="464" r:id="rId37"/>
-    <p:sldId id="466" r:id="rId38"/>
-    <p:sldId id="467" r:id="rId39"/>
-    <p:sldId id="487" r:id="rId40"/>
-    <p:sldId id="463" r:id="rId41"/>
-    <p:sldId id="486" r:id="rId42"/>
-    <p:sldId id="455" r:id="rId43"/>
-    <p:sldId id="394" r:id="rId44"/>
+    <p:sldId id="489" r:id="rId37"/>
+    <p:sldId id="464" r:id="rId38"/>
+    <p:sldId id="466" r:id="rId39"/>
+    <p:sldId id="467" r:id="rId40"/>
+    <p:sldId id="487" r:id="rId41"/>
+    <p:sldId id="463" r:id="rId42"/>
+    <p:sldId id="486" r:id="rId43"/>
+    <p:sldId id="455" r:id="rId44"/>
+    <p:sldId id="394" r:id="rId45"/>
   </p:sldIdLst>
   <p:sldSz cx="9144000" cy="6858000" type="screen4x3"/>
   <p:notesSz cx="9866313" cy="6754813"/>
@@ -535,7 +536,7 @@
           <a:p>
             <a:fld id="{B3D2EA87-6173-4DFB-9754-C2DB0166339E}" type="datetimeFigureOut">
               <a:rPr lang="en-US" smtClean="0"/>
-              <a:t>12/28/2016</a:t>
+              <a:t>12/29/2016</a:t>
             </a:fld>
             <a:endParaRPr lang="en-US"/>
           </a:p>
@@ -1366,7 +1367,7 @@
           <a:p>
             <a:fld id="{D4A788E2-4662-42DA-AE6D-55C618CE61F8}" type="datetimeFigureOut">
               <a:rPr lang="en-US" smtClean="0"/>
-              <a:t>12/28/2016</a:t>
+              <a:t>12/29/2016</a:t>
             </a:fld>
             <a:endParaRPr lang="en-US"/>
           </a:p>
@@ -1536,7 +1537,7 @@
           <a:p>
             <a:fld id="{D4A788E2-4662-42DA-AE6D-55C618CE61F8}" type="datetimeFigureOut">
               <a:rPr lang="en-US" smtClean="0"/>
-              <a:t>12/28/2016</a:t>
+              <a:t>12/29/2016</a:t>
             </a:fld>
             <a:endParaRPr lang="en-US"/>
           </a:p>
@@ -1716,7 +1717,7 @@
           <a:p>
             <a:fld id="{D4A788E2-4662-42DA-AE6D-55C618CE61F8}" type="datetimeFigureOut">
               <a:rPr lang="en-US" smtClean="0"/>
-              <a:t>12/28/2016</a:t>
+              <a:t>12/29/2016</a:t>
             </a:fld>
             <a:endParaRPr lang="en-US"/>
           </a:p>
@@ -1908,7 +1909,7 @@
           <a:p>
             <a:fld id="{D4A788E2-4662-42DA-AE6D-55C618CE61F8}" type="datetimeFigureOut">
               <a:rPr lang="en-US" smtClean="0"/>
-              <a:t>12/28/2016</a:t>
+              <a:t>12/29/2016</a:t>
             </a:fld>
             <a:endParaRPr lang="en-US"/>
           </a:p>
@@ -2078,7 +2079,7 @@
           <a:p>
             <a:fld id="{D4A788E2-4662-42DA-AE6D-55C618CE61F8}" type="datetimeFigureOut">
               <a:rPr lang="en-US" smtClean="0"/>
-              <a:t>12/28/2016</a:t>
+              <a:t>12/29/2016</a:t>
             </a:fld>
             <a:endParaRPr lang="en-US"/>
           </a:p>
@@ -2324,7 +2325,7 @@
           <a:p>
             <a:fld id="{D4A788E2-4662-42DA-AE6D-55C618CE61F8}" type="datetimeFigureOut">
               <a:rPr lang="en-US" smtClean="0"/>
-              <a:t>12/28/2016</a:t>
+              <a:t>12/29/2016</a:t>
             </a:fld>
             <a:endParaRPr lang="en-US"/>
           </a:p>
@@ -2556,7 +2557,7 @@
           <a:p>
             <a:fld id="{D4A788E2-4662-42DA-AE6D-55C618CE61F8}" type="datetimeFigureOut">
               <a:rPr lang="en-US" smtClean="0"/>
-              <a:t>12/28/2016</a:t>
+              <a:t>12/29/2016</a:t>
             </a:fld>
             <a:endParaRPr lang="en-US"/>
           </a:p>
@@ -2923,7 +2924,7 @@
           <a:p>
             <a:fld id="{D4A788E2-4662-42DA-AE6D-55C618CE61F8}" type="datetimeFigureOut">
               <a:rPr lang="en-US" smtClean="0"/>
-              <a:t>12/28/2016</a:t>
+              <a:t>12/29/2016</a:t>
             </a:fld>
             <a:endParaRPr lang="en-US"/>
           </a:p>
@@ -3041,7 +3042,7 @@
           <a:p>
             <a:fld id="{D4A788E2-4662-42DA-AE6D-55C618CE61F8}" type="datetimeFigureOut">
               <a:rPr lang="en-US" smtClean="0"/>
-              <a:t>12/28/2016</a:t>
+              <a:t>12/29/2016</a:t>
             </a:fld>
             <a:endParaRPr lang="en-US"/>
           </a:p>
@@ -3136,7 +3137,7 @@
           <a:p>
             <a:fld id="{D4A788E2-4662-42DA-AE6D-55C618CE61F8}" type="datetimeFigureOut">
               <a:rPr lang="en-US" smtClean="0"/>
-              <a:t>12/28/2016</a:t>
+              <a:t>12/29/2016</a:t>
             </a:fld>
             <a:endParaRPr lang="en-US"/>
           </a:p>
@@ -3413,7 +3414,7 @@
           <a:p>
             <a:fld id="{D4A788E2-4662-42DA-AE6D-55C618CE61F8}" type="datetimeFigureOut">
               <a:rPr lang="en-US" smtClean="0"/>
-              <a:t>12/28/2016</a:t>
+              <a:t>12/29/2016</a:t>
             </a:fld>
             <a:endParaRPr lang="en-US"/>
           </a:p>
@@ -4037,7 +4038,7 @@
           <a:p>
             <a:fld id="{D4A788E2-4662-42DA-AE6D-55C618CE61F8}" type="datetimeFigureOut">
               <a:rPr lang="en-US" smtClean="0"/>
-              <a:t>12/28/2016</a:t>
+              <a:t>12/29/2016</a:t>
             </a:fld>
             <a:endParaRPr lang="en-US"/>
           </a:p>
@@ -4976,7 +4977,7 @@
               <a:pPr>
                 <a:defRPr/>
               </a:pPr>
-              <a:t>Wednesday, December 28, 2016</a:t>
+              <a:t>Thursday, December 29, 2016</a:t>
             </a:fld>
             <a:endParaRPr lang="en-US" dirty="0"/>
           </a:p>
@@ -8882,16 +8883,38 @@
           <a:p>
             <a:r>
               <a:rPr lang="en-US" dirty="0" smtClean="0"/>
-              <a:t>Đánh giá PCA(thống </a:t>
-            </a:r>
-            <a:r>
-              <a:rPr lang="en-US" dirty="0" smtClean="0"/>
-              <a:t>kê độ lệch chuẩn)</a:t>
+              <a:t>Công thức tính độ đo</a:t>
             </a:r>
             <a:endParaRPr lang="en-US" dirty="0"/>
           </a:p>
         </p:txBody>
       </p:sp>
+      <p:pic>
+        <p:nvPicPr>
+          <p:cNvPr id="5" name="Content Placeholder 4"/>
+          <p:cNvPicPr>
+            <a:picLocks noGrp="1" noChangeAspect="1"/>
+          </p:cNvPicPr>
+          <p:nvPr>
+            <p:ph idx="1"/>
+          </p:nvPr>
+        </p:nvPicPr>
+        <p:blipFill>
+          <a:blip r:embed="rId2"/>
+          <a:stretch>
+            <a:fillRect/>
+          </a:stretch>
+        </p:blipFill>
+        <p:spPr>
+          <a:xfrm>
+            <a:off x="336550" y="1986430"/>
+            <a:ext cx="8485188" cy="3059766"/>
+          </a:xfrm>
+          <a:prstGeom prst="rect">
+            <a:avLst/>
+          </a:prstGeom>
+        </p:spPr>
+      </p:pic>
       <p:sp>
         <p:nvSpPr>
           <p:cNvPr id="4" name="Slide Number Placeholder 3"/>
@@ -8916,6 +8939,91 @@
                 <a:defRPr/>
               </a:pPr>
               <a:t>32</a:t>
+            </a:fld>
+            <a:endParaRPr lang="en-US"/>
+          </a:p>
+        </p:txBody>
+      </p:sp>
+    </p:spTree>
+    <p:extLst>
+      <p:ext uri="{BB962C8B-B14F-4D97-AF65-F5344CB8AC3E}">
+        <p14:creationId xmlns:p14="http://schemas.microsoft.com/office/powerpoint/2010/main" val="2598328459"/>
+      </p:ext>
+    </p:extLst>
+  </p:cSld>
+  <p:clrMapOvr>
+    <a:masterClrMapping/>
+  </p:clrMapOvr>
+  <p:transition spd="med">
+    <p:fade/>
+  </p:transition>
+</p:sld>
+</file>
+
+<file path=ppt/slides/slide33.xml><?xml version="1.0" encoding="utf-8"?>
+<p:sld xmlns:a="http://schemas.openxmlformats.org/drawingml/2006/main" xmlns:r="http://schemas.openxmlformats.org/officeDocument/2006/relationships" xmlns:p="http://schemas.openxmlformats.org/presentationml/2006/main">
+  <p:cSld>
+    <p:spTree>
+      <p:nvGrpSpPr>
+        <p:cNvPr id="1" name=""/>
+        <p:cNvGrpSpPr/>
+        <p:nvPr/>
+      </p:nvGrpSpPr>
+      <p:grpSpPr>
+        <a:xfrm>
+          <a:off x="0" y="0"/>
+          <a:ext cx="0" cy="0"/>
+          <a:chOff x="0" y="0"/>
+          <a:chExt cx="0" cy="0"/>
+        </a:xfrm>
+      </p:grpSpPr>
+      <p:sp>
+        <p:nvSpPr>
+          <p:cNvPr id="2" name="Title 1"/>
+          <p:cNvSpPr>
+            <a:spLocks noGrp="1"/>
+          </p:cNvSpPr>
+          <p:nvPr>
+            <p:ph type="title"/>
+          </p:nvPr>
+        </p:nvSpPr>
+        <p:spPr/>
+        <p:txBody>
+          <a:bodyPr/>
+          <a:lstStyle/>
+          <a:p>
+            <a:r>
+              <a:rPr lang="en-US" dirty="0" smtClean="0"/>
+              <a:t>Đánh giá PCA(thống kê độ lệch chuẩn)</a:t>
+            </a:r>
+            <a:endParaRPr lang="en-US" dirty="0"/>
+          </a:p>
+        </p:txBody>
+      </p:sp>
+      <p:sp>
+        <p:nvSpPr>
+          <p:cNvPr id="4" name="Slide Number Placeholder 3"/>
+          <p:cNvSpPr>
+            <a:spLocks noGrp="1"/>
+          </p:cNvSpPr>
+          <p:nvPr>
+            <p:ph type="sldNum" sz="quarter" idx="12"/>
+          </p:nvPr>
+        </p:nvSpPr>
+        <p:spPr/>
+        <p:txBody>
+          <a:bodyPr/>
+          <a:lstStyle/>
+          <a:p>
+            <a:pPr>
+              <a:defRPr/>
+            </a:pPr>
+            <a:fld id="{486618C1-054C-4E1D-BC19-6E8A9BAB5F99}" type="slidenum">
+              <a:rPr lang="en-US" smtClean="0"/>
+              <a:pPr>
+                <a:defRPr/>
+              </a:pPr>
+              <a:t>33</a:t>
             </a:fld>
             <a:endParaRPr lang="en-US"/>
           </a:p>
@@ -9150,7 +9258,7 @@
 </p:sld>
 </file>
 
-<file path=ppt/slides/slide33.xml><?xml version="1.0" encoding="utf-8"?>
+<file path=ppt/slides/slide34.xml><?xml version="1.0" encoding="utf-8"?>
 <p:sld xmlns:a="http://schemas.openxmlformats.org/drawingml/2006/main" xmlns:r="http://schemas.openxmlformats.org/officeDocument/2006/relationships" xmlns:p="http://schemas.openxmlformats.org/presentationml/2006/main">
   <p:cSld>
     <p:spTree>
@@ -9247,7 +9355,7 @@
               <a:pPr>
                 <a:defRPr/>
               </a:pPr>
-              <a:t>33</a:t>
+              <a:t>34</a:t>
             </a:fld>
             <a:endParaRPr lang="en-US"/>
           </a:p>
@@ -9257,132 +9365,6 @@
     <p:extLst>
       <p:ext uri="{BB962C8B-B14F-4D97-AF65-F5344CB8AC3E}">
         <p14:creationId xmlns:p14="http://schemas.microsoft.com/office/powerpoint/2010/main" val="482391247"/>
-      </p:ext>
-    </p:extLst>
-  </p:cSld>
-  <p:clrMapOvr>
-    <a:masterClrMapping/>
-  </p:clrMapOvr>
-  <p:transition spd="med">
-    <p:fade/>
-  </p:transition>
-  <p:timing>
-    <p:tnLst>
-      <p:par>
-        <p:cTn id="1" dur="indefinite" restart="never" nodeType="tmRoot"/>
-      </p:par>
-    </p:tnLst>
-  </p:timing>
-</p:sld>
-</file>
-
-<file path=ppt/slides/slide34.xml><?xml version="1.0" encoding="utf-8"?>
-<p:sld xmlns:a="http://schemas.openxmlformats.org/drawingml/2006/main" xmlns:r="http://schemas.openxmlformats.org/officeDocument/2006/relationships" xmlns:p="http://schemas.openxmlformats.org/presentationml/2006/main">
-  <p:cSld>
-    <p:spTree>
-      <p:nvGrpSpPr>
-        <p:cNvPr id="1" name=""/>
-        <p:cNvGrpSpPr/>
-        <p:nvPr/>
-      </p:nvGrpSpPr>
-      <p:grpSpPr>
-        <a:xfrm>
-          <a:off x="0" y="0"/>
-          <a:ext cx="0" cy="0"/>
-          <a:chOff x="0" y="0"/>
-          <a:chExt cx="0" cy="0"/>
-        </a:xfrm>
-      </p:grpSpPr>
-      <p:sp>
-        <p:nvSpPr>
-          <p:cNvPr id="2" name="Title 1"/>
-          <p:cNvSpPr>
-            <a:spLocks noGrp="1"/>
-          </p:cNvSpPr>
-          <p:nvPr>
-            <p:ph type="title"/>
-          </p:nvPr>
-        </p:nvSpPr>
-        <p:spPr>
-          <a:xfrm>
-            <a:off x="215153" y="126338"/>
-            <a:ext cx="8928847" cy="604198"/>
-          </a:xfrm>
-        </p:spPr>
-        <p:txBody>
-          <a:bodyPr/>
-          <a:lstStyle/>
-          <a:p>
-            <a:r>
-              <a:rPr lang="en-US" dirty="0" smtClean="0"/>
-              <a:t>Đánh giá Non-invertible Transform(FRR và FAR)</a:t>
-            </a:r>
-            <a:endParaRPr lang="en-US" dirty="0"/>
-          </a:p>
-        </p:txBody>
-      </p:sp>
-      <p:pic>
-        <p:nvPicPr>
-          <p:cNvPr id="5" name="Content Placeholder 4"/>
-          <p:cNvPicPr>
-            <a:picLocks noGrp="1" noChangeAspect="1"/>
-          </p:cNvPicPr>
-          <p:nvPr>
-            <p:ph idx="1"/>
-          </p:nvPr>
-        </p:nvPicPr>
-        <p:blipFill>
-          <a:blip r:embed="rId2">
-            <a:extLst>
-              <a:ext uri="{28A0092B-C50C-407E-A947-70E740481C1C}">
-                <a14:useLocalDpi xmlns:a14="http://schemas.microsoft.com/office/drawing/2010/main" val="0"/>
-              </a:ext>
-            </a:extLst>
-          </a:blip>
-          <a:stretch>
-            <a:fillRect/>
-          </a:stretch>
-        </p:blipFill>
-        <p:spPr>
-          <a:xfrm>
-            <a:off x="215153" y="1472051"/>
-            <a:ext cx="8713692" cy="4081829"/>
-          </a:xfrm>
-        </p:spPr>
-      </p:pic>
-      <p:sp>
-        <p:nvSpPr>
-          <p:cNvPr id="4" name="Slide Number Placeholder 3"/>
-          <p:cNvSpPr>
-            <a:spLocks noGrp="1"/>
-          </p:cNvSpPr>
-          <p:nvPr>
-            <p:ph type="sldNum" sz="quarter" idx="12"/>
-          </p:nvPr>
-        </p:nvSpPr>
-        <p:spPr/>
-        <p:txBody>
-          <a:bodyPr/>
-          <a:lstStyle/>
-          <a:p>
-            <a:pPr>
-              <a:defRPr/>
-            </a:pPr>
-            <a:fld id="{486618C1-054C-4E1D-BC19-6E8A9BAB5F99}" type="slidenum">
-              <a:rPr lang="en-US" smtClean="0"/>
-              <a:pPr>
-                <a:defRPr/>
-              </a:pPr>
-              <a:t>34</a:t>
-            </a:fld>
-            <a:endParaRPr lang="en-US"/>
-          </a:p>
-        </p:txBody>
-      </p:sp>
-    </p:spTree>
-    <p:extLst>
-      <p:ext uri="{BB962C8B-B14F-4D97-AF65-F5344CB8AC3E}">
-        <p14:creationId xmlns:p14="http://schemas.microsoft.com/office/powerpoint/2010/main" val="2457184408"/>
       </p:ext>
     </p:extLst>
   </p:cSld>
@@ -9429,19 +9411,53 @@
             <p:ph type="title"/>
           </p:nvPr>
         </p:nvSpPr>
-        <p:spPr/>
+        <p:spPr>
+          <a:xfrm>
+            <a:off x="215153" y="126338"/>
+            <a:ext cx="8928847" cy="604198"/>
+          </a:xfrm>
+        </p:spPr>
         <p:txBody>
           <a:bodyPr/>
           <a:lstStyle/>
           <a:p>
             <a:r>
               <a:rPr lang="en-US" dirty="0" smtClean="0"/>
-              <a:t>Giải thích sự biến đổi</a:t>
+              <a:t>Đánh giá Non-invertible Transform(FRR và FAR)</a:t>
             </a:r>
             <a:endParaRPr lang="en-US" dirty="0"/>
           </a:p>
         </p:txBody>
       </p:sp>
+      <p:pic>
+        <p:nvPicPr>
+          <p:cNvPr id="5" name="Content Placeholder 4"/>
+          <p:cNvPicPr>
+            <a:picLocks noGrp="1" noChangeAspect="1"/>
+          </p:cNvPicPr>
+          <p:nvPr>
+            <p:ph idx="1"/>
+          </p:nvPr>
+        </p:nvPicPr>
+        <p:blipFill>
+          <a:blip r:embed="rId2">
+            <a:extLst>
+              <a:ext uri="{28A0092B-C50C-407E-A947-70E740481C1C}">
+                <a14:useLocalDpi xmlns:a14="http://schemas.microsoft.com/office/drawing/2010/main" val="0"/>
+              </a:ext>
+            </a:extLst>
+          </a:blip>
+          <a:stretch>
+            <a:fillRect/>
+          </a:stretch>
+        </p:blipFill>
+        <p:spPr>
+          <a:xfrm>
+            <a:off x="215153" y="1472051"/>
+            <a:ext cx="8713692" cy="4081829"/>
+          </a:xfrm>
+        </p:spPr>
+      </p:pic>
       <p:sp>
         <p:nvSpPr>
           <p:cNvPr id="4" name="Slide Number Placeholder 3"/>
@@ -9466,6 +9482,98 @@
                 <a:defRPr/>
               </a:pPr>
               <a:t>35</a:t>
+            </a:fld>
+            <a:endParaRPr lang="en-US"/>
+          </a:p>
+        </p:txBody>
+      </p:sp>
+    </p:spTree>
+    <p:extLst>
+      <p:ext uri="{BB962C8B-B14F-4D97-AF65-F5344CB8AC3E}">
+        <p14:creationId xmlns:p14="http://schemas.microsoft.com/office/powerpoint/2010/main" val="2457184408"/>
+      </p:ext>
+    </p:extLst>
+  </p:cSld>
+  <p:clrMapOvr>
+    <a:masterClrMapping/>
+  </p:clrMapOvr>
+  <p:transition spd="med">
+    <p:fade/>
+  </p:transition>
+  <p:timing>
+    <p:tnLst>
+      <p:par>
+        <p:cTn id="1" dur="indefinite" restart="never" nodeType="tmRoot"/>
+      </p:par>
+    </p:tnLst>
+  </p:timing>
+</p:sld>
+</file>
+
+<file path=ppt/slides/slide36.xml><?xml version="1.0" encoding="utf-8"?>
+<p:sld xmlns:a="http://schemas.openxmlformats.org/drawingml/2006/main" xmlns:r="http://schemas.openxmlformats.org/officeDocument/2006/relationships" xmlns:p="http://schemas.openxmlformats.org/presentationml/2006/main">
+  <p:cSld>
+    <p:spTree>
+      <p:nvGrpSpPr>
+        <p:cNvPr id="1" name=""/>
+        <p:cNvGrpSpPr/>
+        <p:nvPr/>
+      </p:nvGrpSpPr>
+      <p:grpSpPr>
+        <a:xfrm>
+          <a:off x="0" y="0"/>
+          <a:ext cx="0" cy="0"/>
+          <a:chOff x="0" y="0"/>
+          <a:chExt cx="0" cy="0"/>
+        </a:xfrm>
+      </p:grpSpPr>
+      <p:sp>
+        <p:nvSpPr>
+          <p:cNvPr id="2" name="Title 1"/>
+          <p:cNvSpPr>
+            <a:spLocks noGrp="1"/>
+          </p:cNvSpPr>
+          <p:nvPr>
+            <p:ph type="title"/>
+          </p:nvPr>
+        </p:nvSpPr>
+        <p:spPr/>
+        <p:txBody>
+          <a:bodyPr/>
+          <a:lstStyle/>
+          <a:p>
+            <a:r>
+              <a:rPr lang="en-US" dirty="0" smtClean="0"/>
+              <a:t>Giải thích sự biến đổi</a:t>
+            </a:r>
+            <a:endParaRPr lang="en-US" dirty="0"/>
+          </a:p>
+        </p:txBody>
+      </p:sp>
+      <p:sp>
+        <p:nvSpPr>
+          <p:cNvPr id="4" name="Slide Number Placeholder 3"/>
+          <p:cNvSpPr>
+            <a:spLocks noGrp="1"/>
+          </p:cNvSpPr>
+          <p:nvPr>
+            <p:ph type="sldNum" sz="quarter" idx="12"/>
+          </p:nvPr>
+        </p:nvSpPr>
+        <p:spPr/>
+        <p:txBody>
+          <a:bodyPr/>
+          <a:lstStyle/>
+          <a:p>
+            <a:pPr>
+              <a:defRPr/>
+            </a:pPr>
+            <a:fld id="{486618C1-054C-4E1D-BC19-6E8A9BAB5F99}" type="slidenum">
+              <a:rPr lang="en-US" smtClean="0"/>
+              <a:pPr>
+                <a:defRPr/>
+              </a:pPr>
+              <a:t>36</a:t>
             </a:fld>
             <a:endParaRPr lang="en-US"/>
           </a:p>
@@ -9530,7 +9638,7 @@
 </p:sld>
 </file>
 
-<file path=ppt/slides/slide36.xml><?xml version="1.0" encoding="utf-8"?>
+<file path=ppt/slides/slide37.xml><?xml version="1.0" encoding="utf-8"?>
 <p:sld xmlns:a="http://schemas.openxmlformats.org/drawingml/2006/main" xmlns:r="http://schemas.openxmlformats.org/officeDocument/2006/relationships" xmlns:p="http://schemas.openxmlformats.org/presentationml/2006/main">
   <p:cSld>
     <p:spTree>
@@ -9593,7 +9701,7 @@
               <a:pPr>
                 <a:defRPr/>
               </a:pPr>
-              <a:t>36</a:t>
+              <a:t>37</a:t>
             </a:fld>
             <a:endParaRPr lang="en-US"/>
           </a:p>
@@ -9659,144 +9767,6 @@
 </p:sld>
 </file>
 
-<file path=ppt/slides/slide37.xml><?xml version="1.0" encoding="utf-8"?>
-<p:sld xmlns:a="http://schemas.openxmlformats.org/drawingml/2006/main" xmlns:r="http://schemas.openxmlformats.org/officeDocument/2006/relationships" xmlns:p="http://schemas.openxmlformats.org/presentationml/2006/main">
-  <p:cSld>
-    <p:spTree>
-      <p:nvGrpSpPr>
-        <p:cNvPr id="1" name=""/>
-        <p:cNvGrpSpPr/>
-        <p:nvPr/>
-      </p:nvGrpSpPr>
-      <p:grpSpPr>
-        <a:xfrm>
-          <a:off x="0" y="0"/>
-          <a:ext cx="0" cy="0"/>
-          <a:chOff x="0" y="0"/>
-          <a:chExt cx="0" cy="0"/>
-        </a:xfrm>
-      </p:grpSpPr>
-      <p:sp>
-        <p:nvSpPr>
-          <p:cNvPr id="2" name="Title 1"/>
-          <p:cNvSpPr>
-            <a:spLocks noGrp="1"/>
-          </p:cNvSpPr>
-          <p:nvPr>
-            <p:ph type="title"/>
-          </p:nvPr>
-        </p:nvSpPr>
-        <p:spPr/>
-        <p:txBody>
-          <a:bodyPr/>
-          <a:lstStyle/>
-          <a:p>
-            <a:r>
-              <a:rPr lang="en-US" dirty="0" smtClean="0"/>
-              <a:t>Nội dung</a:t>
-            </a:r>
-            <a:endParaRPr lang="en-US" dirty="0"/>
-          </a:p>
-        </p:txBody>
-      </p:sp>
-      <p:sp>
-        <p:nvSpPr>
-          <p:cNvPr id="3" name="Content Placeholder 2"/>
-          <p:cNvSpPr>
-            <a:spLocks noGrp="1"/>
-          </p:cNvSpPr>
-          <p:nvPr>
-            <p:ph idx="1"/>
-          </p:nvPr>
-        </p:nvSpPr>
-        <p:spPr/>
-        <p:txBody>
-          <a:bodyPr/>
-          <a:lstStyle/>
-          <a:p>
-            <a:r>
-              <a:rPr lang="en-US" dirty="0" smtClean="0"/>
-              <a:t>Giới thiệu đề tài</a:t>
-            </a:r>
-          </a:p>
-          <a:p>
-            <a:r>
-              <a:rPr lang="en-US" dirty="0" smtClean="0"/>
-              <a:t>Sinh trắc</a:t>
-            </a:r>
-          </a:p>
-          <a:p>
-            <a:r>
-              <a:rPr lang="en-US" dirty="0" smtClean="0"/>
-              <a:t>Kĩ thuật bảo vệ mẫu sinh trắc</a:t>
-            </a:r>
-          </a:p>
-          <a:p>
-            <a:r>
-              <a:rPr lang="en-US" dirty="0" smtClean="0"/>
-              <a:t>Mô hình đề xuất</a:t>
-            </a:r>
-          </a:p>
-          <a:p>
-            <a:r>
-              <a:rPr lang="en-US" dirty="0" smtClean="0"/>
-              <a:t>Đánh giá</a:t>
-            </a:r>
-          </a:p>
-          <a:p>
-            <a:r>
-              <a:rPr lang="en-US" b="1" dirty="0" smtClean="0"/>
-              <a:t>Kết luận</a:t>
-            </a:r>
-            <a:endParaRPr lang="en-US" b="1" dirty="0"/>
-          </a:p>
-        </p:txBody>
-      </p:sp>
-      <p:sp>
-        <p:nvSpPr>
-          <p:cNvPr id="4" name="Slide Number Placeholder 3"/>
-          <p:cNvSpPr>
-            <a:spLocks noGrp="1"/>
-          </p:cNvSpPr>
-          <p:nvPr>
-            <p:ph type="sldNum" sz="quarter" idx="12"/>
-          </p:nvPr>
-        </p:nvSpPr>
-        <p:spPr/>
-        <p:txBody>
-          <a:bodyPr/>
-          <a:lstStyle/>
-          <a:p>
-            <a:pPr>
-              <a:defRPr/>
-            </a:pPr>
-            <a:fld id="{486618C1-054C-4E1D-BC19-6E8A9BAB5F99}" type="slidenum">
-              <a:rPr lang="en-US" smtClean="0"/>
-              <a:pPr>
-                <a:defRPr/>
-              </a:pPr>
-              <a:t>37</a:t>
-            </a:fld>
-            <a:endParaRPr lang="en-US"/>
-          </a:p>
-        </p:txBody>
-      </p:sp>
-    </p:spTree>
-    <p:extLst>
-      <p:ext uri="{BB962C8B-B14F-4D97-AF65-F5344CB8AC3E}">
-        <p14:creationId xmlns:p14="http://schemas.microsoft.com/office/powerpoint/2010/main" val="2106403091"/>
-      </p:ext>
-    </p:extLst>
-  </p:cSld>
-  <p:clrMapOvr>
-    <a:masterClrMapping/>
-  </p:clrMapOvr>
-  <p:transition spd="med">
-    <p:fade/>
-  </p:transition>
-</p:sld>
-</file>
-
 <file path=ppt/slides/slide38.xml><?xml version="1.0" encoding="utf-8"?>
 <p:sld xmlns:a="http://schemas.openxmlformats.org/drawingml/2006/main" xmlns:r="http://schemas.openxmlformats.org/officeDocument/2006/relationships" xmlns:p="http://schemas.openxmlformats.org/presentationml/2006/main">
   <p:cSld>
@@ -9831,44 +9801,62 @@
           <a:p>
             <a:r>
               <a:rPr lang="en-US" dirty="0" smtClean="0"/>
+              <a:t>Nội dung</a:t>
+            </a:r>
+            <a:endParaRPr lang="en-US" dirty="0"/>
+          </a:p>
+        </p:txBody>
+      </p:sp>
+      <p:sp>
+        <p:nvSpPr>
+          <p:cNvPr id="3" name="Content Placeholder 2"/>
+          <p:cNvSpPr>
+            <a:spLocks noGrp="1"/>
+          </p:cNvSpPr>
+          <p:nvPr>
+            <p:ph idx="1"/>
+          </p:nvPr>
+        </p:nvSpPr>
+        <p:spPr/>
+        <p:txBody>
+          <a:bodyPr/>
+          <a:lstStyle/>
+          <a:p>
+            <a:r>
+              <a:rPr lang="en-US" dirty="0" smtClean="0"/>
+              <a:t>Giới thiệu đề tài</a:t>
+            </a:r>
+          </a:p>
+          <a:p>
+            <a:r>
+              <a:rPr lang="en-US" dirty="0" smtClean="0"/>
+              <a:t>Sinh trắc</a:t>
+            </a:r>
+          </a:p>
+          <a:p>
+            <a:r>
+              <a:rPr lang="en-US" dirty="0" smtClean="0"/>
+              <a:t>Kĩ thuật bảo vệ mẫu sinh trắc</a:t>
+            </a:r>
+          </a:p>
+          <a:p>
+            <a:r>
+              <a:rPr lang="en-US" dirty="0" smtClean="0"/>
+              <a:t>Mô hình đề xuất</a:t>
+            </a:r>
+          </a:p>
+          <a:p>
+            <a:r>
+              <a:rPr lang="en-US" dirty="0" smtClean="0"/>
+              <a:t>Đánh giá</a:t>
+            </a:r>
+          </a:p>
+          <a:p>
+            <a:r>
+              <a:rPr lang="en-US" b="1" dirty="0" smtClean="0"/>
               <a:t>Kết luận</a:t>
             </a:r>
-            <a:endParaRPr lang="en-US" dirty="0"/>
-          </a:p>
-        </p:txBody>
-      </p:sp>
-      <p:sp>
-        <p:nvSpPr>
-          <p:cNvPr id="3" name="Content Placeholder 2"/>
-          <p:cNvSpPr>
-            <a:spLocks noGrp="1"/>
-          </p:cNvSpPr>
-          <p:nvPr>
-            <p:ph idx="1"/>
-          </p:nvPr>
-        </p:nvSpPr>
-        <p:spPr/>
-        <p:txBody>
-          <a:bodyPr/>
-          <a:lstStyle/>
-          <a:p>
-            <a:r>
-              <a:rPr lang="en-US" dirty="0" smtClean="0"/>
-              <a:t>Kết quả thu được khá khả quan, với chỉ số sai lệch khoản hơn 8% thì đây có thể được xem là khá tốt.</a:t>
-            </a:r>
-          </a:p>
-          <a:p>
-            <a:r>
-              <a:rPr lang="en-US" dirty="0" smtClean="0"/>
-              <a:t>Hiệu suất chương trình gần như không thay đổi so với hệ thống cũ vì tuy giải thuật hơi phức tạp như độ khó của phép tính không quá cao và phép nhân hai ma trận cũng không tốn nhiều tài nguyên vì đây là nhân với ma trận trực giao.</a:t>
-            </a:r>
-          </a:p>
-          <a:p>
-            <a:r>
-              <a:rPr lang="en-US" dirty="0" smtClean="0"/>
-              <a:t>Hướng phát triển.</a:t>
-            </a:r>
-            <a:endParaRPr lang="en-US" dirty="0"/>
+            <a:endParaRPr lang="en-US" b="1" dirty="0"/>
           </a:p>
         </p:txBody>
       </p:sp>
@@ -9896,6 +9884,126 @@
                 <a:defRPr/>
               </a:pPr>
               <a:t>38</a:t>
+            </a:fld>
+            <a:endParaRPr lang="en-US"/>
+          </a:p>
+        </p:txBody>
+      </p:sp>
+    </p:spTree>
+    <p:extLst>
+      <p:ext uri="{BB962C8B-B14F-4D97-AF65-F5344CB8AC3E}">
+        <p14:creationId xmlns:p14="http://schemas.microsoft.com/office/powerpoint/2010/main" val="2106403091"/>
+      </p:ext>
+    </p:extLst>
+  </p:cSld>
+  <p:clrMapOvr>
+    <a:masterClrMapping/>
+  </p:clrMapOvr>
+  <p:transition spd="med">
+    <p:fade/>
+  </p:transition>
+</p:sld>
+</file>
+
+<file path=ppt/slides/slide39.xml><?xml version="1.0" encoding="utf-8"?>
+<p:sld xmlns:a="http://schemas.openxmlformats.org/drawingml/2006/main" xmlns:r="http://schemas.openxmlformats.org/officeDocument/2006/relationships" xmlns:p="http://schemas.openxmlformats.org/presentationml/2006/main">
+  <p:cSld>
+    <p:spTree>
+      <p:nvGrpSpPr>
+        <p:cNvPr id="1" name=""/>
+        <p:cNvGrpSpPr/>
+        <p:nvPr/>
+      </p:nvGrpSpPr>
+      <p:grpSpPr>
+        <a:xfrm>
+          <a:off x="0" y="0"/>
+          <a:ext cx="0" cy="0"/>
+          <a:chOff x="0" y="0"/>
+          <a:chExt cx="0" cy="0"/>
+        </a:xfrm>
+      </p:grpSpPr>
+      <p:sp>
+        <p:nvSpPr>
+          <p:cNvPr id="2" name="Title 1"/>
+          <p:cNvSpPr>
+            <a:spLocks noGrp="1"/>
+          </p:cNvSpPr>
+          <p:nvPr>
+            <p:ph type="title"/>
+          </p:nvPr>
+        </p:nvSpPr>
+        <p:spPr/>
+        <p:txBody>
+          <a:bodyPr/>
+          <a:lstStyle/>
+          <a:p>
+            <a:r>
+              <a:rPr lang="en-US" dirty="0" smtClean="0"/>
+              <a:t>Kết luận</a:t>
+            </a:r>
+            <a:endParaRPr lang="en-US" dirty="0"/>
+          </a:p>
+        </p:txBody>
+      </p:sp>
+      <p:sp>
+        <p:nvSpPr>
+          <p:cNvPr id="3" name="Content Placeholder 2"/>
+          <p:cNvSpPr>
+            <a:spLocks noGrp="1"/>
+          </p:cNvSpPr>
+          <p:nvPr>
+            <p:ph idx="1"/>
+          </p:nvPr>
+        </p:nvSpPr>
+        <p:spPr/>
+        <p:txBody>
+          <a:bodyPr/>
+          <a:lstStyle/>
+          <a:p>
+            <a:r>
+              <a:rPr lang="en-US" dirty="0" smtClean="0"/>
+              <a:t>Kết quả thu được khá khả quan, với chỉ số sai lệch khoản hơn 8% thì đây có thể được xem là khá tốt.</a:t>
+            </a:r>
+          </a:p>
+          <a:p>
+            <a:r>
+              <a:rPr lang="en-US" dirty="0" smtClean="0"/>
+              <a:t>Hiệu suất chương trình gần như không thay đổi so với hệ thống cũ vì tuy giải thuật hơi phức tạp như độ khó của phép tính không quá cao và phép nhân hai ma trận cũng không tốn nhiều tài nguyên vì đây là nhân với ma trận trực giao.</a:t>
+            </a:r>
+          </a:p>
+          <a:p>
+            <a:r>
+              <a:rPr lang="en-US" dirty="0" smtClean="0"/>
+              <a:t>Hướng phát triển.</a:t>
+            </a:r>
+            <a:endParaRPr lang="en-US" dirty="0"/>
+          </a:p>
+        </p:txBody>
+      </p:sp>
+      <p:sp>
+        <p:nvSpPr>
+          <p:cNvPr id="4" name="Slide Number Placeholder 3"/>
+          <p:cNvSpPr>
+            <a:spLocks noGrp="1"/>
+          </p:cNvSpPr>
+          <p:nvPr>
+            <p:ph type="sldNum" sz="quarter" idx="12"/>
+          </p:nvPr>
+        </p:nvSpPr>
+        <p:spPr/>
+        <p:txBody>
+          <a:bodyPr/>
+          <a:lstStyle/>
+          <a:p>
+            <a:pPr>
+              <a:defRPr/>
+            </a:pPr>
+            <a:fld id="{486618C1-054C-4E1D-BC19-6E8A9BAB5F99}" type="slidenum">
+              <a:rPr lang="en-US" smtClean="0"/>
+              <a:pPr>
+                <a:defRPr/>
+              </a:pPr>
+              <a:t>39</a:t>
             </a:fld>
             <a:endParaRPr lang="en-US"/>
           </a:p>
@@ -9924,7 +10032,153 @@
 </p:sld>
 </file>
 
-<file path=ppt/slides/slide39.xml><?xml version="1.0" encoding="utf-8"?>
+<file path=ppt/slides/slide4.xml><?xml version="1.0" encoding="utf-8"?>
+<p:sld xmlns:a="http://schemas.openxmlformats.org/drawingml/2006/main" xmlns:r="http://schemas.openxmlformats.org/officeDocument/2006/relationships" xmlns:p="http://schemas.openxmlformats.org/presentationml/2006/main">
+  <p:cSld>
+    <p:bg>
+      <p:bgPr>
+        <a:solidFill>
+          <a:srgbClr val="F8F8F8"/>
+        </a:solidFill>
+        <a:effectLst/>
+      </p:bgPr>
+    </p:bg>
+    <p:spTree>
+      <p:nvGrpSpPr>
+        <p:cNvPr id="1" name=""/>
+        <p:cNvGrpSpPr/>
+        <p:nvPr/>
+      </p:nvGrpSpPr>
+      <p:grpSpPr>
+        <a:xfrm>
+          <a:off x="0" y="0"/>
+          <a:ext cx="0" cy="0"/>
+          <a:chOff x="0" y="0"/>
+          <a:chExt cx="0" cy="0"/>
+        </a:xfrm>
+      </p:grpSpPr>
+      <p:sp>
+        <p:nvSpPr>
+          <p:cNvPr id="2" name="Title 1"/>
+          <p:cNvSpPr>
+            <a:spLocks noGrp="1"/>
+          </p:cNvSpPr>
+          <p:nvPr>
+            <p:ph type="title"/>
+          </p:nvPr>
+        </p:nvSpPr>
+        <p:spPr/>
+        <p:txBody>
+          <a:bodyPr/>
+          <a:lstStyle/>
+          <a:p>
+            <a:r>
+              <a:rPr lang="en-US" dirty="0" smtClean="0"/>
+              <a:t>Giới thiệu</a:t>
+            </a:r>
+            <a:endParaRPr lang="en-US" sz="3000" dirty="0"/>
+          </a:p>
+        </p:txBody>
+      </p:sp>
+      <p:sp>
+        <p:nvSpPr>
+          <p:cNvPr id="3" name="Content Placeholder 2"/>
+          <p:cNvSpPr>
+            <a:spLocks noGrp="1"/>
+          </p:cNvSpPr>
+          <p:nvPr>
+            <p:ph idx="1"/>
+          </p:nvPr>
+        </p:nvSpPr>
+        <p:spPr/>
+        <p:txBody>
+          <a:bodyPr/>
+          <a:lstStyle/>
+          <a:p>
+            <a:r>
+              <a:rPr lang="en-US" dirty="0" smtClean="0"/>
+              <a:t>Sự lỗi thời của hệ thống xác thực cũ.</a:t>
+            </a:r>
+          </a:p>
+          <a:p>
+            <a:r>
+              <a:rPr lang="en-US" sz="2800" dirty="0" smtClean="0"/>
+              <a:t>Giới hạn từ phía người dùng(pasword quá dài hoặc quá ngắn).</a:t>
+            </a:r>
+          </a:p>
+          <a:p>
+            <a:r>
+              <a:rPr lang="en-US" dirty="0" smtClean="0"/>
+              <a:t>Chưa có hệ thống nào thực sự được đưa vào thực tiễn với quy mô lớn.</a:t>
+            </a:r>
+          </a:p>
+          <a:p>
+            <a:pPr marL="0" indent="0">
+              <a:buNone/>
+            </a:pPr>
+            <a:r>
+              <a:rPr lang="en-US" dirty="0" smtClean="0"/>
+              <a:t>=&gt; Cần một hệ thống đáp ứng mọi yêu cầu bảo mật và có thể áp dụng trên thực tiễn.</a:t>
+            </a:r>
+          </a:p>
+          <a:p>
+            <a:endParaRPr lang="en-US" sz="2800" dirty="0" smtClean="0"/>
+          </a:p>
+        </p:txBody>
+      </p:sp>
+      <p:sp>
+        <p:nvSpPr>
+          <p:cNvPr id="4" name="Slide Number Placeholder 3"/>
+          <p:cNvSpPr>
+            <a:spLocks noGrp="1"/>
+          </p:cNvSpPr>
+          <p:nvPr>
+            <p:ph type="sldNum" sz="quarter" idx="12"/>
+          </p:nvPr>
+        </p:nvSpPr>
+        <p:spPr/>
+        <p:txBody>
+          <a:bodyPr/>
+          <a:lstStyle/>
+          <a:p>
+            <a:pPr>
+              <a:defRPr/>
+            </a:pPr>
+            <a:fld id="{486618C1-054C-4E1D-BC19-6E8A9BAB5F99}" type="slidenum">
+              <a:rPr lang="en-US" smtClean="0"/>
+              <a:pPr>
+                <a:defRPr/>
+              </a:pPr>
+              <a:t>4</a:t>
+            </a:fld>
+            <a:endParaRPr lang="en-US"/>
+          </a:p>
+        </p:txBody>
+      </p:sp>
+    </p:spTree>
+    <p:extLst>
+      <p:ext uri="{BB962C8B-B14F-4D97-AF65-F5344CB8AC3E}">
+        <p14:creationId xmlns:p14="http://schemas.microsoft.com/office/powerpoint/2010/main" val="3603639932"/>
+      </p:ext>
+    </p:extLst>
+  </p:cSld>
+  <p:clrMapOvr>
+    <a:masterClrMapping/>
+  </p:clrMapOvr>
+  <p:transition spd="med">
+    <p:fade/>
+  </p:transition>
+  <p:timing>
+    <p:tnLst>
+      <p:par>
+        <p:cTn id="1" dur="indefinite" restart="never" nodeType="tmRoot"/>
+      </p:par>
+    </p:tnLst>
+  </p:timing>
+</p:sld>
+</file>
+
+<file path=ppt/slides/slide40.xml><?xml version="1.0" encoding="utf-8"?>
 <p:sld xmlns:a="http://schemas.openxmlformats.org/drawingml/2006/main" xmlns:r="http://schemas.openxmlformats.org/officeDocument/2006/relationships" xmlns:p="http://schemas.openxmlformats.org/presentationml/2006/main">
   <p:cSld>
     <p:spTree>
@@ -10285,159 +10539,13 @@
               <a:pPr>
                 <a:defRPr/>
               </a:pPr>
-              <a:t>39</a:t>
+              <a:t>40</a:t>
             </a:fld>
             <a:endParaRPr lang="en-US"/>
           </a:p>
         </p:txBody>
       </p:sp>
     </p:spTree>
-  </p:cSld>
-  <p:clrMapOvr>
-    <a:masterClrMapping/>
-  </p:clrMapOvr>
-  <p:transition spd="med">
-    <p:fade/>
-  </p:transition>
-  <p:timing>
-    <p:tnLst>
-      <p:par>
-        <p:cTn id="1" dur="indefinite" restart="never" nodeType="tmRoot"/>
-      </p:par>
-    </p:tnLst>
-  </p:timing>
-</p:sld>
-</file>
-
-<file path=ppt/slides/slide4.xml><?xml version="1.0" encoding="utf-8"?>
-<p:sld xmlns:a="http://schemas.openxmlformats.org/drawingml/2006/main" xmlns:r="http://schemas.openxmlformats.org/officeDocument/2006/relationships" xmlns:p="http://schemas.openxmlformats.org/presentationml/2006/main">
-  <p:cSld>
-    <p:bg>
-      <p:bgPr>
-        <a:solidFill>
-          <a:srgbClr val="F8F8F8"/>
-        </a:solidFill>
-        <a:effectLst/>
-      </p:bgPr>
-    </p:bg>
-    <p:spTree>
-      <p:nvGrpSpPr>
-        <p:cNvPr id="1" name=""/>
-        <p:cNvGrpSpPr/>
-        <p:nvPr/>
-      </p:nvGrpSpPr>
-      <p:grpSpPr>
-        <a:xfrm>
-          <a:off x="0" y="0"/>
-          <a:ext cx="0" cy="0"/>
-          <a:chOff x="0" y="0"/>
-          <a:chExt cx="0" cy="0"/>
-        </a:xfrm>
-      </p:grpSpPr>
-      <p:sp>
-        <p:nvSpPr>
-          <p:cNvPr id="2" name="Title 1"/>
-          <p:cNvSpPr>
-            <a:spLocks noGrp="1"/>
-          </p:cNvSpPr>
-          <p:nvPr>
-            <p:ph type="title"/>
-          </p:nvPr>
-        </p:nvSpPr>
-        <p:spPr/>
-        <p:txBody>
-          <a:bodyPr/>
-          <a:lstStyle/>
-          <a:p>
-            <a:r>
-              <a:rPr lang="en-US" dirty="0" smtClean="0"/>
-              <a:t>Giới thiệu</a:t>
-            </a:r>
-            <a:endParaRPr lang="en-US" sz="3000" dirty="0"/>
-          </a:p>
-        </p:txBody>
-      </p:sp>
-      <p:sp>
-        <p:nvSpPr>
-          <p:cNvPr id="3" name="Content Placeholder 2"/>
-          <p:cNvSpPr>
-            <a:spLocks noGrp="1"/>
-          </p:cNvSpPr>
-          <p:nvPr>
-            <p:ph idx="1"/>
-          </p:nvPr>
-        </p:nvSpPr>
-        <p:spPr/>
-        <p:txBody>
-          <a:bodyPr/>
-          <a:lstStyle/>
-          <a:p>
-            <a:r>
-              <a:rPr lang="en-US" dirty="0" smtClean="0"/>
-              <a:t>Sự lỗi thời của hệ thống xác thực cũ.</a:t>
-            </a:r>
-          </a:p>
-          <a:p>
-            <a:r>
-              <a:rPr lang="en-US" sz="2800" dirty="0" smtClean="0"/>
-              <a:t>Giới hạn từ phía người dùng(pasword quá dài hoặc quá ngắn).</a:t>
-            </a:r>
-          </a:p>
-          <a:p>
-            <a:r>
-              <a:rPr lang="en-US" dirty="0" smtClean="0"/>
-              <a:t>Chưa có hệ thống nào thực sự được đưa vào thực tiễn với quy mô lớn.</a:t>
-            </a:r>
-          </a:p>
-          <a:p>
-            <a:pPr marL="0" indent="0">
-              <a:buNone/>
-            </a:pPr>
-            <a:r>
-              <a:rPr lang="en-US" dirty="0" smtClean="0"/>
-              <a:t>=&gt; Cần một hệ thống đáp ứng mọi yêu cầu bảo mật và có thể áp dụng trên thực tiễn.</a:t>
-            </a:r>
-          </a:p>
-          <a:p>
-            <a:endParaRPr lang="en-US" sz="2800" dirty="0" smtClean="0"/>
-          </a:p>
-        </p:txBody>
-      </p:sp>
-      <p:sp>
-        <p:nvSpPr>
-          <p:cNvPr id="4" name="Slide Number Placeholder 3"/>
-          <p:cNvSpPr>
-            <a:spLocks noGrp="1"/>
-          </p:cNvSpPr>
-          <p:nvPr>
-            <p:ph type="sldNum" sz="quarter" idx="12"/>
-          </p:nvPr>
-        </p:nvSpPr>
-        <p:spPr/>
-        <p:txBody>
-          <a:bodyPr/>
-          <a:lstStyle/>
-          <a:p>
-            <a:pPr>
-              <a:defRPr/>
-            </a:pPr>
-            <a:fld id="{486618C1-054C-4E1D-BC19-6E8A9BAB5F99}" type="slidenum">
-              <a:rPr lang="en-US" smtClean="0"/>
-              <a:pPr>
-                <a:defRPr/>
-              </a:pPr>
-              <a:t>4</a:t>
-            </a:fld>
-            <a:endParaRPr lang="en-US"/>
-          </a:p>
-        </p:txBody>
-      </p:sp>
-    </p:spTree>
-    <p:extLst>
-      <p:ext uri="{BB962C8B-B14F-4D97-AF65-F5344CB8AC3E}">
-        <p14:creationId xmlns:p14="http://schemas.microsoft.com/office/powerpoint/2010/main" val="3603639932"/>
-      </p:ext>
-    </p:extLst>
   </p:cSld>
   <p:clrMapOvr>
     <a:masterClrMapping/>
@@ -12907,6 +13015,15 @@
 </file>
 
 <file path=customXml/item1.xml><?xml version="1.0" encoding="utf-8"?>
+<p:properties xmlns:p="http://schemas.microsoft.com/office/2006/metadata/properties" xmlns:xsi="http://www.w3.org/2001/XMLSchema-instance" xmlns:pc="http://schemas.microsoft.com/office/infopath/2007/PartnerControls">
+  <documentManagement>
+    <N_x1ed9_i_x0020_dung_x0020_v_x1eaf_n_x0020_t_x1eaf_t xmlns="f5d0caf3-682d-4511-bb09-f534ff9a8d59">Quy định soạn thảo và mẫu tài liệu Slide</N_x1ed9_i_x0020_dung_x0020_v_x1eaf_n_x0020_t_x1eaf_t>
+    <Ng_x00e0_y_x0020_ban_x0020_h_x00e0_nh xmlns="f5d0caf3-682d-4511-bb09-f534ff9a8d59">2013-06-18T17:00:00+00:00</Ng_x00e0_y_x0020_ban_x0020_h_x00e0_nh>
+  </documentManagement>
+</p:properties>
+</file>
+
+<file path=customXml/item2.xml><?xml version="1.0" encoding="utf-8"?>
 <ct:contentTypeSchema xmlns:ct="http://schemas.microsoft.com/office/2006/metadata/contentType" xmlns:ma="http://schemas.microsoft.com/office/2006/metadata/properties/metaAttributes" ct:_="" ma:_="" ma:contentTypeName="Document" ma:contentTypeID="0x010100A5C46A0FE39FF64D8E7CA40201285CFB" ma:contentTypeVersion="2" ma:contentTypeDescription="Create a new document." ma:contentTypeScope="" ma:versionID="7769227c9d869afbca44a997b860d24e">
   <xsd:schema xmlns:xsd="http://www.w3.org/2001/XMLSchema" xmlns:xs="http://www.w3.org/2001/XMLSchema" xmlns:p="http://schemas.microsoft.com/office/2006/metadata/properties" xmlns:ns2="f5d0caf3-682d-4511-bb09-f534ff9a8d59" targetNamespace="http://schemas.microsoft.com/office/2006/metadata/properties" ma:root="true" ma:fieldsID="f74a8646942e335a3fc7e56a4aa8bfe5" ns2:_="">
     <xsd:import namespace="f5d0caf3-682d-4511-bb09-f534ff9a8d59"/>
@@ -13040,15 +13157,6 @@
 </ct:contentTypeSchema>
 </file>
 
-<file path=customXml/item2.xml><?xml version="1.0" encoding="utf-8"?>
-<p:properties xmlns:p="http://schemas.microsoft.com/office/2006/metadata/properties" xmlns:xsi="http://www.w3.org/2001/XMLSchema-instance" xmlns:pc="http://schemas.microsoft.com/office/infopath/2007/PartnerControls">
-  <documentManagement>
-    <N_x1ed9_i_x0020_dung_x0020_v_x1eaf_n_x0020_t_x1eaf_t xmlns="f5d0caf3-682d-4511-bb09-f534ff9a8d59">Quy định soạn thảo và mẫu tài liệu Slide</N_x1ed9_i_x0020_dung_x0020_v_x1eaf_n_x0020_t_x1eaf_t>
-    <Ng_x00e0_y_x0020_ban_x0020_h_x00e0_nh xmlns="f5d0caf3-682d-4511-bb09-f534ff9a8d59">2013-06-18T17:00:00+00:00</Ng_x00e0_y_x0020_ban_x0020_h_x00e0_nh>
-  </documentManagement>
-</p:properties>
-</file>
-
 <file path=customXml/item3.xml><?xml version="1.0" encoding="utf-8"?>
 <?mso-contentType ?>
 <FormTemplates xmlns="http://schemas.microsoft.com/sharepoint/v3/contenttype/forms">
@@ -13059,6 +13167,22 @@
 </file>
 
 <file path=customXml/itemProps1.xml><?xml version="1.0" encoding="utf-8"?>
+<ds:datastoreItem xmlns:ds="http://schemas.openxmlformats.org/officeDocument/2006/customXml" ds:itemID="{56DAF02F-E1F5-415E-B21E-A647B8A5E393}">
+  <ds:schemaRefs>
+    <ds:schemaRef ds:uri="http://schemas.openxmlformats.org/package/2006/metadata/core-properties"/>
+    <ds:schemaRef ds:uri="f5d0caf3-682d-4511-bb09-f534ff9a8d59"/>
+    <ds:schemaRef ds:uri="http://schemas.microsoft.com/office/infopath/2007/PartnerControls"/>
+    <ds:schemaRef ds:uri="http://purl.org/dc/dcmitype/"/>
+    <ds:schemaRef ds:uri="http://purl.org/dc/elements/1.1/"/>
+    <ds:schemaRef ds:uri="http://schemas.microsoft.com/office/2006/documentManagement/types"/>
+    <ds:schemaRef ds:uri="http://purl.org/dc/terms/"/>
+    <ds:schemaRef ds:uri="http://schemas.microsoft.com/office/2006/metadata/properties"/>
+    <ds:schemaRef ds:uri="http://www.w3.org/XML/1998/namespace"/>
+  </ds:schemaRefs>
+</ds:datastoreItem>
+</file>
+
+<file path=customXml/itemProps2.xml><?xml version="1.0" encoding="utf-8"?>
 <ds:datastoreItem xmlns:ds="http://schemas.openxmlformats.org/officeDocument/2006/customXml" ds:itemID="{108A4DCC-84DE-4465-8BA6-9916E65DA385}">
   <ds:schemaRefs>
     <ds:schemaRef ds:uri="http://schemas.microsoft.com/office/2006/metadata/contentType"/>
@@ -13076,22 +13200,6 @@
 </ds:datastoreItem>
 </file>
 
-<file path=customXml/itemProps2.xml><?xml version="1.0" encoding="utf-8"?>
-<ds:datastoreItem xmlns:ds="http://schemas.openxmlformats.org/officeDocument/2006/customXml" ds:itemID="{56DAF02F-E1F5-415E-B21E-A647B8A5E393}">
-  <ds:schemaRefs>
-    <ds:schemaRef ds:uri="http://schemas.openxmlformats.org/package/2006/metadata/core-properties"/>
-    <ds:schemaRef ds:uri="f5d0caf3-682d-4511-bb09-f534ff9a8d59"/>
-    <ds:schemaRef ds:uri="http://schemas.microsoft.com/office/infopath/2007/PartnerControls"/>
-    <ds:schemaRef ds:uri="http://purl.org/dc/dcmitype/"/>
-    <ds:schemaRef ds:uri="http://purl.org/dc/elements/1.1/"/>
-    <ds:schemaRef ds:uri="http://schemas.microsoft.com/office/2006/documentManagement/types"/>
-    <ds:schemaRef ds:uri="http://purl.org/dc/terms/"/>
-    <ds:schemaRef ds:uri="http://schemas.microsoft.com/office/2006/metadata/properties"/>
-    <ds:schemaRef ds:uri="http://www.w3.org/XML/1998/namespace"/>
-  </ds:schemaRefs>
-</ds:datastoreItem>
-</file>
-
 <file path=customXml/itemProps3.xml><?xml version="1.0" encoding="utf-8"?>
 <ds:datastoreItem xmlns:ds="http://schemas.openxmlformats.org/officeDocument/2006/customXml" ds:itemID="{C89A9221-F11E-42DD-868A-EF57A2B6C81B}">
   <ds:schemaRefs>

</xml_diff>